<commit_message>
slides: add requested pictures for client and job master
</commit_message>
<xml_diff>
--- a/slides/flink_overview.pptx
+++ b/slides/flink_overview.pptx
@@ -241,7 +241,7 @@
           <a:p>
             <a:fld id="{F01141F9-3E73-7448-86C2-E96D93FE379F}" type="datetimeFigureOut">
               <a:rPr lang="en-US" smtClean="0"/>
-              <a:t>6/1/15</a:t>
+              <a:t>01/06/15</a:t>
             </a:fld>
             <a:endParaRPr lang="en-US"/>
           </a:p>
@@ -20833,7 +20833,12 @@
             <p:ph idx="1"/>
           </p:nvPr>
         </p:nvSpPr>
-        <p:spPr/>
+        <p:spPr>
+          <a:xfrm>
+            <a:off x="457200" y="1474376"/>
+            <a:ext cx="8229600" cy="2819726"/>
+          </a:xfrm>
+        </p:spPr>
         <p:txBody>
           <a:bodyPr/>
           <a:lstStyle/>
@@ -20850,11 +20855,19 @@
             </a:r>
             <a:r>
               <a:rPr lang="en-US" dirty="0"/>
-              <a:t>Job </a:t>
+              <a:t>j</a:t>
             </a:r>
             <a:r>
               <a:rPr lang="en-US" dirty="0" smtClean="0"/>
-              <a:t>Graph</a:t>
+              <a:t>ob </a:t>
+            </a:r>
+            <a:r>
+              <a:rPr lang="en-US" dirty="0"/>
+              <a:t>g</a:t>
+            </a:r>
+            <a:r>
+              <a:rPr lang="en-US" dirty="0" smtClean="0"/>
+              <a:t>raph</a:t>
             </a:r>
           </a:p>
           <a:p>
@@ -20863,12 +20876,26 @@
               <a:t>Pass </a:t>
             </a:r>
             <a:r>
-              <a:rPr lang="en-US" dirty="0" err="1" smtClean="0"/>
-              <a:t>JobGraph</a:t>
+              <a:rPr lang="en-US" dirty="0"/>
+              <a:t>j</a:t>
             </a:r>
             <a:r>
               <a:rPr lang="en-US" dirty="0" smtClean="0"/>
-              <a:t> to Job Master</a:t>
+              <a:t>ob </a:t>
+            </a:r>
+            <a:r>
+              <a:rPr lang="en-US" dirty="0"/>
+              <a:t>g</a:t>
+            </a:r>
+            <a:r>
+              <a:rPr lang="en-US" dirty="0" smtClean="0"/>
+              <a:t>raph to job manager</a:t>
+            </a:r>
+          </a:p>
+          <a:p>
+            <a:r>
+              <a:rPr lang="en-US" dirty="0" smtClean="0"/>
+              <a:t>Retrieve job results</a:t>
             </a:r>
           </a:p>
         </p:txBody>
@@ -20899,7 +20926,7 @@
               <a:pPr/>
               <a:t>24</a:t>
             </a:fld>
-            <a:endParaRPr lang="en-US">
+            <a:endParaRPr lang="en-US" dirty="0">
               <a:solidFill>
                 <a:prstClr val="black">
                   <a:tint val="75000"/>
@@ -20909,44 +20936,986 @@
           </a:p>
         </p:txBody>
       </p:sp>
-      <p:sp>
-        <p:nvSpPr>
-          <p:cNvPr id="5" name="TextBox 4"/>
-          <p:cNvSpPr txBox="1"/>
+      <p:grpSp>
+        <p:nvGrpSpPr>
+          <p:cNvPr id="10" name="Group 9"/>
+          <p:cNvGrpSpPr/>
           <p:nvPr/>
-        </p:nvSpPr>
+        </p:nvGrpSpPr>
+        <p:grpSpPr>
+          <a:xfrm>
+            <a:off x="487762" y="4613826"/>
+            <a:ext cx="1528592" cy="1017434"/>
+            <a:chOff x="3373667" y="1260828"/>
+            <a:chExt cx="1528592" cy="1017434"/>
+          </a:xfrm>
+        </p:grpSpPr>
+        <p:sp>
+          <p:nvSpPr>
+            <p:cNvPr id="11" name="Rectangle 10"/>
+            <p:cNvSpPr/>
+            <p:nvPr/>
+          </p:nvSpPr>
+          <p:spPr>
+            <a:xfrm>
+              <a:off x="3892424" y="1260828"/>
+              <a:ext cx="1009835" cy="621565"/>
+            </a:xfrm>
+            <a:prstGeom prst="rect">
+              <a:avLst/>
+            </a:prstGeom>
+            <a:solidFill>
+              <a:srgbClr val="98C1B5"/>
+            </a:solidFill>
+          </p:spPr>
+          <p:style>
+            <a:lnRef idx="1">
+              <a:schemeClr val="accent1"/>
+            </a:lnRef>
+            <a:fillRef idx="3">
+              <a:schemeClr val="accent1"/>
+            </a:fillRef>
+            <a:effectRef idx="2">
+              <a:schemeClr val="accent1"/>
+            </a:effectRef>
+            <a:fontRef idx="minor">
+              <a:schemeClr val="lt1"/>
+            </a:fontRef>
+          </p:style>
+          <p:txBody>
+            <a:bodyPr rtlCol="0" anchor="ctr"/>
+            <a:lstStyle/>
+            <a:p>
+              <a:pPr algn="ctr"/>
+              <a:endParaRPr lang="en-US" sz="2800" dirty="0" smtClean="0"/>
+            </a:p>
+          </p:txBody>
+        </p:sp>
+        <p:pic>
+          <p:nvPicPr>
+            <p:cNvPr id="12" name="Picture 21" descr="C:\Users\warneke\AppData\Local\Microsoft\Windows\Temporary Internet Files\Content.IE5\X8LGV7F5\MCj04348450000[1].png"/>
+            <p:cNvPicPr>
+              <a:picLocks noChangeAspect="1" noChangeArrowheads="1"/>
+            </p:cNvPicPr>
+            <p:nvPr/>
+          </p:nvPicPr>
+          <p:blipFill>
+            <a:blip r:embed="rId2" cstate="screen">
+              <a:extLst>
+                <a:ext uri="{28A0092B-C50C-407E-A947-70E740481C1C}">
+                  <a14:useLocalDpi xmlns:a14="http://schemas.microsoft.com/office/drawing/2010/main"/>
+                </a:ext>
+              </a:extLst>
+            </a:blip>
+            <a:srcRect/>
+            <a:stretch>
+              <a:fillRect/>
+            </a:stretch>
+          </p:blipFill>
+          <p:spPr bwMode="auto">
+            <a:xfrm flipH="1">
+              <a:off x="3373667" y="1558182"/>
+              <a:ext cx="843958" cy="720080"/>
+            </a:xfrm>
+            <a:prstGeom prst="rect">
+              <a:avLst/>
+            </a:prstGeom>
+            <a:noFill/>
+            <a:ln w="9525">
+              <a:noFill/>
+              <a:miter lim="800000"/>
+              <a:headEnd/>
+              <a:tailEnd/>
+            </a:ln>
+          </p:spPr>
+        </p:pic>
+        <p:sp>
+          <p:nvSpPr>
+            <p:cNvPr id="13" name="TextBox 12"/>
+            <p:cNvSpPr txBox="1"/>
+            <p:nvPr/>
+          </p:nvSpPr>
+          <p:spPr>
+            <a:xfrm>
+              <a:off x="4045932" y="1389432"/>
+              <a:ext cx="727145" cy="369332"/>
+            </a:xfrm>
+            <a:prstGeom prst="rect">
+              <a:avLst/>
+            </a:prstGeom>
+            <a:noFill/>
+          </p:spPr>
+          <p:txBody>
+            <a:bodyPr wrap="none" rtlCol="0">
+              <a:spAutoFit/>
+            </a:bodyPr>
+            <a:lstStyle/>
+            <a:p>
+              <a:r>
+                <a:rPr lang="en-US" dirty="0" smtClean="0">
+                  <a:solidFill>
+                    <a:srgbClr val="FFFFFF"/>
+                  </a:solidFill>
+                </a:rPr>
+                <a:t>Client</a:t>
+              </a:r>
+              <a:endParaRPr lang="en-US" dirty="0">
+                <a:solidFill>
+                  <a:srgbClr val="FFFFFF"/>
+                </a:solidFill>
+              </a:endParaRPr>
+            </a:p>
+          </p:txBody>
+        </p:sp>
+      </p:grpSp>
+      <p:grpSp>
+        <p:nvGrpSpPr>
+          <p:cNvPr id="14" name="Group 13"/>
+          <p:cNvGrpSpPr/>
+          <p:nvPr/>
+        </p:nvGrpSpPr>
+        <p:grpSpPr>
+          <a:xfrm>
+            <a:off x="4017357" y="4613826"/>
+            <a:ext cx="2033867" cy="1017434"/>
+            <a:chOff x="3373667" y="1260828"/>
+            <a:chExt cx="2033867" cy="1017434"/>
+          </a:xfrm>
+        </p:grpSpPr>
+        <p:sp>
+          <p:nvSpPr>
+            <p:cNvPr id="15" name="Rectangle 14"/>
+            <p:cNvSpPr/>
+            <p:nvPr/>
+          </p:nvSpPr>
+          <p:spPr>
+            <a:xfrm>
+              <a:off x="3892424" y="1260828"/>
+              <a:ext cx="1442014" cy="621565"/>
+            </a:xfrm>
+            <a:prstGeom prst="rect">
+              <a:avLst/>
+            </a:prstGeom>
+            <a:solidFill>
+              <a:srgbClr val="98C1B5"/>
+            </a:solidFill>
+          </p:spPr>
+          <p:style>
+            <a:lnRef idx="1">
+              <a:schemeClr val="accent1"/>
+            </a:lnRef>
+            <a:fillRef idx="3">
+              <a:schemeClr val="accent1"/>
+            </a:fillRef>
+            <a:effectRef idx="2">
+              <a:schemeClr val="accent1"/>
+            </a:effectRef>
+            <a:fontRef idx="minor">
+              <a:schemeClr val="lt1"/>
+            </a:fontRef>
+          </p:style>
+          <p:txBody>
+            <a:bodyPr rtlCol="0" anchor="ctr"/>
+            <a:lstStyle/>
+            <a:p>
+              <a:pPr algn="ctr"/>
+              <a:endParaRPr lang="en-US" sz="2800" dirty="0" smtClean="0"/>
+            </a:p>
+          </p:txBody>
+        </p:sp>
+        <p:pic>
+          <p:nvPicPr>
+            <p:cNvPr id="16" name="Picture 21" descr="C:\Users\warneke\AppData\Local\Microsoft\Windows\Temporary Internet Files\Content.IE5\X8LGV7F5\MCj04348450000[1].png"/>
+            <p:cNvPicPr>
+              <a:picLocks noChangeAspect="1" noChangeArrowheads="1"/>
+            </p:cNvPicPr>
+            <p:nvPr/>
+          </p:nvPicPr>
+          <p:blipFill>
+            <a:blip r:embed="rId2" cstate="screen">
+              <a:extLst>
+                <a:ext uri="{28A0092B-C50C-407E-A947-70E740481C1C}">
+                  <a14:useLocalDpi xmlns:a14="http://schemas.microsoft.com/office/drawing/2010/main"/>
+                </a:ext>
+              </a:extLst>
+            </a:blip>
+            <a:srcRect/>
+            <a:stretch>
+              <a:fillRect/>
+            </a:stretch>
+          </p:blipFill>
+          <p:spPr bwMode="auto">
+            <a:xfrm flipH="1">
+              <a:off x="3373667" y="1558182"/>
+              <a:ext cx="843958" cy="720080"/>
+            </a:xfrm>
+            <a:prstGeom prst="rect">
+              <a:avLst/>
+            </a:prstGeom>
+            <a:noFill/>
+            <a:ln w="9525">
+              <a:noFill/>
+              <a:miter lim="800000"/>
+              <a:headEnd/>
+              <a:tailEnd/>
+            </a:ln>
+          </p:spPr>
+        </p:pic>
+        <p:sp>
+          <p:nvSpPr>
+            <p:cNvPr id="17" name="TextBox 16"/>
+            <p:cNvSpPr txBox="1"/>
+            <p:nvPr/>
+          </p:nvSpPr>
+          <p:spPr>
+            <a:xfrm>
+              <a:off x="4045932" y="1389432"/>
+              <a:ext cx="1361602" cy="369332"/>
+            </a:xfrm>
+            <a:prstGeom prst="rect">
+              <a:avLst/>
+            </a:prstGeom>
+            <a:noFill/>
+          </p:spPr>
+          <p:txBody>
+            <a:bodyPr wrap="square" rtlCol="0">
+              <a:spAutoFit/>
+            </a:bodyPr>
+            <a:lstStyle/>
+            <a:p>
+              <a:r>
+                <a:rPr lang="en-US" dirty="0" smtClean="0">
+                  <a:solidFill>
+                    <a:srgbClr val="FFFFFF"/>
+                  </a:solidFill>
+                </a:rPr>
+                <a:t>Job Master</a:t>
+              </a:r>
+              <a:endParaRPr lang="en-US" dirty="0">
+                <a:solidFill>
+                  <a:srgbClr val="FFFFFF"/>
+                </a:solidFill>
+              </a:endParaRPr>
+            </a:p>
+          </p:txBody>
+        </p:sp>
+      </p:grpSp>
+      <p:grpSp>
+        <p:nvGrpSpPr>
+          <p:cNvPr id="58" name="Group 57"/>
+          <p:cNvGrpSpPr/>
+          <p:nvPr/>
+        </p:nvGrpSpPr>
+        <p:grpSpPr>
+          <a:xfrm>
+            <a:off x="6524689" y="3439201"/>
+            <a:ext cx="1689589" cy="3207877"/>
+            <a:chOff x="6241442" y="3439201"/>
+            <a:chExt cx="1689589" cy="3207877"/>
+          </a:xfrm>
+        </p:grpSpPr>
+        <p:grpSp>
+          <p:nvGrpSpPr>
+            <p:cNvPr id="18" name="Group 17"/>
+            <p:cNvGrpSpPr/>
+            <p:nvPr/>
+          </p:nvGrpSpPr>
+          <p:grpSpPr>
+            <a:xfrm>
+              <a:off x="6241444" y="4256323"/>
+              <a:ext cx="1689587" cy="720080"/>
+              <a:chOff x="3373667" y="1260828"/>
+              <a:chExt cx="2292637" cy="1017434"/>
+            </a:xfrm>
+          </p:grpSpPr>
+          <p:sp>
+            <p:nvSpPr>
+              <p:cNvPr id="19" name="Rectangle 18"/>
+              <p:cNvSpPr/>
+              <p:nvPr/>
+            </p:nvSpPr>
+            <p:spPr>
+              <a:xfrm>
+                <a:off x="3892422" y="1260828"/>
+                <a:ext cx="1773880" cy="621565"/>
+              </a:xfrm>
+              <a:prstGeom prst="rect">
+                <a:avLst/>
+              </a:prstGeom>
+              <a:solidFill>
+                <a:srgbClr val="98C1B5"/>
+              </a:solidFill>
+            </p:spPr>
+            <p:style>
+              <a:lnRef idx="1">
+                <a:schemeClr val="accent1"/>
+              </a:lnRef>
+              <a:fillRef idx="3">
+                <a:schemeClr val="accent1"/>
+              </a:fillRef>
+              <a:effectRef idx="2">
+                <a:schemeClr val="accent1"/>
+              </a:effectRef>
+              <a:fontRef idx="minor">
+                <a:schemeClr val="lt1"/>
+              </a:fontRef>
+            </p:style>
+            <p:txBody>
+              <a:bodyPr rtlCol="0" anchor="ctr"/>
+              <a:lstStyle/>
+              <a:p>
+                <a:pPr algn="ctr"/>
+                <a:endParaRPr lang="en-US" sz="2800" dirty="0" smtClean="0"/>
+              </a:p>
+            </p:txBody>
+          </p:sp>
+          <p:pic>
+            <p:nvPicPr>
+              <p:cNvPr id="20" name="Picture 21" descr="C:\Users\warneke\AppData\Local\Microsoft\Windows\Temporary Internet Files\Content.IE5\X8LGV7F5\MCj04348450000[1].png"/>
+              <p:cNvPicPr>
+                <a:picLocks noChangeAspect="1" noChangeArrowheads="1"/>
+              </p:cNvPicPr>
+              <p:nvPr/>
+            </p:nvPicPr>
+            <p:blipFill>
+              <a:blip r:embed="rId2" cstate="screen">
+                <a:extLst>
+                  <a:ext uri="{28A0092B-C50C-407E-A947-70E740481C1C}">
+                    <a14:useLocalDpi xmlns:a14="http://schemas.microsoft.com/office/drawing/2010/main"/>
+                  </a:ext>
+                </a:extLst>
+              </a:blip>
+              <a:srcRect/>
+              <a:stretch>
+                <a:fillRect/>
+              </a:stretch>
+            </p:blipFill>
+            <p:spPr bwMode="auto">
+              <a:xfrm flipH="1">
+                <a:off x="3373667" y="1558182"/>
+                <a:ext cx="843958" cy="720080"/>
+              </a:xfrm>
+              <a:prstGeom prst="rect">
+                <a:avLst/>
+              </a:prstGeom>
+              <a:noFill/>
+              <a:ln w="9525">
+                <a:noFill/>
+                <a:miter lim="800000"/>
+                <a:headEnd/>
+                <a:tailEnd/>
+              </a:ln>
+            </p:spPr>
+          </p:pic>
+          <p:sp>
+            <p:nvSpPr>
+              <p:cNvPr id="21" name="TextBox 20"/>
+              <p:cNvSpPr txBox="1"/>
+              <p:nvPr/>
+            </p:nvSpPr>
+            <p:spPr>
+              <a:xfrm>
+                <a:off x="4045931" y="1389431"/>
+                <a:ext cx="1620373" cy="434872"/>
+              </a:xfrm>
+              <a:prstGeom prst="rect">
+                <a:avLst/>
+              </a:prstGeom>
+              <a:noFill/>
+            </p:spPr>
+            <p:txBody>
+              <a:bodyPr wrap="square" rtlCol="0">
+                <a:spAutoFit/>
+              </a:bodyPr>
+              <a:lstStyle/>
+              <a:p>
+                <a:r>
+                  <a:rPr lang="en-US" sz="1400" dirty="0" smtClean="0">
+                    <a:solidFill>
+                      <a:srgbClr val="FFFFFF"/>
+                    </a:solidFill>
+                  </a:rPr>
+                  <a:t>Task Manager</a:t>
+                </a:r>
+                <a:endParaRPr lang="en-US" sz="1400" dirty="0">
+                  <a:solidFill>
+                    <a:srgbClr val="FFFFFF"/>
+                  </a:solidFill>
+                </a:endParaRPr>
+              </a:p>
+            </p:txBody>
+          </p:sp>
+        </p:grpSp>
+        <p:grpSp>
+          <p:nvGrpSpPr>
+            <p:cNvPr id="22" name="Group 21"/>
+            <p:cNvGrpSpPr/>
+            <p:nvPr/>
+          </p:nvGrpSpPr>
+          <p:grpSpPr>
+            <a:xfrm>
+              <a:off x="6241444" y="5091602"/>
+              <a:ext cx="1689587" cy="720080"/>
+              <a:chOff x="3373667" y="1260828"/>
+              <a:chExt cx="2292637" cy="1017434"/>
+            </a:xfrm>
+          </p:grpSpPr>
+          <p:sp>
+            <p:nvSpPr>
+              <p:cNvPr id="23" name="Rectangle 22"/>
+              <p:cNvSpPr/>
+              <p:nvPr/>
+            </p:nvSpPr>
+            <p:spPr>
+              <a:xfrm>
+                <a:off x="3892422" y="1260828"/>
+                <a:ext cx="1773880" cy="621565"/>
+              </a:xfrm>
+              <a:prstGeom prst="rect">
+                <a:avLst/>
+              </a:prstGeom>
+              <a:solidFill>
+                <a:srgbClr val="98C1B5"/>
+              </a:solidFill>
+            </p:spPr>
+            <p:style>
+              <a:lnRef idx="1">
+                <a:schemeClr val="accent1"/>
+              </a:lnRef>
+              <a:fillRef idx="3">
+                <a:schemeClr val="accent1"/>
+              </a:fillRef>
+              <a:effectRef idx="2">
+                <a:schemeClr val="accent1"/>
+              </a:effectRef>
+              <a:fontRef idx="minor">
+                <a:schemeClr val="lt1"/>
+              </a:fontRef>
+            </p:style>
+            <p:txBody>
+              <a:bodyPr rtlCol="0" anchor="ctr"/>
+              <a:lstStyle/>
+              <a:p>
+                <a:pPr algn="ctr"/>
+                <a:endParaRPr lang="en-US" sz="2800" dirty="0" smtClean="0"/>
+              </a:p>
+            </p:txBody>
+          </p:sp>
+          <p:pic>
+            <p:nvPicPr>
+              <p:cNvPr id="24" name="Picture 21" descr="C:\Users\warneke\AppData\Local\Microsoft\Windows\Temporary Internet Files\Content.IE5\X8LGV7F5\MCj04348450000[1].png"/>
+              <p:cNvPicPr>
+                <a:picLocks noChangeAspect="1" noChangeArrowheads="1"/>
+              </p:cNvPicPr>
+              <p:nvPr/>
+            </p:nvPicPr>
+            <p:blipFill>
+              <a:blip r:embed="rId2" cstate="screen">
+                <a:extLst>
+                  <a:ext uri="{28A0092B-C50C-407E-A947-70E740481C1C}">
+                    <a14:useLocalDpi xmlns:a14="http://schemas.microsoft.com/office/drawing/2010/main"/>
+                  </a:ext>
+                </a:extLst>
+              </a:blip>
+              <a:srcRect/>
+              <a:stretch>
+                <a:fillRect/>
+              </a:stretch>
+            </p:blipFill>
+            <p:spPr bwMode="auto">
+              <a:xfrm flipH="1">
+                <a:off x="3373667" y="1558182"/>
+                <a:ext cx="843958" cy="720080"/>
+              </a:xfrm>
+              <a:prstGeom prst="rect">
+                <a:avLst/>
+              </a:prstGeom>
+              <a:noFill/>
+              <a:ln w="9525">
+                <a:noFill/>
+                <a:miter lim="800000"/>
+                <a:headEnd/>
+                <a:tailEnd/>
+              </a:ln>
+            </p:spPr>
+          </p:pic>
+          <p:sp>
+            <p:nvSpPr>
+              <p:cNvPr id="25" name="TextBox 24"/>
+              <p:cNvSpPr txBox="1"/>
+              <p:nvPr/>
+            </p:nvSpPr>
+            <p:spPr>
+              <a:xfrm>
+                <a:off x="4045931" y="1389431"/>
+                <a:ext cx="1620373" cy="434872"/>
+              </a:xfrm>
+              <a:prstGeom prst="rect">
+                <a:avLst/>
+              </a:prstGeom>
+              <a:noFill/>
+            </p:spPr>
+            <p:txBody>
+              <a:bodyPr wrap="square" rtlCol="0">
+                <a:spAutoFit/>
+              </a:bodyPr>
+              <a:lstStyle/>
+              <a:p>
+                <a:r>
+                  <a:rPr lang="en-US" sz="1400" dirty="0" smtClean="0">
+                    <a:solidFill>
+                      <a:srgbClr val="FFFFFF"/>
+                    </a:solidFill>
+                  </a:rPr>
+                  <a:t>Task Manager</a:t>
+                </a:r>
+                <a:endParaRPr lang="en-US" sz="1400" dirty="0">
+                  <a:solidFill>
+                    <a:srgbClr val="FFFFFF"/>
+                  </a:solidFill>
+                </a:endParaRPr>
+              </a:p>
+            </p:txBody>
+          </p:sp>
+        </p:grpSp>
+        <p:grpSp>
+          <p:nvGrpSpPr>
+            <p:cNvPr id="30" name="Group 29"/>
+            <p:cNvGrpSpPr/>
+            <p:nvPr/>
+          </p:nvGrpSpPr>
+          <p:grpSpPr>
+            <a:xfrm>
+              <a:off x="6241443" y="5926998"/>
+              <a:ext cx="1689587" cy="720080"/>
+              <a:chOff x="3373667" y="1260828"/>
+              <a:chExt cx="2292637" cy="1017434"/>
+            </a:xfrm>
+          </p:grpSpPr>
+          <p:sp>
+            <p:nvSpPr>
+              <p:cNvPr id="31" name="Rectangle 30"/>
+              <p:cNvSpPr/>
+              <p:nvPr/>
+            </p:nvSpPr>
+            <p:spPr>
+              <a:xfrm>
+                <a:off x="3892422" y="1260828"/>
+                <a:ext cx="1773880" cy="621565"/>
+              </a:xfrm>
+              <a:prstGeom prst="rect">
+                <a:avLst/>
+              </a:prstGeom>
+              <a:solidFill>
+                <a:srgbClr val="98C1B5"/>
+              </a:solidFill>
+            </p:spPr>
+            <p:style>
+              <a:lnRef idx="1">
+                <a:schemeClr val="accent1"/>
+              </a:lnRef>
+              <a:fillRef idx="3">
+                <a:schemeClr val="accent1"/>
+              </a:fillRef>
+              <a:effectRef idx="2">
+                <a:schemeClr val="accent1"/>
+              </a:effectRef>
+              <a:fontRef idx="minor">
+                <a:schemeClr val="lt1"/>
+              </a:fontRef>
+            </p:style>
+            <p:txBody>
+              <a:bodyPr rtlCol="0" anchor="ctr"/>
+              <a:lstStyle/>
+              <a:p>
+                <a:pPr algn="ctr"/>
+                <a:endParaRPr lang="en-US" sz="2800" dirty="0" smtClean="0"/>
+              </a:p>
+            </p:txBody>
+          </p:sp>
+          <p:pic>
+            <p:nvPicPr>
+              <p:cNvPr id="32" name="Picture 21" descr="C:\Users\warneke\AppData\Local\Microsoft\Windows\Temporary Internet Files\Content.IE5\X8LGV7F5\MCj04348450000[1].png"/>
+              <p:cNvPicPr>
+                <a:picLocks noChangeAspect="1" noChangeArrowheads="1"/>
+              </p:cNvPicPr>
+              <p:nvPr/>
+            </p:nvPicPr>
+            <p:blipFill>
+              <a:blip r:embed="rId2" cstate="screen">
+                <a:extLst>
+                  <a:ext uri="{28A0092B-C50C-407E-A947-70E740481C1C}">
+                    <a14:useLocalDpi xmlns:a14="http://schemas.microsoft.com/office/drawing/2010/main"/>
+                  </a:ext>
+                </a:extLst>
+              </a:blip>
+              <a:srcRect/>
+              <a:stretch>
+                <a:fillRect/>
+              </a:stretch>
+            </p:blipFill>
+            <p:spPr bwMode="auto">
+              <a:xfrm flipH="1">
+                <a:off x="3373667" y="1558182"/>
+                <a:ext cx="843958" cy="720080"/>
+              </a:xfrm>
+              <a:prstGeom prst="rect">
+                <a:avLst/>
+              </a:prstGeom>
+              <a:noFill/>
+              <a:ln w="9525">
+                <a:noFill/>
+                <a:miter lim="800000"/>
+                <a:headEnd/>
+                <a:tailEnd/>
+              </a:ln>
+            </p:spPr>
+          </p:pic>
+          <p:sp>
+            <p:nvSpPr>
+              <p:cNvPr id="33" name="TextBox 32"/>
+              <p:cNvSpPr txBox="1"/>
+              <p:nvPr/>
+            </p:nvSpPr>
+            <p:spPr>
+              <a:xfrm>
+                <a:off x="4045931" y="1389431"/>
+                <a:ext cx="1620373" cy="434872"/>
+              </a:xfrm>
+              <a:prstGeom prst="rect">
+                <a:avLst/>
+              </a:prstGeom>
+              <a:noFill/>
+            </p:spPr>
+            <p:txBody>
+              <a:bodyPr wrap="square" rtlCol="0">
+                <a:spAutoFit/>
+              </a:bodyPr>
+              <a:lstStyle/>
+              <a:p>
+                <a:r>
+                  <a:rPr lang="en-US" sz="1400" dirty="0" smtClean="0">
+                    <a:solidFill>
+                      <a:srgbClr val="FFFFFF"/>
+                    </a:solidFill>
+                  </a:rPr>
+                  <a:t>Task Manager</a:t>
+                </a:r>
+                <a:endParaRPr lang="en-US" sz="1400" dirty="0">
+                  <a:solidFill>
+                    <a:srgbClr val="FFFFFF"/>
+                  </a:solidFill>
+                </a:endParaRPr>
+              </a:p>
+            </p:txBody>
+          </p:sp>
+        </p:grpSp>
+        <p:grpSp>
+          <p:nvGrpSpPr>
+            <p:cNvPr id="54" name="Group 53"/>
+            <p:cNvGrpSpPr/>
+            <p:nvPr/>
+          </p:nvGrpSpPr>
+          <p:grpSpPr>
+            <a:xfrm>
+              <a:off x="6241442" y="3439201"/>
+              <a:ext cx="1689587" cy="720080"/>
+              <a:chOff x="3373667" y="1260828"/>
+              <a:chExt cx="2292637" cy="1017434"/>
+            </a:xfrm>
+          </p:grpSpPr>
+          <p:sp>
+            <p:nvSpPr>
+              <p:cNvPr id="55" name="Rectangle 54"/>
+              <p:cNvSpPr/>
+              <p:nvPr/>
+            </p:nvSpPr>
+            <p:spPr>
+              <a:xfrm>
+                <a:off x="3892422" y="1260828"/>
+                <a:ext cx="1773880" cy="621565"/>
+              </a:xfrm>
+              <a:prstGeom prst="rect">
+                <a:avLst/>
+              </a:prstGeom>
+              <a:solidFill>
+                <a:srgbClr val="98C1B5"/>
+              </a:solidFill>
+            </p:spPr>
+            <p:style>
+              <a:lnRef idx="1">
+                <a:schemeClr val="accent1"/>
+              </a:lnRef>
+              <a:fillRef idx="3">
+                <a:schemeClr val="accent1"/>
+              </a:fillRef>
+              <a:effectRef idx="2">
+                <a:schemeClr val="accent1"/>
+              </a:effectRef>
+              <a:fontRef idx="minor">
+                <a:schemeClr val="lt1"/>
+              </a:fontRef>
+            </p:style>
+            <p:txBody>
+              <a:bodyPr rtlCol="0" anchor="ctr"/>
+              <a:lstStyle/>
+              <a:p>
+                <a:pPr algn="ctr"/>
+                <a:endParaRPr lang="en-US" sz="2800" dirty="0" smtClean="0"/>
+              </a:p>
+            </p:txBody>
+          </p:sp>
+          <p:pic>
+            <p:nvPicPr>
+              <p:cNvPr id="56" name="Picture 21" descr="C:\Users\warneke\AppData\Local\Microsoft\Windows\Temporary Internet Files\Content.IE5\X8LGV7F5\MCj04348450000[1].png"/>
+              <p:cNvPicPr>
+                <a:picLocks noChangeAspect="1" noChangeArrowheads="1"/>
+              </p:cNvPicPr>
+              <p:nvPr/>
+            </p:nvPicPr>
+            <p:blipFill>
+              <a:blip r:embed="rId2" cstate="screen">
+                <a:extLst>
+                  <a:ext uri="{28A0092B-C50C-407E-A947-70E740481C1C}">
+                    <a14:useLocalDpi xmlns:a14="http://schemas.microsoft.com/office/drawing/2010/main"/>
+                  </a:ext>
+                </a:extLst>
+              </a:blip>
+              <a:srcRect/>
+              <a:stretch>
+                <a:fillRect/>
+              </a:stretch>
+            </p:blipFill>
+            <p:spPr bwMode="auto">
+              <a:xfrm flipH="1">
+                <a:off x="3373667" y="1558182"/>
+                <a:ext cx="843958" cy="720080"/>
+              </a:xfrm>
+              <a:prstGeom prst="rect">
+                <a:avLst/>
+              </a:prstGeom>
+              <a:noFill/>
+              <a:ln w="9525">
+                <a:noFill/>
+                <a:miter lim="800000"/>
+                <a:headEnd/>
+                <a:tailEnd/>
+              </a:ln>
+            </p:spPr>
+          </p:pic>
+          <p:sp>
+            <p:nvSpPr>
+              <p:cNvPr id="57" name="TextBox 56"/>
+              <p:cNvSpPr txBox="1"/>
+              <p:nvPr/>
+            </p:nvSpPr>
+            <p:spPr>
+              <a:xfrm>
+                <a:off x="4045931" y="1389431"/>
+                <a:ext cx="1620373" cy="434872"/>
+              </a:xfrm>
+              <a:prstGeom prst="rect">
+                <a:avLst/>
+              </a:prstGeom>
+              <a:noFill/>
+            </p:spPr>
+            <p:txBody>
+              <a:bodyPr wrap="square" rtlCol="0">
+                <a:spAutoFit/>
+              </a:bodyPr>
+              <a:lstStyle/>
+              <a:p>
+                <a:r>
+                  <a:rPr lang="en-US" sz="1400" dirty="0" smtClean="0">
+                    <a:solidFill>
+                      <a:srgbClr val="FFFFFF"/>
+                    </a:solidFill>
+                  </a:rPr>
+                  <a:t>Task Manager</a:t>
+                </a:r>
+                <a:endParaRPr lang="en-US" sz="1400" dirty="0">
+                  <a:solidFill>
+                    <a:srgbClr val="FFFFFF"/>
+                  </a:solidFill>
+                </a:endParaRPr>
+              </a:p>
+            </p:txBody>
+          </p:sp>
+        </p:grpSp>
+      </p:grpSp>
+      <p:cxnSp>
+        <p:nvCxnSpPr>
+          <p:cNvPr id="60" name="Straight Arrow Connector 59"/>
+          <p:cNvCxnSpPr/>
+          <p:nvPr/>
+        </p:nvCxnSpPr>
         <p:spPr>
           <a:xfrm>
-            <a:off x="4002562" y="5122543"/>
-            <a:ext cx="1439028" cy="369332"/>
+            <a:off x="2147230" y="4911180"/>
+            <a:ext cx="1955349" cy="0"/>
           </a:xfrm>
-          <a:prstGeom prst="rect">
+          <a:prstGeom prst="straightConnector1">
             <a:avLst/>
           </a:prstGeom>
-          <a:noFill/>
+          <a:ln>
+            <a:headEnd type="arrow" w="sm" len="med"/>
+            <a:tailEnd type="arrow"/>
+          </a:ln>
         </p:spPr>
-        <p:txBody>
-          <a:bodyPr wrap="none" rtlCol="0">
-            <a:spAutoFit/>
-          </a:bodyPr>
-          <a:lstStyle/>
-          <a:p>
-            <a:r>
-              <a:rPr lang="en-US" dirty="0" smtClean="0">
-                <a:solidFill>
-                  <a:srgbClr val="FF0000"/>
-                </a:solidFill>
-              </a:rPr>
-              <a:t>Picture here?</a:t>
-            </a:r>
-            <a:endParaRPr lang="en-US" dirty="0">
-              <a:solidFill>
-                <a:srgbClr val="FF0000"/>
-              </a:solidFill>
-            </a:endParaRPr>
-          </a:p>
-        </p:txBody>
-      </p:sp>
+        <p:style>
+          <a:lnRef idx="2">
+            <a:schemeClr val="accent1"/>
+          </a:lnRef>
+          <a:fillRef idx="0">
+            <a:schemeClr val="accent1"/>
+          </a:fillRef>
+          <a:effectRef idx="1">
+            <a:schemeClr val="accent1"/>
+          </a:effectRef>
+          <a:fontRef idx="minor">
+            <a:schemeClr val="tx1"/>
+          </a:fontRef>
+        </p:style>
+      </p:cxnSp>
+      <p:cxnSp>
+        <p:nvCxnSpPr>
+          <p:cNvPr id="64" name="Straight Arrow Connector 63"/>
+          <p:cNvCxnSpPr/>
+          <p:nvPr/>
+        </p:nvCxnSpPr>
+        <p:spPr>
+          <a:xfrm flipV="1">
+            <a:off x="6051224" y="4029146"/>
+            <a:ext cx="501976" cy="713284"/>
+          </a:xfrm>
+          <a:prstGeom prst="straightConnector1">
+            <a:avLst/>
+          </a:prstGeom>
+          <a:ln>
+            <a:headEnd type="arrow" w="med" len="med"/>
+            <a:tailEnd type="arrow"/>
+          </a:ln>
+        </p:spPr>
+        <p:style>
+          <a:lnRef idx="2">
+            <a:schemeClr val="accent1"/>
+          </a:lnRef>
+          <a:fillRef idx="0">
+            <a:schemeClr val="accent1"/>
+          </a:fillRef>
+          <a:effectRef idx="1">
+            <a:schemeClr val="accent1"/>
+          </a:effectRef>
+          <a:fontRef idx="minor">
+            <a:schemeClr val="tx1"/>
+          </a:fontRef>
+        </p:style>
+      </p:cxnSp>
+      <p:cxnSp>
+        <p:nvCxnSpPr>
+          <p:cNvPr id="65" name="Straight Arrow Connector 64"/>
+          <p:cNvCxnSpPr>
+            <a:stCxn id="17" idx="3"/>
+            <a:endCxn id="20" idx="3"/>
+          </p:cNvCxnSpPr>
+          <p:nvPr/>
+        </p:nvCxnSpPr>
+        <p:spPr>
+          <a:xfrm flipV="1">
+            <a:off x="6051224" y="4721588"/>
+            <a:ext cx="473467" cy="205508"/>
+          </a:xfrm>
+          <a:prstGeom prst="straightConnector1">
+            <a:avLst/>
+          </a:prstGeom>
+          <a:ln>
+            <a:headEnd type="arrow" w="med" len="med"/>
+            <a:tailEnd type="arrow"/>
+          </a:ln>
+        </p:spPr>
+        <p:style>
+          <a:lnRef idx="2">
+            <a:schemeClr val="accent1"/>
+          </a:lnRef>
+          <a:fillRef idx="0">
+            <a:schemeClr val="accent1"/>
+          </a:fillRef>
+          <a:effectRef idx="1">
+            <a:schemeClr val="accent1"/>
+          </a:effectRef>
+          <a:fontRef idx="minor">
+            <a:schemeClr val="tx1"/>
+          </a:fontRef>
+        </p:style>
+      </p:cxnSp>
+      <p:cxnSp>
+        <p:nvCxnSpPr>
+          <p:cNvPr id="68" name="Straight Arrow Connector 67"/>
+          <p:cNvCxnSpPr/>
+          <p:nvPr/>
+        </p:nvCxnSpPr>
+        <p:spPr>
+          <a:xfrm>
+            <a:off x="6051224" y="5091602"/>
+            <a:ext cx="501976" cy="326275"/>
+          </a:xfrm>
+          <a:prstGeom prst="straightConnector1">
+            <a:avLst/>
+          </a:prstGeom>
+          <a:ln>
+            <a:headEnd type="arrow" w="med" len="med"/>
+            <a:tailEnd type="arrow"/>
+          </a:ln>
+        </p:spPr>
+        <p:style>
+          <a:lnRef idx="2">
+            <a:schemeClr val="accent1"/>
+          </a:lnRef>
+          <a:fillRef idx="0">
+            <a:schemeClr val="accent1"/>
+          </a:fillRef>
+          <a:effectRef idx="1">
+            <a:schemeClr val="accent1"/>
+          </a:effectRef>
+          <a:fontRef idx="minor">
+            <a:schemeClr val="tx1"/>
+          </a:fontRef>
+        </p:style>
+      </p:cxnSp>
+      <p:cxnSp>
+        <p:nvCxnSpPr>
+          <p:cNvPr id="71" name="Straight Arrow Connector 70"/>
+          <p:cNvCxnSpPr/>
+          <p:nvPr/>
+        </p:nvCxnSpPr>
+        <p:spPr>
+          <a:xfrm>
+            <a:off x="6051224" y="5182620"/>
+            <a:ext cx="501976" cy="989064"/>
+          </a:xfrm>
+          <a:prstGeom prst="straightConnector1">
+            <a:avLst/>
+          </a:prstGeom>
+          <a:ln>
+            <a:headEnd type="arrow" w="med" len="med"/>
+            <a:tailEnd type="arrow"/>
+          </a:ln>
+        </p:spPr>
+        <p:style>
+          <a:lnRef idx="2">
+            <a:schemeClr val="accent1"/>
+          </a:lnRef>
+          <a:fillRef idx="0">
+            <a:schemeClr val="accent1"/>
+          </a:fillRef>
+          <a:effectRef idx="1">
+            <a:schemeClr val="accent1"/>
+          </a:effectRef>
+          <a:fontRef idx="minor">
+            <a:schemeClr val="tx1"/>
+          </a:fontRef>
+        </p:style>
+      </p:cxnSp>
     </p:spTree>
     <p:extLst>
       <p:ext uri="{BB962C8B-B14F-4D97-AF65-F5344CB8AC3E}">
@@ -21017,39 +21986,34 @@
             <p:ph idx="1"/>
           </p:nvPr>
         </p:nvSpPr>
-        <p:spPr/>
+        <p:spPr>
+          <a:xfrm>
+            <a:off x="457200" y="1474376"/>
+            <a:ext cx="8229600" cy="1924360"/>
+          </a:xfrm>
+        </p:spPr>
         <p:txBody>
-          <a:bodyPr/>
+          <a:bodyPr>
+            <a:normAutofit/>
+          </a:bodyPr>
           <a:lstStyle/>
           <a:p>
             <a:r>
-              <a:rPr lang="en-US" dirty="0" smtClean="0"/>
-              <a:t>Parallelization</a:t>
-            </a:r>
-          </a:p>
-          <a:p>
-            <a:pPr lvl="1"/>
-            <a:r>
-              <a:rPr lang="en-US" dirty="0" smtClean="0"/>
-              <a:t>Generate Execution Graph</a:t>
-            </a:r>
-          </a:p>
-          <a:p>
-            <a:r>
-              <a:rPr lang="en-US" dirty="0" smtClean="0"/>
-              <a:t>Scheduling</a:t>
-            </a:r>
-          </a:p>
-          <a:p>
-            <a:pPr lvl="1"/>
-            <a:r>
-              <a:rPr lang="en-US" dirty="0" smtClean="0"/>
-              <a:t>Assign tasks to task managers</a:t>
-            </a:r>
-            <a:endParaRPr lang="en-US" dirty="0"/>
-          </a:p>
-          <a:p>
-            <a:endParaRPr lang="en-US" dirty="0"/>
+              <a:rPr lang="en-US" sz="3000" dirty="0" smtClean="0"/>
+              <a:t>Parallelization: Create Execution Graph</a:t>
+            </a:r>
+          </a:p>
+          <a:p>
+            <a:r>
+              <a:rPr lang="en-US" sz="3000" dirty="0" smtClean="0"/>
+              <a:t>Scheduling: Assign tasks to task managers</a:t>
+            </a:r>
+          </a:p>
+          <a:p>
+            <a:r>
+              <a:rPr lang="en-US" sz="3000" dirty="0" smtClean="0"/>
+              <a:t>State tracking: Supervise the execution</a:t>
+            </a:r>
           </a:p>
         </p:txBody>
       </p:sp>
@@ -21079,7 +22043,7 @@
               <a:pPr/>
               <a:t>25</a:t>
             </a:fld>
-            <a:endParaRPr lang="en-US">
+            <a:endParaRPr lang="en-US" dirty="0">
               <a:solidFill>
                 <a:prstClr val="black">
                   <a:tint val="75000"/>
@@ -21089,44 +22053,736 @@
           </a:p>
         </p:txBody>
       </p:sp>
-      <p:sp>
-        <p:nvSpPr>
-          <p:cNvPr id="5" name="TextBox 4"/>
-          <p:cNvSpPr txBox="1"/>
+      <p:grpSp>
+        <p:nvGrpSpPr>
+          <p:cNvPr id="6" name="Group 5"/>
+          <p:cNvGrpSpPr/>
           <p:nvPr/>
-        </p:nvSpPr>
+        </p:nvGrpSpPr>
+        <p:grpSpPr>
+          <a:xfrm>
+            <a:off x="1139156" y="4352935"/>
+            <a:ext cx="2033867" cy="1017434"/>
+            <a:chOff x="3373667" y="1260828"/>
+            <a:chExt cx="2033867" cy="1017434"/>
+          </a:xfrm>
+        </p:grpSpPr>
+        <p:sp>
+          <p:nvSpPr>
+            <p:cNvPr id="7" name="Rectangle 6"/>
+            <p:cNvSpPr/>
+            <p:nvPr/>
+          </p:nvSpPr>
+          <p:spPr>
+            <a:xfrm>
+              <a:off x="3892424" y="1260828"/>
+              <a:ext cx="1442014" cy="621565"/>
+            </a:xfrm>
+            <a:prstGeom prst="rect">
+              <a:avLst/>
+            </a:prstGeom>
+            <a:solidFill>
+              <a:srgbClr val="98C1B5"/>
+            </a:solidFill>
+          </p:spPr>
+          <p:style>
+            <a:lnRef idx="1">
+              <a:schemeClr val="accent1"/>
+            </a:lnRef>
+            <a:fillRef idx="3">
+              <a:schemeClr val="accent1"/>
+            </a:fillRef>
+            <a:effectRef idx="2">
+              <a:schemeClr val="accent1"/>
+            </a:effectRef>
+            <a:fontRef idx="minor">
+              <a:schemeClr val="lt1"/>
+            </a:fontRef>
+          </p:style>
+          <p:txBody>
+            <a:bodyPr rtlCol="0" anchor="ctr"/>
+            <a:lstStyle/>
+            <a:p>
+              <a:pPr algn="ctr"/>
+              <a:endParaRPr lang="en-US" sz="2800" dirty="0" smtClean="0"/>
+            </a:p>
+          </p:txBody>
+        </p:sp>
+        <p:pic>
+          <p:nvPicPr>
+            <p:cNvPr id="8" name="Picture 21" descr="C:\Users\warneke\AppData\Local\Microsoft\Windows\Temporary Internet Files\Content.IE5\X8LGV7F5\MCj04348450000[1].png"/>
+            <p:cNvPicPr>
+              <a:picLocks noChangeAspect="1" noChangeArrowheads="1"/>
+            </p:cNvPicPr>
+            <p:nvPr/>
+          </p:nvPicPr>
+          <p:blipFill>
+            <a:blip r:embed="rId2" cstate="screen">
+              <a:extLst>
+                <a:ext uri="{28A0092B-C50C-407E-A947-70E740481C1C}">
+                  <a14:useLocalDpi xmlns:a14="http://schemas.microsoft.com/office/drawing/2010/main"/>
+                </a:ext>
+              </a:extLst>
+            </a:blip>
+            <a:srcRect/>
+            <a:stretch>
+              <a:fillRect/>
+            </a:stretch>
+          </p:blipFill>
+          <p:spPr bwMode="auto">
+            <a:xfrm flipH="1">
+              <a:off x="3373667" y="1558182"/>
+              <a:ext cx="843958" cy="720080"/>
+            </a:xfrm>
+            <a:prstGeom prst="rect">
+              <a:avLst/>
+            </a:prstGeom>
+            <a:noFill/>
+            <a:ln w="9525">
+              <a:noFill/>
+              <a:miter lim="800000"/>
+              <a:headEnd/>
+              <a:tailEnd/>
+            </a:ln>
+          </p:spPr>
+        </p:pic>
+        <p:sp>
+          <p:nvSpPr>
+            <p:cNvPr id="9" name="TextBox 8"/>
+            <p:cNvSpPr txBox="1"/>
+            <p:nvPr/>
+          </p:nvSpPr>
+          <p:spPr>
+            <a:xfrm>
+              <a:off x="4045932" y="1389432"/>
+              <a:ext cx="1361602" cy="369332"/>
+            </a:xfrm>
+            <a:prstGeom prst="rect">
+              <a:avLst/>
+            </a:prstGeom>
+            <a:noFill/>
+          </p:spPr>
+          <p:txBody>
+            <a:bodyPr wrap="square" rtlCol="0">
+              <a:spAutoFit/>
+            </a:bodyPr>
+            <a:lstStyle/>
+            <a:p>
+              <a:r>
+                <a:rPr lang="en-US" dirty="0" smtClean="0">
+                  <a:solidFill>
+                    <a:srgbClr val="FFFFFF"/>
+                  </a:solidFill>
+                </a:rPr>
+                <a:t>Job Master</a:t>
+              </a:r>
+              <a:endParaRPr lang="en-US" dirty="0">
+                <a:solidFill>
+                  <a:srgbClr val="FFFFFF"/>
+                </a:solidFill>
+              </a:endParaRPr>
+            </a:p>
+          </p:txBody>
+        </p:sp>
+      </p:grpSp>
+      <p:grpSp>
+        <p:nvGrpSpPr>
+          <p:cNvPr id="18" name="Group 17"/>
+          <p:cNvGrpSpPr/>
+          <p:nvPr/>
+        </p:nvGrpSpPr>
+        <p:grpSpPr>
+          <a:xfrm>
+            <a:off x="5056985" y="3127907"/>
+            <a:ext cx="1717763" cy="1817982"/>
+            <a:chOff x="1366323" y="4469427"/>
+            <a:chExt cx="2083467" cy="2252048"/>
+          </a:xfrm>
+        </p:grpSpPr>
+        <p:grpSp>
+          <p:nvGrpSpPr>
+            <p:cNvPr id="19" name="Group 18"/>
+            <p:cNvGrpSpPr/>
+            <p:nvPr/>
+          </p:nvGrpSpPr>
+          <p:grpSpPr>
+            <a:xfrm>
+              <a:off x="1967798" y="4469427"/>
+              <a:ext cx="1481992" cy="1796044"/>
+              <a:chOff x="5036803" y="1773935"/>
+              <a:chExt cx="1481992" cy="1796044"/>
+            </a:xfrm>
+          </p:grpSpPr>
+          <p:sp>
+            <p:nvSpPr>
+              <p:cNvPr id="21" name="Rectangle 20"/>
+              <p:cNvSpPr/>
+              <p:nvPr/>
+            </p:nvSpPr>
+            <p:spPr>
+              <a:xfrm>
+                <a:off x="5036803" y="1773935"/>
+                <a:ext cx="1481992" cy="1796044"/>
+              </a:xfrm>
+              <a:prstGeom prst="rect">
+                <a:avLst/>
+              </a:prstGeom>
+              <a:solidFill>
+                <a:srgbClr val="98C1B5"/>
+              </a:solidFill>
+            </p:spPr>
+            <p:style>
+              <a:lnRef idx="1">
+                <a:schemeClr val="accent1"/>
+              </a:lnRef>
+              <a:fillRef idx="3">
+                <a:schemeClr val="accent1"/>
+              </a:fillRef>
+              <a:effectRef idx="2">
+                <a:schemeClr val="accent1"/>
+              </a:effectRef>
+              <a:fontRef idx="minor">
+                <a:schemeClr val="lt1"/>
+              </a:fontRef>
+            </p:style>
+            <p:txBody>
+              <a:bodyPr rtlCol="0" anchor="ctr"/>
+              <a:lstStyle/>
+              <a:p>
+                <a:pPr algn="ctr"/>
+                <a:endParaRPr lang="en-US" dirty="0" smtClean="0"/>
+              </a:p>
+              <a:p>
+                <a:pPr algn="ctr"/>
+                <a:endParaRPr lang="en-US" dirty="0"/>
+              </a:p>
+              <a:p>
+                <a:pPr algn="ctr"/>
+                <a:endParaRPr lang="en-US" dirty="0" smtClean="0"/>
+              </a:p>
+              <a:p>
+                <a:pPr algn="ctr"/>
+                <a:endParaRPr lang="en-US" dirty="0"/>
+              </a:p>
+              <a:p>
+                <a:pPr algn="ctr"/>
+                <a:r>
+                  <a:rPr lang="en-US" sz="1400" dirty="0" smtClean="0"/>
+                  <a:t>Task Manager</a:t>
+                </a:r>
+                <a:endParaRPr lang="en-US" sz="1400" dirty="0"/>
+              </a:p>
+            </p:txBody>
+          </p:sp>
+          <p:sp>
+            <p:nvSpPr>
+              <p:cNvPr id="22" name="Rectangle 21"/>
+              <p:cNvSpPr/>
+              <p:nvPr/>
+            </p:nvSpPr>
+            <p:spPr>
+              <a:xfrm>
+                <a:off x="5186660" y="1891556"/>
+                <a:ext cx="319712" cy="1243276"/>
+              </a:xfrm>
+              <a:prstGeom prst="rect">
+                <a:avLst/>
+              </a:prstGeom>
+              <a:solidFill>
+                <a:schemeClr val="accent2"/>
+              </a:solidFill>
+            </p:spPr>
+            <p:style>
+              <a:lnRef idx="1">
+                <a:schemeClr val="accent1"/>
+              </a:lnRef>
+              <a:fillRef idx="3">
+                <a:schemeClr val="accent1"/>
+              </a:fillRef>
+              <a:effectRef idx="2">
+                <a:schemeClr val="accent1"/>
+              </a:effectRef>
+              <a:fontRef idx="minor">
+                <a:schemeClr val="lt1"/>
+              </a:fontRef>
+            </p:style>
+            <p:txBody>
+              <a:bodyPr rtlCol="0" anchor="ctr"/>
+              <a:lstStyle/>
+              <a:p>
+                <a:pPr algn="ctr"/>
+                <a:r>
+                  <a:rPr lang="en-US" sz="1400" dirty="0" smtClean="0"/>
+                  <a:t>Slot</a:t>
+                </a:r>
+                <a:endParaRPr lang="en-US" sz="1400" dirty="0"/>
+              </a:p>
+            </p:txBody>
+          </p:sp>
+          <p:sp>
+            <p:nvSpPr>
+              <p:cNvPr id="23" name="Rectangle 22"/>
+              <p:cNvSpPr/>
+              <p:nvPr/>
+            </p:nvSpPr>
+            <p:spPr>
+              <a:xfrm>
+                <a:off x="5612037" y="1891556"/>
+                <a:ext cx="319712" cy="1243276"/>
+              </a:xfrm>
+              <a:prstGeom prst="rect">
+                <a:avLst/>
+              </a:prstGeom>
+              <a:solidFill>
+                <a:srgbClr val="98C1B5"/>
+              </a:solidFill>
+            </p:spPr>
+            <p:style>
+              <a:lnRef idx="1">
+                <a:schemeClr val="accent1"/>
+              </a:lnRef>
+              <a:fillRef idx="3">
+                <a:schemeClr val="accent1"/>
+              </a:fillRef>
+              <a:effectRef idx="2">
+                <a:schemeClr val="accent1"/>
+              </a:effectRef>
+              <a:fontRef idx="minor">
+                <a:schemeClr val="lt1"/>
+              </a:fontRef>
+            </p:style>
+            <p:txBody>
+              <a:bodyPr rtlCol="0" anchor="ctr"/>
+              <a:lstStyle/>
+              <a:p>
+                <a:pPr algn="ctr"/>
+                <a:r>
+                  <a:rPr lang="en-US" sz="1400" dirty="0" smtClean="0"/>
+                  <a:t>Slot</a:t>
+                </a:r>
+                <a:endParaRPr lang="en-US" sz="1400" dirty="0"/>
+              </a:p>
+            </p:txBody>
+          </p:sp>
+          <p:sp>
+            <p:nvSpPr>
+              <p:cNvPr id="24" name="Rectangle 23"/>
+              <p:cNvSpPr/>
+              <p:nvPr/>
+            </p:nvSpPr>
+            <p:spPr>
+              <a:xfrm>
+                <a:off x="6039745" y="1891556"/>
+                <a:ext cx="319712" cy="1243276"/>
+              </a:xfrm>
+              <a:prstGeom prst="rect">
+                <a:avLst/>
+              </a:prstGeom>
+              <a:solidFill>
+                <a:srgbClr val="98C1B5"/>
+              </a:solidFill>
+            </p:spPr>
+            <p:style>
+              <a:lnRef idx="1">
+                <a:schemeClr val="accent1"/>
+              </a:lnRef>
+              <a:fillRef idx="3">
+                <a:schemeClr val="accent1"/>
+              </a:fillRef>
+              <a:effectRef idx="2">
+                <a:schemeClr val="accent1"/>
+              </a:effectRef>
+              <a:fontRef idx="minor">
+                <a:schemeClr val="lt1"/>
+              </a:fontRef>
+            </p:style>
+            <p:txBody>
+              <a:bodyPr rtlCol="0" anchor="ctr"/>
+              <a:lstStyle/>
+              <a:p>
+                <a:pPr algn="ctr"/>
+                <a:r>
+                  <a:rPr lang="en-US" sz="1400" dirty="0" smtClean="0"/>
+                  <a:t>Slot</a:t>
+                </a:r>
+                <a:endParaRPr lang="en-US" sz="1400" dirty="0"/>
+              </a:p>
+            </p:txBody>
+          </p:sp>
+        </p:grpSp>
+        <p:pic>
+          <p:nvPicPr>
+            <p:cNvPr id="20" name="Picture 21" descr="C:\Users\warneke\AppData\Local\Microsoft\Windows\Temporary Internet Files\Content.IE5\X8LGV7F5\MCj04348450000[1].png"/>
+            <p:cNvPicPr>
+              <a:picLocks noChangeAspect="1" noChangeArrowheads="1"/>
+            </p:cNvPicPr>
+            <p:nvPr/>
+          </p:nvPicPr>
+          <p:blipFill>
+            <a:blip r:embed="rId2" cstate="screen">
+              <a:extLst>
+                <a:ext uri="{28A0092B-C50C-407E-A947-70E740481C1C}">
+                  <a14:useLocalDpi xmlns:a14="http://schemas.microsoft.com/office/drawing/2010/main"/>
+                </a:ext>
+              </a:extLst>
+            </a:blip>
+            <a:srcRect/>
+            <a:stretch>
+              <a:fillRect/>
+            </a:stretch>
+          </p:blipFill>
+          <p:spPr bwMode="auto">
+            <a:xfrm flipH="1">
+              <a:off x="1366323" y="6001395"/>
+              <a:ext cx="843958" cy="720080"/>
+            </a:xfrm>
+            <a:prstGeom prst="rect">
+              <a:avLst/>
+            </a:prstGeom>
+            <a:noFill/>
+            <a:ln w="9525">
+              <a:noFill/>
+              <a:miter lim="800000"/>
+              <a:headEnd/>
+              <a:tailEnd/>
+            </a:ln>
+          </p:spPr>
+        </p:pic>
+      </p:grpSp>
+      <p:grpSp>
+        <p:nvGrpSpPr>
+          <p:cNvPr id="26" name="Group 25"/>
+          <p:cNvGrpSpPr/>
+          <p:nvPr/>
+        </p:nvGrpSpPr>
+        <p:grpSpPr>
+          <a:xfrm>
+            <a:off x="5056985" y="4997907"/>
+            <a:ext cx="1717763" cy="1817982"/>
+            <a:chOff x="1366323" y="4469427"/>
+            <a:chExt cx="2083467" cy="2252048"/>
+          </a:xfrm>
+        </p:grpSpPr>
+        <p:grpSp>
+          <p:nvGrpSpPr>
+            <p:cNvPr id="27" name="Group 26"/>
+            <p:cNvGrpSpPr/>
+            <p:nvPr/>
+          </p:nvGrpSpPr>
+          <p:grpSpPr>
+            <a:xfrm>
+              <a:off x="1967798" y="4469427"/>
+              <a:ext cx="1481992" cy="1796044"/>
+              <a:chOff x="5036803" y="1773935"/>
+              <a:chExt cx="1481992" cy="1796044"/>
+            </a:xfrm>
+          </p:grpSpPr>
+          <p:sp>
+            <p:nvSpPr>
+              <p:cNvPr id="29" name="Rectangle 28"/>
+              <p:cNvSpPr/>
+              <p:nvPr/>
+            </p:nvSpPr>
+            <p:spPr>
+              <a:xfrm>
+                <a:off x="5036803" y="1773935"/>
+                <a:ext cx="1481992" cy="1796044"/>
+              </a:xfrm>
+              <a:prstGeom prst="rect">
+                <a:avLst/>
+              </a:prstGeom>
+              <a:solidFill>
+                <a:srgbClr val="98C1B5"/>
+              </a:solidFill>
+            </p:spPr>
+            <p:style>
+              <a:lnRef idx="1">
+                <a:schemeClr val="accent1"/>
+              </a:lnRef>
+              <a:fillRef idx="3">
+                <a:schemeClr val="accent1"/>
+              </a:fillRef>
+              <a:effectRef idx="2">
+                <a:schemeClr val="accent1"/>
+              </a:effectRef>
+              <a:fontRef idx="minor">
+                <a:schemeClr val="lt1"/>
+              </a:fontRef>
+            </p:style>
+            <p:txBody>
+              <a:bodyPr rtlCol="0" anchor="ctr"/>
+              <a:lstStyle/>
+              <a:p>
+                <a:pPr algn="ctr"/>
+                <a:endParaRPr lang="en-US" dirty="0" smtClean="0"/>
+              </a:p>
+              <a:p>
+                <a:pPr algn="ctr"/>
+                <a:endParaRPr lang="en-US" dirty="0"/>
+              </a:p>
+              <a:p>
+                <a:pPr algn="ctr"/>
+                <a:endParaRPr lang="en-US" dirty="0" smtClean="0"/>
+              </a:p>
+              <a:p>
+                <a:pPr algn="ctr"/>
+                <a:endParaRPr lang="en-US" dirty="0"/>
+              </a:p>
+              <a:p>
+                <a:pPr algn="ctr"/>
+                <a:r>
+                  <a:rPr lang="en-US" sz="1400" dirty="0" smtClean="0"/>
+                  <a:t>Task Manager</a:t>
+                </a:r>
+                <a:endParaRPr lang="en-US" sz="1400" dirty="0"/>
+              </a:p>
+            </p:txBody>
+          </p:sp>
+          <p:sp>
+            <p:nvSpPr>
+              <p:cNvPr id="30" name="Rectangle 29"/>
+              <p:cNvSpPr/>
+              <p:nvPr/>
+            </p:nvSpPr>
+            <p:spPr>
+              <a:xfrm>
+                <a:off x="5186660" y="1891556"/>
+                <a:ext cx="319712" cy="1243276"/>
+              </a:xfrm>
+              <a:prstGeom prst="rect">
+                <a:avLst/>
+              </a:prstGeom>
+              <a:solidFill>
+                <a:srgbClr val="98C1B5"/>
+              </a:solidFill>
+            </p:spPr>
+            <p:style>
+              <a:lnRef idx="1">
+                <a:schemeClr val="accent1"/>
+              </a:lnRef>
+              <a:fillRef idx="3">
+                <a:schemeClr val="accent1"/>
+              </a:fillRef>
+              <a:effectRef idx="2">
+                <a:schemeClr val="accent1"/>
+              </a:effectRef>
+              <a:fontRef idx="minor">
+                <a:schemeClr val="lt1"/>
+              </a:fontRef>
+            </p:style>
+            <p:txBody>
+              <a:bodyPr rtlCol="0" anchor="ctr"/>
+              <a:lstStyle/>
+              <a:p>
+                <a:pPr algn="ctr"/>
+                <a:r>
+                  <a:rPr lang="en-US" sz="1400" dirty="0" smtClean="0"/>
+                  <a:t>Slot</a:t>
+                </a:r>
+                <a:endParaRPr lang="en-US" sz="1400" dirty="0"/>
+              </a:p>
+            </p:txBody>
+          </p:sp>
+          <p:sp>
+            <p:nvSpPr>
+              <p:cNvPr id="31" name="Rectangle 30"/>
+              <p:cNvSpPr/>
+              <p:nvPr/>
+            </p:nvSpPr>
+            <p:spPr>
+              <a:xfrm>
+                <a:off x="5612037" y="1891556"/>
+                <a:ext cx="319712" cy="1243276"/>
+              </a:xfrm>
+              <a:prstGeom prst="rect">
+                <a:avLst/>
+              </a:prstGeom>
+              <a:solidFill>
+                <a:srgbClr val="98C1B5"/>
+              </a:solidFill>
+            </p:spPr>
+            <p:style>
+              <a:lnRef idx="1">
+                <a:schemeClr val="accent1"/>
+              </a:lnRef>
+              <a:fillRef idx="3">
+                <a:schemeClr val="accent1"/>
+              </a:fillRef>
+              <a:effectRef idx="2">
+                <a:schemeClr val="accent1"/>
+              </a:effectRef>
+              <a:fontRef idx="minor">
+                <a:schemeClr val="lt1"/>
+              </a:fontRef>
+            </p:style>
+            <p:txBody>
+              <a:bodyPr rtlCol="0" anchor="ctr"/>
+              <a:lstStyle/>
+              <a:p>
+                <a:pPr algn="ctr"/>
+                <a:r>
+                  <a:rPr lang="en-US" sz="1400" dirty="0" smtClean="0"/>
+                  <a:t>Slot</a:t>
+                </a:r>
+                <a:endParaRPr lang="en-US" sz="1400" dirty="0"/>
+              </a:p>
+            </p:txBody>
+          </p:sp>
+          <p:sp>
+            <p:nvSpPr>
+              <p:cNvPr id="32" name="Rectangle 31"/>
+              <p:cNvSpPr/>
+              <p:nvPr/>
+            </p:nvSpPr>
+            <p:spPr>
+              <a:xfrm>
+                <a:off x="6039745" y="1891556"/>
+                <a:ext cx="319712" cy="1243276"/>
+              </a:xfrm>
+              <a:prstGeom prst="rect">
+                <a:avLst/>
+              </a:prstGeom>
+              <a:solidFill>
+                <a:srgbClr val="98C1B5"/>
+              </a:solidFill>
+            </p:spPr>
+            <p:style>
+              <a:lnRef idx="1">
+                <a:schemeClr val="accent1"/>
+              </a:lnRef>
+              <a:fillRef idx="3">
+                <a:schemeClr val="accent1"/>
+              </a:fillRef>
+              <a:effectRef idx="2">
+                <a:schemeClr val="accent1"/>
+              </a:effectRef>
+              <a:fontRef idx="minor">
+                <a:schemeClr val="lt1"/>
+              </a:fontRef>
+            </p:style>
+            <p:txBody>
+              <a:bodyPr rtlCol="0" anchor="ctr"/>
+              <a:lstStyle/>
+              <a:p>
+                <a:pPr algn="ctr"/>
+                <a:r>
+                  <a:rPr lang="en-US" sz="1400" dirty="0" smtClean="0"/>
+                  <a:t>Slot</a:t>
+                </a:r>
+                <a:endParaRPr lang="en-US" sz="1400" dirty="0"/>
+              </a:p>
+            </p:txBody>
+          </p:sp>
+        </p:grpSp>
+        <p:pic>
+          <p:nvPicPr>
+            <p:cNvPr id="28" name="Picture 21" descr="C:\Users\warneke\AppData\Local\Microsoft\Windows\Temporary Internet Files\Content.IE5\X8LGV7F5\MCj04348450000[1].png"/>
+            <p:cNvPicPr>
+              <a:picLocks noChangeAspect="1" noChangeArrowheads="1"/>
+            </p:cNvPicPr>
+            <p:nvPr/>
+          </p:nvPicPr>
+          <p:blipFill>
+            <a:blip r:embed="rId2" cstate="screen">
+              <a:extLst>
+                <a:ext uri="{28A0092B-C50C-407E-A947-70E740481C1C}">
+                  <a14:useLocalDpi xmlns:a14="http://schemas.microsoft.com/office/drawing/2010/main"/>
+                </a:ext>
+              </a:extLst>
+            </a:blip>
+            <a:srcRect/>
+            <a:stretch>
+              <a:fillRect/>
+            </a:stretch>
+          </p:blipFill>
+          <p:spPr bwMode="auto">
+            <a:xfrm flipH="1">
+              <a:off x="1366323" y="6001395"/>
+              <a:ext cx="843958" cy="720080"/>
+            </a:xfrm>
+            <a:prstGeom prst="rect">
+              <a:avLst/>
+            </a:prstGeom>
+            <a:noFill/>
+            <a:ln w="9525">
+              <a:noFill/>
+              <a:miter lim="800000"/>
+              <a:headEnd/>
+              <a:tailEnd/>
+            </a:ln>
+          </p:spPr>
+        </p:pic>
+      </p:grpSp>
+      <p:cxnSp>
+        <p:nvCxnSpPr>
+          <p:cNvPr id="34" name="Straight Arrow Connector 33"/>
+          <p:cNvCxnSpPr>
+            <a:stCxn id="9" idx="3"/>
+          </p:cNvCxnSpPr>
+          <p:nvPr/>
+        </p:nvCxnSpPr>
+        <p:spPr>
+          <a:xfrm flipV="1">
+            <a:off x="3173023" y="4481539"/>
+            <a:ext cx="1883962" cy="184666"/>
+          </a:xfrm>
+          <a:prstGeom prst="straightConnector1">
+            <a:avLst/>
+          </a:prstGeom>
+          <a:ln>
+            <a:headEnd type="arrow"/>
+            <a:tailEnd type="arrow"/>
+          </a:ln>
+        </p:spPr>
+        <p:style>
+          <a:lnRef idx="2">
+            <a:schemeClr val="accent1"/>
+          </a:lnRef>
+          <a:fillRef idx="0">
+            <a:schemeClr val="accent1"/>
+          </a:fillRef>
+          <a:effectRef idx="1">
+            <a:schemeClr val="accent1"/>
+          </a:effectRef>
+          <a:fontRef idx="minor">
+            <a:schemeClr val="tx1"/>
+          </a:fontRef>
+        </p:style>
+      </p:cxnSp>
+      <p:cxnSp>
+        <p:nvCxnSpPr>
+          <p:cNvPr id="35" name="Straight Arrow Connector 34"/>
+          <p:cNvCxnSpPr/>
+          <p:nvPr/>
+        </p:nvCxnSpPr>
         <p:spPr>
           <a:xfrm>
-            <a:off x="4002562" y="5122543"/>
-            <a:ext cx="1439028" cy="369332"/>
+            <a:off x="3173023" y="4818605"/>
+            <a:ext cx="1883962" cy="1537745"/>
           </a:xfrm>
-          <a:prstGeom prst="rect">
+          <a:prstGeom prst="straightConnector1">
             <a:avLst/>
           </a:prstGeom>
-          <a:noFill/>
+          <a:ln>
+            <a:headEnd type="arrow"/>
+            <a:tailEnd type="arrow"/>
+          </a:ln>
         </p:spPr>
-        <p:txBody>
-          <a:bodyPr wrap="none" rtlCol="0">
-            <a:spAutoFit/>
-          </a:bodyPr>
-          <a:lstStyle/>
-          <a:p>
-            <a:r>
-              <a:rPr lang="en-US" dirty="0" smtClean="0">
-                <a:solidFill>
-                  <a:srgbClr val="FF0000"/>
-                </a:solidFill>
-              </a:rPr>
-              <a:t>Picture here?</a:t>
-            </a:r>
-            <a:endParaRPr lang="en-US" dirty="0">
-              <a:solidFill>
-                <a:srgbClr val="FF0000"/>
-              </a:solidFill>
-            </a:endParaRPr>
-          </a:p>
-        </p:txBody>
-      </p:sp>
+        <p:style>
+          <a:lnRef idx="2">
+            <a:schemeClr val="accent1"/>
+          </a:lnRef>
+          <a:fillRef idx="0">
+            <a:schemeClr val="accent1"/>
+          </a:fillRef>
+          <a:effectRef idx="1">
+            <a:schemeClr val="accent1"/>
+          </a:effectRef>
+          <a:fontRef idx="minor">
+            <a:schemeClr val="tx1"/>
+          </a:fontRef>
+        </p:style>
+      </p:cxnSp>
     </p:spTree>
     <p:extLst>
       <p:ext uri="{BB962C8B-B14F-4D97-AF65-F5344CB8AC3E}">
@@ -21200,39 +22856,49 @@
         <p:spPr>
           <a:xfrm>
             <a:off x="457200" y="1474376"/>
-            <a:ext cx="8229600" cy="2495227"/>
+            <a:ext cx="8229600" cy="2847135"/>
           </a:xfrm>
         </p:spPr>
         <p:txBody>
-          <a:bodyPr/>
+          <a:bodyPr>
+            <a:normAutofit fontScale="92500" lnSpcReduction="10000"/>
+          </a:bodyPr>
           <a:lstStyle/>
           <a:p>
             <a:pPr fontAlgn="base"/>
             <a:r>
               <a:rPr lang="en-US" dirty="0" smtClean="0"/>
-              <a:t>Operations </a:t>
-            </a:r>
-            <a:r>
-              <a:rPr lang="en-US" dirty="0" err="1" smtClean="0"/>
-              <a:t>vs</a:t>
+              <a:t>Operations are split up into tasks</a:t>
+            </a:r>
+            <a:r>
+              <a:rPr lang="en-US" dirty="0"/>
+              <a:t> </a:t>
             </a:r>
             <a:r>
               <a:rPr lang="en-US" dirty="0" smtClean="0"/>
-              <a:t> Tasks</a:t>
+              <a:t>depending on the specified parallelism</a:t>
             </a:r>
           </a:p>
           <a:p>
             <a:pPr fontAlgn="base"/>
             <a:r>
               <a:rPr lang="en-US" dirty="0" smtClean="0"/>
-              <a:t>Parallelism specifies the number of tasks</a:t>
+              <a:t>Each parallel instance</a:t>
+            </a:r>
+            <a:r>
+              <a:rPr lang="en-US" dirty="0"/>
+              <a:t> </a:t>
+            </a:r>
+            <a:r>
+              <a:rPr lang="en-US" dirty="0" smtClean="0"/>
+              <a:t>of an operation runs in a separate task slot</a:t>
             </a:r>
           </a:p>
           <a:p>
             <a:pPr fontAlgn="base"/>
             <a:r>
               <a:rPr lang="en-US" dirty="0" smtClean="0"/>
-              <a:t>Each task of an operation runs in one task slot</a:t>
+              <a:t>The scheduler may run several tasks from different operators in one task slot</a:t>
             </a:r>
             <a:endParaRPr lang="en-US" dirty="0"/>
           </a:p>
@@ -21282,228 +22948,13 @@
       </p:sp>
       <p:grpSp>
         <p:nvGrpSpPr>
-          <p:cNvPr id="9" name="Group 8"/>
-          <p:cNvGrpSpPr/>
-          <p:nvPr/>
-        </p:nvGrpSpPr>
-        <p:grpSpPr>
-          <a:xfrm>
-            <a:off x="1967798" y="4076579"/>
-            <a:ext cx="1481992" cy="1796044"/>
-            <a:chOff x="5036803" y="1773935"/>
-            <a:chExt cx="1481992" cy="1796044"/>
-          </a:xfrm>
-        </p:grpSpPr>
-        <p:sp>
-          <p:nvSpPr>
-            <p:cNvPr id="5" name="Rectangle 4"/>
-            <p:cNvSpPr/>
-            <p:nvPr/>
-          </p:nvSpPr>
-          <p:spPr>
-            <a:xfrm>
-              <a:off x="5036803" y="1773935"/>
-              <a:ext cx="1481992" cy="1796044"/>
-            </a:xfrm>
-            <a:prstGeom prst="rect">
-              <a:avLst/>
-            </a:prstGeom>
-            <a:solidFill>
-              <a:srgbClr val="98C1B5"/>
-            </a:solidFill>
-          </p:spPr>
-          <p:style>
-            <a:lnRef idx="1">
-              <a:schemeClr val="accent1"/>
-            </a:lnRef>
-            <a:fillRef idx="3">
-              <a:schemeClr val="accent1"/>
-            </a:fillRef>
-            <a:effectRef idx="2">
-              <a:schemeClr val="accent1"/>
-            </a:effectRef>
-            <a:fontRef idx="minor">
-              <a:schemeClr val="lt1"/>
-            </a:fontRef>
-          </p:style>
-          <p:txBody>
-            <a:bodyPr rtlCol="0" anchor="ctr"/>
-            <a:lstStyle/>
-            <a:p>
-              <a:pPr algn="ctr"/>
-              <a:endParaRPr lang="en-US" dirty="0" smtClean="0"/>
-            </a:p>
-            <a:p>
-              <a:pPr algn="ctr"/>
-              <a:endParaRPr lang="en-US" dirty="0"/>
-            </a:p>
-            <a:p>
-              <a:pPr algn="ctr"/>
-              <a:endParaRPr lang="en-US" dirty="0" smtClean="0"/>
-            </a:p>
-            <a:p>
-              <a:pPr algn="ctr"/>
-              <a:endParaRPr lang="en-US" dirty="0"/>
-            </a:p>
-            <a:p>
-              <a:pPr algn="ctr"/>
-              <a:endParaRPr lang="en-US" dirty="0" smtClean="0"/>
-            </a:p>
-            <a:p>
-              <a:pPr algn="ctr"/>
-              <a:r>
-                <a:rPr lang="en-US" dirty="0" smtClean="0"/>
-                <a:t>Task Manager</a:t>
-              </a:r>
-              <a:endParaRPr lang="en-US" dirty="0"/>
-            </a:p>
-          </p:txBody>
-        </p:sp>
-        <p:sp>
-          <p:nvSpPr>
-            <p:cNvPr id="6" name="Rectangle 5"/>
-            <p:cNvSpPr/>
-            <p:nvPr/>
-          </p:nvSpPr>
-          <p:spPr>
-            <a:xfrm>
-              <a:off x="5186660" y="1891556"/>
-              <a:ext cx="319712" cy="1243276"/>
-            </a:xfrm>
-            <a:prstGeom prst="rect">
-              <a:avLst/>
-            </a:prstGeom>
-            <a:solidFill>
-              <a:schemeClr val="accent2"/>
-            </a:solidFill>
-          </p:spPr>
-          <p:style>
-            <a:lnRef idx="1">
-              <a:schemeClr val="accent1"/>
-            </a:lnRef>
-            <a:fillRef idx="3">
-              <a:schemeClr val="accent1"/>
-            </a:fillRef>
-            <a:effectRef idx="2">
-              <a:schemeClr val="accent1"/>
-            </a:effectRef>
-            <a:fontRef idx="minor">
-              <a:schemeClr val="lt1"/>
-            </a:fontRef>
-          </p:style>
-          <p:txBody>
-            <a:bodyPr rtlCol="0" anchor="ctr"/>
-            <a:lstStyle/>
-            <a:p>
-              <a:pPr algn="ctr"/>
-              <a:r>
-                <a:rPr lang="en-US" dirty="0" smtClean="0"/>
-                <a:t>Slot</a:t>
-              </a:r>
-              <a:endParaRPr lang="en-US" dirty="0"/>
-            </a:p>
-          </p:txBody>
-        </p:sp>
-        <p:sp>
-          <p:nvSpPr>
-            <p:cNvPr id="7" name="Rectangle 6"/>
-            <p:cNvSpPr/>
-            <p:nvPr/>
-          </p:nvSpPr>
-          <p:spPr>
-            <a:xfrm>
-              <a:off x="5612037" y="1891556"/>
-              <a:ext cx="319712" cy="1243276"/>
-            </a:xfrm>
-            <a:prstGeom prst="rect">
-              <a:avLst/>
-            </a:prstGeom>
-            <a:solidFill>
-              <a:srgbClr val="98C1B5"/>
-            </a:solidFill>
-          </p:spPr>
-          <p:style>
-            <a:lnRef idx="1">
-              <a:schemeClr val="accent1"/>
-            </a:lnRef>
-            <a:fillRef idx="3">
-              <a:schemeClr val="accent1"/>
-            </a:fillRef>
-            <a:effectRef idx="2">
-              <a:schemeClr val="accent1"/>
-            </a:effectRef>
-            <a:fontRef idx="minor">
-              <a:schemeClr val="lt1"/>
-            </a:fontRef>
-          </p:style>
-          <p:txBody>
-            <a:bodyPr rtlCol="0" anchor="ctr"/>
-            <a:lstStyle/>
-            <a:p>
-              <a:pPr algn="ctr"/>
-              <a:r>
-                <a:rPr lang="en-US" dirty="0" smtClean="0"/>
-                <a:t>Slot</a:t>
-              </a:r>
-              <a:endParaRPr lang="en-US" dirty="0"/>
-            </a:p>
-          </p:txBody>
-        </p:sp>
-        <p:sp>
-          <p:nvSpPr>
-            <p:cNvPr id="8" name="Rectangle 7"/>
-            <p:cNvSpPr/>
-            <p:nvPr/>
-          </p:nvSpPr>
-          <p:spPr>
-            <a:xfrm>
-              <a:off x="6039745" y="1891556"/>
-              <a:ext cx="319712" cy="1243276"/>
-            </a:xfrm>
-            <a:prstGeom prst="rect">
-              <a:avLst/>
-            </a:prstGeom>
-            <a:solidFill>
-              <a:srgbClr val="98C1B5"/>
-            </a:solidFill>
-          </p:spPr>
-          <p:style>
-            <a:lnRef idx="1">
-              <a:schemeClr val="accent1"/>
-            </a:lnRef>
-            <a:fillRef idx="3">
-              <a:schemeClr val="accent1"/>
-            </a:fillRef>
-            <a:effectRef idx="2">
-              <a:schemeClr val="accent1"/>
-            </a:effectRef>
-            <a:fontRef idx="minor">
-              <a:schemeClr val="lt1"/>
-            </a:fontRef>
-          </p:style>
-          <p:txBody>
-            <a:bodyPr rtlCol="0" anchor="ctr"/>
-            <a:lstStyle/>
-            <a:p>
-              <a:pPr algn="ctr"/>
-              <a:r>
-                <a:rPr lang="en-US" dirty="0" smtClean="0"/>
-                <a:t>Slot</a:t>
-              </a:r>
-              <a:endParaRPr lang="en-US" dirty="0"/>
-            </a:p>
-          </p:txBody>
-        </p:sp>
-      </p:grpSp>
-      <p:grpSp>
-        <p:nvGrpSpPr>
           <p:cNvPr id="15" name="Group 14"/>
           <p:cNvGrpSpPr/>
           <p:nvPr/>
         </p:nvGrpSpPr>
         <p:grpSpPr>
           <a:xfrm>
-            <a:off x="3863311" y="4076579"/>
+            <a:off x="3863311" y="4469427"/>
             <a:ext cx="1481992" cy="1796044"/>
             <a:chOff x="5036803" y="1773935"/>
             <a:chExt cx="1481992" cy="1796044"/>
@@ -21718,7 +23169,7 @@
         </p:nvGrpSpPr>
         <p:grpSpPr>
           <a:xfrm>
-            <a:off x="5747488" y="4076579"/>
+            <a:off x="5975913" y="4469427"/>
             <a:ext cx="1481992" cy="1796044"/>
             <a:chOff x="5036803" y="1773935"/>
             <a:chExt cx="1481992" cy="1796044"/>
@@ -21925,6 +23376,350 @@
           </p:txBody>
         </p:sp>
       </p:grpSp>
+      <p:grpSp>
+        <p:nvGrpSpPr>
+          <p:cNvPr id="10" name="Group 9"/>
+          <p:cNvGrpSpPr/>
+          <p:nvPr/>
+        </p:nvGrpSpPr>
+        <p:grpSpPr>
+          <a:xfrm>
+            <a:off x="1120885" y="4469427"/>
+            <a:ext cx="2100480" cy="2252048"/>
+            <a:chOff x="1349310" y="4469427"/>
+            <a:chExt cx="2100480" cy="2252048"/>
+          </a:xfrm>
+        </p:grpSpPr>
+        <p:grpSp>
+          <p:nvGrpSpPr>
+            <p:cNvPr id="9" name="Group 8"/>
+            <p:cNvGrpSpPr/>
+            <p:nvPr/>
+          </p:nvGrpSpPr>
+          <p:grpSpPr>
+            <a:xfrm>
+              <a:off x="1967798" y="4469427"/>
+              <a:ext cx="1481992" cy="1796044"/>
+              <a:chOff x="5036803" y="1773935"/>
+              <a:chExt cx="1481992" cy="1796044"/>
+            </a:xfrm>
+          </p:grpSpPr>
+          <p:sp>
+            <p:nvSpPr>
+              <p:cNvPr id="5" name="Rectangle 4"/>
+              <p:cNvSpPr/>
+              <p:nvPr/>
+            </p:nvSpPr>
+            <p:spPr>
+              <a:xfrm>
+                <a:off x="5036803" y="1773935"/>
+                <a:ext cx="1481992" cy="1796044"/>
+              </a:xfrm>
+              <a:prstGeom prst="rect">
+                <a:avLst/>
+              </a:prstGeom>
+              <a:solidFill>
+                <a:srgbClr val="98C1B5"/>
+              </a:solidFill>
+            </p:spPr>
+            <p:style>
+              <a:lnRef idx="1">
+                <a:schemeClr val="accent1"/>
+              </a:lnRef>
+              <a:fillRef idx="3">
+                <a:schemeClr val="accent1"/>
+              </a:fillRef>
+              <a:effectRef idx="2">
+                <a:schemeClr val="accent1"/>
+              </a:effectRef>
+              <a:fontRef idx="minor">
+                <a:schemeClr val="lt1"/>
+              </a:fontRef>
+            </p:style>
+            <p:txBody>
+              <a:bodyPr rtlCol="0" anchor="ctr"/>
+              <a:lstStyle/>
+              <a:p>
+                <a:pPr algn="ctr"/>
+                <a:endParaRPr lang="en-US" dirty="0" smtClean="0"/>
+              </a:p>
+              <a:p>
+                <a:pPr algn="ctr"/>
+                <a:endParaRPr lang="en-US" dirty="0"/>
+              </a:p>
+              <a:p>
+                <a:pPr algn="ctr"/>
+                <a:endParaRPr lang="en-US" dirty="0" smtClean="0"/>
+              </a:p>
+              <a:p>
+                <a:pPr algn="ctr"/>
+                <a:endParaRPr lang="en-US" dirty="0"/>
+              </a:p>
+              <a:p>
+                <a:pPr algn="ctr"/>
+                <a:endParaRPr lang="en-US" dirty="0" smtClean="0"/>
+              </a:p>
+              <a:p>
+                <a:pPr algn="ctr"/>
+                <a:r>
+                  <a:rPr lang="en-US" dirty="0" smtClean="0"/>
+                  <a:t>Task Manager</a:t>
+                </a:r>
+                <a:endParaRPr lang="en-US" dirty="0"/>
+              </a:p>
+            </p:txBody>
+          </p:sp>
+          <p:sp>
+            <p:nvSpPr>
+              <p:cNvPr id="6" name="Rectangle 5"/>
+              <p:cNvSpPr/>
+              <p:nvPr/>
+            </p:nvSpPr>
+            <p:spPr>
+              <a:xfrm>
+                <a:off x="5186660" y="1891556"/>
+                <a:ext cx="319712" cy="1243276"/>
+              </a:xfrm>
+              <a:prstGeom prst="rect">
+                <a:avLst/>
+              </a:prstGeom>
+              <a:solidFill>
+                <a:schemeClr val="accent2"/>
+              </a:solidFill>
+            </p:spPr>
+            <p:style>
+              <a:lnRef idx="1">
+                <a:schemeClr val="accent1"/>
+              </a:lnRef>
+              <a:fillRef idx="3">
+                <a:schemeClr val="accent1"/>
+              </a:fillRef>
+              <a:effectRef idx="2">
+                <a:schemeClr val="accent1"/>
+              </a:effectRef>
+              <a:fontRef idx="minor">
+                <a:schemeClr val="lt1"/>
+              </a:fontRef>
+            </p:style>
+            <p:txBody>
+              <a:bodyPr rtlCol="0" anchor="ctr"/>
+              <a:lstStyle/>
+              <a:p>
+                <a:pPr algn="ctr"/>
+                <a:r>
+                  <a:rPr lang="en-US" dirty="0" smtClean="0"/>
+                  <a:t>Slot</a:t>
+                </a:r>
+                <a:endParaRPr lang="en-US" dirty="0"/>
+              </a:p>
+            </p:txBody>
+          </p:sp>
+          <p:sp>
+            <p:nvSpPr>
+              <p:cNvPr id="7" name="Rectangle 6"/>
+              <p:cNvSpPr/>
+              <p:nvPr/>
+            </p:nvSpPr>
+            <p:spPr>
+              <a:xfrm>
+                <a:off x="5612037" y="1891556"/>
+                <a:ext cx="319712" cy="1243276"/>
+              </a:xfrm>
+              <a:prstGeom prst="rect">
+                <a:avLst/>
+              </a:prstGeom>
+              <a:solidFill>
+                <a:srgbClr val="98C1B5"/>
+              </a:solidFill>
+            </p:spPr>
+            <p:style>
+              <a:lnRef idx="1">
+                <a:schemeClr val="accent1"/>
+              </a:lnRef>
+              <a:fillRef idx="3">
+                <a:schemeClr val="accent1"/>
+              </a:fillRef>
+              <a:effectRef idx="2">
+                <a:schemeClr val="accent1"/>
+              </a:effectRef>
+              <a:fontRef idx="minor">
+                <a:schemeClr val="lt1"/>
+              </a:fontRef>
+            </p:style>
+            <p:txBody>
+              <a:bodyPr rtlCol="0" anchor="ctr"/>
+              <a:lstStyle/>
+              <a:p>
+                <a:pPr algn="ctr"/>
+                <a:r>
+                  <a:rPr lang="en-US" dirty="0" smtClean="0"/>
+                  <a:t>Slot</a:t>
+                </a:r>
+                <a:endParaRPr lang="en-US" dirty="0"/>
+              </a:p>
+            </p:txBody>
+          </p:sp>
+          <p:sp>
+            <p:nvSpPr>
+              <p:cNvPr id="8" name="Rectangle 7"/>
+              <p:cNvSpPr/>
+              <p:nvPr/>
+            </p:nvSpPr>
+            <p:spPr>
+              <a:xfrm>
+                <a:off x="6039745" y="1891556"/>
+                <a:ext cx="319712" cy="1243276"/>
+              </a:xfrm>
+              <a:prstGeom prst="rect">
+                <a:avLst/>
+              </a:prstGeom>
+              <a:solidFill>
+                <a:srgbClr val="98C1B5"/>
+              </a:solidFill>
+            </p:spPr>
+            <p:style>
+              <a:lnRef idx="1">
+                <a:schemeClr val="accent1"/>
+              </a:lnRef>
+              <a:fillRef idx="3">
+                <a:schemeClr val="accent1"/>
+              </a:fillRef>
+              <a:effectRef idx="2">
+                <a:schemeClr val="accent1"/>
+              </a:effectRef>
+              <a:fontRef idx="minor">
+                <a:schemeClr val="lt1"/>
+              </a:fontRef>
+            </p:style>
+            <p:txBody>
+              <a:bodyPr rtlCol="0" anchor="ctr"/>
+              <a:lstStyle/>
+              <a:p>
+                <a:pPr algn="ctr"/>
+                <a:r>
+                  <a:rPr lang="en-US" dirty="0" smtClean="0"/>
+                  <a:t>Slot</a:t>
+                </a:r>
+                <a:endParaRPr lang="en-US" dirty="0"/>
+              </a:p>
+            </p:txBody>
+          </p:sp>
+        </p:grpSp>
+        <p:pic>
+          <p:nvPicPr>
+            <p:cNvPr id="30" name="Picture 21" descr="C:\Users\warneke\AppData\Local\Microsoft\Windows\Temporary Internet Files\Content.IE5\X8LGV7F5\MCj04348450000[1].png"/>
+            <p:cNvPicPr>
+              <a:picLocks noChangeAspect="1" noChangeArrowheads="1"/>
+            </p:cNvPicPr>
+            <p:nvPr/>
+          </p:nvPicPr>
+          <p:blipFill>
+            <a:blip r:embed="rId2" cstate="screen">
+              <a:extLst>
+                <a:ext uri="{28A0092B-C50C-407E-A947-70E740481C1C}">
+                  <a14:useLocalDpi xmlns:a14="http://schemas.microsoft.com/office/drawing/2010/main"/>
+                </a:ext>
+              </a:extLst>
+            </a:blip>
+            <a:srcRect/>
+            <a:stretch>
+              <a:fillRect/>
+            </a:stretch>
+          </p:blipFill>
+          <p:spPr bwMode="auto">
+            <a:xfrm flipH="1">
+              <a:off x="1349310" y="6001395"/>
+              <a:ext cx="843958" cy="720080"/>
+            </a:xfrm>
+            <a:prstGeom prst="rect">
+              <a:avLst/>
+            </a:prstGeom>
+            <a:noFill/>
+            <a:ln w="9525">
+              <a:noFill/>
+              <a:miter lim="800000"/>
+              <a:headEnd/>
+              <a:tailEnd/>
+            </a:ln>
+          </p:spPr>
+        </p:pic>
+      </p:grpSp>
+      <p:pic>
+        <p:nvPicPr>
+          <p:cNvPr id="31" name="Picture 21" descr="C:\Users\warneke\AppData\Local\Microsoft\Windows\Temporary Internet Files\Content.IE5\X8LGV7F5\MCj04348450000[1].png"/>
+          <p:cNvPicPr>
+            <a:picLocks noChangeAspect="1" noChangeArrowheads="1"/>
+          </p:cNvPicPr>
+          <p:nvPr/>
+        </p:nvPicPr>
+        <p:blipFill>
+          <a:blip r:embed="rId2" cstate="screen">
+            <a:extLst>
+              <a:ext uri="{28A0092B-C50C-407E-A947-70E740481C1C}">
+                <a14:useLocalDpi xmlns:a14="http://schemas.microsoft.com/office/drawing/2010/main"/>
+              </a:ext>
+            </a:extLst>
+          </a:blip>
+          <a:srcRect/>
+          <a:stretch>
+            <a:fillRect/>
+          </a:stretch>
+        </p:blipFill>
+        <p:spPr bwMode="auto">
+          <a:xfrm flipH="1">
+            <a:off x="3253904" y="6025888"/>
+            <a:ext cx="843958" cy="720080"/>
+          </a:xfrm>
+          <a:prstGeom prst="rect">
+            <a:avLst/>
+          </a:prstGeom>
+          <a:noFill/>
+          <a:ln w="9525">
+            <a:noFill/>
+            <a:miter lim="800000"/>
+            <a:headEnd/>
+            <a:tailEnd/>
+          </a:ln>
+        </p:spPr>
+      </p:pic>
+      <p:pic>
+        <p:nvPicPr>
+          <p:cNvPr id="32" name="Picture 21" descr="C:\Users\warneke\AppData\Local\Microsoft\Windows\Temporary Internet Files\Content.IE5\X8LGV7F5\MCj04348450000[1].png"/>
+          <p:cNvPicPr>
+            <a:picLocks noChangeAspect="1" noChangeArrowheads="1"/>
+          </p:cNvPicPr>
+          <p:nvPr/>
+        </p:nvPicPr>
+        <p:blipFill>
+          <a:blip r:embed="rId2" cstate="screen">
+            <a:extLst>
+              <a:ext uri="{28A0092B-C50C-407E-A947-70E740481C1C}">
+                <a14:useLocalDpi xmlns:a14="http://schemas.microsoft.com/office/drawing/2010/main"/>
+              </a:ext>
+            </a:extLst>
+          </a:blip>
+          <a:srcRect/>
+          <a:stretch>
+            <a:fillRect/>
+          </a:stretch>
+        </p:blipFill>
+        <p:spPr bwMode="auto">
+          <a:xfrm flipH="1">
+            <a:off x="5345303" y="6025888"/>
+            <a:ext cx="843958" cy="720080"/>
+          </a:xfrm>
+          <a:prstGeom prst="rect">
+            <a:avLst/>
+          </a:prstGeom>
+          <a:noFill/>
+          <a:ln w="9525">
+            <a:noFill/>
+            <a:miter lim="800000"/>
+            <a:headEnd/>
+            <a:tailEnd/>
+          </a:ln>
+        </p:spPr>
+      </p:pic>
     </p:spTree>
     <p:extLst>
       <p:ext uri="{BB962C8B-B14F-4D97-AF65-F5344CB8AC3E}">
@@ -26160,10 +27955,10 @@
         </p:nvGrpSpPr>
         <p:grpSpPr>
           <a:xfrm>
-            <a:off x="3565547" y="1385531"/>
-            <a:ext cx="1336713" cy="1338570"/>
-            <a:chOff x="3565547" y="1192385"/>
-            <a:chExt cx="1336713" cy="1338570"/>
+            <a:off x="3031430" y="1745049"/>
+            <a:ext cx="1528592" cy="1017434"/>
+            <a:chOff x="3373667" y="1260828"/>
+            <a:chExt cx="1528592" cy="1017434"/>
           </a:xfrm>
         </p:grpSpPr>
         <p:sp>
@@ -26174,8 +27969,8 @@
           </p:nvSpPr>
           <p:spPr>
             <a:xfrm>
-              <a:off x="3605784" y="1192385"/>
-              <a:ext cx="1296476" cy="1338570"/>
+              <a:off x="3892424" y="1260828"/>
+              <a:ext cx="1009835" cy="621565"/>
             </a:xfrm>
             <a:prstGeom prst="rect">
               <a:avLst/>
@@ -26230,7 +28025,7 @@
           </p:blipFill>
           <p:spPr bwMode="auto">
             <a:xfrm flipH="1">
-              <a:off x="3565547" y="1669749"/>
+              <a:off x="3373667" y="1558182"/>
               <a:ext cx="843958" cy="720080"/>
             </a:xfrm>
             <a:prstGeom prst="rect">
@@ -26861,8 +28656,8 @@
         </p:nvGrpSpPr>
         <p:grpSpPr>
           <a:xfrm>
-            <a:off x="4409505" y="2075538"/>
-            <a:ext cx="1700556" cy="369332"/>
+            <a:off x="4430840" y="2075538"/>
+            <a:ext cx="1423384" cy="369332"/>
             <a:chOff x="4409505" y="1906799"/>
             <a:chExt cx="1700556" cy="369332"/>
           </a:xfrm>
@@ -28751,19 +30546,11 @@
             </a:r>
             <a:r>
               <a:rPr lang="en-US" sz="2800" i="1" dirty="0" smtClean="0"/>
-              <a:t>batch and </a:t>
-            </a:r>
-            <a:r>
-              <a:rPr lang="en-US" sz="2800" i="1" dirty="0" smtClean="0"/>
-              <a:t>streaming</a:t>
+              <a:t>batch and streaming</a:t>
             </a:r>
             <a:r>
               <a:rPr lang="en-US" sz="2800" dirty="0" smtClean="0"/>
-              <a:t> </a:t>
-            </a:r>
-            <a:r>
-              <a:rPr lang="en-US" sz="2800" dirty="0" smtClean="0"/>
-              <a:t>analysis (Java / </a:t>
+              <a:t> analysis (Java / </a:t>
             </a:r>
             <a:r>
               <a:rPr lang="en-US" sz="2800" dirty="0" err="1" smtClean="0"/>

</xml_diff>

<commit_message>
dropped a few slides
</commit_message>
<xml_diff>
--- a/slides/flink_overview.pptx
+++ b/slides/flink_overview.pptx
@@ -2,55 +2,51 @@
 <file path=ppt/presentation.xml><?xml version="1.0" encoding="utf-8"?>
 <p:presentation xmlns:a="http://schemas.openxmlformats.org/drawingml/2006/main" xmlns:r="http://schemas.openxmlformats.org/officeDocument/2006/relationships" xmlns:mc="http://schemas.openxmlformats.org/markup-compatibility/2006" xmlns:mv="urn:schemas-microsoft-com:mac:vml" xmlns:p="http://schemas.openxmlformats.org/presentationml/2006/main" xmlns:c="http://schemas.openxmlformats.org/drawingml/2006/chart" xmlns:dgm="http://schemas.openxmlformats.org/drawingml/2006/diagram" xmlns:o="urn:schemas-microsoft-com:office:office" xmlns:v="urn:schemas-microsoft-com:vml" xmlns:pvml="urn:schemas-microsoft-com:office:powerpoint" xmlns:com="http://schemas.openxmlformats.org/drawingml/2006/compatibility" xmlns:p14="http://schemas.microsoft.com/office/powerpoint/2010/main" autoCompressPictures="0" embedTrueTypeFonts="1" strictFirstAndLastChars="0" saveSubsetFonts="1">
   <p:sldMasterIdLst>
-    <p:sldMasterId id="2147483694" r:id="rId4"/>
-    <p:sldMasterId id="2147483695" r:id="rId5"/>
-    <p:sldMasterId id="2147483696" r:id="rId6"/>
-    <p:sldMasterId id="2147483697" r:id="rId7"/>
+    <p:sldMasterId id="2147483694" r:id="rId3"/>
+    <p:sldMasterId id="2147483695" r:id="rId4"/>
+    <p:sldMasterId id="2147483696" r:id="rId5"/>
+    <p:sldMasterId id="2147483697" r:id="rId6"/>
   </p:sldMasterIdLst>
   <p:notesMasterIdLst>
-    <p:notesMasterId r:id="rId8"/>
+    <p:notesMasterId r:id="rId7"/>
   </p:notesMasterIdLst>
   <p:sldIdLst>
-    <p:sldId id="256" r:id="rId9"/>
-    <p:sldId id="257" r:id="rId10"/>
-    <p:sldId id="258" r:id="rId11"/>
-    <p:sldId id="259" r:id="rId12"/>
-    <p:sldId id="260" r:id="rId13"/>
-    <p:sldId id="261" r:id="rId14"/>
-    <p:sldId id="262" r:id="rId15"/>
-    <p:sldId id="263" r:id="rId16"/>
-    <p:sldId id="264" r:id="rId17"/>
-    <p:sldId id="265" r:id="rId18"/>
-    <p:sldId id="266" r:id="rId19"/>
-    <p:sldId id="267" r:id="rId20"/>
-    <p:sldId id="268" r:id="rId21"/>
-    <p:sldId id="269" r:id="rId22"/>
-    <p:sldId id="270" r:id="rId23"/>
-    <p:sldId id="271" r:id="rId24"/>
-    <p:sldId id="272" r:id="rId25"/>
-    <p:sldId id="273" r:id="rId26"/>
-    <p:sldId id="274" r:id="rId27"/>
-    <p:sldId id="275" r:id="rId28"/>
-    <p:sldId id="276" r:id="rId29"/>
-    <p:sldId id="277" r:id="rId30"/>
-    <p:sldId id="278" r:id="rId31"/>
-    <p:sldId id="279" r:id="rId32"/>
-    <p:sldId id="280" r:id="rId33"/>
-    <p:sldId id="281" r:id="rId34"/>
-    <p:sldId id="282" r:id="rId35"/>
-    <p:sldId id="283" r:id="rId36"/>
-    <p:sldId id="284" r:id="rId37"/>
-    <p:sldId id="285" r:id="rId38"/>
+    <p:sldId id="256" r:id="rId8"/>
+    <p:sldId id="257" r:id="rId9"/>
+    <p:sldId id="258" r:id="rId10"/>
+    <p:sldId id="259" r:id="rId11"/>
+    <p:sldId id="260" r:id="rId12"/>
+    <p:sldId id="261" r:id="rId13"/>
+    <p:sldId id="262" r:id="rId14"/>
+    <p:sldId id="263" r:id="rId15"/>
+    <p:sldId id="264" r:id="rId16"/>
+    <p:sldId id="265" r:id="rId17"/>
+    <p:sldId id="266" r:id="rId18"/>
+    <p:sldId id="267" r:id="rId19"/>
+    <p:sldId id="268" r:id="rId20"/>
+    <p:sldId id="269" r:id="rId21"/>
+    <p:sldId id="270" r:id="rId22"/>
+    <p:sldId id="271" r:id="rId23"/>
+    <p:sldId id="272" r:id="rId24"/>
+    <p:sldId id="273" r:id="rId25"/>
+    <p:sldId id="274" r:id="rId26"/>
+    <p:sldId id="275" r:id="rId27"/>
+    <p:sldId id="276" r:id="rId28"/>
+    <p:sldId id="277" r:id="rId29"/>
+    <p:sldId id="278" r:id="rId30"/>
+    <p:sldId id="279" r:id="rId31"/>
+    <p:sldId id="280" r:id="rId32"/>
+    <p:sldId id="281" r:id="rId33"/>
   </p:sldIdLst>
   <p:sldSz cy="6858000" cx="9144000"/>
   <p:notesSz cx="6858000" cy="9144000"/>
   <p:embeddedFontLst>
     <p:embeddedFont>
       <p:font typeface="Helvetica Neue"/>
-      <p:regular r:id="rId39"/>
-      <p:bold r:id="rId40"/>
-      <p:italic r:id="rId41"/>
-      <p:boldItalic r:id="rId42"/>
+      <p:regular r:id="rId34"/>
+      <p:bold r:id="rId35"/>
+      <p:italic r:id="rId36"/>
+      <p:boldItalic r:id="rId37"/>
     </p:embeddedFont>
   </p:embeddedFontLst>
   <p:defaultTextStyle>
@@ -258,13 +254,6 @@
 </p:presentation>
 </file>
 
-<file path=ppt/commentAuthors.xml><?xml version="1.0" encoding="utf-8"?>
-<p:cmAuthorLst xmlns:a="http://schemas.openxmlformats.org/drawingml/2006/main" xmlns:r="http://schemas.openxmlformats.org/officeDocument/2006/relationships" xmlns:mc="http://schemas.openxmlformats.org/markup-compatibility/2006" xmlns:mv="urn:schemas-microsoft-com:mac:vml" xmlns:p="http://schemas.openxmlformats.org/presentationml/2006/main" xmlns:c="http://schemas.openxmlformats.org/drawingml/2006/chart" xmlns:dgm="http://schemas.openxmlformats.org/drawingml/2006/diagram" xmlns:o="urn:schemas-microsoft-com:office:office" xmlns:v="urn:schemas-microsoft-com:vml" xmlns:pvml="urn:schemas-microsoft-com:office:powerpoint" xmlns:com="http://schemas.openxmlformats.org/drawingml/2006/compatibility" xmlns:p14="http://schemas.microsoft.com/office/powerpoint/2010/main">
-  <p:cmAuthor clrIdx="0" id="0" initials="" lastIdx="1" name="Fabian Hueske"/>
-  <p:cmAuthor clrIdx="1" id="1" initials="" lastIdx="1" name="David Anderson"/>
-</p:cmAuthorLst>
-</file>
-
 <file path=ppt/comments/comment1.xml><?xml version="1.0" encoding="utf-8"?>
 <p:cmLst xmlns:a="http://schemas.openxmlformats.org/drawingml/2006/main" xmlns:r="http://schemas.openxmlformats.org/officeDocument/2006/relationships" xmlns:mc="http://schemas.openxmlformats.org/markup-compatibility/2006" xmlns:mv="urn:schemas-microsoft-com:mac:vml" xmlns:p="http://schemas.openxmlformats.org/presentationml/2006/main" xmlns:c="http://schemas.openxmlformats.org/drawingml/2006/chart" xmlns:dgm="http://schemas.openxmlformats.org/drawingml/2006/diagram" xmlns:o="urn:schemas-microsoft-com:office:office" xmlns:v="urn:schemas-microsoft-com:vml" xmlns:pvml="urn:schemas-microsoft-com:office:powerpoint" xmlns:com="http://schemas.openxmlformats.org/drawingml/2006/compatibility" xmlns:p14="http://schemas.microsoft.com/office/powerpoint/2010/main"/>
 </file>
@@ -283,19 +272,6 @@
 
 <file path=ppt/comments/comment5.xml><?xml version="1.0" encoding="utf-8"?>
 <p:cmLst xmlns:a="http://schemas.openxmlformats.org/drawingml/2006/main" xmlns:r="http://schemas.openxmlformats.org/officeDocument/2006/relationships" xmlns:mc="http://schemas.openxmlformats.org/markup-compatibility/2006" xmlns:mv="urn:schemas-microsoft-com:mac:vml" xmlns:p="http://schemas.openxmlformats.org/presentationml/2006/main" xmlns:c="http://schemas.openxmlformats.org/drawingml/2006/chart" xmlns:dgm="http://schemas.openxmlformats.org/drawingml/2006/diagram" xmlns:o="urn:schemas-microsoft-com:office:office" xmlns:v="urn:schemas-microsoft-com:vml" xmlns:pvml="urn:schemas-microsoft-com:office:powerpoint" xmlns:com="http://schemas.openxmlformats.org/drawingml/2006/compatibility" xmlns:p14="http://schemas.microsoft.com/office/powerpoint/2010/main"/>
-</file>
-
-<file path=ppt/comments/comment6.xml><?xml version="1.0" encoding="utf-8"?>
-<p:cmLst xmlns:a="http://schemas.openxmlformats.org/drawingml/2006/main" xmlns:r="http://schemas.openxmlformats.org/officeDocument/2006/relationships" xmlns:mc="http://schemas.openxmlformats.org/markup-compatibility/2006" xmlns:mv="urn:schemas-microsoft-com:mac:vml" xmlns:p="http://schemas.openxmlformats.org/presentationml/2006/main" xmlns:c="http://schemas.openxmlformats.org/drawingml/2006/chart" xmlns:dgm="http://schemas.openxmlformats.org/drawingml/2006/diagram" xmlns:o="urn:schemas-microsoft-com:office:office" xmlns:v="urn:schemas-microsoft-com:vml" xmlns:pvml="urn:schemas-microsoft-com:office:powerpoint" xmlns:com="http://schemas.openxmlformats.org/drawingml/2006/compatibility" xmlns:p14="http://schemas.microsoft.com/office/powerpoint/2010/main">
-  <p:cm authorId="0" idx="1" dt="2016-11-09T03:01:07.116">
-    <p:pos x="6000" y="0"/>
-    <p:text>Not sure we should talk about this here. One can easily spend a lot of time on this topic + many questions. Maybe add this to a closing session (if we want one)?</p:text>
-  </p:cm>
-  <p:cm authorId="1" idx="1" dt="2016-11-09T03:01:07.116">
-    <p:pos x="6000" y="100"/>
-    <p:text>I had the same thought, but I wasn't sure I wanted to create another presentation for 3 or 4 slides. But yes, the content makes more sense in a wrap-up session.</p:text>
-  </p:cm>
-</p:cmLst>
 </file>
 
 <file path=ppt/notesMasters/notesMaster1.xml><?xml version="1.0" encoding="utf-8"?>
@@ -2312,303 +2288,6 @@
 </p:notes>
 </file>
 
-<file path=ppt/notesSlides/notesSlide27.xml><?xml version="1.0" encoding="utf-8"?>
-<p:notes xmlns:a="http://schemas.openxmlformats.org/drawingml/2006/main" xmlns:r="http://schemas.openxmlformats.org/officeDocument/2006/relationships" xmlns:mc="http://schemas.openxmlformats.org/markup-compatibility/2006" xmlns:mv="urn:schemas-microsoft-com:mac:vml" xmlns:p="http://schemas.openxmlformats.org/presentationml/2006/main" xmlns:c="http://schemas.openxmlformats.org/drawingml/2006/chart" xmlns:dgm="http://schemas.openxmlformats.org/drawingml/2006/diagram" xmlns:o="urn:schemas-microsoft-com:office:office" xmlns:v="urn:schemas-microsoft-com:vml" xmlns:pvml="urn:schemas-microsoft-com:office:powerpoint" xmlns:com="http://schemas.openxmlformats.org/drawingml/2006/compatibility" xmlns:p14="http://schemas.microsoft.com/office/powerpoint/2010/main" showMasterPhAnim="0" showMasterSp="0">
-  <p:cSld>
-    <p:spTree>
-      <p:nvGrpSpPr>
-        <p:cNvPr id="776" name="Shape 776"/>
-        <p:cNvGrpSpPr/>
-        <p:nvPr/>
-      </p:nvGrpSpPr>
-      <p:grpSpPr>
-        <a:xfrm>
-          <a:off x="0" y="0"/>
-          <a:ext cx="0" cy="0"/>
-          <a:chOff x="0" y="0"/>
-          <a:chExt cx="0" cy="0"/>
-        </a:xfrm>
-      </p:grpSpPr>
-      <p:sp>
-        <p:nvSpPr>
-          <p:cNvPr id="777" name="Shape 777"/>
-          <p:cNvSpPr txBox="1"/>
-          <p:nvPr>
-            <p:ph idx="1" type="body"/>
-          </p:nvPr>
-        </p:nvSpPr>
-        <p:spPr>
-          <a:xfrm>
-            <a:off x="685800" y="4343400"/>
-            <a:ext cx="5486400" cy="4114800"/>
-          </a:xfrm>
-          <a:prstGeom prst="rect">
-            <a:avLst/>
-          </a:prstGeom>
-          <a:noFill/>
-          <a:ln>
-            <a:noFill/>
-          </a:ln>
-        </p:spPr>
-        <p:txBody>
-          <a:bodyPr anchorCtr="0" anchor="ctr" bIns="91425" lIns="91425" rIns="91425" tIns="91425">
-            <a:noAutofit/>
-          </a:bodyPr>
-          <a:lstStyle/>
-          <a:p>
-            <a:pPr lvl="0" rtl="0">
-              <a:spcBef>
-                <a:spcPts val="0"/>
-              </a:spcBef>
-              <a:buNone/>
-            </a:pPr>
-            <a:r>
-              <a:t/>
-            </a:r>
-            <a:endParaRPr/>
-          </a:p>
-        </p:txBody>
-      </p:sp>
-      <p:sp>
-        <p:nvSpPr>
-          <p:cNvPr id="778" name="Shape 778"/>
-          <p:cNvSpPr/>
-          <p:nvPr>
-            <p:ph idx="2" type="sldImg"/>
-          </p:nvPr>
-        </p:nvSpPr>
-        <p:spPr>
-          <a:xfrm>
-            <a:off x="1143000" y="685800"/>
-            <a:ext cx="4572000" cy="3429000"/>
-          </a:xfrm>
-          <a:custGeom>
-            <a:pathLst>
-              <a:path extrusionOk="0" h="120000" w="120000">
-                <a:moveTo>
-                  <a:pt x="0" y="0"/>
-                </a:moveTo>
-                <a:lnTo>
-                  <a:pt x="120000" y="0"/>
-                </a:lnTo>
-                <a:lnTo>
-                  <a:pt x="120000" y="120000"/>
-                </a:lnTo>
-                <a:lnTo>
-                  <a:pt x="0" y="120000"/>
-                </a:lnTo>
-                <a:close/>
-              </a:path>
-            </a:pathLst>
-          </a:custGeom>
-        </p:spPr>
-      </p:sp>
-    </p:spTree>
-  </p:cSld>
-  <p:clrMapOvr>
-    <a:masterClrMapping/>
-  </p:clrMapOvr>
-</p:notes>
-</file>
-
-<file path=ppt/notesSlides/notesSlide28.xml><?xml version="1.0" encoding="utf-8"?>
-<p:notes xmlns:a="http://schemas.openxmlformats.org/drawingml/2006/main" xmlns:r="http://schemas.openxmlformats.org/officeDocument/2006/relationships" xmlns:mc="http://schemas.openxmlformats.org/markup-compatibility/2006" xmlns:mv="urn:schemas-microsoft-com:mac:vml" xmlns:p="http://schemas.openxmlformats.org/presentationml/2006/main" xmlns:c="http://schemas.openxmlformats.org/drawingml/2006/chart" xmlns:dgm="http://schemas.openxmlformats.org/drawingml/2006/diagram" xmlns:o="urn:schemas-microsoft-com:office:office" xmlns:v="urn:schemas-microsoft-com:vml" xmlns:pvml="urn:schemas-microsoft-com:office:powerpoint" xmlns:com="http://schemas.openxmlformats.org/drawingml/2006/compatibility" xmlns:p14="http://schemas.microsoft.com/office/powerpoint/2010/main" showMasterPhAnim="0" showMasterSp="0">
-  <p:cSld>
-    <p:spTree>
-      <p:nvGrpSpPr>
-        <p:cNvPr id="783" name="Shape 783"/>
-        <p:cNvGrpSpPr/>
-        <p:nvPr/>
-      </p:nvGrpSpPr>
-      <p:grpSpPr>
-        <a:xfrm>
-          <a:off x="0" y="0"/>
-          <a:ext cx="0" cy="0"/>
-          <a:chOff x="0" y="0"/>
-          <a:chExt cx="0" cy="0"/>
-        </a:xfrm>
-      </p:grpSpPr>
-      <p:sp>
-        <p:nvSpPr>
-          <p:cNvPr id="784" name="Shape 784"/>
-          <p:cNvSpPr txBox="1"/>
-          <p:nvPr>
-            <p:ph idx="1" type="body"/>
-          </p:nvPr>
-        </p:nvSpPr>
-        <p:spPr>
-          <a:xfrm>
-            <a:off x="685800" y="4343400"/>
-            <a:ext cx="5486400" cy="4114800"/>
-          </a:xfrm>
-          <a:prstGeom prst="rect">
-            <a:avLst/>
-          </a:prstGeom>
-          <a:noFill/>
-          <a:ln>
-            <a:noFill/>
-          </a:ln>
-        </p:spPr>
-        <p:txBody>
-          <a:bodyPr anchorCtr="0" anchor="ctr" bIns="91425" lIns="91425" rIns="91425" tIns="91425">
-            <a:noAutofit/>
-          </a:bodyPr>
-          <a:lstStyle/>
-          <a:p>
-            <a:pPr lvl="0" rtl="0">
-              <a:spcBef>
-                <a:spcPts val="0"/>
-              </a:spcBef>
-              <a:buNone/>
-            </a:pPr>
-            <a:r>
-              <a:t/>
-            </a:r>
-            <a:endParaRPr/>
-          </a:p>
-        </p:txBody>
-      </p:sp>
-      <p:sp>
-        <p:nvSpPr>
-          <p:cNvPr id="785" name="Shape 785"/>
-          <p:cNvSpPr/>
-          <p:nvPr>
-            <p:ph idx="2" type="sldImg"/>
-          </p:nvPr>
-        </p:nvSpPr>
-        <p:spPr>
-          <a:xfrm>
-            <a:off x="1143000" y="685800"/>
-            <a:ext cx="4572000" cy="3429000"/>
-          </a:xfrm>
-          <a:custGeom>
-            <a:pathLst>
-              <a:path extrusionOk="0" h="120000" w="120000">
-                <a:moveTo>
-                  <a:pt x="0" y="0"/>
-                </a:moveTo>
-                <a:lnTo>
-                  <a:pt x="120000" y="0"/>
-                </a:lnTo>
-                <a:lnTo>
-                  <a:pt x="120000" y="120000"/>
-                </a:lnTo>
-                <a:lnTo>
-                  <a:pt x="0" y="120000"/>
-                </a:lnTo>
-                <a:close/>
-              </a:path>
-            </a:pathLst>
-          </a:custGeom>
-        </p:spPr>
-      </p:sp>
-    </p:spTree>
-  </p:cSld>
-  <p:clrMapOvr>
-    <a:masterClrMapping/>
-  </p:clrMapOvr>
-</p:notes>
-</file>
-
-<file path=ppt/notesSlides/notesSlide29.xml><?xml version="1.0" encoding="utf-8"?>
-<p:notes xmlns:a="http://schemas.openxmlformats.org/drawingml/2006/main" xmlns:r="http://schemas.openxmlformats.org/officeDocument/2006/relationships" xmlns:mc="http://schemas.openxmlformats.org/markup-compatibility/2006" xmlns:mv="urn:schemas-microsoft-com:mac:vml" xmlns:p="http://schemas.openxmlformats.org/presentationml/2006/main" xmlns:c="http://schemas.openxmlformats.org/drawingml/2006/chart" xmlns:dgm="http://schemas.openxmlformats.org/drawingml/2006/diagram" xmlns:o="urn:schemas-microsoft-com:office:office" xmlns:v="urn:schemas-microsoft-com:vml" xmlns:pvml="urn:schemas-microsoft-com:office:powerpoint" xmlns:com="http://schemas.openxmlformats.org/drawingml/2006/compatibility" xmlns:p14="http://schemas.microsoft.com/office/powerpoint/2010/main" showMasterPhAnim="0" showMasterSp="0">
-  <p:cSld>
-    <p:spTree>
-      <p:nvGrpSpPr>
-        <p:cNvPr id="794" name="Shape 794"/>
-        <p:cNvGrpSpPr/>
-        <p:nvPr/>
-      </p:nvGrpSpPr>
-      <p:grpSpPr>
-        <a:xfrm>
-          <a:off x="0" y="0"/>
-          <a:ext cx="0" cy="0"/>
-          <a:chOff x="0" y="0"/>
-          <a:chExt cx="0" cy="0"/>
-        </a:xfrm>
-      </p:grpSpPr>
-      <p:sp>
-        <p:nvSpPr>
-          <p:cNvPr id="795" name="Shape 795"/>
-          <p:cNvSpPr txBox="1"/>
-          <p:nvPr>
-            <p:ph idx="1" type="body"/>
-          </p:nvPr>
-        </p:nvSpPr>
-        <p:spPr>
-          <a:xfrm>
-            <a:off x="685800" y="4343400"/>
-            <a:ext cx="5486400" cy="4114800"/>
-          </a:xfrm>
-          <a:prstGeom prst="rect">
-            <a:avLst/>
-          </a:prstGeom>
-          <a:noFill/>
-          <a:ln>
-            <a:noFill/>
-          </a:ln>
-        </p:spPr>
-        <p:txBody>
-          <a:bodyPr anchorCtr="0" anchor="ctr" bIns="91425" lIns="91425" rIns="91425" tIns="91425">
-            <a:noAutofit/>
-          </a:bodyPr>
-          <a:lstStyle/>
-          <a:p>
-            <a:pPr lvl="0" rtl="0">
-              <a:spcBef>
-                <a:spcPts val="0"/>
-              </a:spcBef>
-              <a:buNone/>
-            </a:pPr>
-            <a:r>
-              <a:t/>
-            </a:r>
-            <a:endParaRPr/>
-          </a:p>
-        </p:txBody>
-      </p:sp>
-      <p:sp>
-        <p:nvSpPr>
-          <p:cNvPr id="796" name="Shape 796"/>
-          <p:cNvSpPr/>
-          <p:nvPr>
-            <p:ph idx="2" type="sldImg"/>
-          </p:nvPr>
-        </p:nvSpPr>
-        <p:spPr>
-          <a:xfrm>
-            <a:off x="1143000" y="685800"/>
-            <a:ext cx="4572000" cy="3429000"/>
-          </a:xfrm>
-          <a:custGeom>
-            <a:pathLst>
-              <a:path extrusionOk="0" h="120000" w="120000">
-                <a:moveTo>
-                  <a:pt x="0" y="0"/>
-                </a:moveTo>
-                <a:lnTo>
-                  <a:pt x="120000" y="0"/>
-                </a:lnTo>
-                <a:lnTo>
-                  <a:pt x="120000" y="120000"/>
-                </a:lnTo>
-                <a:lnTo>
-                  <a:pt x="0" y="120000"/>
-                </a:lnTo>
-                <a:close/>
-              </a:path>
-            </a:pathLst>
-          </a:custGeom>
-        </p:spPr>
-      </p:sp>
-    </p:spTree>
-  </p:cSld>
-  <p:clrMapOvr>
-    <a:masterClrMapping/>
-  </p:clrMapOvr>
-</p:notes>
-</file>
-
 <file path=ppt/notesSlides/notesSlide3.xml><?xml version="1.0" encoding="utf-8"?>
 <p:notes xmlns:a="http://schemas.openxmlformats.org/drawingml/2006/main" xmlns:r="http://schemas.openxmlformats.org/officeDocument/2006/relationships" xmlns:mc="http://schemas.openxmlformats.org/markup-compatibility/2006" xmlns:mv="urn:schemas-microsoft-com:mac:vml" xmlns:p="http://schemas.openxmlformats.org/presentationml/2006/main" xmlns:c="http://schemas.openxmlformats.org/drawingml/2006/chart" xmlns:dgm="http://schemas.openxmlformats.org/drawingml/2006/diagram" xmlns:o="urn:schemas-microsoft-com:office:office" xmlns:v="urn:schemas-microsoft-com:vml" xmlns:pvml="urn:schemas-microsoft-com:office:powerpoint" xmlns:com="http://schemas.openxmlformats.org/drawingml/2006/compatibility" xmlns:p14="http://schemas.microsoft.com/office/powerpoint/2010/main" showMasterPhAnim="0" showMasterSp="0">
   <p:cSld>
@@ -2669,105 +2348,6 @@
       <p:sp>
         <p:nvSpPr>
           <p:cNvPr id="312" name="Shape 312"/>
-          <p:cNvSpPr/>
-          <p:nvPr>
-            <p:ph idx="2" type="sldImg"/>
-          </p:nvPr>
-        </p:nvSpPr>
-        <p:spPr>
-          <a:xfrm>
-            <a:off x="1143000" y="685800"/>
-            <a:ext cx="4572000" cy="3429000"/>
-          </a:xfrm>
-          <a:custGeom>
-            <a:pathLst>
-              <a:path extrusionOk="0" h="120000" w="120000">
-                <a:moveTo>
-                  <a:pt x="0" y="0"/>
-                </a:moveTo>
-                <a:lnTo>
-                  <a:pt x="120000" y="0"/>
-                </a:lnTo>
-                <a:lnTo>
-                  <a:pt x="120000" y="120000"/>
-                </a:lnTo>
-                <a:lnTo>
-                  <a:pt x="0" y="120000"/>
-                </a:lnTo>
-                <a:close/>
-              </a:path>
-            </a:pathLst>
-          </a:custGeom>
-        </p:spPr>
-      </p:sp>
-    </p:spTree>
-  </p:cSld>
-  <p:clrMapOvr>
-    <a:masterClrMapping/>
-  </p:clrMapOvr>
-</p:notes>
-</file>
-
-<file path=ppt/notesSlides/notesSlide30.xml><?xml version="1.0" encoding="utf-8"?>
-<p:notes xmlns:a="http://schemas.openxmlformats.org/drawingml/2006/main" xmlns:r="http://schemas.openxmlformats.org/officeDocument/2006/relationships" xmlns:mc="http://schemas.openxmlformats.org/markup-compatibility/2006" xmlns:mv="urn:schemas-microsoft-com:mac:vml" xmlns:p="http://schemas.openxmlformats.org/presentationml/2006/main" xmlns:c="http://schemas.openxmlformats.org/drawingml/2006/chart" xmlns:dgm="http://schemas.openxmlformats.org/drawingml/2006/diagram" xmlns:o="urn:schemas-microsoft-com:office:office" xmlns:v="urn:schemas-microsoft-com:vml" xmlns:pvml="urn:schemas-microsoft-com:office:powerpoint" xmlns:com="http://schemas.openxmlformats.org/drawingml/2006/compatibility" xmlns:p14="http://schemas.microsoft.com/office/powerpoint/2010/main" showMasterPhAnim="0" showMasterSp="0">
-  <p:cSld>
-    <p:spTree>
-      <p:nvGrpSpPr>
-        <p:cNvPr id="828" name="Shape 828"/>
-        <p:cNvGrpSpPr/>
-        <p:nvPr/>
-      </p:nvGrpSpPr>
-      <p:grpSpPr>
-        <a:xfrm>
-          <a:off x="0" y="0"/>
-          <a:ext cx="0" cy="0"/>
-          <a:chOff x="0" y="0"/>
-          <a:chExt cx="0" cy="0"/>
-        </a:xfrm>
-      </p:grpSpPr>
-      <p:sp>
-        <p:nvSpPr>
-          <p:cNvPr id="829" name="Shape 829"/>
-          <p:cNvSpPr txBox="1"/>
-          <p:nvPr>
-            <p:ph idx="1" type="body"/>
-          </p:nvPr>
-        </p:nvSpPr>
-        <p:spPr>
-          <a:xfrm>
-            <a:off x="685800" y="4343400"/>
-            <a:ext cx="5486400" cy="4114800"/>
-          </a:xfrm>
-          <a:prstGeom prst="rect">
-            <a:avLst/>
-          </a:prstGeom>
-          <a:noFill/>
-          <a:ln>
-            <a:noFill/>
-          </a:ln>
-        </p:spPr>
-        <p:txBody>
-          <a:bodyPr anchorCtr="0" anchor="ctr" bIns="91425" lIns="91425" rIns="91425" tIns="91425">
-            <a:noAutofit/>
-          </a:bodyPr>
-          <a:lstStyle/>
-          <a:p>
-            <a:pPr lvl="0" rtl="0">
-              <a:spcBef>
-                <a:spcPts val="0"/>
-              </a:spcBef>
-              <a:buNone/>
-            </a:pPr>
-            <a:r>
-              <a:t/>
-            </a:r>
-            <a:endParaRPr/>
-          </a:p>
-        </p:txBody>
-      </p:sp>
-      <p:sp>
-        <p:nvSpPr>
-          <p:cNvPr id="830" name="Shape 830"/>
           <p:cNvSpPr/>
           <p:nvPr>
             <p:ph idx="2" type="sldImg"/>
@@ -43839,2499 +43419,6 @@
 </p:sld>
 </file>
 
-<file path=ppt/slides/slide27.xml><?xml version="1.0" encoding="utf-8"?>
-<p:sld xmlns:a="http://schemas.openxmlformats.org/drawingml/2006/main" xmlns:r="http://schemas.openxmlformats.org/officeDocument/2006/relationships" xmlns:mc="http://schemas.openxmlformats.org/markup-compatibility/2006" xmlns:mv="urn:schemas-microsoft-com:mac:vml" xmlns:p="http://schemas.openxmlformats.org/presentationml/2006/main" xmlns:c="http://schemas.openxmlformats.org/drawingml/2006/chart" xmlns:dgm="http://schemas.openxmlformats.org/drawingml/2006/diagram" xmlns:o="urn:schemas-microsoft-com:office:office" xmlns:v="urn:schemas-microsoft-com:vml" xmlns:pvml="urn:schemas-microsoft-com:office:powerpoint" xmlns:com="http://schemas.openxmlformats.org/drawingml/2006/compatibility" xmlns:p14="http://schemas.microsoft.com/office/powerpoint/2010/main">
-  <p:cSld>
-    <p:spTree>
-      <p:nvGrpSpPr>
-        <p:cNvPr id="779" name="Shape 779"/>
-        <p:cNvGrpSpPr/>
-        <p:nvPr/>
-      </p:nvGrpSpPr>
-      <p:grpSpPr>
-        <a:xfrm>
-          <a:off x="0" y="0"/>
-          <a:ext cx="0" cy="0"/>
-          <a:chOff x="0" y="0"/>
-          <a:chExt cx="0" cy="0"/>
-        </a:xfrm>
-      </p:grpSpPr>
-      <p:sp>
-        <p:nvSpPr>
-          <p:cNvPr id="780" name="Shape 780"/>
-          <p:cNvSpPr txBox="1"/>
-          <p:nvPr>
-            <p:ph type="title"/>
-          </p:nvPr>
-        </p:nvSpPr>
-        <p:spPr>
-          <a:xfrm>
-            <a:off x="722312" y="4406901"/>
-            <a:ext cx="7772400" cy="1362000"/>
-          </a:xfrm>
-          <a:prstGeom prst="rect">
-            <a:avLst/>
-          </a:prstGeom>
-          <a:noFill/>
-          <a:ln>
-            <a:noFill/>
-          </a:ln>
-        </p:spPr>
-        <p:txBody>
-          <a:bodyPr anchorCtr="0" anchor="t" bIns="45700" lIns="91425" rIns="91425" tIns="45700">
-            <a:noAutofit/>
-          </a:bodyPr>
-          <a:lstStyle/>
-          <a:p>
-            <a:pPr indent="0" lvl="0" marL="0" marR="0" rtl="0" algn="l">
-              <a:spcBef>
-                <a:spcPts val="0"/>
-              </a:spcBef>
-              <a:buClr>
-                <a:srgbClr val="FFFFFF"/>
-              </a:buClr>
-              <a:buSzPct val="25000"/>
-              <a:buFont typeface="Avenir"/>
-              <a:buNone/>
-            </a:pPr>
-            <a:r>
-              <a:rPr i="0" lang="en" sz="4000" u="none" cap="none" strike="noStrike">
-                <a:solidFill>
-                  <a:srgbClr val="FFFFFF"/>
-                </a:solidFill>
-                <a:latin typeface="Arial"/>
-                <a:ea typeface="Arial"/>
-                <a:cs typeface="Arial"/>
-                <a:sym typeface="Arial"/>
-              </a:rPr>
-              <a:t>Current work in Flink</a:t>
-            </a:r>
-          </a:p>
-        </p:txBody>
-      </p:sp>
-      <p:sp>
-        <p:nvSpPr>
-          <p:cNvPr id="781" name="Shape 781"/>
-          <p:cNvSpPr txBox="1"/>
-          <p:nvPr>
-            <p:ph idx="1" type="body"/>
-          </p:nvPr>
-        </p:nvSpPr>
-        <p:spPr>
-          <a:xfrm>
-            <a:off x="722312" y="2906713"/>
-            <a:ext cx="7772400" cy="1500000"/>
-          </a:xfrm>
-          <a:prstGeom prst="rect">
-            <a:avLst/>
-          </a:prstGeom>
-          <a:noFill/>
-          <a:ln>
-            <a:noFill/>
-          </a:ln>
-        </p:spPr>
-        <p:txBody>
-          <a:bodyPr anchorCtr="0" anchor="b" bIns="45700" lIns="91425" rIns="91425" tIns="45700">
-            <a:noAutofit/>
-          </a:bodyPr>
-          <a:lstStyle/>
-          <a:p>
-            <a:pPr indent="0" lvl="0" marL="0" marR="0" rtl="0" algn="l">
-              <a:spcBef>
-                <a:spcPts val="0"/>
-              </a:spcBef>
-              <a:buClr>
-                <a:srgbClr val="34AD91"/>
-              </a:buClr>
-              <a:buSzPct val="25000"/>
-              <a:buFont typeface="Noto Sans Symbols"/>
-              <a:buNone/>
-            </a:pPr>
-            <a:r>
-              <a:t/>
-            </a:r>
-            <a:endParaRPr b="0" i="0" sz="2000" u="none" cap="none" strike="noStrike">
-              <a:solidFill>
-                <a:srgbClr val="FFFFFF"/>
-              </a:solidFill>
-              <a:latin typeface="Avenir"/>
-              <a:ea typeface="Avenir"/>
-              <a:cs typeface="Avenir"/>
-              <a:sym typeface="Avenir"/>
-            </a:endParaRPr>
-          </a:p>
-        </p:txBody>
-      </p:sp>
-      <p:sp>
-        <p:nvSpPr>
-          <p:cNvPr id="782" name="Shape 782"/>
-          <p:cNvSpPr txBox="1"/>
-          <p:nvPr>
-            <p:ph idx="12" type="sldNum"/>
-          </p:nvPr>
-        </p:nvSpPr>
-        <p:spPr>
-          <a:xfrm>
-            <a:off x="6553200" y="6356352"/>
-            <a:ext cx="2133600" cy="365100"/>
-          </a:xfrm>
-          <a:prstGeom prst="rect">
-            <a:avLst/>
-          </a:prstGeom>
-          <a:noFill/>
-          <a:ln>
-            <a:noFill/>
-          </a:ln>
-        </p:spPr>
-        <p:txBody>
-          <a:bodyPr anchorCtr="0" anchor="ctr" bIns="45700" lIns="91425" rIns="91425" tIns="45700">
-            <a:noAutofit/>
-          </a:bodyPr>
-          <a:lstStyle/>
-          <a:p>
-            <a:pPr indent="0" lvl="0" marL="0" marR="0" rtl="0" algn="r">
-              <a:spcBef>
-                <a:spcPts val="0"/>
-              </a:spcBef>
-              <a:buSzPct val="25000"/>
-              <a:buNone/>
-            </a:pPr>
-            <a:fld id="{00000000-1234-1234-1234-123412341234}" type="slidenum">
-              <a:rPr lang="en" sz="1200">
-                <a:solidFill>
-                  <a:srgbClr val="888888"/>
-                </a:solidFill>
-                <a:latin typeface="Avenir"/>
-                <a:ea typeface="Avenir"/>
-                <a:cs typeface="Avenir"/>
-                <a:sym typeface="Avenir"/>
-              </a:rPr>
-              <a:t>‹#›</a:t>
-            </a:fld>
-          </a:p>
-        </p:txBody>
-      </p:sp>
-    </p:spTree>
-  </p:cSld>
-  <p:clrMapOvr>
-    <a:masterClrMapping/>
-  </p:clrMapOvr>
-</p:sld>
-</file>
-
-<file path=ppt/slides/slide28.xml><?xml version="1.0" encoding="utf-8"?>
-<p:sld xmlns:a="http://schemas.openxmlformats.org/drawingml/2006/main" xmlns:r="http://schemas.openxmlformats.org/officeDocument/2006/relationships" xmlns:mc="http://schemas.openxmlformats.org/markup-compatibility/2006" xmlns:mv="urn:schemas-microsoft-com:mac:vml" xmlns:p="http://schemas.openxmlformats.org/presentationml/2006/main" xmlns:c="http://schemas.openxmlformats.org/drawingml/2006/chart" xmlns:dgm="http://schemas.openxmlformats.org/drawingml/2006/diagram" xmlns:o="urn:schemas-microsoft-com:office:office" xmlns:v="urn:schemas-microsoft-com:vml" xmlns:pvml="urn:schemas-microsoft-com:office:powerpoint" xmlns:com="http://schemas.openxmlformats.org/drawingml/2006/compatibility" xmlns:p14="http://schemas.microsoft.com/office/powerpoint/2010/main">
-  <p:cSld>
-    <p:spTree>
-      <p:nvGrpSpPr>
-        <p:cNvPr id="786" name="Shape 786"/>
-        <p:cNvGrpSpPr/>
-        <p:nvPr/>
-      </p:nvGrpSpPr>
-      <p:grpSpPr>
-        <a:xfrm>
-          <a:off x="0" y="0"/>
-          <a:ext cx="0" cy="0"/>
-          <a:chOff x="0" y="0"/>
-          <a:chExt cx="0" cy="0"/>
-        </a:xfrm>
-      </p:grpSpPr>
-      <p:sp>
-        <p:nvSpPr>
-          <p:cNvPr id="787" name="Shape 787"/>
-          <p:cNvSpPr txBox="1"/>
-          <p:nvPr>
-            <p:ph type="title"/>
-          </p:nvPr>
-        </p:nvSpPr>
-        <p:spPr>
-          <a:xfrm>
-            <a:off x="457200" y="274651"/>
-            <a:ext cx="8229600" cy="898500"/>
-          </a:xfrm>
-          <a:prstGeom prst="rect">
-            <a:avLst/>
-          </a:prstGeom>
-          <a:noFill/>
-          <a:ln>
-            <a:noFill/>
-          </a:ln>
-        </p:spPr>
-        <p:txBody>
-          <a:bodyPr anchorCtr="0" anchor="ctr" bIns="45700" lIns="91425" rIns="91425" tIns="45700">
-            <a:noAutofit/>
-          </a:bodyPr>
-          <a:lstStyle/>
-          <a:p>
-            <a:pPr indent="0" lvl="0" marL="0" marR="0" rtl="0" algn="l">
-              <a:spcBef>
-                <a:spcPts val="0"/>
-              </a:spcBef>
-              <a:buClr>
-                <a:schemeClr val="dk1"/>
-              </a:buClr>
-              <a:buSzPct val="25000"/>
-              <a:buFont typeface="Avenir"/>
-              <a:buNone/>
-            </a:pPr>
-            <a:r>
-              <a:rPr b="0" i="0" lang="en" sz="3959" u="none" cap="none" strike="noStrike">
-                <a:solidFill>
-                  <a:schemeClr val="dk1"/>
-                </a:solidFill>
-                <a:latin typeface="Arial"/>
-                <a:ea typeface="Arial"/>
-                <a:cs typeface="Arial"/>
-                <a:sym typeface="Arial"/>
-              </a:rPr>
-              <a:t>Flink 1.1</a:t>
-            </a:r>
-          </a:p>
-        </p:txBody>
-      </p:sp>
-      <p:sp>
-        <p:nvSpPr>
-          <p:cNvPr id="788" name="Shape 788"/>
-          <p:cNvSpPr txBox="1"/>
-          <p:nvPr>
-            <p:ph idx="12" type="sldNum"/>
-          </p:nvPr>
-        </p:nvSpPr>
-        <p:spPr>
-          <a:xfrm>
-            <a:off x="6553200" y="6356352"/>
-            <a:ext cx="2133600" cy="365100"/>
-          </a:xfrm>
-          <a:prstGeom prst="rect">
-            <a:avLst/>
-          </a:prstGeom>
-          <a:noFill/>
-          <a:ln>
-            <a:noFill/>
-          </a:ln>
-        </p:spPr>
-        <p:txBody>
-          <a:bodyPr anchorCtr="0" anchor="ctr" bIns="45700" lIns="91425" rIns="91425" tIns="45700">
-            <a:noAutofit/>
-          </a:bodyPr>
-          <a:lstStyle/>
-          <a:p>
-            <a:pPr indent="0" lvl="0" marL="0" marR="0" rtl="0" algn="r">
-              <a:spcBef>
-                <a:spcPts val="0"/>
-              </a:spcBef>
-              <a:buSzPct val="25000"/>
-              <a:buNone/>
-            </a:pPr>
-            <a:fld id="{00000000-1234-1234-1234-123412341234}" type="slidenum">
-              <a:rPr lang="en" sz="1200">
-                <a:solidFill>
-                  <a:srgbClr val="888888"/>
-                </a:solidFill>
-                <a:latin typeface="Avenir"/>
-                <a:ea typeface="Avenir"/>
-                <a:cs typeface="Avenir"/>
-                <a:sym typeface="Avenir"/>
-              </a:rPr>
-              <a:t>‹#›</a:t>
-            </a:fld>
-          </a:p>
-        </p:txBody>
-      </p:sp>
-      <p:sp>
-        <p:nvSpPr>
-          <p:cNvPr id="789" name="Shape 789"/>
-          <p:cNvSpPr txBox="1"/>
-          <p:nvPr/>
-        </p:nvSpPr>
-        <p:spPr>
-          <a:xfrm>
-            <a:off x="812833" y="3475337"/>
-            <a:ext cx="1269000" cy="451500"/>
-          </a:xfrm>
-          <a:prstGeom prst="rect">
-            <a:avLst/>
-          </a:prstGeom>
-          <a:noFill/>
-          <a:ln>
-            <a:noFill/>
-          </a:ln>
-        </p:spPr>
-        <p:txBody>
-          <a:bodyPr anchorCtr="0" anchor="t" bIns="45700" lIns="91425" rIns="91425" tIns="45700">
-            <a:noAutofit/>
-          </a:bodyPr>
-          <a:lstStyle/>
-          <a:p>
-            <a:pPr indent="0" lvl="0" marL="0" marR="0" rtl="0" algn="l">
-              <a:spcBef>
-                <a:spcPts val="0"/>
-              </a:spcBef>
-              <a:buSzPct val="25000"/>
-              <a:buNone/>
-            </a:pPr>
-            <a:r>
-              <a:rPr lang="en" sz="1600">
-                <a:solidFill>
-                  <a:schemeClr val="dk1"/>
-                </a:solidFill>
-                <a:latin typeface="Avenir"/>
-                <a:ea typeface="Avenir"/>
-                <a:cs typeface="Avenir"/>
-                <a:sym typeface="Avenir"/>
-              </a:rPr>
-              <a:t>Connectors</a:t>
-            </a:r>
-          </a:p>
-        </p:txBody>
-      </p:sp>
-      <p:sp>
-        <p:nvSpPr>
-          <p:cNvPr id="790" name="Shape 790"/>
-          <p:cNvSpPr txBox="1"/>
-          <p:nvPr/>
-        </p:nvSpPr>
-        <p:spPr>
-          <a:xfrm>
-            <a:off x="2139350" y="3311189"/>
-            <a:ext cx="852600" cy="779700"/>
-          </a:xfrm>
-          <a:prstGeom prst="rect">
-            <a:avLst/>
-          </a:prstGeom>
-          <a:noFill/>
-          <a:ln>
-            <a:noFill/>
-          </a:ln>
-        </p:spPr>
-        <p:txBody>
-          <a:bodyPr anchorCtr="0" anchor="t" bIns="45700" lIns="91425" rIns="91425" tIns="45700">
-            <a:noAutofit/>
-          </a:bodyPr>
-          <a:lstStyle/>
-          <a:p>
-            <a:pPr indent="0" lvl="0" marL="0" marR="0" rtl="0" algn="ctr">
-              <a:spcBef>
-                <a:spcPts val="0"/>
-              </a:spcBef>
-              <a:buSzPct val="25000"/>
-              <a:buNone/>
-            </a:pPr>
-            <a:r>
-              <a:rPr lang="en" sz="1600">
-                <a:solidFill>
-                  <a:schemeClr val="dk1"/>
-                </a:solidFill>
-                <a:latin typeface="Avenir"/>
-                <a:ea typeface="Avenir"/>
-                <a:cs typeface="Avenir"/>
-                <a:sym typeface="Avenir"/>
-              </a:rPr>
-              <a:t>Metric</a:t>
-            </a:r>
-            <a:br>
-              <a:rPr lang="en" sz="1600">
-                <a:solidFill>
-                  <a:schemeClr val="dk1"/>
-                </a:solidFill>
-                <a:latin typeface="Avenir"/>
-                <a:ea typeface="Avenir"/>
-                <a:cs typeface="Avenir"/>
-                <a:sym typeface="Avenir"/>
-              </a:rPr>
-            </a:br>
-            <a:r>
-              <a:rPr lang="en" sz="1600">
-                <a:solidFill>
-                  <a:schemeClr val="dk1"/>
-                </a:solidFill>
-                <a:latin typeface="Avenir"/>
-                <a:ea typeface="Avenir"/>
-                <a:cs typeface="Avenir"/>
-                <a:sym typeface="Avenir"/>
-              </a:rPr>
-              <a:t>System</a:t>
-            </a:r>
-          </a:p>
-        </p:txBody>
-      </p:sp>
-      <p:sp>
-        <p:nvSpPr>
-          <p:cNvPr id="791" name="Shape 791"/>
-          <p:cNvSpPr txBox="1"/>
-          <p:nvPr/>
-        </p:nvSpPr>
-        <p:spPr>
-          <a:xfrm>
-            <a:off x="3205036" y="3468788"/>
-            <a:ext cx="1415700" cy="451500"/>
-          </a:xfrm>
-          <a:prstGeom prst="rect">
-            <a:avLst/>
-          </a:prstGeom>
-          <a:noFill/>
-          <a:ln>
-            <a:noFill/>
-          </a:ln>
-        </p:spPr>
-        <p:txBody>
-          <a:bodyPr anchorCtr="0" anchor="t" bIns="45700" lIns="91425" rIns="91425" tIns="45700">
-            <a:noAutofit/>
-          </a:bodyPr>
-          <a:lstStyle/>
-          <a:p>
-            <a:pPr indent="0" lvl="0" marL="0" marR="0" rtl="0" algn="l">
-              <a:spcBef>
-                <a:spcPts val="0"/>
-              </a:spcBef>
-              <a:buSzPct val="25000"/>
-              <a:buNone/>
-            </a:pPr>
-            <a:r>
-              <a:rPr lang="en" sz="1600">
-                <a:solidFill>
-                  <a:schemeClr val="dk1"/>
-                </a:solidFill>
-                <a:latin typeface="Avenir"/>
-                <a:ea typeface="Avenir"/>
-                <a:cs typeface="Avenir"/>
-                <a:sym typeface="Avenir"/>
-              </a:rPr>
-              <a:t>(Stream) SQL</a:t>
-            </a:r>
-          </a:p>
-        </p:txBody>
-      </p:sp>
-      <p:sp>
-        <p:nvSpPr>
-          <p:cNvPr id="792" name="Shape 792"/>
-          <p:cNvSpPr txBox="1"/>
-          <p:nvPr/>
-        </p:nvSpPr>
-        <p:spPr>
-          <a:xfrm>
-            <a:off x="4849355" y="3475337"/>
-            <a:ext cx="1745999" cy="779700"/>
-          </a:xfrm>
-          <a:prstGeom prst="rect">
-            <a:avLst/>
-          </a:prstGeom>
-          <a:noFill/>
-          <a:ln>
-            <a:noFill/>
-          </a:ln>
-        </p:spPr>
-        <p:txBody>
-          <a:bodyPr anchorCtr="0" anchor="t" bIns="45700" lIns="91425" rIns="91425" tIns="45700">
-            <a:noAutofit/>
-          </a:bodyPr>
-          <a:lstStyle/>
-          <a:p>
-            <a:pPr indent="0" lvl="0" marL="0" marR="0" rtl="0" algn="ctr">
-              <a:spcBef>
-                <a:spcPts val="0"/>
-              </a:spcBef>
-              <a:buSzPct val="25000"/>
-              <a:buNone/>
-            </a:pPr>
-            <a:r>
-              <a:rPr lang="en" sz="1600">
-                <a:solidFill>
-                  <a:schemeClr val="dk1"/>
-                </a:solidFill>
-                <a:latin typeface="Avenir"/>
-                <a:ea typeface="Avenir"/>
-                <a:cs typeface="Avenir"/>
-                <a:sym typeface="Avenir"/>
-              </a:rPr>
-              <a:t>Session Windows</a:t>
-            </a:r>
-          </a:p>
-        </p:txBody>
-      </p:sp>
-      <p:sp>
-        <p:nvSpPr>
-          <p:cNvPr id="793" name="Shape 793"/>
-          <p:cNvSpPr txBox="1"/>
-          <p:nvPr/>
-        </p:nvSpPr>
-        <p:spPr>
-          <a:xfrm>
-            <a:off x="6809728" y="3304640"/>
-            <a:ext cx="1563600" cy="779700"/>
-          </a:xfrm>
-          <a:prstGeom prst="rect">
-            <a:avLst/>
-          </a:prstGeom>
-          <a:noFill/>
-          <a:ln>
-            <a:noFill/>
-          </a:ln>
-        </p:spPr>
-        <p:txBody>
-          <a:bodyPr anchorCtr="0" anchor="t" bIns="45700" lIns="91425" rIns="91425" tIns="45700">
-            <a:noAutofit/>
-          </a:bodyPr>
-          <a:lstStyle/>
-          <a:p>
-            <a:pPr indent="0" lvl="0" marL="0" marR="0" rtl="0" algn="ctr">
-              <a:spcBef>
-                <a:spcPts val="0"/>
-              </a:spcBef>
-              <a:buSzPct val="25000"/>
-              <a:buNone/>
-            </a:pPr>
-            <a:r>
-              <a:rPr lang="en" sz="1600">
-                <a:solidFill>
-                  <a:schemeClr val="dk1"/>
-                </a:solidFill>
-                <a:latin typeface="Avenir"/>
-                <a:ea typeface="Avenir"/>
-                <a:cs typeface="Avenir"/>
-                <a:sym typeface="Avenir"/>
-              </a:rPr>
-              <a:t>Library</a:t>
-            </a:r>
-            <a:br>
-              <a:rPr lang="en" sz="1600">
-                <a:solidFill>
-                  <a:schemeClr val="dk1"/>
-                </a:solidFill>
-                <a:latin typeface="Avenir"/>
-                <a:ea typeface="Avenir"/>
-                <a:cs typeface="Avenir"/>
-                <a:sym typeface="Avenir"/>
-              </a:rPr>
-            </a:br>
-            <a:r>
-              <a:rPr lang="en" sz="1600">
-                <a:solidFill>
-                  <a:schemeClr val="dk1"/>
-                </a:solidFill>
-                <a:latin typeface="Avenir"/>
-                <a:ea typeface="Avenir"/>
-                <a:cs typeface="Avenir"/>
-                <a:sym typeface="Avenir"/>
-              </a:rPr>
-              <a:t>enhancements</a:t>
-            </a:r>
-          </a:p>
-        </p:txBody>
-      </p:sp>
-    </p:spTree>
-  </p:cSld>
-  <p:clrMapOvr>
-    <a:masterClrMapping/>
-  </p:clrMapOvr>
-  <p:timing>
-    <p:tnLst>
-      <p:par>
-        <p:cTn dur="indefinite" nodeType="tmRoot" restart="never">
-          <p:childTnLst>
-            <p:seq concurrent="1" nextAc="seek">
-              <p:cTn dur="indefinite" id="2" nodeType="mainSeq">
-                <p:childTnLst>
-                  <p:par>
-                    <p:cTn fill="hold">
-                      <p:stCondLst>
-                        <p:cond delay="indefinite"/>
-                        <p:cond evt="onBegin" delay="0">
-                          <p:tn val="2"/>
-                        </p:cond>
-                      </p:stCondLst>
-                      <p:childTnLst>
-                        <p:par>
-                          <p:cTn fill="hold">
-                            <p:stCondLst>
-                              <p:cond delay="0"/>
-                            </p:stCondLst>
-                            <p:childTnLst>
-                              <p:par>
-                                <p:cTn fill="hold" nodeType="withEffect" presetClass="entr" presetID="10" presetSubtype="0">
-                                  <p:stCondLst>
-                                    <p:cond delay="0"/>
-                                  </p:stCondLst>
-                                  <p:childTnLst>
-                                    <p:set>
-                                      <p:cBhvr>
-                                        <p:cTn dur="1" fill="hold">
-                                          <p:stCondLst>
-                                            <p:cond delay="0"/>
-                                          </p:stCondLst>
-                                        </p:cTn>
-                                        <p:tgtEl>
-                                          <p:spTgt spid="789"/>
-                                        </p:tgtEl>
-                                        <p:attrNameLst>
-                                          <p:attrName>style.visibility</p:attrName>
-                                        </p:attrNameLst>
-                                      </p:cBhvr>
-                                      <p:to>
-                                        <p:strVal val="visible"/>
-                                      </p:to>
-                                    </p:set>
-                                    <p:animEffect filter="fade" transition="in">
-                                      <p:cBhvr>
-                                        <p:cTn dur="500"/>
-                                        <p:tgtEl>
-                                          <p:spTgt spid="789"/>
-                                        </p:tgtEl>
-                                      </p:cBhvr>
-                                    </p:animEffect>
-                                  </p:childTnLst>
-                                </p:cTn>
-                              </p:par>
-                              <p:par>
-                                <p:cTn fill="hold" nodeType="withEffect" presetClass="entr" presetID="10" presetSubtype="0">
-                                  <p:stCondLst>
-                                    <p:cond delay="0"/>
-                                  </p:stCondLst>
-                                  <p:childTnLst>
-                                    <p:set>
-                                      <p:cBhvr>
-                                        <p:cTn dur="1" fill="hold">
-                                          <p:stCondLst>
-                                            <p:cond delay="0"/>
-                                          </p:stCondLst>
-                                        </p:cTn>
-                                        <p:tgtEl>
-                                          <p:spTgt spid="790"/>
-                                        </p:tgtEl>
-                                        <p:attrNameLst>
-                                          <p:attrName>style.visibility</p:attrName>
-                                        </p:attrNameLst>
-                                      </p:cBhvr>
-                                      <p:to>
-                                        <p:strVal val="visible"/>
-                                      </p:to>
-                                    </p:set>
-                                    <p:animEffect filter="fade" transition="in">
-                                      <p:cBhvr>
-                                        <p:cTn dur="500"/>
-                                        <p:tgtEl>
-                                          <p:spTgt spid="790"/>
-                                        </p:tgtEl>
-                                      </p:cBhvr>
-                                    </p:animEffect>
-                                  </p:childTnLst>
-                                </p:cTn>
-                              </p:par>
-                              <p:par>
-                                <p:cTn fill="hold" nodeType="withEffect" presetClass="entr" presetID="10" presetSubtype="0">
-                                  <p:stCondLst>
-                                    <p:cond delay="0"/>
-                                  </p:stCondLst>
-                                  <p:childTnLst>
-                                    <p:set>
-                                      <p:cBhvr>
-                                        <p:cTn dur="1" fill="hold">
-                                          <p:stCondLst>
-                                            <p:cond delay="0"/>
-                                          </p:stCondLst>
-                                        </p:cTn>
-                                        <p:tgtEl>
-                                          <p:spTgt spid="791"/>
-                                        </p:tgtEl>
-                                        <p:attrNameLst>
-                                          <p:attrName>style.visibility</p:attrName>
-                                        </p:attrNameLst>
-                                      </p:cBhvr>
-                                      <p:to>
-                                        <p:strVal val="visible"/>
-                                      </p:to>
-                                    </p:set>
-                                    <p:animEffect filter="fade" transition="in">
-                                      <p:cBhvr>
-                                        <p:cTn dur="500"/>
-                                        <p:tgtEl>
-                                          <p:spTgt spid="791"/>
-                                        </p:tgtEl>
-                                      </p:cBhvr>
-                                    </p:animEffect>
-                                  </p:childTnLst>
-                                </p:cTn>
-                              </p:par>
-                              <p:par>
-                                <p:cTn fill="hold" nodeType="withEffect" presetClass="entr" presetID="10" presetSubtype="0">
-                                  <p:stCondLst>
-                                    <p:cond delay="0"/>
-                                  </p:stCondLst>
-                                  <p:childTnLst>
-                                    <p:set>
-                                      <p:cBhvr>
-                                        <p:cTn dur="1" fill="hold">
-                                          <p:stCondLst>
-                                            <p:cond delay="0"/>
-                                          </p:stCondLst>
-                                        </p:cTn>
-                                        <p:tgtEl>
-                                          <p:spTgt spid="792"/>
-                                        </p:tgtEl>
-                                        <p:attrNameLst>
-                                          <p:attrName>style.visibility</p:attrName>
-                                        </p:attrNameLst>
-                                      </p:cBhvr>
-                                      <p:to>
-                                        <p:strVal val="visible"/>
-                                      </p:to>
-                                    </p:set>
-                                    <p:animEffect filter="fade" transition="in">
-                                      <p:cBhvr>
-                                        <p:cTn dur="500"/>
-                                        <p:tgtEl>
-                                          <p:spTgt spid="792"/>
-                                        </p:tgtEl>
-                                      </p:cBhvr>
-                                    </p:animEffect>
-                                  </p:childTnLst>
-                                </p:cTn>
-                              </p:par>
-                              <p:par>
-                                <p:cTn fill="hold" nodeType="withEffect" presetClass="entr" presetID="10" presetSubtype="0">
-                                  <p:stCondLst>
-                                    <p:cond delay="0"/>
-                                  </p:stCondLst>
-                                  <p:childTnLst>
-                                    <p:set>
-                                      <p:cBhvr>
-                                        <p:cTn dur="1" fill="hold">
-                                          <p:stCondLst>
-                                            <p:cond delay="0"/>
-                                          </p:stCondLst>
-                                        </p:cTn>
-                                        <p:tgtEl>
-                                          <p:spTgt spid="793"/>
-                                        </p:tgtEl>
-                                        <p:attrNameLst>
-                                          <p:attrName>style.visibility</p:attrName>
-                                        </p:attrNameLst>
-                                      </p:cBhvr>
-                                      <p:to>
-                                        <p:strVal val="visible"/>
-                                      </p:to>
-                                    </p:set>
-                                    <p:animEffect filter="fade" transition="in">
-                                      <p:cBhvr>
-                                        <p:cTn dur="500"/>
-                                        <p:tgtEl>
-                                          <p:spTgt spid="793"/>
-                                        </p:tgtEl>
-                                      </p:cBhvr>
-                                    </p:animEffect>
-                                  </p:childTnLst>
-                                </p:cTn>
-                              </p:par>
-                            </p:childTnLst>
-                          </p:cTn>
-                        </p:par>
-                      </p:childTnLst>
-                    </p:cTn>
-                  </p:par>
-                </p:childTnLst>
-              </p:cTn>
-              <p:prevCondLst>
-                <p:cond evt="onPrev">
-                  <p:tgtEl>
-                    <p:sldTgt/>
-                  </p:tgtEl>
-                </p:cond>
-              </p:prevCondLst>
-              <p:nextCondLst>
-                <p:cond evt="onNext">
-                  <p:tgtEl>
-                    <p:sldTgt/>
-                  </p:tgtEl>
-                </p:cond>
-              </p:nextCondLst>
-            </p:seq>
-          </p:childTnLst>
-        </p:cTn>
-      </p:par>
-    </p:tnLst>
-  </p:timing>
-</p:sld>
-</file>
-
-<file path=ppt/slides/slide29.xml><?xml version="1.0" encoding="utf-8"?>
-<p:sld xmlns:a="http://schemas.openxmlformats.org/drawingml/2006/main" xmlns:r="http://schemas.openxmlformats.org/officeDocument/2006/relationships" xmlns:mc="http://schemas.openxmlformats.org/markup-compatibility/2006" xmlns:mv="urn:schemas-microsoft-com:mac:vml" xmlns:p="http://schemas.openxmlformats.org/presentationml/2006/main" xmlns:c="http://schemas.openxmlformats.org/drawingml/2006/chart" xmlns:dgm="http://schemas.openxmlformats.org/drawingml/2006/diagram" xmlns:o="urn:schemas-microsoft-com:office:office" xmlns:v="urn:schemas-microsoft-com:vml" xmlns:pvml="urn:schemas-microsoft-com:office:powerpoint" xmlns:com="http://schemas.openxmlformats.org/drawingml/2006/compatibility" xmlns:p14="http://schemas.microsoft.com/office/powerpoint/2010/main">
-  <p:cSld>
-    <p:spTree>
-      <p:nvGrpSpPr>
-        <p:cNvPr id="797" name="Shape 797"/>
-        <p:cNvGrpSpPr/>
-        <p:nvPr/>
-      </p:nvGrpSpPr>
-      <p:grpSpPr>
-        <a:xfrm>
-          <a:off x="0" y="0"/>
-          <a:ext cx="0" cy="0"/>
-          <a:chOff x="0" y="0"/>
-          <a:chExt cx="0" cy="0"/>
-        </a:xfrm>
-      </p:grpSpPr>
-      <p:sp>
-        <p:nvSpPr>
-          <p:cNvPr id="798" name="Shape 798"/>
-          <p:cNvSpPr txBox="1"/>
-          <p:nvPr>
-            <p:ph type="title"/>
-          </p:nvPr>
-        </p:nvSpPr>
-        <p:spPr>
-          <a:xfrm>
-            <a:off x="457200" y="274651"/>
-            <a:ext cx="8229600" cy="898500"/>
-          </a:xfrm>
-          <a:prstGeom prst="rect">
-            <a:avLst/>
-          </a:prstGeom>
-          <a:noFill/>
-          <a:ln>
-            <a:noFill/>
-          </a:ln>
-        </p:spPr>
-        <p:txBody>
-          <a:bodyPr anchorCtr="0" anchor="ctr" bIns="45700" lIns="91425" rIns="91425" tIns="45700">
-            <a:noAutofit/>
-          </a:bodyPr>
-          <a:lstStyle/>
-          <a:p>
-            <a:pPr indent="0" lvl="0" marL="0" marR="0" rtl="0" algn="l">
-              <a:spcBef>
-                <a:spcPts val="0"/>
-              </a:spcBef>
-              <a:buClr>
-                <a:schemeClr val="dk1"/>
-              </a:buClr>
-              <a:buSzPct val="25000"/>
-              <a:buFont typeface="Avenir"/>
-              <a:buNone/>
-            </a:pPr>
-            <a:r>
-              <a:rPr b="0" i="0" lang="en" sz="3600" u="none" cap="none" strike="noStrike">
-                <a:solidFill>
-                  <a:schemeClr val="dk1"/>
-                </a:solidFill>
-                <a:latin typeface="Arial"/>
-                <a:ea typeface="Arial"/>
-                <a:cs typeface="Arial"/>
-                <a:sym typeface="Arial"/>
-              </a:rPr>
-              <a:t>Flink 1.1 + ongoing development</a:t>
-            </a:r>
-          </a:p>
-        </p:txBody>
-      </p:sp>
-      <p:sp>
-        <p:nvSpPr>
-          <p:cNvPr id="799" name="Shape 799"/>
-          <p:cNvSpPr txBox="1"/>
-          <p:nvPr>
-            <p:ph idx="12" type="sldNum"/>
-          </p:nvPr>
-        </p:nvSpPr>
-        <p:spPr>
-          <a:xfrm>
-            <a:off x="6553200" y="6356352"/>
-            <a:ext cx="2133600" cy="365100"/>
-          </a:xfrm>
-          <a:prstGeom prst="rect">
-            <a:avLst/>
-          </a:prstGeom>
-          <a:noFill/>
-          <a:ln>
-            <a:noFill/>
-          </a:ln>
-        </p:spPr>
-        <p:txBody>
-          <a:bodyPr anchorCtr="0" anchor="ctr" bIns="45700" lIns="91425" rIns="91425" tIns="45700">
-            <a:noAutofit/>
-          </a:bodyPr>
-          <a:lstStyle/>
-          <a:p>
-            <a:pPr indent="0" lvl="0" marL="0" marR="0" rtl="0" algn="r">
-              <a:spcBef>
-                <a:spcPts val="0"/>
-              </a:spcBef>
-              <a:buSzPct val="25000"/>
-              <a:buNone/>
-            </a:pPr>
-            <a:fld id="{00000000-1234-1234-1234-123412341234}" type="slidenum">
-              <a:rPr lang="en" sz="1200">
-                <a:solidFill>
-                  <a:srgbClr val="888888"/>
-                </a:solidFill>
-                <a:latin typeface="Avenir"/>
-                <a:ea typeface="Avenir"/>
-                <a:cs typeface="Avenir"/>
-                <a:sym typeface="Avenir"/>
-              </a:rPr>
-              <a:t>‹#›</a:t>
-            </a:fld>
-          </a:p>
-        </p:txBody>
-      </p:sp>
-      <p:sp>
-        <p:nvSpPr>
-          <p:cNvPr id="800" name="Shape 800"/>
-          <p:cNvSpPr txBox="1"/>
-          <p:nvPr/>
-        </p:nvSpPr>
-        <p:spPr>
-          <a:xfrm>
-            <a:off x="412783" y="5394977"/>
-            <a:ext cx="1269000" cy="451500"/>
-          </a:xfrm>
-          <a:prstGeom prst="rect">
-            <a:avLst/>
-          </a:prstGeom>
-          <a:noFill/>
-          <a:ln>
-            <a:noFill/>
-          </a:ln>
-        </p:spPr>
-        <p:txBody>
-          <a:bodyPr anchorCtr="0" anchor="t" bIns="45700" lIns="91425" rIns="91425" tIns="45700">
-            <a:noAutofit/>
-          </a:bodyPr>
-          <a:lstStyle/>
-          <a:p>
-            <a:pPr indent="0" lvl="0" marL="0" marR="0" rtl="0" algn="l">
-              <a:spcBef>
-                <a:spcPts val="0"/>
-              </a:spcBef>
-              <a:buSzPct val="25000"/>
-              <a:buNone/>
-            </a:pPr>
-            <a:r>
-              <a:rPr lang="en" sz="1600">
-                <a:solidFill>
-                  <a:schemeClr val="dk1"/>
-                </a:solidFill>
-                <a:latin typeface="Avenir"/>
-                <a:ea typeface="Avenir"/>
-                <a:cs typeface="Avenir"/>
-                <a:sym typeface="Avenir"/>
-              </a:rPr>
-              <a:t>Connectors</a:t>
-            </a:r>
-          </a:p>
-        </p:txBody>
-      </p:sp>
-      <p:sp>
-        <p:nvSpPr>
-          <p:cNvPr id="801" name="Shape 801"/>
-          <p:cNvSpPr txBox="1"/>
-          <p:nvPr/>
-        </p:nvSpPr>
-        <p:spPr>
-          <a:xfrm>
-            <a:off x="6508112" y="5886523"/>
-            <a:ext cx="1746000" cy="779700"/>
-          </a:xfrm>
-          <a:prstGeom prst="rect">
-            <a:avLst/>
-          </a:prstGeom>
-          <a:noFill/>
-          <a:ln>
-            <a:noFill/>
-          </a:ln>
-        </p:spPr>
-        <p:txBody>
-          <a:bodyPr anchorCtr="0" anchor="t" bIns="45700" lIns="91425" rIns="91425" tIns="45700">
-            <a:noAutofit/>
-          </a:bodyPr>
-          <a:lstStyle/>
-          <a:p>
-            <a:pPr indent="0" lvl="0" marL="0" marR="0" rtl="0" algn="ctr">
-              <a:spcBef>
-                <a:spcPts val="0"/>
-              </a:spcBef>
-              <a:buSzPct val="25000"/>
-              <a:buNone/>
-            </a:pPr>
-            <a:r>
-              <a:rPr lang="en" sz="1600">
-                <a:solidFill>
-                  <a:schemeClr val="dk1"/>
-                </a:solidFill>
-                <a:latin typeface="Avenir"/>
-                <a:ea typeface="Avenir"/>
-                <a:cs typeface="Avenir"/>
-                <a:sym typeface="Avenir"/>
-              </a:rPr>
-              <a:t>Session Windows</a:t>
-            </a:r>
-          </a:p>
-        </p:txBody>
-      </p:sp>
-      <p:sp>
-        <p:nvSpPr>
-          <p:cNvPr id="802" name="Shape 802"/>
-          <p:cNvSpPr txBox="1"/>
-          <p:nvPr/>
-        </p:nvSpPr>
-        <p:spPr>
-          <a:xfrm>
-            <a:off x="4397023" y="5993210"/>
-            <a:ext cx="1415700" cy="451500"/>
-          </a:xfrm>
-          <a:prstGeom prst="rect">
-            <a:avLst/>
-          </a:prstGeom>
-          <a:noFill/>
-          <a:ln>
-            <a:noFill/>
-          </a:ln>
-        </p:spPr>
-        <p:txBody>
-          <a:bodyPr anchorCtr="0" anchor="t" bIns="45700" lIns="91425" rIns="91425" tIns="45700">
-            <a:noAutofit/>
-          </a:bodyPr>
-          <a:lstStyle/>
-          <a:p>
-            <a:pPr indent="0" lvl="0" marL="0" marR="0" rtl="0" algn="l">
-              <a:spcBef>
-                <a:spcPts val="0"/>
-              </a:spcBef>
-              <a:buSzPct val="25000"/>
-              <a:buNone/>
-            </a:pPr>
-            <a:r>
-              <a:rPr lang="en" sz="1600">
-                <a:solidFill>
-                  <a:schemeClr val="dk1"/>
-                </a:solidFill>
-                <a:latin typeface="Avenir"/>
-                <a:ea typeface="Avenir"/>
-                <a:cs typeface="Avenir"/>
-                <a:sym typeface="Avenir"/>
-              </a:rPr>
-              <a:t>(Stream) SQL</a:t>
-            </a:r>
-          </a:p>
-        </p:txBody>
-      </p:sp>
-      <p:sp>
-        <p:nvSpPr>
-          <p:cNvPr id="803" name="Shape 803"/>
-          <p:cNvSpPr txBox="1"/>
-          <p:nvPr/>
-        </p:nvSpPr>
-        <p:spPr>
-          <a:xfrm>
-            <a:off x="7201614" y="3907262"/>
-            <a:ext cx="1563600" cy="779700"/>
-          </a:xfrm>
-          <a:prstGeom prst="rect">
-            <a:avLst/>
-          </a:prstGeom>
-          <a:noFill/>
-          <a:ln>
-            <a:noFill/>
-          </a:ln>
-        </p:spPr>
-        <p:txBody>
-          <a:bodyPr anchorCtr="0" anchor="t" bIns="45700" lIns="91425" rIns="91425" tIns="45700">
-            <a:noAutofit/>
-          </a:bodyPr>
-          <a:lstStyle/>
-          <a:p>
-            <a:pPr indent="0" lvl="0" marL="0" marR="0" rtl="0" algn="ctr">
-              <a:spcBef>
-                <a:spcPts val="0"/>
-              </a:spcBef>
-              <a:buSzPct val="25000"/>
-              <a:buNone/>
-            </a:pPr>
-            <a:r>
-              <a:rPr lang="en" sz="1600">
-                <a:solidFill>
-                  <a:schemeClr val="dk1"/>
-                </a:solidFill>
-                <a:latin typeface="Avenir"/>
-                <a:ea typeface="Avenir"/>
-                <a:cs typeface="Avenir"/>
-                <a:sym typeface="Avenir"/>
-              </a:rPr>
-              <a:t>Library</a:t>
-            </a:r>
-            <a:br>
-              <a:rPr lang="en" sz="1600">
-                <a:solidFill>
-                  <a:schemeClr val="dk1"/>
-                </a:solidFill>
-                <a:latin typeface="Avenir"/>
-                <a:ea typeface="Avenir"/>
-                <a:cs typeface="Avenir"/>
-                <a:sym typeface="Avenir"/>
-              </a:rPr>
-            </a:br>
-            <a:r>
-              <a:rPr lang="en" sz="1600">
-                <a:solidFill>
-                  <a:schemeClr val="dk1"/>
-                </a:solidFill>
-                <a:latin typeface="Avenir"/>
-                <a:ea typeface="Avenir"/>
-                <a:cs typeface="Avenir"/>
-                <a:sym typeface="Avenir"/>
-              </a:rPr>
-              <a:t>enhancements</a:t>
-            </a:r>
-          </a:p>
-        </p:txBody>
-      </p:sp>
-      <p:sp>
-        <p:nvSpPr>
-          <p:cNvPr id="804" name="Shape 804"/>
-          <p:cNvSpPr txBox="1"/>
-          <p:nvPr/>
-        </p:nvSpPr>
-        <p:spPr>
-          <a:xfrm>
-            <a:off x="3625251" y="1415418"/>
-            <a:ext cx="852600" cy="779700"/>
-          </a:xfrm>
-          <a:prstGeom prst="rect">
-            <a:avLst/>
-          </a:prstGeom>
-          <a:noFill/>
-          <a:ln>
-            <a:noFill/>
-          </a:ln>
-        </p:spPr>
-        <p:txBody>
-          <a:bodyPr anchorCtr="0" anchor="t" bIns="45700" lIns="91425" rIns="91425" tIns="45700">
-            <a:noAutofit/>
-          </a:bodyPr>
-          <a:lstStyle/>
-          <a:p>
-            <a:pPr indent="0" lvl="0" marL="0" marR="0" rtl="0" algn="ctr">
-              <a:spcBef>
-                <a:spcPts val="0"/>
-              </a:spcBef>
-              <a:buSzPct val="25000"/>
-              <a:buNone/>
-            </a:pPr>
-            <a:r>
-              <a:rPr lang="en" sz="1600">
-                <a:solidFill>
-                  <a:schemeClr val="dk1"/>
-                </a:solidFill>
-                <a:latin typeface="Avenir"/>
-                <a:ea typeface="Avenir"/>
-                <a:cs typeface="Avenir"/>
-                <a:sym typeface="Avenir"/>
-              </a:rPr>
-              <a:t>Metric</a:t>
-            </a:r>
-            <a:br>
-              <a:rPr lang="en" sz="1600">
-                <a:solidFill>
-                  <a:schemeClr val="dk1"/>
-                </a:solidFill>
-                <a:latin typeface="Avenir"/>
-                <a:ea typeface="Avenir"/>
-                <a:cs typeface="Avenir"/>
-                <a:sym typeface="Avenir"/>
-              </a:rPr>
-            </a:br>
-            <a:r>
-              <a:rPr lang="en" sz="1600">
-                <a:solidFill>
-                  <a:schemeClr val="dk1"/>
-                </a:solidFill>
-                <a:latin typeface="Avenir"/>
-                <a:ea typeface="Avenir"/>
-                <a:cs typeface="Avenir"/>
-                <a:sym typeface="Avenir"/>
-              </a:rPr>
-              <a:t>System</a:t>
-            </a:r>
-          </a:p>
-        </p:txBody>
-      </p:sp>
-      <p:sp>
-        <p:nvSpPr>
-          <p:cNvPr id="805" name="Shape 805"/>
-          <p:cNvSpPr/>
-          <p:nvPr/>
-        </p:nvSpPr>
-        <p:spPr>
-          <a:xfrm>
-            <a:off x="3772321" y="2463477"/>
-            <a:ext cx="1449600" cy="954000"/>
-          </a:xfrm>
-          <a:prstGeom prst="roundRect">
-            <a:avLst>
-              <a:gd fmla="val 16667" name="adj"/>
-            </a:avLst>
-          </a:prstGeom>
-          <a:solidFill>
-            <a:srgbClr val="FFD966"/>
-          </a:solidFill>
-          <a:ln>
-            <a:noFill/>
-          </a:ln>
-        </p:spPr>
-        <p:txBody>
-          <a:bodyPr anchorCtr="0" anchor="ctr" bIns="0" lIns="0" rIns="0" tIns="0">
-            <a:noAutofit/>
-          </a:bodyPr>
-          <a:lstStyle/>
-          <a:p>
-            <a:pPr indent="0" lvl="0" marL="0" marR="0" rtl="0" algn="ctr">
-              <a:spcBef>
-                <a:spcPts val="0"/>
-              </a:spcBef>
-              <a:buSzPct val="25000"/>
-              <a:buNone/>
-            </a:pPr>
-            <a:r>
-              <a:rPr lang="en" sz="1800">
-                <a:solidFill>
-                  <a:schemeClr val="dk1"/>
-                </a:solidFill>
-                <a:latin typeface="Avenir"/>
-                <a:ea typeface="Avenir"/>
-                <a:cs typeface="Avenir"/>
-                <a:sym typeface="Avenir"/>
-              </a:rPr>
-              <a:t>Operations</a:t>
-            </a:r>
-          </a:p>
-        </p:txBody>
-      </p:sp>
-      <p:sp>
-        <p:nvSpPr>
-          <p:cNvPr id="806" name="Shape 806"/>
-          <p:cNvSpPr/>
-          <p:nvPr/>
-        </p:nvSpPr>
-        <p:spPr>
-          <a:xfrm>
-            <a:off x="1675852" y="4218777"/>
-            <a:ext cx="1449600" cy="954000"/>
-          </a:xfrm>
-          <a:prstGeom prst="roundRect">
-            <a:avLst>
-              <a:gd fmla="val 16667" name="adj"/>
-            </a:avLst>
-          </a:prstGeom>
-          <a:solidFill>
-            <a:srgbClr val="34AC91"/>
-          </a:solidFill>
-          <a:ln>
-            <a:noFill/>
-          </a:ln>
-        </p:spPr>
-        <p:txBody>
-          <a:bodyPr anchorCtr="0" anchor="ctr" bIns="0" lIns="0" rIns="0" tIns="0">
-            <a:noAutofit/>
-          </a:bodyPr>
-          <a:lstStyle/>
-          <a:p>
-            <a:pPr indent="0" lvl="0" marL="0" marR="0" rtl="0" algn="ctr">
-              <a:spcBef>
-                <a:spcPts val="0"/>
-              </a:spcBef>
-              <a:buSzPct val="25000"/>
-              <a:buNone/>
-            </a:pPr>
-            <a:r>
-              <a:rPr lang="en" sz="1800">
-                <a:solidFill>
-                  <a:schemeClr val="dk1"/>
-                </a:solidFill>
-                <a:latin typeface="Avenir"/>
-                <a:ea typeface="Avenir"/>
-                <a:cs typeface="Avenir"/>
-                <a:sym typeface="Avenir"/>
-              </a:rPr>
-              <a:t>Ecosystem</a:t>
-            </a:r>
-          </a:p>
-        </p:txBody>
-      </p:sp>
-      <p:sp>
-        <p:nvSpPr>
-          <p:cNvPr id="807" name="Shape 807"/>
-          <p:cNvSpPr/>
-          <p:nvPr/>
-        </p:nvSpPr>
-        <p:spPr>
-          <a:xfrm>
-            <a:off x="5758578" y="4210038"/>
-            <a:ext cx="1449600" cy="954000"/>
-          </a:xfrm>
-          <a:prstGeom prst="roundRect">
-            <a:avLst>
-              <a:gd fmla="val 16667" name="adj"/>
-            </a:avLst>
-          </a:prstGeom>
-          <a:solidFill>
-            <a:srgbClr val="CD86CB"/>
-          </a:solidFill>
-          <a:ln>
-            <a:noFill/>
-          </a:ln>
-        </p:spPr>
-        <p:txBody>
-          <a:bodyPr anchorCtr="0" anchor="ctr" bIns="0" lIns="0" rIns="0" tIns="0">
-            <a:noAutofit/>
-          </a:bodyPr>
-          <a:lstStyle/>
-          <a:p>
-            <a:pPr indent="0" lvl="0" marL="0" marR="0" rtl="0" algn="ctr">
-              <a:spcBef>
-                <a:spcPts val="0"/>
-              </a:spcBef>
-              <a:buSzPct val="25000"/>
-              <a:buNone/>
-            </a:pPr>
-            <a:r>
-              <a:rPr lang="en" sz="1800">
-                <a:solidFill>
-                  <a:schemeClr val="dk1"/>
-                </a:solidFill>
-                <a:latin typeface="Avenir"/>
-                <a:ea typeface="Avenir"/>
-                <a:cs typeface="Avenir"/>
-                <a:sym typeface="Avenir"/>
-              </a:rPr>
-              <a:t>Application</a:t>
-            </a:r>
-            <a:br>
-              <a:rPr lang="en" sz="1800">
-                <a:solidFill>
-                  <a:schemeClr val="dk1"/>
-                </a:solidFill>
-                <a:latin typeface="Avenir"/>
-                <a:ea typeface="Avenir"/>
-                <a:cs typeface="Avenir"/>
-                <a:sym typeface="Avenir"/>
-              </a:rPr>
-            </a:br>
-            <a:r>
-              <a:rPr lang="en" sz="1800">
-                <a:solidFill>
-                  <a:schemeClr val="dk1"/>
-                </a:solidFill>
-                <a:latin typeface="Avenir"/>
-                <a:ea typeface="Avenir"/>
-                <a:cs typeface="Avenir"/>
-                <a:sym typeface="Avenir"/>
-              </a:rPr>
-              <a:t>Features</a:t>
-            </a:r>
-          </a:p>
-        </p:txBody>
-      </p:sp>
-      <p:sp>
-        <p:nvSpPr>
-          <p:cNvPr id="808" name="Shape 808"/>
-          <p:cNvSpPr txBox="1"/>
-          <p:nvPr/>
-        </p:nvSpPr>
-        <p:spPr>
-          <a:xfrm>
-            <a:off x="4669055" y="1376661"/>
-            <a:ext cx="1342200" cy="779700"/>
-          </a:xfrm>
-          <a:prstGeom prst="rect">
-            <a:avLst/>
-          </a:prstGeom>
-          <a:noFill/>
-          <a:ln>
-            <a:noFill/>
-          </a:ln>
-        </p:spPr>
-        <p:txBody>
-          <a:bodyPr anchorCtr="0" anchor="t" bIns="45700" lIns="91425" rIns="91425" tIns="45700">
-            <a:noAutofit/>
-          </a:bodyPr>
-          <a:lstStyle/>
-          <a:p>
-            <a:pPr indent="0" lvl="0" marL="0" marR="0" rtl="0" algn="ctr">
-              <a:spcBef>
-                <a:spcPts val="0"/>
-              </a:spcBef>
-              <a:buSzPct val="25000"/>
-              <a:buNone/>
-            </a:pPr>
-            <a:r>
-              <a:rPr lang="en" sz="1600">
-                <a:solidFill>
-                  <a:schemeClr val="dk1"/>
-                </a:solidFill>
-                <a:latin typeface="Avenir"/>
-                <a:ea typeface="Avenir"/>
-                <a:cs typeface="Avenir"/>
-                <a:sym typeface="Avenir"/>
-              </a:rPr>
-              <a:t>Metrics &amp;</a:t>
-            </a:r>
-            <a:br>
-              <a:rPr lang="en" sz="1600">
-                <a:solidFill>
-                  <a:schemeClr val="dk1"/>
-                </a:solidFill>
-                <a:latin typeface="Avenir"/>
-                <a:ea typeface="Avenir"/>
-                <a:cs typeface="Avenir"/>
-                <a:sym typeface="Avenir"/>
-              </a:rPr>
-            </a:br>
-            <a:r>
-              <a:rPr lang="en" sz="1600">
-                <a:solidFill>
-                  <a:schemeClr val="dk1"/>
-                </a:solidFill>
-                <a:latin typeface="Avenir"/>
-                <a:ea typeface="Avenir"/>
-                <a:cs typeface="Avenir"/>
-                <a:sym typeface="Avenir"/>
-              </a:rPr>
-              <a:t>Visualization</a:t>
-            </a:r>
-          </a:p>
-        </p:txBody>
-      </p:sp>
-      <p:sp>
-        <p:nvSpPr>
-          <p:cNvPr id="809" name="Shape 809"/>
-          <p:cNvSpPr txBox="1"/>
-          <p:nvPr/>
-        </p:nvSpPr>
-        <p:spPr>
-          <a:xfrm>
-            <a:off x="1724099" y="1435835"/>
-            <a:ext cx="1734900" cy="451500"/>
-          </a:xfrm>
-          <a:prstGeom prst="rect">
-            <a:avLst/>
-          </a:prstGeom>
-          <a:noFill/>
-          <a:ln>
-            <a:noFill/>
-          </a:ln>
-        </p:spPr>
-        <p:txBody>
-          <a:bodyPr anchorCtr="0" anchor="t" bIns="45700" lIns="91425" rIns="91425" tIns="45700">
-            <a:noAutofit/>
-          </a:bodyPr>
-          <a:lstStyle/>
-          <a:p>
-            <a:pPr indent="0" lvl="0" marL="0" marR="0" rtl="0" algn="ctr">
-              <a:spcBef>
-                <a:spcPts val="0"/>
-              </a:spcBef>
-              <a:buSzPct val="25000"/>
-              <a:buNone/>
-            </a:pPr>
-            <a:r>
-              <a:rPr lang="en" sz="1600">
-                <a:solidFill>
-                  <a:schemeClr val="dk1"/>
-                </a:solidFill>
-                <a:latin typeface="Avenir"/>
-                <a:ea typeface="Avenir"/>
-                <a:cs typeface="Avenir"/>
-                <a:sym typeface="Avenir"/>
-              </a:rPr>
-              <a:t>Dynamic Scaling</a:t>
-            </a:r>
-          </a:p>
-        </p:txBody>
-      </p:sp>
-      <p:sp>
-        <p:nvSpPr>
-          <p:cNvPr id="810" name="Shape 810"/>
-          <p:cNvSpPr txBox="1"/>
-          <p:nvPr/>
-        </p:nvSpPr>
-        <p:spPr>
-          <a:xfrm>
-            <a:off x="2017308" y="2102886"/>
-            <a:ext cx="1402800" cy="779700"/>
-          </a:xfrm>
-          <a:prstGeom prst="rect">
-            <a:avLst/>
-          </a:prstGeom>
-          <a:noFill/>
-          <a:ln>
-            <a:noFill/>
-          </a:ln>
-        </p:spPr>
-        <p:txBody>
-          <a:bodyPr anchorCtr="0" anchor="t" bIns="45700" lIns="91425" rIns="91425" tIns="45700">
-            <a:noAutofit/>
-          </a:bodyPr>
-          <a:lstStyle/>
-          <a:p>
-            <a:pPr indent="0" lvl="0" marL="0" marR="0" rtl="0" algn="ctr">
-              <a:spcBef>
-                <a:spcPts val="0"/>
-              </a:spcBef>
-              <a:buSzPct val="25000"/>
-              <a:buNone/>
-            </a:pPr>
-            <a:r>
-              <a:rPr lang="en" sz="1600">
-                <a:solidFill>
-                  <a:schemeClr val="dk1"/>
-                </a:solidFill>
-                <a:latin typeface="Avenir"/>
-                <a:ea typeface="Avenir"/>
-                <a:cs typeface="Avenir"/>
-                <a:sym typeface="Avenir"/>
-              </a:rPr>
-              <a:t>Savepoint</a:t>
-            </a:r>
-            <a:br>
-              <a:rPr lang="en" sz="1600">
-                <a:solidFill>
-                  <a:schemeClr val="dk1"/>
-                </a:solidFill>
-                <a:latin typeface="Avenir"/>
-                <a:ea typeface="Avenir"/>
-                <a:cs typeface="Avenir"/>
-                <a:sym typeface="Avenir"/>
-              </a:rPr>
-            </a:br>
-            <a:r>
-              <a:rPr lang="en" sz="1600">
-                <a:solidFill>
-                  <a:schemeClr val="dk1"/>
-                </a:solidFill>
-                <a:latin typeface="Avenir"/>
-                <a:ea typeface="Avenir"/>
-                <a:cs typeface="Avenir"/>
-                <a:sym typeface="Avenir"/>
-              </a:rPr>
-              <a:t>compatibility</a:t>
-            </a:r>
-          </a:p>
-        </p:txBody>
-      </p:sp>
-      <p:sp>
-        <p:nvSpPr>
-          <p:cNvPr id="811" name="Shape 811"/>
-          <p:cNvSpPr txBox="1"/>
-          <p:nvPr/>
-        </p:nvSpPr>
-        <p:spPr>
-          <a:xfrm>
-            <a:off x="7539795" y="2364771"/>
-            <a:ext cx="1428600" cy="779700"/>
-          </a:xfrm>
-          <a:prstGeom prst="rect">
-            <a:avLst/>
-          </a:prstGeom>
-          <a:noFill/>
-          <a:ln>
-            <a:noFill/>
-          </a:ln>
-        </p:spPr>
-        <p:txBody>
-          <a:bodyPr anchorCtr="0" anchor="t" bIns="45700" lIns="91425" rIns="91425" tIns="45700">
-            <a:noAutofit/>
-          </a:bodyPr>
-          <a:lstStyle/>
-          <a:p>
-            <a:pPr indent="0" lvl="0" marL="0" marR="0" rtl="0" algn="ctr">
-              <a:spcBef>
-                <a:spcPts val="0"/>
-              </a:spcBef>
-              <a:buSzPct val="25000"/>
-              <a:buNone/>
-            </a:pPr>
-            <a:r>
-              <a:rPr lang="en" sz="1600">
-                <a:solidFill>
-                  <a:schemeClr val="dk1"/>
-                </a:solidFill>
-                <a:latin typeface="Avenir"/>
-                <a:ea typeface="Avenir"/>
-                <a:cs typeface="Avenir"/>
-                <a:sym typeface="Avenir"/>
-              </a:rPr>
-              <a:t>Checkpoints</a:t>
-            </a:r>
-            <a:br>
-              <a:rPr lang="en" sz="1600">
-                <a:solidFill>
-                  <a:schemeClr val="dk1"/>
-                </a:solidFill>
-                <a:latin typeface="Avenir"/>
-                <a:ea typeface="Avenir"/>
-                <a:cs typeface="Avenir"/>
-                <a:sym typeface="Avenir"/>
-              </a:rPr>
-            </a:br>
-            <a:r>
-              <a:rPr lang="en" sz="1600">
-                <a:solidFill>
-                  <a:schemeClr val="dk1"/>
-                </a:solidFill>
-                <a:latin typeface="Avenir"/>
-                <a:ea typeface="Avenir"/>
-                <a:cs typeface="Avenir"/>
-                <a:sym typeface="Avenir"/>
-              </a:rPr>
-              <a:t>to savepoints</a:t>
-            </a:r>
-          </a:p>
-        </p:txBody>
-      </p:sp>
-      <p:sp>
-        <p:nvSpPr>
-          <p:cNvPr id="812" name="Shape 812"/>
-          <p:cNvSpPr txBox="1"/>
-          <p:nvPr/>
-        </p:nvSpPr>
-        <p:spPr>
-          <a:xfrm>
-            <a:off x="855020" y="5987665"/>
-            <a:ext cx="1774800" cy="451500"/>
-          </a:xfrm>
-          <a:prstGeom prst="rect">
-            <a:avLst/>
-          </a:prstGeom>
-          <a:noFill/>
-          <a:ln>
-            <a:noFill/>
-          </a:ln>
-        </p:spPr>
-        <p:txBody>
-          <a:bodyPr anchorCtr="0" anchor="t" bIns="45700" lIns="91425" rIns="91425" tIns="45700">
-            <a:noAutofit/>
-          </a:bodyPr>
-          <a:lstStyle/>
-          <a:p>
-            <a:pPr indent="0" lvl="0" marL="0" marR="0" rtl="0" algn="l">
-              <a:spcBef>
-                <a:spcPts val="0"/>
-              </a:spcBef>
-              <a:buSzPct val="25000"/>
-              <a:buNone/>
-            </a:pPr>
-            <a:r>
-              <a:rPr lang="en" sz="1600">
-                <a:solidFill>
-                  <a:schemeClr val="dk1"/>
-                </a:solidFill>
-                <a:latin typeface="Avenir"/>
-                <a:ea typeface="Avenir"/>
-                <a:cs typeface="Avenir"/>
-                <a:sym typeface="Avenir"/>
-              </a:rPr>
-              <a:t>More connectors</a:t>
-            </a:r>
-          </a:p>
-        </p:txBody>
-      </p:sp>
-      <p:sp>
-        <p:nvSpPr>
-          <p:cNvPr id="813" name="Shape 813"/>
-          <p:cNvSpPr txBox="1"/>
-          <p:nvPr/>
-        </p:nvSpPr>
-        <p:spPr>
-          <a:xfrm>
-            <a:off x="3053263" y="5866641"/>
-            <a:ext cx="1300500" cy="779700"/>
-          </a:xfrm>
-          <a:prstGeom prst="rect">
-            <a:avLst/>
-          </a:prstGeom>
-          <a:noFill/>
-          <a:ln>
-            <a:noFill/>
-          </a:ln>
-        </p:spPr>
-        <p:txBody>
-          <a:bodyPr anchorCtr="0" anchor="t" bIns="45700" lIns="91425" rIns="91425" tIns="45700">
-            <a:noAutofit/>
-          </a:bodyPr>
-          <a:lstStyle/>
-          <a:p>
-            <a:pPr indent="0" lvl="0" marL="0" marR="0" rtl="0" algn="ctr">
-              <a:spcBef>
-                <a:spcPts val="0"/>
-              </a:spcBef>
-              <a:buSzPct val="25000"/>
-              <a:buNone/>
-            </a:pPr>
-            <a:r>
-              <a:rPr lang="en" sz="1600">
-                <a:solidFill>
-                  <a:schemeClr val="dk1"/>
-                </a:solidFill>
-                <a:latin typeface="Avenir"/>
-                <a:ea typeface="Avenir"/>
-                <a:cs typeface="Avenir"/>
-                <a:sym typeface="Avenir"/>
-              </a:rPr>
-              <a:t>Stream SQL</a:t>
-            </a:r>
-            <a:br>
-              <a:rPr lang="en" sz="1600">
-                <a:solidFill>
-                  <a:schemeClr val="dk1"/>
-                </a:solidFill>
-                <a:latin typeface="Avenir"/>
-                <a:ea typeface="Avenir"/>
-                <a:cs typeface="Avenir"/>
-                <a:sym typeface="Avenir"/>
-              </a:rPr>
-            </a:br>
-            <a:r>
-              <a:rPr lang="en" sz="1600">
-                <a:solidFill>
-                  <a:schemeClr val="dk1"/>
-                </a:solidFill>
-                <a:latin typeface="Avenir"/>
-                <a:ea typeface="Avenir"/>
-                <a:cs typeface="Avenir"/>
-                <a:sym typeface="Avenir"/>
-              </a:rPr>
-              <a:t>Windows</a:t>
-            </a:r>
-          </a:p>
-        </p:txBody>
-      </p:sp>
-      <p:sp>
-        <p:nvSpPr>
-          <p:cNvPr id="814" name="Shape 814"/>
-          <p:cNvSpPr txBox="1"/>
-          <p:nvPr/>
-        </p:nvSpPr>
-        <p:spPr>
-          <a:xfrm>
-            <a:off x="5692610" y="2602684"/>
-            <a:ext cx="1396800" cy="779700"/>
-          </a:xfrm>
-          <a:prstGeom prst="rect">
-            <a:avLst/>
-          </a:prstGeom>
-          <a:noFill/>
-          <a:ln>
-            <a:noFill/>
-          </a:ln>
-        </p:spPr>
-        <p:txBody>
-          <a:bodyPr anchorCtr="0" anchor="t" bIns="45700" lIns="91425" rIns="91425" tIns="45700">
-            <a:noAutofit/>
-          </a:bodyPr>
-          <a:lstStyle/>
-          <a:p>
-            <a:pPr indent="0" lvl="0" marL="0" marR="0" rtl="0" algn="ctr">
-              <a:spcBef>
-                <a:spcPts val="0"/>
-              </a:spcBef>
-              <a:buSzPct val="25000"/>
-              <a:buNone/>
-            </a:pPr>
-            <a:r>
-              <a:rPr lang="en" sz="1600">
-                <a:solidFill>
-                  <a:schemeClr val="dk1"/>
-                </a:solidFill>
-                <a:latin typeface="Avenir"/>
-                <a:ea typeface="Avenir"/>
-                <a:cs typeface="Avenir"/>
-                <a:sym typeface="Avenir"/>
-              </a:rPr>
-              <a:t>Large state</a:t>
-            </a:r>
-            <a:br>
-              <a:rPr lang="en" sz="1600">
-                <a:solidFill>
-                  <a:schemeClr val="dk1"/>
-                </a:solidFill>
-                <a:latin typeface="Avenir"/>
-                <a:ea typeface="Avenir"/>
-                <a:cs typeface="Avenir"/>
-                <a:sym typeface="Avenir"/>
-              </a:rPr>
-            </a:br>
-            <a:r>
-              <a:rPr lang="en" sz="1600">
-                <a:solidFill>
-                  <a:schemeClr val="dk1"/>
-                </a:solidFill>
-                <a:latin typeface="Avenir"/>
-                <a:ea typeface="Avenir"/>
-                <a:cs typeface="Avenir"/>
-                <a:sym typeface="Avenir"/>
-              </a:rPr>
-              <a:t>Maintenance</a:t>
-            </a:r>
-          </a:p>
-        </p:txBody>
-      </p:sp>
-      <p:sp>
-        <p:nvSpPr>
-          <p:cNvPr id="815" name="Shape 815"/>
-          <p:cNvSpPr txBox="1"/>
-          <p:nvPr/>
-        </p:nvSpPr>
-        <p:spPr>
-          <a:xfrm>
-            <a:off x="401309" y="1816551"/>
-            <a:ext cx="1364700" cy="779700"/>
-          </a:xfrm>
-          <a:prstGeom prst="rect">
-            <a:avLst/>
-          </a:prstGeom>
-          <a:noFill/>
-          <a:ln>
-            <a:noFill/>
-          </a:ln>
-        </p:spPr>
-        <p:txBody>
-          <a:bodyPr anchorCtr="0" anchor="t" bIns="45700" lIns="91425" rIns="91425" tIns="45700">
-            <a:noAutofit/>
-          </a:bodyPr>
-          <a:lstStyle/>
-          <a:p>
-            <a:pPr indent="0" lvl="0" marL="0" marR="0" rtl="0" algn="ctr">
-              <a:spcBef>
-                <a:spcPts val="0"/>
-              </a:spcBef>
-              <a:buSzPct val="25000"/>
-              <a:buNone/>
-            </a:pPr>
-            <a:r>
-              <a:rPr lang="en" sz="1600">
-                <a:solidFill>
-                  <a:schemeClr val="dk1"/>
-                </a:solidFill>
-                <a:latin typeface="Avenir"/>
-                <a:ea typeface="Avenir"/>
-                <a:cs typeface="Avenir"/>
-                <a:sym typeface="Avenir"/>
-              </a:rPr>
-              <a:t>Fine grained</a:t>
-            </a:r>
-            <a:br>
-              <a:rPr lang="en" sz="1600">
-                <a:solidFill>
-                  <a:schemeClr val="dk1"/>
-                </a:solidFill>
-                <a:latin typeface="Avenir"/>
-                <a:ea typeface="Avenir"/>
-                <a:cs typeface="Avenir"/>
-                <a:sym typeface="Avenir"/>
-              </a:rPr>
-            </a:br>
-            <a:r>
-              <a:rPr lang="en" sz="1600">
-                <a:solidFill>
-                  <a:schemeClr val="dk1"/>
-                </a:solidFill>
-                <a:latin typeface="Avenir"/>
-                <a:ea typeface="Avenir"/>
-                <a:cs typeface="Avenir"/>
-                <a:sym typeface="Avenir"/>
-              </a:rPr>
-              <a:t>recovery</a:t>
-            </a:r>
-          </a:p>
-        </p:txBody>
-      </p:sp>
-      <p:sp>
-        <p:nvSpPr>
-          <p:cNvPr id="816" name="Shape 816"/>
-          <p:cNvSpPr txBox="1"/>
-          <p:nvPr/>
-        </p:nvSpPr>
-        <p:spPr>
-          <a:xfrm>
-            <a:off x="7215497" y="5104046"/>
-            <a:ext cx="1678500" cy="451500"/>
-          </a:xfrm>
-          <a:prstGeom prst="rect">
-            <a:avLst/>
-          </a:prstGeom>
-          <a:noFill/>
-          <a:ln>
-            <a:noFill/>
-          </a:ln>
-        </p:spPr>
-        <p:txBody>
-          <a:bodyPr anchorCtr="0" anchor="t" bIns="45700" lIns="91425" rIns="91425" tIns="45700">
-            <a:noAutofit/>
-          </a:bodyPr>
-          <a:lstStyle/>
-          <a:p>
-            <a:pPr indent="0" lvl="0" marL="0" marR="0" rtl="0" algn="ctr">
-              <a:spcBef>
-                <a:spcPts val="0"/>
-              </a:spcBef>
-              <a:buSzPct val="25000"/>
-              <a:buNone/>
-            </a:pPr>
-            <a:r>
-              <a:rPr lang="en" sz="1600">
-                <a:solidFill>
-                  <a:schemeClr val="dk1"/>
-                </a:solidFill>
-                <a:latin typeface="Avenir"/>
-                <a:ea typeface="Avenir"/>
-                <a:cs typeface="Avenir"/>
-                <a:sym typeface="Avenir"/>
-              </a:rPr>
-              <a:t>Side in-/outputs</a:t>
-            </a:r>
-          </a:p>
-        </p:txBody>
-      </p:sp>
-      <p:sp>
-        <p:nvSpPr>
-          <p:cNvPr id="817" name="Shape 817"/>
-          <p:cNvSpPr txBox="1"/>
-          <p:nvPr/>
-        </p:nvSpPr>
-        <p:spPr>
-          <a:xfrm>
-            <a:off x="3924094" y="5363234"/>
-            <a:ext cx="1402800" cy="451500"/>
-          </a:xfrm>
-          <a:prstGeom prst="rect">
-            <a:avLst/>
-          </a:prstGeom>
-          <a:noFill/>
-          <a:ln>
-            <a:noFill/>
-          </a:ln>
-        </p:spPr>
-        <p:txBody>
-          <a:bodyPr anchorCtr="0" anchor="t" bIns="45700" lIns="91425" rIns="91425" tIns="45700">
-            <a:noAutofit/>
-          </a:bodyPr>
-          <a:lstStyle/>
-          <a:p>
-            <a:pPr indent="0" lvl="0" marL="0" marR="0" rtl="0" algn="ctr">
-              <a:spcBef>
-                <a:spcPts val="0"/>
-              </a:spcBef>
-              <a:buSzPct val="25000"/>
-              <a:buNone/>
-            </a:pPr>
-            <a:r>
-              <a:rPr lang="en" sz="1600">
-                <a:solidFill>
-                  <a:schemeClr val="dk1"/>
-                </a:solidFill>
-                <a:latin typeface="Avenir"/>
-                <a:ea typeface="Avenir"/>
-                <a:cs typeface="Avenir"/>
-                <a:sym typeface="Avenir"/>
-              </a:rPr>
-              <a:t>Window DSL</a:t>
-            </a:r>
-          </a:p>
-        </p:txBody>
-      </p:sp>
-      <p:sp>
-        <p:nvSpPr>
-          <p:cNvPr id="818" name="Shape 818"/>
-          <p:cNvSpPr/>
-          <p:nvPr/>
-        </p:nvSpPr>
-        <p:spPr>
-          <a:xfrm>
-            <a:off x="3728796" y="4230818"/>
-            <a:ext cx="1449600" cy="954000"/>
-          </a:xfrm>
-          <a:prstGeom prst="roundRect">
-            <a:avLst>
-              <a:gd fmla="val 16667" name="adj"/>
-            </a:avLst>
-          </a:prstGeom>
-          <a:solidFill>
-            <a:srgbClr val="E4EAF4"/>
-          </a:solidFill>
-          <a:ln>
-            <a:noFill/>
-          </a:ln>
-        </p:spPr>
-        <p:txBody>
-          <a:bodyPr anchorCtr="0" anchor="ctr" bIns="0" lIns="0" rIns="0" tIns="0">
-            <a:noAutofit/>
-          </a:bodyPr>
-          <a:lstStyle/>
-          <a:p>
-            <a:pPr indent="0" lvl="0" marL="0" marR="0" rtl="0" algn="ctr">
-              <a:spcBef>
-                <a:spcPts val="0"/>
-              </a:spcBef>
-              <a:buSzPct val="25000"/>
-              <a:buNone/>
-            </a:pPr>
-            <a:r>
-              <a:rPr lang="en" sz="1800">
-                <a:solidFill>
-                  <a:schemeClr val="dk1"/>
-                </a:solidFill>
-                <a:latin typeface="Avenir"/>
-                <a:ea typeface="Avenir"/>
-                <a:cs typeface="Avenir"/>
-                <a:sym typeface="Avenir"/>
-              </a:rPr>
-              <a:t>Broader</a:t>
-            </a:r>
-            <a:br>
-              <a:rPr lang="en" sz="1800">
-                <a:solidFill>
-                  <a:schemeClr val="dk1"/>
-                </a:solidFill>
-                <a:latin typeface="Avenir"/>
-                <a:ea typeface="Avenir"/>
-                <a:cs typeface="Avenir"/>
-                <a:sym typeface="Avenir"/>
-              </a:rPr>
-            </a:br>
-            <a:r>
-              <a:rPr lang="en" sz="1800">
-                <a:solidFill>
-                  <a:schemeClr val="dk1"/>
-                </a:solidFill>
-                <a:latin typeface="Avenir"/>
-                <a:ea typeface="Avenir"/>
-                <a:cs typeface="Avenir"/>
-                <a:sym typeface="Avenir"/>
-              </a:rPr>
-              <a:t>Audience</a:t>
-            </a:r>
-          </a:p>
-        </p:txBody>
-      </p:sp>
-      <p:sp>
-        <p:nvSpPr>
-          <p:cNvPr id="819" name="Shape 819"/>
-          <p:cNvSpPr txBox="1"/>
-          <p:nvPr/>
-        </p:nvSpPr>
-        <p:spPr>
-          <a:xfrm>
-            <a:off x="2584683" y="3137757"/>
-            <a:ext cx="930000" cy="451500"/>
-          </a:xfrm>
-          <a:prstGeom prst="rect">
-            <a:avLst/>
-          </a:prstGeom>
-          <a:noFill/>
-          <a:ln>
-            <a:noFill/>
-          </a:ln>
-        </p:spPr>
-        <p:txBody>
-          <a:bodyPr anchorCtr="0" anchor="t" bIns="45700" lIns="91425" rIns="91425" tIns="45700">
-            <a:noAutofit/>
-          </a:bodyPr>
-          <a:lstStyle/>
-          <a:p>
-            <a:pPr indent="0" lvl="0" marL="0" marR="0" rtl="0" algn="ctr">
-              <a:spcBef>
-                <a:spcPts val="0"/>
-              </a:spcBef>
-              <a:buSzPct val="25000"/>
-              <a:buNone/>
-            </a:pPr>
-            <a:r>
-              <a:rPr lang="en" sz="1600">
-                <a:solidFill>
-                  <a:schemeClr val="dk1"/>
-                </a:solidFill>
-                <a:latin typeface="Avenir"/>
-                <a:ea typeface="Avenir"/>
-                <a:cs typeface="Avenir"/>
-                <a:sym typeface="Avenir"/>
-              </a:rPr>
-              <a:t>Security</a:t>
-            </a:r>
-          </a:p>
-        </p:txBody>
-      </p:sp>
-      <p:sp>
-        <p:nvSpPr>
-          <p:cNvPr id="820" name="Shape 820"/>
-          <p:cNvSpPr txBox="1"/>
-          <p:nvPr/>
-        </p:nvSpPr>
-        <p:spPr>
-          <a:xfrm>
-            <a:off x="573991" y="4297113"/>
-            <a:ext cx="992700" cy="779700"/>
-          </a:xfrm>
-          <a:prstGeom prst="rect">
-            <a:avLst/>
-          </a:prstGeom>
-          <a:noFill/>
-          <a:ln>
-            <a:noFill/>
-          </a:ln>
-        </p:spPr>
-        <p:txBody>
-          <a:bodyPr anchorCtr="0" anchor="t" bIns="45700" lIns="91425" rIns="91425" tIns="45700">
-            <a:noAutofit/>
-          </a:bodyPr>
-          <a:lstStyle/>
-          <a:p>
-            <a:pPr indent="0" lvl="0" marL="0" marR="0" rtl="0" algn="ctr">
-              <a:spcBef>
-                <a:spcPts val="0"/>
-              </a:spcBef>
-              <a:buSzPct val="25000"/>
-              <a:buNone/>
-            </a:pPr>
-            <a:r>
-              <a:rPr lang="en" sz="1600">
-                <a:solidFill>
-                  <a:schemeClr val="dk1"/>
-                </a:solidFill>
-                <a:latin typeface="Avenir"/>
-                <a:ea typeface="Avenir"/>
-                <a:cs typeface="Avenir"/>
-                <a:sym typeface="Avenir"/>
-              </a:rPr>
-              <a:t>Mesos &amp;</a:t>
-            </a:r>
-            <a:br>
-              <a:rPr lang="en" sz="1600">
-                <a:solidFill>
-                  <a:schemeClr val="dk1"/>
-                </a:solidFill>
-                <a:latin typeface="Avenir"/>
-                <a:ea typeface="Avenir"/>
-                <a:cs typeface="Avenir"/>
-                <a:sym typeface="Avenir"/>
-              </a:rPr>
-            </a:br>
-            <a:r>
-              <a:rPr lang="en" sz="1600">
-                <a:solidFill>
-                  <a:schemeClr val="dk1"/>
-                </a:solidFill>
-                <a:latin typeface="Avenir"/>
-                <a:ea typeface="Avenir"/>
-                <a:cs typeface="Avenir"/>
-                <a:sym typeface="Avenir"/>
-              </a:rPr>
-              <a:t>others</a:t>
-            </a:r>
-          </a:p>
-        </p:txBody>
-      </p:sp>
-      <p:sp>
-        <p:nvSpPr>
-          <p:cNvPr id="821" name="Shape 821"/>
-          <p:cNvSpPr txBox="1"/>
-          <p:nvPr/>
-        </p:nvSpPr>
-        <p:spPr>
-          <a:xfrm>
-            <a:off x="6248805" y="1563146"/>
-            <a:ext cx="1918799" cy="779700"/>
-          </a:xfrm>
-          <a:prstGeom prst="rect">
-            <a:avLst/>
-          </a:prstGeom>
-          <a:noFill/>
-          <a:ln>
-            <a:noFill/>
-          </a:ln>
-        </p:spPr>
-        <p:txBody>
-          <a:bodyPr anchorCtr="0" anchor="t" bIns="45700" lIns="91425" rIns="91425" tIns="45700">
-            <a:noAutofit/>
-          </a:bodyPr>
-          <a:lstStyle/>
-          <a:p>
-            <a:pPr indent="0" lvl="0" marL="0" marR="0" rtl="0" algn="ctr">
-              <a:spcBef>
-                <a:spcPts val="0"/>
-              </a:spcBef>
-              <a:buSzPct val="25000"/>
-              <a:buNone/>
-            </a:pPr>
-            <a:r>
-              <a:rPr lang="en" sz="1600">
-                <a:solidFill>
-                  <a:schemeClr val="dk1"/>
-                </a:solidFill>
-                <a:latin typeface="Avenir"/>
-                <a:ea typeface="Avenir"/>
-                <a:cs typeface="Avenir"/>
-                <a:sym typeface="Avenir"/>
-              </a:rPr>
-              <a:t>Dynamic Resource</a:t>
-            </a:r>
-            <a:br>
-              <a:rPr lang="en" sz="1600">
-                <a:solidFill>
-                  <a:schemeClr val="dk1"/>
-                </a:solidFill>
-                <a:latin typeface="Avenir"/>
-                <a:ea typeface="Avenir"/>
-                <a:cs typeface="Avenir"/>
-                <a:sym typeface="Avenir"/>
-              </a:rPr>
-            </a:br>
-            <a:r>
-              <a:rPr lang="en" sz="1600">
-                <a:solidFill>
-                  <a:schemeClr val="dk1"/>
-                </a:solidFill>
-                <a:latin typeface="Avenir"/>
-                <a:ea typeface="Avenir"/>
-                <a:cs typeface="Avenir"/>
-                <a:sym typeface="Avenir"/>
-              </a:rPr>
-              <a:t>Management</a:t>
-            </a:r>
-          </a:p>
-        </p:txBody>
-      </p:sp>
-      <p:sp>
-        <p:nvSpPr>
-          <p:cNvPr id="822" name="Shape 822"/>
-          <p:cNvSpPr txBox="1"/>
-          <p:nvPr/>
-        </p:nvSpPr>
-        <p:spPr>
-          <a:xfrm>
-            <a:off x="628712" y="3040001"/>
-            <a:ext cx="1556100" cy="451500"/>
-          </a:xfrm>
-          <a:prstGeom prst="rect">
-            <a:avLst/>
-          </a:prstGeom>
-          <a:noFill/>
-          <a:ln>
-            <a:noFill/>
-          </a:ln>
-        </p:spPr>
-        <p:txBody>
-          <a:bodyPr anchorCtr="0" anchor="t" bIns="45700" lIns="91425" rIns="91425" tIns="45700">
-            <a:noAutofit/>
-          </a:bodyPr>
-          <a:lstStyle/>
-          <a:p>
-            <a:pPr indent="0" lvl="0" marL="0" marR="0" rtl="0" algn="ctr">
-              <a:spcBef>
-                <a:spcPts val="0"/>
-              </a:spcBef>
-              <a:buSzPct val="25000"/>
-              <a:buNone/>
-            </a:pPr>
-            <a:r>
-              <a:rPr lang="en" sz="1600">
-                <a:solidFill>
-                  <a:schemeClr val="dk1"/>
-                </a:solidFill>
-                <a:latin typeface="Avenir"/>
-                <a:ea typeface="Avenir"/>
-                <a:cs typeface="Avenir"/>
-                <a:sym typeface="Avenir"/>
-              </a:rPr>
-              <a:t>Authentication</a:t>
-            </a:r>
-          </a:p>
-        </p:txBody>
-      </p:sp>
-      <p:cxnSp>
-        <p:nvCxnSpPr>
-          <p:cNvPr id="823" name="Shape 823"/>
-          <p:cNvCxnSpPr/>
-          <p:nvPr/>
-        </p:nvCxnSpPr>
-        <p:spPr>
-          <a:xfrm flipH="1">
-            <a:off x="2701876" y="4264444"/>
-            <a:ext cx="897600" cy="2340000"/>
-          </a:xfrm>
-          <a:prstGeom prst="straightConnector1">
-            <a:avLst/>
-          </a:prstGeom>
-          <a:noFill/>
-          <a:ln cap="flat" cmpd="sng" w="9525">
-            <a:solidFill>
-              <a:schemeClr val="dk1"/>
-            </a:solidFill>
-            <a:prstDash val="dot"/>
-            <a:round/>
-            <a:headEnd len="med" w="med" type="none"/>
-            <a:tailEnd len="med" w="med" type="none"/>
-          </a:ln>
-          <a:effectLst>
-            <a:outerShdw blurRad="39999" rotWithShape="0" dir="5400000" dist="20000">
-              <a:srgbClr val="000000">
-                <a:alpha val="37650"/>
-              </a:srgbClr>
-            </a:outerShdw>
-          </a:effectLst>
-        </p:spPr>
-      </p:cxnSp>
-      <p:cxnSp>
-        <p:nvCxnSpPr>
-          <p:cNvPr id="824" name="Shape 824"/>
-          <p:cNvCxnSpPr/>
-          <p:nvPr/>
-        </p:nvCxnSpPr>
-        <p:spPr>
-          <a:xfrm>
-            <a:off x="5246203" y="4230817"/>
-            <a:ext cx="860700" cy="2446500"/>
-          </a:xfrm>
-          <a:prstGeom prst="straightConnector1">
-            <a:avLst/>
-          </a:prstGeom>
-          <a:noFill/>
-          <a:ln cap="flat" cmpd="sng" w="9525">
-            <a:solidFill>
-              <a:schemeClr val="dk1"/>
-            </a:solidFill>
-            <a:prstDash val="dot"/>
-            <a:round/>
-            <a:headEnd len="med" w="med" type="none"/>
-            <a:tailEnd len="med" w="med" type="none"/>
-          </a:ln>
-          <a:effectLst>
-            <a:outerShdw blurRad="39999" rotWithShape="0" dir="5400000" dist="20000">
-              <a:srgbClr val="000000">
-                <a:alpha val="37650"/>
-              </a:srgbClr>
-            </a:outerShdw>
-          </a:effectLst>
-        </p:spPr>
-      </p:cxnSp>
-      <p:cxnSp>
-        <p:nvCxnSpPr>
-          <p:cNvPr id="825" name="Shape 825"/>
-          <p:cNvCxnSpPr/>
-          <p:nvPr/>
-        </p:nvCxnSpPr>
-        <p:spPr>
-          <a:xfrm>
-            <a:off x="524750" y="3618311"/>
-            <a:ext cx="3230700" cy="288900"/>
-          </a:xfrm>
-          <a:prstGeom prst="straightConnector1">
-            <a:avLst/>
-          </a:prstGeom>
-          <a:noFill/>
-          <a:ln cap="flat" cmpd="sng" w="9525">
-            <a:solidFill>
-              <a:schemeClr val="dk1"/>
-            </a:solidFill>
-            <a:prstDash val="dot"/>
-            <a:round/>
-            <a:headEnd len="med" w="med" type="none"/>
-            <a:tailEnd len="med" w="med" type="none"/>
-          </a:ln>
-          <a:effectLst>
-            <a:outerShdw blurRad="39999" rotWithShape="0" dir="5400000" dist="20000">
-              <a:srgbClr val="000000">
-                <a:alpha val="37650"/>
-              </a:srgbClr>
-            </a:outerShdw>
-          </a:effectLst>
-        </p:spPr>
-      </p:cxnSp>
-      <p:cxnSp>
-        <p:nvCxnSpPr>
-          <p:cNvPr id="826" name="Shape 826"/>
-          <p:cNvCxnSpPr/>
-          <p:nvPr/>
-        </p:nvCxnSpPr>
-        <p:spPr>
-          <a:xfrm flipH="1">
-            <a:off x="5159578" y="3615291"/>
-            <a:ext cx="3247800" cy="291900"/>
-          </a:xfrm>
-          <a:prstGeom prst="straightConnector1">
-            <a:avLst/>
-          </a:prstGeom>
-          <a:noFill/>
-          <a:ln cap="flat" cmpd="sng" w="9525">
-            <a:solidFill>
-              <a:schemeClr val="dk1"/>
-            </a:solidFill>
-            <a:prstDash val="dot"/>
-            <a:round/>
-            <a:headEnd len="med" w="med" type="none"/>
-            <a:tailEnd len="med" w="med" type="none"/>
-          </a:ln>
-          <a:effectLst>
-            <a:outerShdw blurRad="39999" rotWithShape="0" dir="5400000" dist="20000">
-              <a:srgbClr val="000000">
-                <a:alpha val="37650"/>
-              </a:srgbClr>
-            </a:outerShdw>
-          </a:effectLst>
-        </p:spPr>
-      </p:cxnSp>
-      <p:sp>
-        <p:nvSpPr>
-          <p:cNvPr id="827" name="Shape 827"/>
-          <p:cNvSpPr txBox="1"/>
-          <p:nvPr/>
-        </p:nvSpPr>
-        <p:spPr>
-          <a:xfrm>
-            <a:off x="5676523" y="5394977"/>
-            <a:ext cx="1661400" cy="779700"/>
-          </a:xfrm>
-          <a:prstGeom prst="rect">
-            <a:avLst/>
-          </a:prstGeom>
-          <a:noFill/>
-          <a:ln>
-            <a:noFill/>
-          </a:ln>
-        </p:spPr>
-        <p:txBody>
-          <a:bodyPr anchorCtr="0" anchor="t" bIns="45700" lIns="91425" rIns="91425" tIns="45700">
-            <a:noAutofit/>
-          </a:bodyPr>
-          <a:lstStyle/>
-          <a:p>
-            <a:pPr indent="0" lvl="0" marL="0" marR="0" rtl="0" algn="ctr">
-              <a:spcBef>
-                <a:spcPts val="0"/>
-              </a:spcBef>
-              <a:buSzPct val="25000"/>
-              <a:buNone/>
-            </a:pPr>
-            <a:r>
-              <a:rPr lang="en" sz="1600">
-                <a:solidFill>
-                  <a:schemeClr val="dk1"/>
-                </a:solidFill>
-                <a:latin typeface="Avenir"/>
-                <a:ea typeface="Avenir"/>
-                <a:cs typeface="Avenir"/>
-                <a:sym typeface="Avenir"/>
-              </a:rPr>
-              <a:t>Queryable State</a:t>
-            </a:r>
-          </a:p>
-        </p:txBody>
-      </p:sp>
-    </p:spTree>
-  </p:cSld>
-  <p:clrMapOvr>
-    <a:masterClrMapping/>
-  </p:clrMapOvr>
-</p:sld>
-</file>
-
 <file path=ppt/slides/slide3.xml><?xml version="1.0" encoding="utf-8"?>
 <p:sld xmlns:a="http://schemas.openxmlformats.org/drawingml/2006/main" xmlns:r="http://schemas.openxmlformats.org/officeDocument/2006/relationships" xmlns:mc="http://schemas.openxmlformats.org/markup-compatibility/2006" xmlns:mv="urn:schemas-microsoft-com:mac:vml" xmlns:p="http://schemas.openxmlformats.org/presentationml/2006/main" xmlns:c="http://schemas.openxmlformats.org/drawingml/2006/chart" xmlns:dgm="http://schemas.openxmlformats.org/drawingml/2006/diagram" xmlns:o="urn:schemas-microsoft-com:office:office" xmlns:v="urn:schemas-microsoft-com:vml" xmlns:pvml="urn:schemas-microsoft-com:office:powerpoint" xmlns:com="http://schemas.openxmlformats.org/drawingml/2006/compatibility" xmlns:p14="http://schemas.microsoft.com/office/powerpoint/2010/main">
   <p:cSld>
@@ -47962,778 +45049,6 @@
 </p:sld>
 </file>
 
-<file path=ppt/slides/slide30.xml><?xml version="1.0" encoding="utf-8"?>
-<p:sld xmlns:a="http://schemas.openxmlformats.org/drawingml/2006/main" xmlns:r="http://schemas.openxmlformats.org/officeDocument/2006/relationships" xmlns:mc="http://schemas.openxmlformats.org/markup-compatibility/2006" xmlns:mv="urn:schemas-microsoft-com:mac:vml" xmlns:p="http://schemas.openxmlformats.org/presentationml/2006/main" xmlns:c="http://schemas.openxmlformats.org/drawingml/2006/chart" xmlns:dgm="http://schemas.openxmlformats.org/drawingml/2006/diagram" xmlns:o="urn:schemas-microsoft-com:office:office" xmlns:v="urn:schemas-microsoft-com:vml" xmlns:pvml="urn:schemas-microsoft-com:office:powerpoint" xmlns:com="http://schemas.openxmlformats.org/drawingml/2006/compatibility" xmlns:p14="http://schemas.microsoft.com/office/powerpoint/2010/main">
-  <p:cSld>
-    <p:spTree>
-      <p:nvGrpSpPr>
-        <p:cNvPr id="831" name="Shape 831"/>
-        <p:cNvGrpSpPr/>
-        <p:nvPr/>
-      </p:nvGrpSpPr>
-      <p:grpSpPr>
-        <a:xfrm>
-          <a:off x="0" y="0"/>
-          <a:ext cx="0" cy="0"/>
-          <a:chOff x="0" y="0"/>
-          <a:chExt cx="0" cy="0"/>
-        </a:xfrm>
-      </p:grpSpPr>
-      <p:sp>
-        <p:nvSpPr>
-          <p:cNvPr id="832" name="Shape 832"/>
-          <p:cNvSpPr txBox="1"/>
-          <p:nvPr>
-            <p:ph type="title"/>
-          </p:nvPr>
-        </p:nvSpPr>
-        <p:spPr>
-          <a:xfrm>
-            <a:off x="457222" y="274651"/>
-            <a:ext cx="7474800" cy="898500"/>
-          </a:xfrm>
-          <a:prstGeom prst="rect">
-            <a:avLst/>
-          </a:prstGeom>
-          <a:noFill/>
-          <a:ln>
-            <a:noFill/>
-          </a:ln>
-        </p:spPr>
-        <p:txBody>
-          <a:bodyPr anchorCtr="0" anchor="ctr" bIns="45700" lIns="91425" rIns="91425" tIns="45700">
-            <a:noAutofit/>
-          </a:bodyPr>
-          <a:lstStyle/>
-          <a:p>
-            <a:pPr indent="0" lvl="0" marL="0" marR="0" rtl="0" algn="l">
-              <a:spcBef>
-                <a:spcPts val="0"/>
-              </a:spcBef>
-              <a:buClr>
-                <a:schemeClr val="dk1"/>
-              </a:buClr>
-              <a:buSzPct val="25000"/>
-              <a:buFont typeface="Avenir"/>
-              <a:buNone/>
-            </a:pPr>
-            <a:r>
-              <a:rPr b="0" i="0" lang="en" sz="3959" u="none" cap="none" strike="noStrike">
-                <a:solidFill>
-                  <a:schemeClr val="dk1"/>
-                </a:solidFill>
-                <a:latin typeface="Arial"/>
-                <a:ea typeface="Arial"/>
-                <a:cs typeface="Arial"/>
-                <a:sym typeface="Arial"/>
-              </a:rPr>
-              <a:t>Request/response applications</a:t>
-            </a:r>
-          </a:p>
-        </p:txBody>
-      </p:sp>
-      <p:sp>
-        <p:nvSpPr>
-          <p:cNvPr id="833" name="Shape 833"/>
-          <p:cNvSpPr txBox="1"/>
-          <p:nvPr>
-            <p:ph idx="1" type="body"/>
-          </p:nvPr>
-        </p:nvSpPr>
-        <p:spPr>
-          <a:xfrm>
-            <a:off x="457200" y="1474378"/>
-            <a:ext cx="8229600" cy="2581500"/>
-          </a:xfrm>
-          <a:prstGeom prst="rect">
-            <a:avLst/>
-          </a:prstGeom>
-          <a:noFill/>
-          <a:ln>
-            <a:noFill/>
-          </a:ln>
-        </p:spPr>
-        <p:txBody>
-          <a:bodyPr anchorCtr="0" anchor="t" bIns="45700" lIns="91425" rIns="91425" tIns="45700">
-            <a:noAutofit/>
-          </a:bodyPr>
-          <a:lstStyle/>
-          <a:p>
-            <a:pPr indent="-342900" lvl="0" marL="342900" marR="0" rtl="0" algn="l">
-              <a:lnSpc>
-                <a:spcPct val="80000"/>
-              </a:lnSpc>
-              <a:spcBef>
-                <a:spcPts val="0"/>
-              </a:spcBef>
-              <a:spcAft>
-                <a:spcPts val="0"/>
-              </a:spcAft>
-              <a:buClr>
-                <a:srgbClr val="34AD91"/>
-              </a:buClr>
-              <a:buSzPct val="100740"/>
-              <a:buFont typeface="Arial"/>
-              <a:buChar char="▪"/>
-            </a:pPr>
-            <a:r>
-              <a:rPr b="0" i="0" lang="en" sz="2720" u="none" cap="none" strike="noStrike">
-                <a:solidFill>
-                  <a:schemeClr val="dk1"/>
-                </a:solidFill>
-                <a:latin typeface="Arial"/>
-                <a:ea typeface="Arial"/>
-                <a:cs typeface="Arial"/>
-                <a:sym typeface="Arial"/>
-              </a:rPr>
-              <a:t>Queryable state: query Flink state directly instead of pushing results in a database</a:t>
-            </a:r>
-          </a:p>
-          <a:p>
-            <a:pPr indent="-228600" lvl="8" marL="3886200" marR="0" rtl="0" algn="l">
-              <a:lnSpc>
-                <a:spcPct val="80000"/>
-              </a:lnSpc>
-              <a:spcBef>
-                <a:spcPts val="340"/>
-              </a:spcBef>
-              <a:spcAft>
-                <a:spcPts val="0"/>
-              </a:spcAft>
-              <a:buClr>
-                <a:schemeClr val="dk1"/>
-              </a:buClr>
-              <a:buSzPct val="100000"/>
-              <a:buFont typeface="Arial"/>
-              <a:buNone/>
-            </a:pPr>
-            <a:r>
-              <a:t/>
-            </a:r>
-            <a:endParaRPr b="0" i="0" sz="1700" u="none" cap="none" strike="noStrike">
-              <a:solidFill>
-                <a:schemeClr val="dk1"/>
-              </a:solidFill>
-              <a:latin typeface="Arial"/>
-              <a:ea typeface="Arial"/>
-              <a:cs typeface="Arial"/>
-              <a:sym typeface="Arial"/>
-            </a:endParaRPr>
-          </a:p>
-          <a:p>
-            <a:pPr indent="-342900" lvl="0" marL="342900" marR="0" rtl="0" algn="l">
-              <a:lnSpc>
-                <a:spcPct val="80000"/>
-              </a:lnSpc>
-              <a:spcBef>
-                <a:spcPts val="544"/>
-              </a:spcBef>
-              <a:buClr>
-                <a:srgbClr val="34AD91"/>
-              </a:buClr>
-              <a:buSzPct val="100740"/>
-              <a:buFont typeface="Arial"/>
-              <a:buChar char="▪"/>
-            </a:pPr>
-            <a:r>
-              <a:rPr b="0" i="0" lang="en" sz="2720" u="none" cap="none" strike="noStrike">
-                <a:solidFill>
-                  <a:schemeClr val="dk1"/>
-                </a:solidFill>
-                <a:latin typeface="Arial"/>
-                <a:ea typeface="Arial"/>
-                <a:cs typeface="Arial"/>
-                <a:sym typeface="Arial"/>
-              </a:rPr>
-              <a:t>Large state support and query API coming in Flink</a:t>
-            </a:r>
-          </a:p>
-        </p:txBody>
-      </p:sp>
-      <p:sp>
-        <p:nvSpPr>
-          <p:cNvPr id="834" name="Shape 834"/>
-          <p:cNvSpPr txBox="1"/>
-          <p:nvPr>
-            <p:ph idx="12" type="sldNum"/>
-          </p:nvPr>
-        </p:nvSpPr>
-        <p:spPr>
-          <a:xfrm>
-            <a:off x="6553200" y="6356352"/>
-            <a:ext cx="2133600" cy="365100"/>
-          </a:xfrm>
-          <a:prstGeom prst="rect">
-            <a:avLst/>
-          </a:prstGeom>
-          <a:noFill/>
-          <a:ln>
-            <a:noFill/>
-          </a:ln>
-        </p:spPr>
-        <p:txBody>
-          <a:bodyPr anchorCtr="0" anchor="ctr" bIns="45700" lIns="91425" rIns="91425" tIns="45700">
-            <a:noAutofit/>
-          </a:bodyPr>
-          <a:lstStyle/>
-          <a:p>
-            <a:pPr indent="0" lvl="0" marL="0" marR="0" rtl="0" algn="r">
-              <a:spcBef>
-                <a:spcPts val="0"/>
-              </a:spcBef>
-              <a:buSzPct val="25000"/>
-              <a:buNone/>
-            </a:pPr>
-            <a:fld id="{00000000-1234-1234-1234-123412341234}" type="slidenum">
-              <a:rPr lang="en" sz="1200">
-                <a:solidFill>
-                  <a:srgbClr val="888888"/>
-                </a:solidFill>
-                <a:latin typeface="Avenir"/>
-                <a:ea typeface="Avenir"/>
-                <a:cs typeface="Avenir"/>
-                <a:sym typeface="Avenir"/>
-              </a:rPr>
-              <a:t>‹#›</a:t>
-            </a:fld>
-          </a:p>
-        </p:txBody>
-      </p:sp>
-      <p:sp>
-        <p:nvSpPr>
-          <p:cNvPr id="835" name="Shape 835"/>
-          <p:cNvSpPr/>
-          <p:nvPr/>
-        </p:nvSpPr>
-        <p:spPr>
-          <a:xfrm rot="5400000">
-            <a:off x="1189971" y="3705959"/>
-            <a:ext cx="720900" cy="1805400"/>
-          </a:xfrm>
-          <a:prstGeom prst="can">
-            <a:avLst>
-              <a:gd fmla="val 25000" name="adj"/>
-            </a:avLst>
-          </a:prstGeom>
-          <a:solidFill>
-            <a:srgbClr val="FDB212"/>
-          </a:solidFill>
-          <a:ln>
-            <a:noFill/>
-          </a:ln>
-        </p:spPr>
-        <p:txBody>
-          <a:bodyPr anchorCtr="0" anchor="ctr" bIns="45700" lIns="91425" rIns="91425" tIns="45700">
-            <a:noAutofit/>
-          </a:bodyPr>
-          <a:lstStyle/>
-          <a:p>
-            <a:pPr indent="0" lvl="0" marL="0" marR="0" rtl="0" algn="ctr">
-              <a:spcBef>
-                <a:spcPts val="0"/>
-              </a:spcBef>
-              <a:buNone/>
-            </a:pPr>
-            <a:r>
-              <a:t/>
-            </a:r>
-            <a:endParaRPr sz="1800">
-              <a:solidFill>
-                <a:schemeClr val="lt1"/>
-              </a:solidFill>
-              <a:latin typeface="Calibri"/>
-              <a:ea typeface="Calibri"/>
-              <a:cs typeface="Calibri"/>
-              <a:sym typeface="Calibri"/>
-            </a:endParaRPr>
-          </a:p>
-        </p:txBody>
-      </p:sp>
-      <p:pic>
-        <p:nvPicPr>
-          <p:cNvPr descr="http://hortonworks.com/wp-content/uploads/2014/08/kafka-logo-wide.png" id="836" name="Shape 836"/>
-          <p:cNvPicPr preferRelativeResize="0"/>
-          <p:nvPr/>
-        </p:nvPicPr>
-        <p:blipFill rotWithShape="1">
-          <a:blip r:embed="rId3">
-            <a:alphaModFix/>
-          </a:blip>
-          <a:srcRect b="0" l="0" r="0" t="0"/>
-          <a:stretch/>
-        </p:blipFill>
-        <p:spPr>
-          <a:xfrm>
-            <a:off x="1011500" y="4248209"/>
-            <a:ext cx="986399" cy="691200"/>
-          </a:xfrm>
-          <a:prstGeom prst="rect">
-            <a:avLst/>
-          </a:prstGeom>
-          <a:noFill/>
-          <a:ln>
-            <a:noFill/>
-          </a:ln>
-        </p:spPr>
-      </p:pic>
-      <p:sp>
-        <p:nvSpPr>
-          <p:cNvPr id="837" name="Shape 837"/>
-          <p:cNvSpPr/>
-          <p:nvPr/>
-        </p:nvSpPr>
-        <p:spPr>
-          <a:xfrm>
-            <a:off x="3119342" y="4189102"/>
-            <a:ext cx="1267799" cy="839100"/>
-          </a:xfrm>
-          <a:prstGeom prst="rect">
-            <a:avLst/>
-          </a:prstGeom>
-          <a:solidFill>
-            <a:srgbClr val="2DA07E"/>
-          </a:solidFill>
-          <a:ln cap="flat" cmpd="sng" w="9525">
-            <a:solidFill>
-              <a:srgbClr val="2DA07E"/>
-            </a:solidFill>
-            <a:prstDash val="solid"/>
-            <a:round/>
-            <a:headEnd len="med" w="med" type="none"/>
-            <a:tailEnd len="med" w="med" type="none"/>
-          </a:ln>
-        </p:spPr>
-        <p:txBody>
-          <a:bodyPr anchorCtr="0" anchor="ctr" bIns="45700" lIns="91425" rIns="91425" tIns="45700">
-            <a:noAutofit/>
-          </a:bodyPr>
-          <a:lstStyle/>
-          <a:p>
-            <a:pPr indent="0" lvl="0" marL="0" marR="0" rtl="0" algn="ctr">
-              <a:spcBef>
-                <a:spcPts val="0"/>
-              </a:spcBef>
-              <a:buNone/>
-            </a:pPr>
-            <a:r>
-              <a:t/>
-            </a:r>
-            <a:endParaRPr sz="1400">
-              <a:solidFill>
-                <a:srgbClr val="FFFFFF"/>
-              </a:solidFill>
-              <a:latin typeface="Avenir"/>
-              <a:ea typeface="Avenir"/>
-              <a:cs typeface="Avenir"/>
-              <a:sym typeface="Avenir"/>
-            </a:endParaRPr>
-          </a:p>
-        </p:txBody>
-      </p:sp>
-      <p:cxnSp>
-        <p:nvCxnSpPr>
-          <p:cNvPr id="838" name="Shape 838"/>
-          <p:cNvCxnSpPr>
-            <a:stCxn id="835" idx="1"/>
-            <a:endCxn id="837" idx="1"/>
-          </p:cNvCxnSpPr>
-          <p:nvPr/>
-        </p:nvCxnSpPr>
-        <p:spPr>
-          <a:xfrm>
-            <a:off x="2453121" y="4608659"/>
-            <a:ext cx="666300" cy="0"/>
-          </a:xfrm>
-          <a:prstGeom prst="straightConnector1">
-            <a:avLst/>
-          </a:prstGeom>
-          <a:noFill/>
-          <a:ln cap="flat" cmpd="sng" w="12700">
-            <a:solidFill>
-              <a:schemeClr val="dk1"/>
-            </a:solidFill>
-            <a:prstDash val="solid"/>
-            <a:round/>
-            <a:headEnd len="med" w="med" type="none"/>
-            <a:tailEnd len="lg" w="lg" type="triangle"/>
-          </a:ln>
-        </p:spPr>
-      </p:cxnSp>
-      <p:pic>
-        <p:nvPicPr>
-          <p:cNvPr id="839" name="Shape 839"/>
-          <p:cNvPicPr preferRelativeResize="0"/>
-          <p:nvPr/>
-        </p:nvPicPr>
-        <p:blipFill rotWithShape="1">
-          <a:blip r:embed="rId4">
-            <a:alphaModFix/>
-          </a:blip>
-          <a:srcRect b="0" l="0" r="0" t="0"/>
-          <a:stretch/>
-        </p:blipFill>
-        <p:spPr>
-          <a:xfrm>
-            <a:off x="3463788" y="4261372"/>
-            <a:ext cx="486000" cy="486000"/>
-          </a:xfrm>
-          <a:prstGeom prst="rect">
-            <a:avLst/>
-          </a:prstGeom>
-          <a:noFill/>
-          <a:ln>
-            <a:noFill/>
-          </a:ln>
-        </p:spPr>
-      </p:pic>
-      <p:sp>
-        <p:nvSpPr>
-          <p:cNvPr id="840" name="Shape 840"/>
-          <p:cNvSpPr/>
-          <p:nvPr/>
-        </p:nvSpPr>
-        <p:spPr>
-          <a:xfrm>
-            <a:off x="4086958" y="4774959"/>
-            <a:ext cx="507900" cy="550500"/>
-          </a:xfrm>
-          <a:prstGeom prst="can">
-            <a:avLst>
-              <a:gd fmla="val 25000" name="adj"/>
-            </a:avLst>
-          </a:prstGeom>
-          <a:solidFill>
-            <a:srgbClr val="FDB212"/>
-          </a:solidFill>
-          <a:ln>
-            <a:noFill/>
-          </a:ln>
-        </p:spPr>
-        <p:txBody>
-          <a:bodyPr anchorCtr="0" anchor="ctr" bIns="45700" lIns="91425" rIns="91425" tIns="45700">
-            <a:noAutofit/>
-          </a:bodyPr>
-          <a:lstStyle/>
-          <a:p>
-            <a:pPr indent="0" lvl="0" marL="0" marR="0" rtl="0" algn="ctr">
-              <a:spcBef>
-                <a:spcPts val="0"/>
-              </a:spcBef>
-              <a:buNone/>
-            </a:pPr>
-            <a:r>
-              <a:t/>
-            </a:r>
-            <a:endParaRPr sz="1800">
-              <a:solidFill>
-                <a:schemeClr val="lt1"/>
-              </a:solidFill>
-              <a:latin typeface="Calibri"/>
-              <a:ea typeface="Calibri"/>
-              <a:cs typeface="Calibri"/>
-              <a:sym typeface="Calibri"/>
-            </a:endParaRPr>
-          </a:p>
-        </p:txBody>
-      </p:sp>
-      <p:sp>
-        <p:nvSpPr>
-          <p:cNvPr id="841" name="Shape 841"/>
-          <p:cNvSpPr/>
-          <p:nvPr/>
-        </p:nvSpPr>
-        <p:spPr>
-          <a:xfrm>
-            <a:off x="5149483" y="4671496"/>
-            <a:ext cx="1412700" cy="720000"/>
-          </a:xfrm>
-          <a:prstGeom prst="can">
-            <a:avLst>
-              <a:gd fmla="val 25000" name="adj"/>
-            </a:avLst>
-          </a:prstGeom>
-          <a:solidFill>
-            <a:srgbClr val="FDB212"/>
-          </a:solidFill>
-          <a:ln>
-            <a:noFill/>
-          </a:ln>
-        </p:spPr>
-        <p:txBody>
-          <a:bodyPr anchorCtr="0" anchor="ctr" bIns="45700" lIns="91425" rIns="91425" tIns="45700">
-            <a:noAutofit/>
-          </a:bodyPr>
-          <a:lstStyle/>
-          <a:p>
-            <a:pPr indent="0" lvl="0" marL="0" marR="0" rtl="0" algn="ctr">
-              <a:spcBef>
-                <a:spcPts val="0"/>
-              </a:spcBef>
-              <a:buNone/>
-            </a:pPr>
-            <a:r>
-              <a:t/>
-            </a:r>
-            <a:endParaRPr sz="1800">
-              <a:solidFill>
-                <a:schemeClr val="lt1"/>
-              </a:solidFill>
-              <a:latin typeface="Calibri"/>
-              <a:ea typeface="Calibri"/>
-              <a:cs typeface="Calibri"/>
-              <a:sym typeface="Calibri"/>
-            </a:endParaRPr>
-          </a:p>
-        </p:txBody>
-      </p:sp>
-      <p:cxnSp>
-        <p:nvCxnSpPr>
-          <p:cNvPr id="842" name="Shape 842"/>
-          <p:cNvCxnSpPr>
-            <a:stCxn id="840" idx="4"/>
-            <a:endCxn id="841" idx="2"/>
-          </p:cNvCxnSpPr>
-          <p:nvPr/>
-        </p:nvCxnSpPr>
-        <p:spPr>
-          <a:xfrm flipH="1" rot="10800000">
-            <a:off x="4594858" y="5031609"/>
-            <a:ext cx="554700" cy="18600"/>
-          </a:xfrm>
-          <a:prstGeom prst="straightConnector1">
-            <a:avLst/>
-          </a:prstGeom>
-          <a:noFill/>
-          <a:ln cap="flat" cmpd="sng" w="12700">
-            <a:solidFill>
-              <a:schemeClr val="dk1"/>
-            </a:solidFill>
-            <a:prstDash val="solid"/>
-            <a:round/>
-            <a:headEnd len="med" w="med" type="none"/>
-            <a:tailEnd len="lg" w="lg" type="triangle"/>
-          </a:ln>
-        </p:spPr>
-      </p:cxnSp>
-      <p:pic>
-        <p:nvPicPr>
-          <p:cNvPr descr="http://s3.thinkaurelius.com/docs/titan/0.5.4/images/hdfs-logo.jpg" id="843" name="Shape 843"/>
-          <p:cNvPicPr preferRelativeResize="0"/>
-          <p:nvPr/>
-        </p:nvPicPr>
-        <p:blipFill rotWithShape="1">
-          <a:blip r:embed="rId5">
-            <a:alphaModFix/>
-          </a:blip>
-          <a:srcRect b="0" l="0" r="0" t="0"/>
-          <a:stretch/>
-        </p:blipFill>
-        <p:spPr>
-          <a:xfrm>
-            <a:off x="5119718" y="4233624"/>
-            <a:ext cx="838500" cy="344700"/>
-          </a:xfrm>
-          <a:prstGeom prst="rect">
-            <a:avLst/>
-          </a:prstGeom>
-          <a:noFill/>
-          <a:ln>
-            <a:noFill/>
-          </a:ln>
-        </p:spPr>
-      </p:pic>
-      <p:pic>
-        <p:nvPicPr>
-          <p:cNvPr id="844" name="Shape 844"/>
-          <p:cNvPicPr preferRelativeResize="0"/>
-          <p:nvPr/>
-        </p:nvPicPr>
-        <p:blipFill rotWithShape="1">
-          <a:blip r:embed="rId6">
-            <a:alphaModFix/>
-          </a:blip>
-          <a:srcRect b="0" l="0" r="0" t="0"/>
-          <a:stretch/>
-        </p:blipFill>
-        <p:spPr>
-          <a:xfrm>
-            <a:off x="6127642" y="4189102"/>
-            <a:ext cx="434700" cy="388500"/>
-          </a:xfrm>
-          <a:prstGeom prst="rect">
-            <a:avLst/>
-          </a:prstGeom>
-          <a:noFill/>
-          <a:ln>
-            <a:noFill/>
-          </a:ln>
-        </p:spPr>
-      </p:pic>
-      <p:cxnSp>
-        <p:nvCxnSpPr>
-          <p:cNvPr id="845" name="Shape 845"/>
-          <p:cNvCxnSpPr>
-            <a:endCxn id="841" idx="4"/>
-          </p:cNvCxnSpPr>
-          <p:nvPr/>
-        </p:nvCxnSpPr>
-        <p:spPr>
-          <a:xfrm rot="10800000">
-            <a:off x="6562183" y="5031496"/>
-            <a:ext cx="346500" cy="0"/>
-          </a:xfrm>
-          <a:prstGeom prst="straightConnector1">
-            <a:avLst/>
-          </a:prstGeom>
-          <a:noFill/>
-          <a:ln cap="flat" cmpd="sng" w="12700">
-            <a:solidFill>
-              <a:schemeClr val="dk1"/>
-            </a:solidFill>
-            <a:prstDash val="solid"/>
-            <a:round/>
-            <a:headEnd len="med" w="med" type="none"/>
-            <a:tailEnd len="lg" w="lg" type="triangle"/>
-          </a:ln>
-        </p:spPr>
-      </p:cxnSp>
-      <p:sp>
-        <p:nvSpPr>
-          <p:cNvPr id="846" name="Shape 846"/>
-          <p:cNvSpPr txBox="1"/>
-          <p:nvPr/>
-        </p:nvSpPr>
-        <p:spPr>
-          <a:xfrm>
-            <a:off x="6908748" y="4812609"/>
-            <a:ext cx="832800" cy="410400"/>
-          </a:xfrm>
-          <a:prstGeom prst="rect">
-            <a:avLst/>
-          </a:prstGeom>
-          <a:noFill/>
-          <a:ln>
-            <a:noFill/>
-          </a:ln>
-        </p:spPr>
-        <p:txBody>
-          <a:bodyPr anchorCtr="0" anchor="t" bIns="45700" lIns="91425" rIns="91425" tIns="45700">
-            <a:noAutofit/>
-          </a:bodyPr>
-          <a:lstStyle/>
-          <a:p>
-            <a:pPr indent="0" lvl="0" marL="0" marR="0" rtl="0" algn="l">
-              <a:spcBef>
-                <a:spcPts val="0"/>
-              </a:spcBef>
-              <a:buSzPct val="25000"/>
-              <a:buNone/>
-            </a:pPr>
-            <a:r>
-              <a:rPr i="1" lang="en" sz="1400">
-                <a:solidFill>
-                  <a:schemeClr val="dk1"/>
-                </a:solidFill>
-                <a:latin typeface="Avenir"/>
-                <a:ea typeface="Avenir"/>
-                <a:cs typeface="Avenir"/>
-                <a:sym typeface="Avenir"/>
-              </a:rPr>
-              <a:t>queries</a:t>
-            </a:r>
-          </a:p>
-        </p:txBody>
-      </p:sp>
-      <p:cxnSp>
-        <p:nvCxnSpPr>
-          <p:cNvPr id="847" name="Shape 847"/>
-          <p:cNvCxnSpPr>
-            <a:endCxn id="840" idx="3"/>
-          </p:cNvCxnSpPr>
-          <p:nvPr/>
-        </p:nvCxnSpPr>
-        <p:spPr>
-          <a:xfrm rot="10800000">
-            <a:off x="4340908" y="5325459"/>
-            <a:ext cx="0" cy="640800"/>
-          </a:xfrm>
-          <a:prstGeom prst="straightConnector1">
-            <a:avLst/>
-          </a:prstGeom>
-          <a:noFill/>
-          <a:ln cap="flat" cmpd="sng" w="38100">
-            <a:solidFill>
-              <a:schemeClr val="dk1"/>
-            </a:solidFill>
-            <a:prstDash val="solid"/>
-            <a:round/>
-            <a:headEnd len="med" w="med" type="none"/>
-            <a:tailEnd len="lg" w="lg" type="triangle"/>
-          </a:ln>
-        </p:spPr>
-      </p:cxnSp>
-      <p:cxnSp>
-        <p:nvCxnSpPr>
-          <p:cNvPr id="848" name="Shape 848"/>
-          <p:cNvCxnSpPr/>
-          <p:nvPr/>
-        </p:nvCxnSpPr>
-        <p:spPr>
-          <a:xfrm rot="10800000">
-            <a:off x="4341027" y="5966159"/>
-            <a:ext cx="2984100" cy="0"/>
-          </a:xfrm>
-          <a:prstGeom prst="straightConnector1">
-            <a:avLst/>
-          </a:prstGeom>
-          <a:noFill/>
-          <a:ln cap="flat" cmpd="sng" w="38100">
-            <a:solidFill>
-              <a:schemeClr val="dk1"/>
-            </a:solidFill>
-            <a:prstDash val="solid"/>
-            <a:round/>
-            <a:headEnd len="med" w="med" type="none"/>
-            <a:tailEnd len="med" w="med" type="none"/>
-          </a:ln>
-        </p:spPr>
-      </p:cxnSp>
-      <p:cxnSp>
-        <p:nvCxnSpPr>
-          <p:cNvPr id="849" name="Shape 849"/>
-          <p:cNvCxnSpPr>
-            <a:stCxn id="846" idx="2"/>
-          </p:cNvCxnSpPr>
-          <p:nvPr/>
-        </p:nvCxnSpPr>
-        <p:spPr>
-          <a:xfrm>
-            <a:off x="7325148" y="5223009"/>
-            <a:ext cx="0" cy="743100"/>
-          </a:xfrm>
-          <a:prstGeom prst="straightConnector1">
-            <a:avLst/>
-          </a:prstGeom>
-          <a:noFill/>
-          <a:ln cap="flat" cmpd="sng" w="38100">
-            <a:solidFill>
-              <a:schemeClr val="dk1"/>
-            </a:solidFill>
-            <a:prstDash val="solid"/>
-            <a:round/>
-            <a:headEnd len="med" w="med" type="none"/>
-            <a:tailEnd len="med" w="med" type="none"/>
-          </a:ln>
-        </p:spPr>
-      </p:cxnSp>
-    </p:spTree>
-  </p:cSld>
-  <p:clrMapOvr>
-    <a:masterClrMapping/>
-  </p:clrMapOvr>
-</p:sld>
-</file>
-
 <file path=ppt/slides/slide4.xml><?xml version="1.0" encoding="utf-8"?>
 <p:sld xmlns:a="http://schemas.openxmlformats.org/drawingml/2006/main" xmlns:r="http://schemas.openxmlformats.org/officeDocument/2006/relationships" xmlns:mc="http://schemas.openxmlformats.org/markup-compatibility/2006" xmlns:mv="urn:schemas-microsoft-com:mac:vml" xmlns:p="http://schemas.openxmlformats.org/presentationml/2006/main" xmlns:c="http://schemas.openxmlformats.org/drawingml/2006/chart" xmlns:dgm="http://schemas.openxmlformats.org/drawingml/2006/diagram" xmlns:o="urn:schemas-microsoft-com:office:office" xmlns:v="urn:schemas-microsoft-com:vml" xmlns:pvml="urn:schemas-microsoft-com:office:powerpoint" xmlns:com="http://schemas.openxmlformats.org/drawingml/2006/compatibility" xmlns:p14="http://schemas.microsoft.com/office/powerpoint/2010/main">
   <p:cSld>
@@ -55236,9 +51551,9 @@
 </file>
 
 <file path=ppt/theme/theme1.xml><?xml version="1.0" encoding="utf-8"?>
-<a:theme xmlns:a="http://schemas.openxmlformats.org/drawingml/2006/main" xmlns:r="http://schemas.openxmlformats.org/officeDocument/2006/relationships" name="1_Office Theme">
+<a:theme xmlns:a="http://schemas.openxmlformats.org/drawingml/2006/main" xmlns:r="http://schemas.openxmlformats.org/officeDocument/2006/relationships" name="Custom Theme">
   <a:themeElements>
-    <a:clrScheme name="Office">
+    <a:clrScheme name="Default">
       <a:dk1>
         <a:srgbClr val="000000"/>
       </a:dk1>
@@ -55246,34 +51561,34 @@
         <a:srgbClr val="FFFFFF"/>
       </a:lt1>
       <a:dk2>
-        <a:srgbClr val="1F497D"/>
+        <a:srgbClr val="158158"/>
       </a:dk2>
       <a:lt2>
-        <a:srgbClr val="EEECE1"/>
+        <a:srgbClr val="F3F3F3"/>
       </a:lt2>
       <a:accent1>
-        <a:srgbClr val="4F81BD"/>
+        <a:srgbClr val="058DC7"/>
       </a:accent1>
       <a:accent2>
-        <a:srgbClr val="C0504D"/>
+        <a:srgbClr val="50B432"/>
       </a:accent2>
       <a:accent3>
-        <a:srgbClr val="9BBB59"/>
+        <a:srgbClr val="ED561B"/>
       </a:accent3>
       <a:accent4>
-        <a:srgbClr val="8064A2"/>
+        <a:srgbClr val="EDEF00"/>
       </a:accent4>
       <a:accent5>
-        <a:srgbClr val="4BACC6"/>
+        <a:srgbClr val="24CBE5"/>
       </a:accent5>
       <a:accent6>
-        <a:srgbClr val="F79646"/>
+        <a:srgbClr val="64E572"/>
       </a:accent6>
       <a:hlink>
-        <a:srgbClr val="0000FF"/>
+        <a:srgbClr val="2200CC"/>
       </a:hlink>
       <a:folHlink>
-        <a:srgbClr val="800080"/>
+        <a:srgbClr val="551A8B"/>
       </a:folHlink>
     </a:clrScheme>
     <a:fontScheme name="Office">
@@ -55515,9 +51830,9 @@
 </file>
 
 <file path=ppt/theme/theme2.xml><?xml version="1.0" encoding="utf-8"?>
-<a:theme xmlns:a="http://schemas.openxmlformats.org/drawingml/2006/main" xmlns:r="http://schemas.openxmlformats.org/officeDocument/2006/relationships" name="Custom Theme">
+<a:theme xmlns:a="http://schemas.openxmlformats.org/drawingml/2006/main" xmlns:r="http://schemas.openxmlformats.org/officeDocument/2006/relationships" name="1_Office Theme">
   <a:themeElements>
-    <a:clrScheme name="Default">
+    <a:clrScheme name="Office">
       <a:dk1>
         <a:srgbClr val="000000"/>
       </a:dk1>
@@ -55525,34 +51840,34 @@
         <a:srgbClr val="FFFFFF"/>
       </a:lt1>
       <a:dk2>
-        <a:srgbClr val="158158"/>
+        <a:srgbClr val="1F497D"/>
       </a:dk2>
       <a:lt2>
-        <a:srgbClr val="F3F3F3"/>
+        <a:srgbClr val="EEECE1"/>
       </a:lt2>
       <a:accent1>
-        <a:srgbClr val="058DC7"/>
+        <a:srgbClr val="4F81BD"/>
       </a:accent1>
       <a:accent2>
-        <a:srgbClr val="50B432"/>
+        <a:srgbClr val="C0504D"/>
       </a:accent2>
       <a:accent3>
-        <a:srgbClr val="ED561B"/>
+        <a:srgbClr val="9BBB59"/>
       </a:accent3>
       <a:accent4>
-        <a:srgbClr val="EDEF00"/>
+        <a:srgbClr val="8064A2"/>
       </a:accent4>
       <a:accent5>
-        <a:srgbClr val="24CBE5"/>
+        <a:srgbClr val="4BACC6"/>
       </a:accent5>
       <a:accent6>
-        <a:srgbClr val="64E572"/>
+        <a:srgbClr val="F79646"/>
       </a:accent6>
       <a:hlink>
-        <a:srgbClr val="2200CC"/>
+        <a:srgbClr val="0000FF"/>
       </a:hlink>
       <a:folHlink>
-        <a:srgbClr val="551A8B"/>
+        <a:srgbClr val="800080"/>
       </a:folHlink>
     </a:clrScheme>
     <a:fontScheme name="Office">
@@ -56073,6 +52388,285 @@
 </file>
 
 <file path=ppt/theme/theme4.xml><?xml version="1.0" encoding="utf-8"?>
+<a:theme xmlns:a="http://schemas.openxmlformats.org/drawingml/2006/main" xmlns:r="http://schemas.openxmlformats.org/officeDocument/2006/relationships" name="simple-light-2">
+  <a:themeElements>
+    <a:clrScheme name="Simple Light">
+      <a:dk1>
+        <a:srgbClr val="000000"/>
+      </a:dk1>
+      <a:lt1>
+        <a:srgbClr val="FFFFFF"/>
+      </a:lt1>
+      <a:dk2>
+        <a:srgbClr val="595959"/>
+      </a:dk2>
+      <a:lt2>
+        <a:srgbClr val="EEEEEE"/>
+      </a:lt2>
+      <a:accent1>
+        <a:srgbClr val="FFAB40"/>
+      </a:accent1>
+      <a:accent2>
+        <a:srgbClr val="212121"/>
+      </a:accent2>
+      <a:accent3>
+        <a:srgbClr val="78909C"/>
+      </a:accent3>
+      <a:accent4>
+        <a:srgbClr val="FFAB40"/>
+      </a:accent4>
+      <a:accent5>
+        <a:srgbClr val="0097A7"/>
+      </a:accent5>
+      <a:accent6>
+        <a:srgbClr val="EEFF41"/>
+      </a:accent6>
+      <a:hlink>
+        <a:srgbClr val="0097A7"/>
+      </a:hlink>
+      <a:folHlink>
+        <a:srgbClr val="0097A7"/>
+      </a:folHlink>
+    </a:clrScheme>
+    <a:fontScheme name="Office">
+      <a:majorFont>
+        <a:latin typeface="Arial"/>
+        <a:ea typeface=""/>
+        <a:cs typeface=""/>
+        <a:font script="Jpan" typeface="ＭＳ Ｐゴシック"/>
+        <a:font script="Hang" typeface="맑은 고딕"/>
+        <a:font script="Hans" typeface="宋体"/>
+        <a:font script="Hant" typeface="新細明體"/>
+        <a:font script="Arab" typeface="Times New Roman"/>
+        <a:font script="Hebr" typeface="Times New Roman"/>
+        <a:font script="Thai" typeface="Angsana New"/>
+        <a:font script="Ethi" typeface="Nyala"/>
+        <a:font script="Beng" typeface="Vrinda"/>
+        <a:font script="Gujr" typeface="Shruti"/>
+        <a:font script="Khmr" typeface="MoolBoran"/>
+        <a:font script="Knda" typeface="Tunga"/>
+        <a:font script="Guru" typeface="Raavi"/>
+        <a:font script="Cans" typeface="Euphemia"/>
+        <a:font script="Cher" typeface="Plantagenet Cherokee"/>
+        <a:font script="Yiii" typeface="Microsoft Yi Baiti"/>
+        <a:font script="Tibt" typeface="Microsoft Himalaya"/>
+        <a:font script="Thaa" typeface="MV Boli"/>
+        <a:font script="Deva" typeface="Mangal"/>
+        <a:font script="Telu" typeface="Gautami"/>
+        <a:font script="Taml" typeface="Latha"/>
+        <a:font script="Syrc" typeface="Estrangelo Edessa"/>
+        <a:font script="Orya" typeface="Kalinga"/>
+        <a:font script="Mlym" typeface="Kartika"/>
+        <a:font script="Laoo" typeface="DokChampa"/>
+        <a:font script="Sinh" typeface="Iskoola Pota"/>
+        <a:font script="Mong" typeface="Mongolian Baiti"/>
+        <a:font script="Viet" typeface="Times New Roman"/>
+        <a:font script="Uigh" typeface="Microsoft Uighur"/>
+        <a:font script="Geor" typeface="Sylfaen"/>
+      </a:majorFont>
+      <a:minorFont>
+        <a:latin typeface="Arial"/>
+        <a:ea typeface=""/>
+        <a:cs typeface=""/>
+        <a:font script="Jpan" typeface="ＭＳ Ｐゴシック"/>
+        <a:font script="Hang" typeface="맑은 고딕"/>
+        <a:font script="Hans" typeface="宋体"/>
+        <a:font script="Hant" typeface="新細明體"/>
+        <a:font script="Arab" typeface="Arial"/>
+        <a:font script="Hebr" typeface="Arial"/>
+        <a:font script="Thai" typeface="Cordia New"/>
+        <a:font script="Ethi" typeface="Nyala"/>
+        <a:font script="Beng" typeface="Vrinda"/>
+        <a:font script="Gujr" typeface="Shruti"/>
+        <a:font script="Khmr" typeface="DaunPenh"/>
+        <a:font script="Knda" typeface="Tunga"/>
+        <a:font script="Guru" typeface="Raavi"/>
+        <a:font script="Cans" typeface="Euphemia"/>
+        <a:font script="Cher" typeface="Plantagenet Cherokee"/>
+        <a:font script="Yiii" typeface="Microsoft Yi Baiti"/>
+        <a:font script="Tibt" typeface="Microsoft Himalaya"/>
+        <a:font script="Thaa" typeface="MV Boli"/>
+        <a:font script="Deva" typeface="Mangal"/>
+        <a:font script="Telu" typeface="Gautami"/>
+        <a:font script="Taml" typeface="Latha"/>
+        <a:font script="Syrc" typeface="Estrangelo Edessa"/>
+        <a:font script="Orya" typeface="Kalinga"/>
+        <a:font script="Mlym" typeface="Kartika"/>
+        <a:font script="Laoo" typeface="DokChampa"/>
+        <a:font script="Sinh" typeface="Iskoola Pota"/>
+        <a:font script="Mong" typeface="Mongolian Baiti"/>
+        <a:font script="Viet" typeface="Arial"/>
+        <a:font script="Uigh" typeface="Microsoft Uighur"/>
+        <a:font script="Geor" typeface="Sylfaen"/>
+      </a:minorFont>
+    </a:fontScheme>
+    <a:fmtScheme name="Office">
+      <a:fillStyleLst>
+        <a:solidFill>
+          <a:schemeClr val="phClr"/>
+        </a:solidFill>
+        <a:gradFill rotWithShape="1">
+          <a:gsLst>
+            <a:gs pos="0">
+              <a:schemeClr val="phClr">
+                <a:tint val="50000"/>
+                <a:satMod val="300000"/>
+              </a:schemeClr>
+            </a:gs>
+            <a:gs pos="35000">
+              <a:schemeClr val="phClr">
+                <a:tint val="37000"/>
+                <a:satMod val="300000"/>
+              </a:schemeClr>
+            </a:gs>
+            <a:gs pos="100000">
+              <a:schemeClr val="phClr">
+                <a:tint val="15000"/>
+                <a:satMod val="350000"/>
+              </a:schemeClr>
+            </a:gs>
+          </a:gsLst>
+          <a:lin ang="16200000" scaled="1"/>
+        </a:gradFill>
+        <a:gradFill rotWithShape="1">
+          <a:gsLst>
+            <a:gs pos="0">
+              <a:schemeClr val="phClr">
+                <a:tint val="100000"/>
+                <a:shade val="100000"/>
+                <a:satMod val="130000"/>
+              </a:schemeClr>
+            </a:gs>
+            <a:gs pos="100000">
+              <a:schemeClr val="phClr">
+                <a:tint val="50000"/>
+                <a:shade val="100000"/>
+                <a:satMod val="350000"/>
+              </a:schemeClr>
+            </a:gs>
+          </a:gsLst>
+          <a:lin ang="16200000" scaled="0"/>
+        </a:gradFill>
+      </a:fillStyleLst>
+      <a:lnStyleLst>
+        <a:ln w="9525" cap="flat" cmpd="sng" algn="ctr">
+          <a:solidFill>
+            <a:schemeClr val="phClr">
+              <a:shade val="95000"/>
+              <a:satMod val="105000"/>
+            </a:schemeClr>
+          </a:solidFill>
+          <a:prstDash val="solid"/>
+        </a:ln>
+        <a:ln w="25400" cap="flat" cmpd="sng" algn="ctr">
+          <a:solidFill>
+            <a:schemeClr val="phClr"/>
+          </a:solidFill>
+          <a:prstDash val="solid"/>
+        </a:ln>
+        <a:ln w="38100" cap="flat" cmpd="sng" algn="ctr">
+          <a:solidFill>
+            <a:schemeClr val="phClr"/>
+          </a:solidFill>
+          <a:prstDash val="solid"/>
+        </a:ln>
+      </a:lnStyleLst>
+      <a:effectStyleLst>
+        <a:effectStyle>
+          <a:effectLst>
+            <a:outerShdw blurRad="40000" dist="20000" dir="5400000" rotWithShape="0">
+              <a:srgbClr val="000000">
+                <a:alpha val="38000"/>
+              </a:srgbClr>
+            </a:outerShdw>
+          </a:effectLst>
+        </a:effectStyle>
+        <a:effectStyle>
+          <a:effectLst>
+            <a:outerShdw blurRad="40000" dist="23000" dir="5400000" rotWithShape="0">
+              <a:srgbClr val="000000">
+                <a:alpha val="35000"/>
+              </a:srgbClr>
+            </a:outerShdw>
+          </a:effectLst>
+        </a:effectStyle>
+        <a:effectStyle>
+          <a:effectLst>
+            <a:outerShdw blurRad="40000" dist="23000" dir="5400000" rotWithShape="0">
+              <a:srgbClr val="000000">
+                <a:alpha val="35000"/>
+              </a:srgbClr>
+            </a:outerShdw>
+          </a:effectLst>
+          <a:scene3d>
+            <a:camera prst="orthographicFront">
+              <a:rot lat="0" lon="0" rev="0"/>
+            </a:camera>
+            <a:lightRig rig="threePt" dir="t">
+              <a:rot lat="0" lon="0" rev="1200000"/>
+            </a:lightRig>
+          </a:scene3d>
+          <a:sp3d>
+            <a:bevelT w="63500" h="25400"/>
+          </a:sp3d>
+        </a:effectStyle>
+      </a:effectStyleLst>
+      <a:bgFillStyleLst>
+        <a:solidFill>
+          <a:schemeClr val="phClr"/>
+        </a:solidFill>
+        <a:gradFill rotWithShape="1">
+          <a:gsLst>
+            <a:gs pos="0">
+              <a:schemeClr val="phClr">
+                <a:tint val="40000"/>
+                <a:satMod val="350000"/>
+              </a:schemeClr>
+            </a:gs>
+            <a:gs pos="40000">
+              <a:schemeClr val="phClr">
+                <a:tint val="45000"/>
+                <a:shade val="99000"/>
+                <a:satMod val="350000"/>
+              </a:schemeClr>
+            </a:gs>
+            <a:gs pos="100000">
+              <a:schemeClr val="phClr">
+                <a:shade val="20000"/>
+                <a:satMod val="255000"/>
+              </a:schemeClr>
+            </a:gs>
+          </a:gsLst>
+          <a:path path="circle">
+            <a:fillToRect l="50000" t="-80000" r="50000" b="180000"/>
+          </a:path>
+        </a:gradFill>
+        <a:gradFill rotWithShape="1">
+          <a:gsLst>
+            <a:gs pos="0">
+              <a:schemeClr val="phClr">
+                <a:tint val="80000"/>
+                <a:satMod val="300000"/>
+              </a:schemeClr>
+            </a:gs>
+            <a:gs pos="100000">
+              <a:schemeClr val="phClr">
+                <a:shade val="30000"/>
+                <a:satMod val="200000"/>
+              </a:schemeClr>
+            </a:gs>
+          </a:gsLst>
+          <a:path path="circle">
+            <a:fillToRect l="50000" t="50000" r="50000" b="50000"/>
+          </a:path>
+        </a:gradFill>
+      </a:bgFillStyleLst>
+    </a:fmtScheme>
+  </a:themeElements>
+</a:theme>
+</file>
+
+<file path=ppt/theme/theme5.xml><?xml version="1.0" encoding="utf-8"?>
 <a:theme xmlns:a="http://schemas.openxmlformats.org/drawingml/2006/main" xmlns:r="http://schemas.openxmlformats.org/officeDocument/2006/relationships" name="1_Office Theme">
   <a:themeElements>
     <a:clrScheme name="Office">
@@ -56349,283 +52943,4 @@
     </a:fmtScheme>
   </a:themeElements>
 </a:theme>
-</file>
-
-<file path=ppt/theme/theme5.xml><?xml version="1.0" encoding="utf-8"?>
-<a:theme xmlns:a="http://schemas.openxmlformats.org/drawingml/2006/main" xmlns:r="http://schemas.openxmlformats.org/officeDocument/2006/relationships" name="simple-light-2">
-  <a:themeElements>
-    <a:clrScheme name="Simple Light">
-      <a:dk1>
-        <a:srgbClr val="000000"/>
-      </a:dk1>
-      <a:lt1>
-        <a:srgbClr val="FFFFFF"/>
-      </a:lt1>
-      <a:dk2>
-        <a:srgbClr val="595959"/>
-      </a:dk2>
-      <a:lt2>
-        <a:srgbClr val="EEEEEE"/>
-      </a:lt2>
-      <a:accent1>
-        <a:srgbClr val="FFAB40"/>
-      </a:accent1>
-      <a:accent2>
-        <a:srgbClr val="212121"/>
-      </a:accent2>
-      <a:accent3>
-        <a:srgbClr val="78909C"/>
-      </a:accent3>
-      <a:accent4>
-        <a:srgbClr val="FFAB40"/>
-      </a:accent4>
-      <a:accent5>
-        <a:srgbClr val="0097A7"/>
-      </a:accent5>
-      <a:accent6>
-        <a:srgbClr val="EEFF41"/>
-      </a:accent6>
-      <a:hlink>
-        <a:srgbClr val="0097A7"/>
-      </a:hlink>
-      <a:folHlink>
-        <a:srgbClr val="0097A7"/>
-      </a:folHlink>
-    </a:clrScheme>
-    <a:fontScheme name="Office">
-      <a:majorFont>
-        <a:latin typeface="Arial"/>
-        <a:ea typeface=""/>
-        <a:cs typeface=""/>
-        <a:font script="Jpan" typeface="ＭＳ Ｐゴシック"/>
-        <a:font script="Hang" typeface="맑은 고딕"/>
-        <a:font script="Hans" typeface="宋体"/>
-        <a:font script="Hant" typeface="新細明體"/>
-        <a:font script="Arab" typeface="Times New Roman"/>
-        <a:font script="Hebr" typeface="Times New Roman"/>
-        <a:font script="Thai" typeface="Angsana New"/>
-        <a:font script="Ethi" typeface="Nyala"/>
-        <a:font script="Beng" typeface="Vrinda"/>
-        <a:font script="Gujr" typeface="Shruti"/>
-        <a:font script="Khmr" typeface="MoolBoran"/>
-        <a:font script="Knda" typeface="Tunga"/>
-        <a:font script="Guru" typeface="Raavi"/>
-        <a:font script="Cans" typeface="Euphemia"/>
-        <a:font script="Cher" typeface="Plantagenet Cherokee"/>
-        <a:font script="Yiii" typeface="Microsoft Yi Baiti"/>
-        <a:font script="Tibt" typeface="Microsoft Himalaya"/>
-        <a:font script="Thaa" typeface="MV Boli"/>
-        <a:font script="Deva" typeface="Mangal"/>
-        <a:font script="Telu" typeface="Gautami"/>
-        <a:font script="Taml" typeface="Latha"/>
-        <a:font script="Syrc" typeface="Estrangelo Edessa"/>
-        <a:font script="Orya" typeface="Kalinga"/>
-        <a:font script="Mlym" typeface="Kartika"/>
-        <a:font script="Laoo" typeface="DokChampa"/>
-        <a:font script="Sinh" typeface="Iskoola Pota"/>
-        <a:font script="Mong" typeface="Mongolian Baiti"/>
-        <a:font script="Viet" typeface="Times New Roman"/>
-        <a:font script="Uigh" typeface="Microsoft Uighur"/>
-        <a:font script="Geor" typeface="Sylfaen"/>
-      </a:majorFont>
-      <a:minorFont>
-        <a:latin typeface="Arial"/>
-        <a:ea typeface=""/>
-        <a:cs typeface=""/>
-        <a:font script="Jpan" typeface="ＭＳ Ｐゴシック"/>
-        <a:font script="Hang" typeface="맑은 고딕"/>
-        <a:font script="Hans" typeface="宋体"/>
-        <a:font script="Hant" typeface="新細明體"/>
-        <a:font script="Arab" typeface="Arial"/>
-        <a:font script="Hebr" typeface="Arial"/>
-        <a:font script="Thai" typeface="Cordia New"/>
-        <a:font script="Ethi" typeface="Nyala"/>
-        <a:font script="Beng" typeface="Vrinda"/>
-        <a:font script="Gujr" typeface="Shruti"/>
-        <a:font script="Khmr" typeface="DaunPenh"/>
-        <a:font script="Knda" typeface="Tunga"/>
-        <a:font script="Guru" typeface="Raavi"/>
-        <a:font script="Cans" typeface="Euphemia"/>
-        <a:font script="Cher" typeface="Plantagenet Cherokee"/>
-        <a:font script="Yiii" typeface="Microsoft Yi Baiti"/>
-        <a:font script="Tibt" typeface="Microsoft Himalaya"/>
-        <a:font script="Thaa" typeface="MV Boli"/>
-        <a:font script="Deva" typeface="Mangal"/>
-        <a:font script="Telu" typeface="Gautami"/>
-        <a:font script="Taml" typeface="Latha"/>
-        <a:font script="Syrc" typeface="Estrangelo Edessa"/>
-        <a:font script="Orya" typeface="Kalinga"/>
-        <a:font script="Mlym" typeface="Kartika"/>
-        <a:font script="Laoo" typeface="DokChampa"/>
-        <a:font script="Sinh" typeface="Iskoola Pota"/>
-        <a:font script="Mong" typeface="Mongolian Baiti"/>
-        <a:font script="Viet" typeface="Arial"/>
-        <a:font script="Uigh" typeface="Microsoft Uighur"/>
-        <a:font script="Geor" typeface="Sylfaen"/>
-      </a:minorFont>
-    </a:fontScheme>
-    <a:fmtScheme name="Office">
-      <a:fillStyleLst>
-        <a:solidFill>
-          <a:schemeClr val="phClr"/>
-        </a:solidFill>
-        <a:gradFill rotWithShape="1">
-          <a:gsLst>
-            <a:gs pos="0">
-              <a:schemeClr val="phClr">
-                <a:tint val="50000"/>
-                <a:satMod val="300000"/>
-              </a:schemeClr>
-            </a:gs>
-            <a:gs pos="35000">
-              <a:schemeClr val="phClr">
-                <a:tint val="37000"/>
-                <a:satMod val="300000"/>
-              </a:schemeClr>
-            </a:gs>
-            <a:gs pos="100000">
-              <a:schemeClr val="phClr">
-                <a:tint val="15000"/>
-                <a:satMod val="350000"/>
-              </a:schemeClr>
-            </a:gs>
-          </a:gsLst>
-          <a:lin ang="16200000" scaled="1"/>
-        </a:gradFill>
-        <a:gradFill rotWithShape="1">
-          <a:gsLst>
-            <a:gs pos="0">
-              <a:schemeClr val="phClr">
-                <a:tint val="100000"/>
-                <a:shade val="100000"/>
-                <a:satMod val="130000"/>
-              </a:schemeClr>
-            </a:gs>
-            <a:gs pos="100000">
-              <a:schemeClr val="phClr">
-                <a:tint val="50000"/>
-                <a:shade val="100000"/>
-                <a:satMod val="350000"/>
-              </a:schemeClr>
-            </a:gs>
-          </a:gsLst>
-          <a:lin ang="16200000" scaled="0"/>
-        </a:gradFill>
-      </a:fillStyleLst>
-      <a:lnStyleLst>
-        <a:ln w="9525" cap="flat" cmpd="sng" algn="ctr">
-          <a:solidFill>
-            <a:schemeClr val="phClr">
-              <a:shade val="95000"/>
-              <a:satMod val="105000"/>
-            </a:schemeClr>
-          </a:solidFill>
-          <a:prstDash val="solid"/>
-        </a:ln>
-        <a:ln w="25400" cap="flat" cmpd="sng" algn="ctr">
-          <a:solidFill>
-            <a:schemeClr val="phClr"/>
-          </a:solidFill>
-          <a:prstDash val="solid"/>
-        </a:ln>
-        <a:ln w="38100" cap="flat" cmpd="sng" algn="ctr">
-          <a:solidFill>
-            <a:schemeClr val="phClr"/>
-          </a:solidFill>
-          <a:prstDash val="solid"/>
-        </a:ln>
-      </a:lnStyleLst>
-      <a:effectStyleLst>
-        <a:effectStyle>
-          <a:effectLst>
-            <a:outerShdw blurRad="40000" dist="20000" dir="5400000" rotWithShape="0">
-              <a:srgbClr val="000000">
-                <a:alpha val="38000"/>
-              </a:srgbClr>
-            </a:outerShdw>
-          </a:effectLst>
-        </a:effectStyle>
-        <a:effectStyle>
-          <a:effectLst>
-            <a:outerShdw blurRad="40000" dist="23000" dir="5400000" rotWithShape="0">
-              <a:srgbClr val="000000">
-                <a:alpha val="35000"/>
-              </a:srgbClr>
-            </a:outerShdw>
-          </a:effectLst>
-        </a:effectStyle>
-        <a:effectStyle>
-          <a:effectLst>
-            <a:outerShdw blurRad="40000" dist="23000" dir="5400000" rotWithShape="0">
-              <a:srgbClr val="000000">
-                <a:alpha val="35000"/>
-              </a:srgbClr>
-            </a:outerShdw>
-          </a:effectLst>
-          <a:scene3d>
-            <a:camera prst="orthographicFront">
-              <a:rot lat="0" lon="0" rev="0"/>
-            </a:camera>
-            <a:lightRig rig="threePt" dir="t">
-              <a:rot lat="0" lon="0" rev="1200000"/>
-            </a:lightRig>
-          </a:scene3d>
-          <a:sp3d>
-            <a:bevelT w="63500" h="25400"/>
-          </a:sp3d>
-        </a:effectStyle>
-      </a:effectStyleLst>
-      <a:bgFillStyleLst>
-        <a:solidFill>
-          <a:schemeClr val="phClr"/>
-        </a:solidFill>
-        <a:gradFill rotWithShape="1">
-          <a:gsLst>
-            <a:gs pos="0">
-              <a:schemeClr val="phClr">
-                <a:tint val="40000"/>
-                <a:satMod val="350000"/>
-              </a:schemeClr>
-            </a:gs>
-            <a:gs pos="40000">
-              <a:schemeClr val="phClr">
-                <a:tint val="45000"/>
-                <a:shade val="99000"/>
-                <a:satMod val="350000"/>
-              </a:schemeClr>
-            </a:gs>
-            <a:gs pos="100000">
-              <a:schemeClr val="phClr">
-                <a:shade val="20000"/>
-                <a:satMod val="255000"/>
-              </a:schemeClr>
-            </a:gs>
-          </a:gsLst>
-          <a:path path="circle">
-            <a:fillToRect l="50000" t="-80000" r="50000" b="180000"/>
-          </a:path>
-        </a:gradFill>
-        <a:gradFill rotWithShape="1">
-          <a:gsLst>
-            <a:gs pos="0">
-              <a:schemeClr val="phClr">
-                <a:tint val="80000"/>
-                <a:satMod val="300000"/>
-              </a:schemeClr>
-            </a:gs>
-            <a:gs pos="100000">
-              <a:schemeClr val="phClr">
-                <a:shade val="30000"/>
-                <a:satMod val="200000"/>
-              </a:schemeClr>
-            </a:gs>
-          </a:gsLst>
-          <a:path path="circle">
-            <a:fillToRect l="50000" t="50000" r="50000" b="50000"/>
-          </a:path>
-        </a:gradFill>
-      </a:bgFillStyleLst>
-    </a:fmtScheme>
-  </a:themeElements>
-</a:theme>
 </file>
</xml_diff>

<commit_message>
Updates to setup instructions and slides. Removed custom connector section, moved fault tolerance guarantees to the connector slides.
</commit_message>
<xml_diff>
--- a/slides/flink_overview.pptx
+++ b/slides/flink_overview.pptx
@@ -1,6 +1,6 @@
 
 <file path=ppt/presentation.xml><?xml version="1.0" encoding="utf-8"?>
-<p:presentation xmlns:a="http://schemas.openxmlformats.org/drawingml/2006/main" xmlns:r="http://schemas.openxmlformats.org/officeDocument/2006/relationships" xmlns:p="http://schemas.openxmlformats.org/presentationml/2006/main" strictFirstAndLastChars="0" embedTrueTypeFonts="1" saveSubsetFonts="1" autoCompressPictures="0">
+<p:presentation xmlns:a="http://schemas.openxmlformats.org/drawingml/2006/main" xmlns:r="http://schemas.openxmlformats.org/officeDocument/2006/relationships" xmlns:p="http://schemas.openxmlformats.org/presentationml/2006/main" strictFirstAndLastChars="0" saveSubsetFonts="1" autoCompressPictures="0">
   <p:sldMasterIdLst>
     <p:sldMasterId id="2147483694" r:id="rId1"/>
     <p:sldMasterId id="2147483695" r:id="rId2"/>
@@ -8,38 +8,40 @@
     <p:sldMasterId id="2147483697" r:id="rId4"/>
   </p:sldMasterIdLst>
   <p:notesMasterIdLst>
-    <p:notesMasterId r:id="rId34"/>
+    <p:notesMasterId r:id="rId36"/>
   </p:notesMasterIdLst>
   <p:sldIdLst>
     <p:sldId id="256" r:id="rId5"/>
     <p:sldId id="257" r:id="rId6"/>
     <p:sldId id="258" r:id="rId7"/>
-    <p:sldId id="259" r:id="rId8"/>
-    <p:sldId id="260" r:id="rId9"/>
-    <p:sldId id="261" r:id="rId10"/>
-    <p:sldId id="262" r:id="rId11"/>
-    <p:sldId id="263" r:id="rId12"/>
-    <p:sldId id="264" r:id="rId13"/>
-    <p:sldId id="265" r:id="rId14"/>
+    <p:sldId id="285" r:id="rId8"/>
+    <p:sldId id="259" r:id="rId9"/>
+    <p:sldId id="260" r:id="rId10"/>
+    <p:sldId id="261" r:id="rId11"/>
+    <p:sldId id="262" r:id="rId12"/>
+    <p:sldId id="263" r:id="rId13"/>
+    <p:sldId id="264" r:id="rId14"/>
     <p:sldId id="282" r:id="rId15"/>
     <p:sldId id="283" r:id="rId16"/>
     <p:sldId id="284" r:id="rId17"/>
-    <p:sldId id="266" r:id="rId18"/>
-    <p:sldId id="267" r:id="rId19"/>
-    <p:sldId id="268" r:id="rId20"/>
-    <p:sldId id="269" r:id="rId21"/>
-    <p:sldId id="270" r:id="rId22"/>
-    <p:sldId id="271" r:id="rId23"/>
-    <p:sldId id="272" r:id="rId24"/>
-    <p:sldId id="274" r:id="rId25"/>
-    <p:sldId id="273" r:id="rId26"/>
-    <p:sldId id="275" r:id="rId27"/>
-    <p:sldId id="276" r:id="rId28"/>
-    <p:sldId id="277" r:id="rId29"/>
-    <p:sldId id="281" r:id="rId30"/>
-    <p:sldId id="278" r:id="rId31"/>
-    <p:sldId id="279" r:id="rId32"/>
-    <p:sldId id="280" r:id="rId33"/>
+    <p:sldId id="265" r:id="rId18"/>
+    <p:sldId id="266" r:id="rId19"/>
+    <p:sldId id="267" r:id="rId20"/>
+    <p:sldId id="268" r:id="rId21"/>
+    <p:sldId id="269" r:id="rId22"/>
+    <p:sldId id="270" r:id="rId23"/>
+    <p:sldId id="271" r:id="rId24"/>
+    <p:sldId id="272" r:id="rId25"/>
+    <p:sldId id="274" r:id="rId26"/>
+    <p:sldId id="273" r:id="rId27"/>
+    <p:sldId id="275" r:id="rId28"/>
+    <p:sldId id="276" r:id="rId29"/>
+    <p:sldId id="277" r:id="rId30"/>
+    <p:sldId id="281" r:id="rId31"/>
+    <p:sldId id="278" r:id="rId32"/>
+    <p:sldId id="279" r:id="rId33"/>
+    <p:sldId id="280" r:id="rId34"/>
+    <p:sldId id="286" r:id="rId35"/>
   </p:sldIdLst>
   <p:sldSz cx="9144000" cy="6858000" type="screen4x3"/>
   <p:notesSz cx="6858000" cy="9144000"/>
@@ -245,6 +247,22 @@
       </a:defRPr>
     </a:lvl9pPr>
   </p:defaultTextStyle>
+  <p:extLst>
+    <p:ext uri="{EFAFB233-063F-42B5-8137-9DF3F51BA10A}">
+      <p15:sldGuideLst xmlns:p15="http://schemas.microsoft.com/office/powerpoint/2012/main">
+        <p15:guide id="1" orient="horz" pos="2160">
+          <p15:clr>
+            <a:srgbClr val="A4A3A4"/>
+          </p15:clr>
+        </p15:guide>
+        <p15:guide id="2" pos="2880">
+          <p15:clr>
+            <a:srgbClr val="A4A3A4"/>
+          </p15:clr>
+        </p15:guide>
+      </p15:sldGuideLst>
+    </p:ext>
+  </p:extLst>
 </p:presentation>
 </file>
 
@@ -35829,6 +35847,13 @@
   <p:clrMapOvr>
     <a:masterClrMapping/>
   </p:clrMapOvr>
+  <p:timing>
+    <p:tnLst>
+      <p:par>
+        <p:cTn id="1" dur="indefinite" restart="never" nodeType="tmRoot"/>
+      </p:par>
+    </p:tnLst>
+  </p:timing>
 </p:sld>
 </file>
 
@@ -35837,7 +35862,7 @@
   <p:cSld>
     <p:spTree>
       <p:nvGrpSpPr>
-        <p:cNvPr id="1" name="Shape 510"/>
+        <p:cNvPr id="1" name="Shape 504"/>
         <p:cNvGrpSpPr/>
         <p:nvPr/>
       </p:nvGrpSpPr>
@@ -35851,7 +35876,7 @@
       </p:grpSpPr>
       <p:sp>
         <p:nvSpPr>
-          <p:cNvPr id="511" name="Shape 511"/>
+          <p:cNvPr id="505" name="Shape 505"/>
           <p:cNvSpPr txBox="1">
             <a:spLocks noGrp="1"/>
           </p:cNvSpPr>
@@ -35867,46 +35892,34 @@
           <a:prstGeom prst="rect">
             <a:avLst/>
           </a:prstGeom>
-          <a:noFill/>
-          <a:ln>
-            <a:noFill/>
-          </a:ln>
         </p:spPr>
         <p:txBody>
-          <a:bodyPr lIns="91425" tIns="45700" rIns="91425" bIns="45700" anchor="ctr" anchorCtr="0">
+          <a:bodyPr lIns="91425" tIns="91425" rIns="91425" bIns="91425" anchor="ctr" anchorCtr="0">
             <a:noAutofit/>
           </a:bodyPr>
           <a:lstStyle/>
           <a:p>
-            <a:pPr marL="0" marR="0" lvl="0" indent="0" algn="l" rtl="0">
-              <a:spcBef>
-                <a:spcPts val="0"/>
-              </a:spcBef>
-              <a:buClr>
-                <a:schemeClr val="dk1"/>
-              </a:buClr>
-              <a:buSzPct val="25000"/>
-              <a:buFont typeface="Avenir"/>
+            <a:pPr lvl="0">
+              <a:spcBef>
+                <a:spcPts val="0"/>
+              </a:spcBef>
               <a:buNone/>
             </a:pPr>
             <a:r>
-              <a:rPr lang="en" sz="3959" b="0" i="0" u="none" strike="noStrike" cap="none">
-                <a:solidFill>
-                  <a:schemeClr val="dk1"/>
-                </a:solidFill>
+              <a:rPr lang="en" sz="3600" b="0" dirty="0">
                 <a:latin typeface="Arial"/>
                 <a:ea typeface="Arial"/>
                 <a:cs typeface="Arial"/>
                 <a:sym typeface="Arial"/>
               </a:rPr>
-              <a:t>Accurate computation</a:t>
+              <a:t>Benefits of a streaming architecture</a:t>
             </a:r>
           </a:p>
         </p:txBody>
       </p:sp>
       <p:sp>
         <p:nvSpPr>
-          <p:cNvPr id="512" name="Shape 512"/>
+          <p:cNvPr id="506" name="Shape 506"/>
           <p:cNvSpPr txBox="1">
             <a:spLocks noGrp="1"/>
           </p:cNvSpPr>
@@ -35916,8 +35929,8 @@
         </p:nvSpPr>
         <p:spPr>
           <a:xfrm>
-            <a:off x="457200" y="1474378"/>
-            <a:ext cx="8229600" cy="4651500"/>
+            <a:off x="457200" y="1474375"/>
+            <a:ext cx="8229600" cy="4651800"/>
           </a:xfrm>
           <a:prstGeom prst="rect">
             <a:avLst/>
@@ -35934,36 +35947,11 @@
           <a:lstStyle/>
           <a:p>
             <a:pPr marL="342900" marR="0" lvl="0" indent="-342900" algn="l" rtl="0">
-              <a:spcBef>
-                <a:spcPts val="0"/>
-              </a:spcBef>
-              <a:spcAft>
-                <a:spcPts val="0"/>
-              </a:spcAft>
-              <a:buClr>
-                <a:srgbClr val="34AD91"/>
-              </a:buClr>
-              <a:buSzPct val="98666"/>
-              <a:buFont typeface="Arial"/>
-              <a:buChar char="▪"/>
-            </a:pPr>
-            <a:r>
-              <a:rPr lang="en" sz="2960" b="0" i="0" u="none" strike="noStrike" cap="none" dirty="0">
-                <a:solidFill>
-                  <a:schemeClr val="dk1"/>
-                </a:solidFill>
-                <a:latin typeface="Arial"/>
-                <a:ea typeface="Arial"/>
-                <a:cs typeface="Arial"/>
-                <a:sym typeface="Arial"/>
-              </a:rPr>
-              <a:t>Batch processing is not an accurate computation model for continuous data</a:t>
-            </a:r>
-          </a:p>
-          <a:p>
-            <a:pPr marL="742950" marR="0" lvl="1" indent="-273685" algn="l" rtl="0">
-              <a:spcBef>
-                <a:spcPts val="518"/>
+              <a:lnSpc>
+                <a:spcPct val="115000"/>
+              </a:lnSpc>
+              <a:spcBef>
+                <a:spcPts val="0"/>
               </a:spcBef>
               <a:spcAft>
                 <a:spcPts val="0"/>
@@ -35973,25 +35961,25 @@
               </a:buClr>
               <a:buSzPct val="100000"/>
               <a:buFont typeface="Arial"/>
-              <a:buChar char="•"/>
+              <a:buChar char="▪"/>
             </a:pPr>
             <a:r>
-              <a:rPr lang="en" sz="2400" b="0" i="0" u="none" strike="noStrike" cap="none" dirty="0">
-                <a:solidFill>
-                  <a:schemeClr val="dk1"/>
-                </a:solidFill>
+              <a:rPr lang="en" dirty="0">
                 <a:latin typeface="Arial"/>
                 <a:ea typeface="Arial"/>
                 <a:cs typeface="Arial"/>
                 <a:sym typeface="Arial"/>
               </a:rPr>
-              <a:t>Misses the right concepts and primitives</a:t>
+              <a:t>More real-time reaction to events</a:t>
             </a:r>
           </a:p>
           <a:p>
-            <a:pPr marL="742950" marR="0" lvl="1" indent="-273685" algn="l" rtl="0">
-              <a:spcBef>
-                <a:spcPts val="518"/>
+            <a:pPr marL="342900" marR="0" lvl="0" indent="-342900" algn="l" rtl="0">
+              <a:lnSpc>
+                <a:spcPct val="115000"/>
+              </a:lnSpc>
+              <a:spcBef>
+                <a:spcPts val="640"/>
               </a:spcBef>
               <a:spcAft>
                 <a:spcPts val="0"/>
@@ -36001,204 +35989,85 @@
               </a:buClr>
               <a:buSzPct val="100000"/>
               <a:buFont typeface="Arial"/>
-              <a:buChar char="•"/>
+              <a:buChar char="▪"/>
             </a:pPr>
             <a:r>
-              <a:rPr lang="en" sz="2400" b="0" i="0" u="none" strike="noStrike" cap="none" dirty="0">
-                <a:solidFill>
-                  <a:schemeClr val="dk1"/>
-                </a:solidFill>
+              <a:rPr lang="en" dirty="0">
                 <a:latin typeface="Arial"/>
                 <a:ea typeface="Arial"/>
                 <a:cs typeface="Arial"/>
                 <a:sym typeface="Arial"/>
               </a:rPr>
-              <a:t>Time handling, state across batch boundaries</a:t>
+              <a:t>Robust continuous applications</a:t>
             </a:r>
           </a:p>
           <a:p>
-            <a:pPr marL="3886200" marR="0" lvl="8" indent="-228600" algn="l" rtl="0">
-              <a:spcBef>
-                <a:spcPts val="370"/>
+            <a:pPr marR="0" lvl="1" indent="-347472" algn="l" rtl="0">
+              <a:lnSpc>
+                <a:spcPct val="115000"/>
+              </a:lnSpc>
+              <a:spcBef>
+                <a:spcPts val="640"/>
               </a:spcBef>
               <a:spcAft>
                 <a:spcPts val="0"/>
               </a:spcAft>
-              <a:buClr>
-                <a:schemeClr val="dk1"/>
-              </a:buClr>
-              <a:buSzPct val="97368"/>
               <a:buFont typeface="Arial"/>
-              <a:buNone/>
-            </a:pPr>
-            <a:endParaRPr sz="1850" b="0" i="0" u="none" strike="noStrike" cap="none" dirty="0">
-              <a:solidFill>
-                <a:schemeClr val="dk1"/>
-              </a:solidFill>
-              <a:latin typeface="Arial"/>
-              <a:ea typeface="Arial"/>
-              <a:cs typeface="Arial"/>
-              <a:sym typeface="Arial"/>
-            </a:endParaRPr>
-          </a:p>
-          <a:p>
-            <a:pPr marL="342900" marR="0" lvl="0" indent="-342900" algn="l" rtl="0">
-              <a:spcBef>
-                <a:spcPts val="592"/>
-              </a:spcBef>
-              <a:spcAft>
-                <a:spcPts val="0"/>
-              </a:spcAft>
-              <a:buClr>
-                <a:srgbClr val="34AD91"/>
-              </a:buClr>
-              <a:buSzPct val="98666"/>
-              <a:buFont typeface="Arial"/>
-              <a:buChar char="▪"/>
             </a:pPr>
             <a:r>
-              <a:rPr lang="en" sz="2960" b="0" i="0" u="none" strike="noStrike" cap="none" dirty="0">
-                <a:solidFill>
-                  <a:schemeClr val="dk1"/>
-                </a:solidFill>
+              <a:rPr lang="en" dirty="0">
                 <a:latin typeface="Arial"/>
                 <a:ea typeface="Arial"/>
                 <a:cs typeface="Arial"/>
                 <a:sym typeface="Arial"/>
               </a:rPr>
-              <a:t>Stateful stream processing a better model</a:t>
+              <a:t>Continuous batch apps are duck-taped together from many tools</a:t>
             </a:r>
           </a:p>
           <a:p>
-            <a:pPr marR="0" lvl="1" indent="-274320" algn="l" rtl="0">
-              <a:spcBef>
-                <a:spcPts val="592"/>
-              </a:spcBef>
-              <a:spcAft>
-                <a:spcPts val="0"/>
-              </a:spcAft>
+            <a:pPr marL="342900" marR="0" lvl="0" indent="-342900" algn="l" rtl="0">
+              <a:lnSpc>
+                <a:spcPct val="115000"/>
+              </a:lnSpc>
+              <a:spcBef>
+                <a:spcPts val="640"/>
+              </a:spcBef>
               <a:buClr>
                 <a:srgbClr val="34AD91"/>
               </a:buClr>
               <a:buSzPct val="100000"/>
               <a:buFont typeface="Arial"/>
-              <a:buChar char="•"/>
+              <a:buChar char="▪"/>
             </a:pPr>
             <a:r>
-              <a:rPr lang="en" sz="2400" dirty="0" smtClean="0">
+              <a:rPr lang="en" dirty="0">
                 <a:latin typeface="Arial"/>
                 <a:ea typeface="Arial"/>
                 <a:cs typeface="Arial"/>
                 <a:sym typeface="Arial"/>
               </a:rPr>
-              <a:t>Can </a:t>
+              <a:t>Process both real-time and historical data</a:t>
             </a:r>
+          </a:p>
+          <a:p>
+            <a:pPr marR="0" lvl="1" indent="-347472" algn="l" rtl="0">
+              <a:lnSpc>
+                <a:spcPct val="115000"/>
+              </a:lnSpc>
+              <a:spcBef>
+                <a:spcPts val="640"/>
+              </a:spcBef>
+              <a:buFont typeface="Arial"/>
+            </a:pPr>
             <a:r>
-              <a:rPr lang="en" sz="2400" dirty="0">
+              <a:rPr lang="en" dirty="0">
                 <a:latin typeface="Arial"/>
                 <a:ea typeface="Arial"/>
                 <a:cs typeface="Arial"/>
                 <a:sym typeface="Arial"/>
               </a:rPr>
-              <a:t>achieve high throughput and low latency while robustly delivering accurate results</a:t>
+              <a:t>Using exactly the same application</a:t>
             </a:r>
-          </a:p>
-          <a:p>
-            <a:pPr marL="742950" marR="0" lvl="1" indent="-273685" algn="l" rtl="0">
-              <a:spcBef>
-                <a:spcPts val="518"/>
-              </a:spcBef>
-              <a:buClr>
-                <a:srgbClr val="34AD91"/>
-              </a:buClr>
-              <a:buSzPct val="100000"/>
-              <a:buFont typeface="Arial"/>
-              <a:buChar char="•"/>
-            </a:pPr>
-            <a:r>
-              <a:rPr lang="en" sz="2400" b="0" i="0" u="none" strike="noStrike" cap="none" dirty="0">
-                <a:solidFill>
-                  <a:schemeClr val="dk1"/>
-                </a:solidFill>
-                <a:latin typeface="Arial"/>
-                <a:ea typeface="Arial"/>
-                <a:cs typeface="Arial"/>
-                <a:sym typeface="Arial"/>
-              </a:rPr>
-              <a:t>Real-time/low-latency is the </a:t>
-            </a:r>
-            <a:r>
-              <a:rPr lang="en" sz="2400" b="0" i="0" u="none" strike="noStrike" cap="none" dirty="0">
-                <a:solidFill>
-                  <a:srgbClr val="34AD91"/>
-                </a:solidFill>
-                <a:latin typeface="Arial"/>
-                <a:ea typeface="Arial"/>
-                <a:cs typeface="Arial"/>
-                <a:sym typeface="Arial"/>
-              </a:rPr>
-              <a:t>icing on the cake</a:t>
-            </a:r>
-          </a:p>
-        </p:txBody>
-      </p:sp>
-      <p:sp>
-        <p:nvSpPr>
-          <p:cNvPr id="513" name="Shape 513"/>
-          <p:cNvSpPr txBox="1">
-            <a:spLocks noGrp="1"/>
-          </p:cNvSpPr>
-          <p:nvPr>
-            <p:ph type="sldNum" idx="12"/>
-          </p:nvPr>
-        </p:nvSpPr>
-        <p:spPr>
-          <a:xfrm>
-            <a:off x="6553200" y="6356352"/>
-            <a:ext cx="2133600" cy="365100"/>
-          </a:xfrm>
-          <a:prstGeom prst="rect">
-            <a:avLst/>
-          </a:prstGeom>
-          <a:noFill/>
-          <a:ln>
-            <a:noFill/>
-          </a:ln>
-        </p:spPr>
-        <p:txBody>
-          <a:bodyPr lIns="91425" tIns="45700" rIns="91425" bIns="45700" anchor="ctr" anchorCtr="0">
-            <a:noAutofit/>
-          </a:bodyPr>
-          <a:lstStyle/>
-          <a:p>
-            <a:pPr marL="0" marR="0" lvl="0" indent="0" algn="r" rtl="0">
-              <a:spcBef>
-                <a:spcPts val="0"/>
-              </a:spcBef>
-              <a:buSzPct val="25000"/>
-              <a:buNone/>
-            </a:pPr>
-            <a:fld id="{00000000-1234-1234-1234-123412341234}" type="slidenum">
-              <a:rPr lang="en" sz="1200">
-                <a:solidFill>
-                  <a:srgbClr val="888888"/>
-                </a:solidFill>
-                <a:latin typeface="Avenir"/>
-                <a:ea typeface="Avenir"/>
-                <a:cs typeface="Avenir"/>
-                <a:sym typeface="Avenir"/>
-              </a:rPr>
-              <a:t>10</a:t>
-            </a:fld>
-            <a:endParaRPr lang="en" sz="1200">
-              <a:solidFill>
-                <a:srgbClr val="888888"/>
-              </a:solidFill>
-              <a:latin typeface="Avenir"/>
-              <a:ea typeface="Avenir"/>
-              <a:cs typeface="Avenir"/>
-              <a:sym typeface="Avenir"/>
-            </a:endParaRPr>
           </a:p>
         </p:txBody>
       </p:sp>
@@ -36207,6 +36076,13 @@
   <p:clrMapOvr>
     <a:masterClrMapping/>
   </p:clrMapOvr>
+  <p:timing>
+    <p:tnLst>
+      <p:par>
+        <p:cTn id="1" dur="indefinite" restart="never" nodeType="tmRoot"/>
+      </p:par>
+    </p:tnLst>
+  </p:timing>
 </p:sld>
 </file>
 
@@ -36960,7 +36836,7 @@
   <p:timing>
     <p:tnLst>
       <p:par>
-        <p:cTn xmlns:p14="http://schemas.microsoft.com/office/powerpoint/2010/main" id="1" dur="indefinite" restart="never" nodeType="tmRoot"/>
+        <p:cTn id="1" dur="indefinite" restart="never" nodeType="tmRoot"/>
       </p:par>
     </p:tnLst>
   </p:timing>
@@ -38254,7 +38130,7 @@
   <p:timing>
     <p:tnLst>
       <p:par>
-        <p:cTn xmlns:p14="http://schemas.microsoft.com/office/powerpoint/2010/main" id="1" dur="indefinite" restart="never" nodeType="tmRoot"/>
+        <p:cTn id="1" dur="indefinite" restart="never" nodeType="tmRoot"/>
       </p:par>
     </p:tnLst>
   </p:timing>
@@ -38416,17 +38292,8 @@
               <a:rPr lang="en-US" sz="2000" dirty="0" smtClean="0">
                 <a:latin typeface="+mn-lt"/>
               </a:rPr>
-              <a:t>Initializes pending state (like partial sessions</a:t>
+              <a:t>Initializes pending state (like partial sessions)</a:t>
             </a:r>
-            <a:r>
-              <a:rPr lang="en-US" sz="2000" dirty="0" smtClean="0">
-                <a:latin typeface="+mn-lt"/>
-              </a:rPr>
-              <a:t>)</a:t>
-            </a:r>
-            <a:endParaRPr lang="en-US" sz="2000" dirty="0" smtClean="0">
-              <a:latin typeface="+mn-lt"/>
-            </a:endParaRPr>
           </a:p>
         </p:txBody>
       </p:sp>
@@ -39307,7 +39174,7 @@
   <p:timing>
     <p:tnLst>
       <p:par>
-        <p:cTn xmlns:p14="http://schemas.microsoft.com/office/powerpoint/2010/main" id="1" dur="indefinite" restart="never" nodeType="tmRoot"/>
+        <p:cTn id="1" dur="indefinite" restart="never" nodeType="tmRoot"/>
       </p:par>
     </p:tnLst>
   </p:timing>
@@ -39315,6 +39182,391 @@
 </file>
 
 <file path=ppt/slides/slide14.xml><?xml version="1.0" encoding="utf-8"?>
+<p:sld xmlns:a="http://schemas.openxmlformats.org/drawingml/2006/main" xmlns:r="http://schemas.openxmlformats.org/officeDocument/2006/relationships" xmlns:p="http://schemas.openxmlformats.org/presentationml/2006/main">
+  <p:cSld>
+    <p:spTree>
+      <p:nvGrpSpPr>
+        <p:cNvPr id="1" name="Shape 510"/>
+        <p:cNvGrpSpPr/>
+        <p:nvPr/>
+      </p:nvGrpSpPr>
+      <p:grpSpPr>
+        <a:xfrm>
+          <a:off x="0" y="0"/>
+          <a:ext cx="0" cy="0"/>
+          <a:chOff x="0" y="0"/>
+          <a:chExt cx="0" cy="0"/>
+        </a:xfrm>
+      </p:grpSpPr>
+      <p:sp>
+        <p:nvSpPr>
+          <p:cNvPr id="511" name="Shape 511"/>
+          <p:cNvSpPr txBox="1">
+            <a:spLocks noGrp="1"/>
+          </p:cNvSpPr>
+          <p:nvPr>
+            <p:ph type="title"/>
+          </p:nvPr>
+        </p:nvSpPr>
+        <p:spPr>
+          <a:xfrm>
+            <a:off x="457222" y="274651"/>
+            <a:ext cx="7474800" cy="898500"/>
+          </a:xfrm>
+          <a:prstGeom prst="rect">
+            <a:avLst/>
+          </a:prstGeom>
+          <a:noFill/>
+          <a:ln>
+            <a:noFill/>
+          </a:ln>
+        </p:spPr>
+        <p:txBody>
+          <a:bodyPr lIns="91425" tIns="45700" rIns="91425" bIns="45700" anchor="ctr" anchorCtr="0">
+            <a:noAutofit/>
+          </a:bodyPr>
+          <a:lstStyle/>
+          <a:p>
+            <a:pPr marL="0" marR="0" lvl="0" indent="0" algn="l" rtl="0">
+              <a:spcBef>
+                <a:spcPts val="0"/>
+              </a:spcBef>
+              <a:buClr>
+                <a:schemeClr val="dk1"/>
+              </a:buClr>
+              <a:buSzPct val="25000"/>
+              <a:buFont typeface="Avenir"/>
+              <a:buNone/>
+            </a:pPr>
+            <a:r>
+              <a:rPr lang="en" sz="3959" b="0" i="0" u="none" strike="noStrike" cap="none">
+                <a:solidFill>
+                  <a:schemeClr val="dk1"/>
+                </a:solidFill>
+                <a:latin typeface="Arial"/>
+                <a:ea typeface="Arial"/>
+                <a:cs typeface="Arial"/>
+                <a:sym typeface="Arial"/>
+              </a:rPr>
+              <a:t>Accurate computation</a:t>
+            </a:r>
+          </a:p>
+        </p:txBody>
+      </p:sp>
+      <p:sp>
+        <p:nvSpPr>
+          <p:cNvPr id="512" name="Shape 512"/>
+          <p:cNvSpPr txBox="1">
+            <a:spLocks noGrp="1"/>
+          </p:cNvSpPr>
+          <p:nvPr>
+            <p:ph type="body" idx="1"/>
+          </p:nvPr>
+        </p:nvSpPr>
+        <p:spPr>
+          <a:xfrm>
+            <a:off x="457200" y="1474378"/>
+            <a:ext cx="8229600" cy="4651500"/>
+          </a:xfrm>
+          <a:prstGeom prst="rect">
+            <a:avLst/>
+          </a:prstGeom>
+          <a:noFill/>
+          <a:ln>
+            <a:noFill/>
+          </a:ln>
+        </p:spPr>
+        <p:txBody>
+          <a:bodyPr lIns="91425" tIns="45700" rIns="91425" bIns="45700" anchor="t" anchorCtr="0">
+            <a:noAutofit/>
+          </a:bodyPr>
+          <a:lstStyle/>
+          <a:p>
+            <a:pPr marL="342900" marR="0" lvl="0" indent="-342900" algn="l" rtl="0">
+              <a:spcBef>
+                <a:spcPts val="0"/>
+              </a:spcBef>
+              <a:spcAft>
+                <a:spcPts val="0"/>
+              </a:spcAft>
+              <a:buClr>
+                <a:srgbClr val="34AD91"/>
+              </a:buClr>
+              <a:buSzPct val="98666"/>
+              <a:buFont typeface="Arial"/>
+              <a:buChar char="▪"/>
+            </a:pPr>
+            <a:r>
+              <a:rPr lang="en" sz="2960" b="0" i="0" u="none" strike="noStrike" cap="none" dirty="0">
+                <a:solidFill>
+                  <a:schemeClr val="dk1"/>
+                </a:solidFill>
+                <a:latin typeface="Arial"/>
+                <a:ea typeface="Arial"/>
+                <a:cs typeface="Arial"/>
+                <a:sym typeface="Arial"/>
+              </a:rPr>
+              <a:t>Batch processing is not an accurate computation model for continuous data</a:t>
+            </a:r>
+          </a:p>
+          <a:p>
+            <a:pPr marL="742950" marR="0" lvl="1" indent="-273685" algn="l" rtl="0">
+              <a:spcBef>
+                <a:spcPts val="518"/>
+              </a:spcBef>
+              <a:spcAft>
+                <a:spcPts val="0"/>
+              </a:spcAft>
+              <a:buClr>
+                <a:srgbClr val="34AD91"/>
+              </a:buClr>
+              <a:buSzPct val="100000"/>
+              <a:buFont typeface="Arial"/>
+              <a:buChar char="•"/>
+            </a:pPr>
+            <a:r>
+              <a:rPr lang="en" sz="2400" b="0" i="0" u="none" strike="noStrike" cap="none" dirty="0">
+                <a:solidFill>
+                  <a:schemeClr val="dk1"/>
+                </a:solidFill>
+                <a:latin typeface="Arial"/>
+                <a:ea typeface="Arial"/>
+                <a:cs typeface="Arial"/>
+                <a:sym typeface="Arial"/>
+              </a:rPr>
+              <a:t>Misses the right concepts and primitives</a:t>
+            </a:r>
+          </a:p>
+          <a:p>
+            <a:pPr marL="742950" marR="0" lvl="1" indent="-273685" algn="l" rtl="0">
+              <a:spcBef>
+                <a:spcPts val="518"/>
+              </a:spcBef>
+              <a:spcAft>
+                <a:spcPts val="0"/>
+              </a:spcAft>
+              <a:buClr>
+                <a:srgbClr val="34AD91"/>
+              </a:buClr>
+              <a:buSzPct val="100000"/>
+              <a:buFont typeface="Arial"/>
+              <a:buChar char="•"/>
+            </a:pPr>
+            <a:r>
+              <a:rPr lang="en" sz="2400" b="0" i="0" u="none" strike="noStrike" cap="none" dirty="0">
+                <a:solidFill>
+                  <a:schemeClr val="dk1"/>
+                </a:solidFill>
+                <a:latin typeface="Arial"/>
+                <a:ea typeface="Arial"/>
+                <a:cs typeface="Arial"/>
+                <a:sym typeface="Arial"/>
+              </a:rPr>
+              <a:t>Time handling, state across batch boundaries</a:t>
+            </a:r>
+          </a:p>
+          <a:p>
+            <a:pPr marL="3886200" marR="0" lvl="8" indent="-228600" algn="l" rtl="0">
+              <a:spcBef>
+                <a:spcPts val="370"/>
+              </a:spcBef>
+              <a:spcAft>
+                <a:spcPts val="0"/>
+              </a:spcAft>
+              <a:buClr>
+                <a:schemeClr val="dk1"/>
+              </a:buClr>
+              <a:buSzPct val="97368"/>
+              <a:buFont typeface="Arial"/>
+              <a:buNone/>
+            </a:pPr>
+            <a:endParaRPr sz="1850" b="0" i="0" u="none" strike="noStrike" cap="none" dirty="0">
+              <a:solidFill>
+                <a:schemeClr val="dk1"/>
+              </a:solidFill>
+              <a:latin typeface="Arial"/>
+              <a:ea typeface="Arial"/>
+              <a:cs typeface="Arial"/>
+              <a:sym typeface="Arial"/>
+            </a:endParaRPr>
+          </a:p>
+          <a:p>
+            <a:pPr marL="342900" marR="0" lvl="0" indent="-342900" algn="l" rtl="0">
+              <a:spcBef>
+                <a:spcPts val="592"/>
+              </a:spcBef>
+              <a:spcAft>
+                <a:spcPts val="0"/>
+              </a:spcAft>
+              <a:buClr>
+                <a:srgbClr val="34AD91"/>
+              </a:buClr>
+              <a:buSzPct val="98666"/>
+              <a:buFont typeface="Arial"/>
+              <a:buChar char="▪"/>
+            </a:pPr>
+            <a:r>
+              <a:rPr lang="en" sz="2960" b="0" i="0" u="none" strike="noStrike" cap="none" dirty="0">
+                <a:solidFill>
+                  <a:schemeClr val="dk1"/>
+                </a:solidFill>
+                <a:latin typeface="Arial"/>
+                <a:ea typeface="Arial"/>
+                <a:cs typeface="Arial"/>
+                <a:sym typeface="Arial"/>
+              </a:rPr>
+              <a:t>Stateful stream processing a better model</a:t>
+            </a:r>
+          </a:p>
+          <a:p>
+            <a:pPr marR="0" lvl="1" indent="-274320" algn="l" rtl="0">
+              <a:spcBef>
+                <a:spcPts val="592"/>
+              </a:spcBef>
+              <a:spcAft>
+                <a:spcPts val="0"/>
+              </a:spcAft>
+              <a:buClr>
+                <a:srgbClr val="34AD91"/>
+              </a:buClr>
+              <a:buSzPct val="100000"/>
+              <a:buFont typeface="Arial"/>
+              <a:buChar char="•"/>
+            </a:pPr>
+            <a:r>
+              <a:rPr lang="en" sz="2400" dirty="0" smtClean="0">
+                <a:latin typeface="Arial"/>
+                <a:ea typeface="Arial"/>
+                <a:cs typeface="Arial"/>
+                <a:sym typeface="Arial"/>
+              </a:rPr>
+              <a:t>Can </a:t>
+            </a:r>
+            <a:r>
+              <a:rPr lang="en" sz="2400" dirty="0">
+                <a:latin typeface="Arial"/>
+                <a:ea typeface="Arial"/>
+                <a:cs typeface="Arial"/>
+                <a:sym typeface="Arial"/>
+              </a:rPr>
+              <a:t>achieve high throughput and low latency while robustly delivering accurate results</a:t>
+            </a:r>
+          </a:p>
+          <a:p>
+            <a:pPr marL="742950" marR="0" lvl="1" indent="-273685" algn="l" rtl="0">
+              <a:spcBef>
+                <a:spcPts val="518"/>
+              </a:spcBef>
+              <a:buClr>
+                <a:srgbClr val="34AD91"/>
+              </a:buClr>
+              <a:buSzPct val="100000"/>
+              <a:buFont typeface="Arial"/>
+              <a:buChar char="•"/>
+            </a:pPr>
+            <a:r>
+              <a:rPr lang="en" sz="2400" b="0" i="0" u="none" strike="noStrike" cap="none" dirty="0">
+                <a:solidFill>
+                  <a:schemeClr val="dk1"/>
+                </a:solidFill>
+                <a:latin typeface="Arial"/>
+                <a:ea typeface="Arial"/>
+                <a:cs typeface="Arial"/>
+                <a:sym typeface="Arial"/>
+              </a:rPr>
+              <a:t>Real-time/low-latency is the </a:t>
+            </a:r>
+            <a:r>
+              <a:rPr lang="en" sz="2400" b="0" i="0" u="none" strike="noStrike" cap="none" dirty="0">
+                <a:solidFill>
+                  <a:srgbClr val="34AD91"/>
+                </a:solidFill>
+                <a:latin typeface="Arial"/>
+                <a:ea typeface="Arial"/>
+                <a:cs typeface="Arial"/>
+                <a:sym typeface="Arial"/>
+              </a:rPr>
+              <a:t>icing on the cake</a:t>
+            </a:r>
+          </a:p>
+        </p:txBody>
+      </p:sp>
+      <p:sp>
+        <p:nvSpPr>
+          <p:cNvPr id="513" name="Shape 513"/>
+          <p:cNvSpPr txBox="1">
+            <a:spLocks noGrp="1"/>
+          </p:cNvSpPr>
+          <p:nvPr>
+            <p:ph type="sldNum" idx="12"/>
+          </p:nvPr>
+        </p:nvSpPr>
+        <p:spPr>
+          <a:xfrm>
+            <a:off x="6553200" y="6356352"/>
+            <a:ext cx="2133600" cy="365100"/>
+          </a:xfrm>
+          <a:prstGeom prst="rect">
+            <a:avLst/>
+          </a:prstGeom>
+          <a:noFill/>
+          <a:ln>
+            <a:noFill/>
+          </a:ln>
+        </p:spPr>
+        <p:txBody>
+          <a:bodyPr lIns="91425" tIns="45700" rIns="91425" bIns="45700" anchor="ctr" anchorCtr="0">
+            <a:noAutofit/>
+          </a:bodyPr>
+          <a:lstStyle/>
+          <a:p>
+            <a:pPr marL="0" marR="0" lvl="0" indent="0" algn="r" rtl="0">
+              <a:spcBef>
+                <a:spcPts val="0"/>
+              </a:spcBef>
+              <a:buSzPct val="25000"/>
+              <a:buNone/>
+            </a:pPr>
+            <a:fld id="{00000000-1234-1234-1234-123412341234}" type="slidenum">
+              <a:rPr lang="en" sz="1200">
+                <a:solidFill>
+                  <a:srgbClr val="888888"/>
+                </a:solidFill>
+                <a:latin typeface="Avenir"/>
+                <a:ea typeface="Avenir"/>
+                <a:cs typeface="Avenir"/>
+                <a:sym typeface="Avenir"/>
+              </a:rPr>
+              <a:t>14</a:t>
+            </a:fld>
+            <a:endParaRPr lang="en" sz="1200">
+              <a:solidFill>
+                <a:srgbClr val="888888"/>
+              </a:solidFill>
+              <a:latin typeface="Avenir"/>
+              <a:ea typeface="Avenir"/>
+              <a:cs typeface="Avenir"/>
+              <a:sym typeface="Avenir"/>
+            </a:endParaRPr>
+          </a:p>
+        </p:txBody>
+      </p:sp>
+    </p:spTree>
+  </p:cSld>
+  <p:clrMapOvr>
+    <a:masterClrMapping/>
+  </p:clrMapOvr>
+  <p:timing>
+    <p:tnLst>
+      <p:par>
+        <p:cTn id="1" dur="indefinite" restart="never" nodeType="tmRoot"/>
+      </p:par>
+    </p:tnLst>
+  </p:timing>
+</p:sld>
+</file>
+
+<file path=ppt/slides/slide15.xml><?xml version="1.0" encoding="utf-8"?>
 <p:sld xmlns:a="http://schemas.openxmlformats.org/drawingml/2006/main" xmlns:r="http://schemas.openxmlformats.org/officeDocument/2006/relationships" xmlns:p="http://schemas.openxmlformats.org/presentationml/2006/main">
   <p:cSld>
     <p:spTree>
@@ -39488,7 +39740,7 @@
                 <a:cs typeface="Arial"/>
                 <a:sym typeface="Arial"/>
               </a:rPr>
-              <a:t>14</a:t>
+              <a:t>15</a:t>
             </a:fld>
             <a:endParaRPr lang="en" sz="1200">
               <a:solidFill>
@@ -39507,10 +39759,17 @@
   <p:clrMapOvr>
     <a:masterClrMapping/>
   </p:clrMapOvr>
+  <p:timing>
+    <p:tnLst>
+      <p:par>
+        <p:cTn id="1" dur="indefinite" restart="never" nodeType="tmRoot"/>
+      </p:par>
+    </p:tnLst>
+  </p:timing>
 </p:sld>
 </file>
 
-<file path=ppt/slides/slide15.xml><?xml version="1.0" encoding="utf-8"?>
+<file path=ppt/slides/slide16.xml><?xml version="1.0" encoding="utf-8"?>
 <p:sld xmlns:a="http://schemas.openxmlformats.org/drawingml/2006/main" xmlns:r="http://schemas.openxmlformats.org/officeDocument/2006/relationships" xmlns:p="http://schemas.openxmlformats.org/presentationml/2006/main">
   <p:cSld>
     <p:spTree>
@@ -39560,10 +39819,17 @@
   <p:clrMapOvr>
     <a:masterClrMapping/>
   </p:clrMapOvr>
+  <p:timing>
+    <p:tnLst>
+      <p:par>
+        <p:cTn id="1" dur="indefinite" restart="never" nodeType="tmRoot"/>
+      </p:par>
+    </p:tnLst>
+  </p:timing>
 </p:sld>
 </file>
 
-<file path=ppt/slides/slide16.xml><?xml version="1.0" encoding="utf-8"?>
+<file path=ppt/slides/slide17.xml><?xml version="1.0" encoding="utf-8"?>
 <p:sld xmlns:a="http://schemas.openxmlformats.org/drawingml/2006/main" xmlns:r="http://schemas.openxmlformats.org/officeDocument/2006/relationships" xmlns:p="http://schemas.openxmlformats.org/presentationml/2006/main">
   <p:cSld>
     <p:spTree>
@@ -39651,10 +39917,17 @@
   <p:clrMapOvr>
     <a:masterClrMapping/>
   </p:clrMapOvr>
+  <p:timing>
+    <p:tnLst>
+      <p:par>
+        <p:cTn id="1" dur="indefinite" restart="never" nodeType="tmRoot"/>
+      </p:par>
+    </p:tnLst>
+  </p:timing>
 </p:sld>
 </file>
 
-<file path=ppt/slides/slide17.xml><?xml version="1.0" encoding="utf-8"?>
+<file path=ppt/slides/slide18.xml><?xml version="1.0" encoding="utf-8"?>
 <p:sld xmlns:a="http://schemas.openxmlformats.org/drawingml/2006/main" xmlns:r="http://schemas.openxmlformats.org/officeDocument/2006/relationships" xmlns:p="http://schemas.openxmlformats.org/presentationml/2006/main">
   <p:cSld>
     <p:spTree>
@@ -39742,10 +40015,17 @@
   <p:clrMapOvr>
     <a:masterClrMapping/>
   </p:clrMapOvr>
+  <p:timing>
+    <p:tnLst>
+      <p:par>
+        <p:cTn id="1" dur="indefinite" restart="never" nodeType="tmRoot"/>
+      </p:par>
+    </p:tnLst>
+  </p:timing>
 </p:sld>
 </file>
 
-<file path=ppt/slides/slide18.xml><?xml version="1.0" encoding="utf-8"?>
+<file path=ppt/slides/slide19.xml><?xml version="1.0" encoding="utf-8"?>
 <p:sld xmlns:a="http://schemas.openxmlformats.org/drawingml/2006/main" xmlns:r="http://schemas.openxmlformats.org/officeDocument/2006/relationships" xmlns:p="http://schemas.openxmlformats.org/presentationml/2006/main">
   <p:cSld>
     <p:spTree>
@@ -39907,7 +40187,7 @@
                 <a:cs typeface="Arial"/>
                 <a:sym typeface="Arial"/>
               </a:rPr>
-              <a:t>18</a:t>
+              <a:t>19</a:t>
             </a:fld>
             <a:endParaRPr lang="en" sz="1200">
               <a:solidFill>
@@ -39926,10 +40206,216 @@
   <p:clrMapOvr>
     <a:masterClrMapping/>
   </p:clrMapOvr>
+  <p:timing>
+    <p:tnLst>
+      <p:par>
+        <p:cTn id="1" dur="indefinite" restart="never" nodeType="tmRoot"/>
+      </p:par>
+    </p:tnLst>
+  </p:timing>
 </p:sld>
 </file>
 
-<file path=ppt/slides/slide19.xml><?xml version="1.0" encoding="utf-8"?>
+<file path=ppt/slides/slide2.xml><?xml version="1.0" encoding="utf-8"?>
+<p:sld xmlns:a="http://schemas.openxmlformats.org/drawingml/2006/main" xmlns:r="http://schemas.openxmlformats.org/officeDocument/2006/relationships" xmlns:p="http://schemas.openxmlformats.org/presentationml/2006/main">
+  <p:cSld>
+    <p:spTree>
+      <p:nvGrpSpPr>
+        <p:cNvPr id="1" name="Shape 306"/>
+        <p:cNvGrpSpPr/>
+        <p:nvPr/>
+      </p:nvGrpSpPr>
+      <p:grpSpPr>
+        <a:xfrm>
+          <a:off x="0" y="0"/>
+          <a:ext cx="0" cy="0"/>
+          <a:chOff x="0" y="0"/>
+          <a:chExt cx="0" cy="0"/>
+        </a:xfrm>
+      </p:grpSpPr>
+      <p:sp>
+        <p:nvSpPr>
+          <p:cNvPr id="307" name="Shape 307"/>
+          <p:cNvSpPr txBox="1">
+            <a:spLocks noGrp="1"/>
+          </p:cNvSpPr>
+          <p:nvPr>
+            <p:ph type="title"/>
+          </p:nvPr>
+        </p:nvSpPr>
+        <p:spPr>
+          <a:xfrm>
+            <a:off x="722312" y="4406900"/>
+            <a:ext cx="7772400" cy="1362000"/>
+          </a:xfrm>
+          <a:prstGeom prst="rect">
+            <a:avLst/>
+          </a:prstGeom>
+          <a:noFill/>
+          <a:ln>
+            <a:noFill/>
+          </a:ln>
+        </p:spPr>
+        <p:txBody>
+          <a:bodyPr lIns="91425" tIns="45700" rIns="91425" bIns="45700" anchor="t" anchorCtr="0">
+            <a:noAutofit/>
+          </a:bodyPr>
+          <a:lstStyle/>
+          <a:p>
+            <a:pPr marL="0" marR="0" lvl="0" indent="0" algn="l" rtl="0">
+              <a:spcBef>
+                <a:spcPts val="0"/>
+              </a:spcBef>
+              <a:buClr>
+                <a:srgbClr val="FFFFFF"/>
+              </a:buClr>
+              <a:buSzPct val="25000"/>
+              <a:buFont typeface="Arial"/>
+              <a:buNone/>
+            </a:pPr>
+            <a:r>
+              <a:rPr lang="en" sz="4000" b="1" i="0" u="none" strike="noStrike" cap="none">
+                <a:solidFill>
+                  <a:srgbClr val="FFFFFF"/>
+                </a:solidFill>
+                <a:latin typeface="Arial"/>
+                <a:ea typeface="Arial"/>
+                <a:cs typeface="Arial"/>
+                <a:sym typeface="Arial"/>
+              </a:rPr>
+              <a:t>What is Flink?</a:t>
+            </a:r>
+          </a:p>
+        </p:txBody>
+      </p:sp>
+      <p:sp>
+        <p:nvSpPr>
+          <p:cNvPr id="308" name="Shape 308"/>
+          <p:cNvSpPr txBox="1">
+            <a:spLocks noGrp="1"/>
+          </p:cNvSpPr>
+          <p:nvPr>
+            <p:ph type="body" idx="1"/>
+          </p:nvPr>
+        </p:nvSpPr>
+        <p:spPr>
+          <a:xfrm>
+            <a:off x="722312" y="2906713"/>
+            <a:ext cx="7772400" cy="1500300"/>
+          </a:xfrm>
+          <a:prstGeom prst="rect">
+            <a:avLst/>
+          </a:prstGeom>
+          <a:noFill/>
+          <a:ln>
+            <a:noFill/>
+          </a:ln>
+        </p:spPr>
+        <p:txBody>
+          <a:bodyPr lIns="91425" tIns="45700" rIns="91425" bIns="45700" anchor="b" anchorCtr="0">
+            <a:noAutofit/>
+          </a:bodyPr>
+          <a:lstStyle/>
+          <a:p>
+            <a:pPr marL="0" marR="0" lvl="0" indent="0" algn="l" rtl="0">
+              <a:spcBef>
+                <a:spcPts val="0"/>
+              </a:spcBef>
+              <a:buClr>
+                <a:srgbClr val="34AD91"/>
+              </a:buClr>
+              <a:buSzPct val="25000"/>
+              <a:buFont typeface="Noto Sans Symbols"/>
+              <a:buNone/>
+            </a:pPr>
+            <a:endParaRPr sz="2000" b="0" i="0" u="none" strike="noStrike" cap="none">
+              <a:solidFill>
+                <a:srgbClr val="FFFFFF"/>
+              </a:solidFill>
+              <a:latin typeface="Arial"/>
+              <a:ea typeface="Arial"/>
+              <a:cs typeface="Arial"/>
+              <a:sym typeface="Arial"/>
+            </a:endParaRPr>
+          </a:p>
+        </p:txBody>
+      </p:sp>
+      <p:sp>
+        <p:nvSpPr>
+          <p:cNvPr id="309" name="Shape 309"/>
+          <p:cNvSpPr txBox="1">
+            <a:spLocks noGrp="1"/>
+          </p:cNvSpPr>
+          <p:nvPr>
+            <p:ph type="sldNum" idx="12"/>
+          </p:nvPr>
+        </p:nvSpPr>
+        <p:spPr>
+          <a:xfrm>
+            <a:off x="6553200" y="6356350"/>
+            <a:ext cx="2133600" cy="365100"/>
+          </a:xfrm>
+          <a:prstGeom prst="rect">
+            <a:avLst/>
+          </a:prstGeom>
+          <a:noFill/>
+          <a:ln>
+            <a:noFill/>
+          </a:ln>
+        </p:spPr>
+        <p:txBody>
+          <a:bodyPr lIns="91425" tIns="45700" rIns="91425" bIns="45700" anchor="ctr" anchorCtr="0">
+            <a:noAutofit/>
+          </a:bodyPr>
+          <a:lstStyle/>
+          <a:p>
+            <a:pPr marL="0" marR="0" lvl="0" indent="0" algn="r" rtl="0">
+              <a:spcBef>
+                <a:spcPts val="0"/>
+              </a:spcBef>
+              <a:buSzPct val="25000"/>
+              <a:buNone/>
+            </a:pPr>
+            <a:fld id="{00000000-1234-1234-1234-123412341234}" type="slidenum">
+              <a:rPr lang="en" sz="1200">
+                <a:solidFill>
+                  <a:srgbClr val="888888"/>
+                </a:solidFill>
+                <a:latin typeface="Arial"/>
+                <a:ea typeface="Arial"/>
+                <a:cs typeface="Arial"/>
+                <a:sym typeface="Arial"/>
+              </a:rPr>
+              <a:t>2</a:t>
+            </a:fld>
+            <a:endParaRPr lang="en" sz="1200">
+              <a:solidFill>
+                <a:srgbClr val="888888"/>
+              </a:solidFill>
+              <a:latin typeface="Arial"/>
+              <a:ea typeface="Arial"/>
+              <a:cs typeface="Arial"/>
+              <a:sym typeface="Arial"/>
+            </a:endParaRPr>
+          </a:p>
+        </p:txBody>
+      </p:sp>
+    </p:spTree>
+  </p:cSld>
+  <p:clrMapOvr>
+    <a:masterClrMapping/>
+  </p:clrMapOvr>
+  <p:timing>
+    <p:tnLst>
+      <p:par>
+        <p:cTn id="1" dur="indefinite" restart="never" nodeType="tmRoot"/>
+      </p:par>
+    </p:tnLst>
+  </p:timing>
+</p:sld>
+</file>
+
+<file path=ppt/slides/slide20.xml><?xml version="1.0" encoding="utf-8"?>
 <p:sld xmlns:a="http://schemas.openxmlformats.org/drawingml/2006/main" xmlns:r="http://schemas.openxmlformats.org/officeDocument/2006/relationships" xmlns:p="http://schemas.openxmlformats.org/presentationml/2006/main">
   <p:cSld>
     <p:spTree>
@@ -40219,7 +40705,7 @@
                 <a:cs typeface="Arial"/>
                 <a:sym typeface="Arial"/>
               </a:rPr>
-              <a:t>19</a:t>
+              <a:t>20</a:t>
             </a:fld>
             <a:endParaRPr lang="en" sz="1200">
               <a:solidFill>
@@ -40710,202 +41196,17 @@
   <p:clrMapOvr>
     <a:masterClrMapping/>
   </p:clrMapOvr>
+  <p:timing>
+    <p:tnLst>
+      <p:par>
+        <p:cTn id="1" dur="indefinite" restart="never" nodeType="tmRoot"/>
+      </p:par>
+    </p:tnLst>
+  </p:timing>
 </p:sld>
 </file>
 
-<file path=ppt/slides/slide2.xml><?xml version="1.0" encoding="utf-8"?>
-<p:sld xmlns:a="http://schemas.openxmlformats.org/drawingml/2006/main" xmlns:r="http://schemas.openxmlformats.org/officeDocument/2006/relationships" xmlns:p="http://schemas.openxmlformats.org/presentationml/2006/main">
-  <p:cSld>
-    <p:spTree>
-      <p:nvGrpSpPr>
-        <p:cNvPr id="1" name="Shape 306"/>
-        <p:cNvGrpSpPr/>
-        <p:nvPr/>
-      </p:nvGrpSpPr>
-      <p:grpSpPr>
-        <a:xfrm>
-          <a:off x="0" y="0"/>
-          <a:ext cx="0" cy="0"/>
-          <a:chOff x="0" y="0"/>
-          <a:chExt cx="0" cy="0"/>
-        </a:xfrm>
-      </p:grpSpPr>
-      <p:sp>
-        <p:nvSpPr>
-          <p:cNvPr id="307" name="Shape 307"/>
-          <p:cNvSpPr txBox="1">
-            <a:spLocks noGrp="1"/>
-          </p:cNvSpPr>
-          <p:nvPr>
-            <p:ph type="title"/>
-          </p:nvPr>
-        </p:nvSpPr>
-        <p:spPr>
-          <a:xfrm>
-            <a:off x="722312" y="4406900"/>
-            <a:ext cx="7772400" cy="1362000"/>
-          </a:xfrm>
-          <a:prstGeom prst="rect">
-            <a:avLst/>
-          </a:prstGeom>
-          <a:noFill/>
-          <a:ln>
-            <a:noFill/>
-          </a:ln>
-        </p:spPr>
-        <p:txBody>
-          <a:bodyPr lIns="91425" tIns="45700" rIns="91425" bIns="45700" anchor="t" anchorCtr="0">
-            <a:noAutofit/>
-          </a:bodyPr>
-          <a:lstStyle/>
-          <a:p>
-            <a:pPr marL="0" marR="0" lvl="0" indent="0" algn="l" rtl="0">
-              <a:spcBef>
-                <a:spcPts val="0"/>
-              </a:spcBef>
-              <a:buClr>
-                <a:srgbClr val="FFFFFF"/>
-              </a:buClr>
-              <a:buSzPct val="25000"/>
-              <a:buFont typeface="Arial"/>
-              <a:buNone/>
-            </a:pPr>
-            <a:r>
-              <a:rPr lang="en" sz="4000" b="1" i="0" u="none" strike="noStrike" cap="none">
-                <a:solidFill>
-                  <a:srgbClr val="FFFFFF"/>
-                </a:solidFill>
-                <a:latin typeface="Arial"/>
-                <a:ea typeface="Arial"/>
-                <a:cs typeface="Arial"/>
-                <a:sym typeface="Arial"/>
-              </a:rPr>
-              <a:t>What is Flink?</a:t>
-            </a:r>
-          </a:p>
-        </p:txBody>
-      </p:sp>
-      <p:sp>
-        <p:nvSpPr>
-          <p:cNvPr id="308" name="Shape 308"/>
-          <p:cNvSpPr txBox="1">
-            <a:spLocks noGrp="1"/>
-          </p:cNvSpPr>
-          <p:nvPr>
-            <p:ph type="body" idx="1"/>
-          </p:nvPr>
-        </p:nvSpPr>
-        <p:spPr>
-          <a:xfrm>
-            <a:off x="722312" y="2906713"/>
-            <a:ext cx="7772400" cy="1500300"/>
-          </a:xfrm>
-          <a:prstGeom prst="rect">
-            <a:avLst/>
-          </a:prstGeom>
-          <a:noFill/>
-          <a:ln>
-            <a:noFill/>
-          </a:ln>
-        </p:spPr>
-        <p:txBody>
-          <a:bodyPr lIns="91425" tIns="45700" rIns="91425" bIns="45700" anchor="b" anchorCtr="0">
-            <a:noAutofit/>
-          </a:bodyPr>
-          <a:lstStyle/>
-          <a:p>
-            <a:pPr marL="0" marR="0" lvl="0" indent="0" algn="l" rtl="0">
-              <a:spcBef>
-                <a:spcPts val="0"/>
-              </a:spcBef>
-              <a:buClr>
-                <a:srgbClr val="34AD91"/>
-              </a:buClr>
-              <a:buSzPct val="25000"/>
-              <a:buFont typeface="Noto Sans Symbols"/>
-              <a:buNone/>
-            </a:pPr>
-            <a:endParaRPr sz="2000" b="0" i="0" u="none" strike="noStrike" cap="none">
-              <a:solidFill>
-                <a:srgbClr val="FFFFFF"/>
-              </a:solidFill>
-              <a:latin typeface="Arial"/>
-              <a:ea typeface="Arial"/>
-              <a:cs typeface="Arial"/>
-              <a:sym typeface="Arial"/>
-            </a:endParaRPr>
-          </a:p>
-        </p:txBody>
-      </p:sp>
-      <p:sp>
-        <p:nvSpPr>
-          <p:cNvPr id="309" name="Shape 309"/>
-          <p:cNvSpPr txBox="1">
-            <a:spLocks noGrp="1"/>
-          </p:cNvSpPr>
-          <p:nvPr>
-            <p:ph type="sldNum" idx="12"/>
-          </p:nvPr>
-        </p:nvSpPr>
-        <p:spPr>
-          <a:xfrm>
-            <a:off x="6553200" y="6356350"/>
-            <a:ext cx="2133600" cy="365100"/>
-          </a:xfrm>
-          <a:prstGeom prst="rect">
-            <a:avLst/>
-          </a:prstGeom>
-          <a:noFill/>
-          <a:ln>
-            <a:noFill/>
-          </a:ln>
-        </p:spPr>
-        <p:txBody>
-          <a:bodyPr lIns="91425" tIns="45700" rIns="91425" bIns="45700" anchor="ctr" anchorCtr="0">
-            <a:noAutofit/>
-          </a:bodyPr>
-          <a:lstStyle/>
-          <a:p>
-            <a:pPr marL="0" marR="0" lvl="0" indent="0" algn="r" rtl="0">
-              <a:spcBef>
-                <a:spcPts val="0"/>
-              </a:spcBef>
-              <a:buSzPct val="25000"/>
-              <a:buNone/>
-            </a:pPr>
-            <a:fld id="{00000000-1234-1234-1234-123412341234}" type="slidenum">
-              <a:rPr lang="en" sz="1200">
-                <a:solidFill>
-                  <a:srgbClr val="888888"/>
-                </a:solidFill>
-                <a:latin typeface="Arial"/>
-                <a:ea typeface="Arial"/>
-                <a:cs typeface="Arial"/>
-                <a:sym typeface="Arial"/>
-              </a:rPr>
-              <a:t>2</a:t>
-            </a:fld>
-            <a:endParaRPr lang="en" sz="1200">
-              <a:solidFill>
-                <a:srgbClr val="888888"/>
-              </a:solidFill>
-              <a:latin typeface="Arial"/>
-              <a:ea typeface="Arial"/>
-              <a:cs typeface="Arial"/>
-              <a:sym typeface="Arial"/>
-            </a:endParaRPr>
-          </a:p>
-        </p:txBody>
-      </p:sp>
-    </p:spTree>
-  </p:cSld>
-  <p:clrMapOvr>
-    <a:masterClrMapping/>
-  </p:clrMapOvr>
-</p:sld>
-</file>
-
-<file path=ppt/slides/slide20.xml><?xml version="1.0" encoding="utf-8"?>
+<file path=ppt/slides/slide21.xml><?xml version="1.0" encoding="utf-8"?>
 <p:sld xmlns:a="http://schemas.openxmlformats.org/drawingml/2006/main" xmlns:r="http://schemas.openxmlformats.org/officeDocument/2006/relationships" xmlns:p="http://schemas.openxmlformats.org/presentationml/2006/main">
   <p:cSld>
     <p:spTree>
@@ -41159,7 +41460,7 @@
                 <a:cs typeface="Arial"/>
                 <a:sym typeface="Arial"/>
               </a:rPr>
-              <a:t>20</a:t>
+              <a:t>21</a:t>
             </a:fld>
             <a:endParaRPr lang="en" sz="1200">
               <a:solidFill>
@@ -42045,10 +42346,17 @@
   <p:clrMapOvr>
     <a:masterClrMapping/>
   </p:clrMapOvr>
+  <p:timing>
+    <p:tnLst>
+      <p:par>
+        <p:cTn id="1" dur="indefinite" restart="never" nodeType="tmRoot"/>
+      </p:par>
+    </p:tnLst>
+  </p:timing>
 </p:sld>
 </file>
 
-<file path=ppt/slides/slide21.xml><?xml version="1.0" encoding="utf-8"?>
+<file path=ppt/slides/slide22.xml><?xml version="1.0" encoding="utf-8"?>
 <p:sld xmlns:a="http://schemas.openxmlformats.org/drawingml/2006/main" xmlns:r="http://schemas.openxmlformats.org/officeDocument/2006/relationships" xmlns:p="http://schemas.openxmlformats.org/presentationml/2006/main">
   <p:cSld>
     <p:spTree>
@@ -42276,7 +42584,7 @@
                 <a:cs typeface="Arial"/>
                 <a:sym typeface="Arial"/>
               </a:rPr>
-              <a:t>21</a:t>
+              <a:t>22</a:t>
             </a:fld>
             <a:endParaRPr lang="en" sz="1200">
               <a:solidFill>
@@ -43745,10 +44053,17 @@
   <p:clrMapOvr>
     <a:masterClrMapping/>
   </p:clrMapOvr>
+  <p:timing>
+    <p:tnLst>
+      <p:par>
+        <p:cTn id="1" dur="indefinite" restart="never" nodeType="tmRoot"/>
+      </p:par>
+    </p:tnLst>
+  </p:timing>
 </p:sld>
 </file>
 
-<file path=ppt/slides/slide22.xml><?xml version="1.0" encoding="utf-8"?>
+<file path=ppt/slides/slide23.xml><?xml version="1.0" encoding="utf-8"?>
 <p:sld xmlns:a="http://schemas.openxmlformats.org/drawingml/2006/main" xmlns:r="http://schemas.openxmlformats.org/officeDocument/2006/relationships" xmlns:p="http://schemas.openxmlformats.org/presentationml/2006/main">
   <p:cSld>
     <p:spTree>
@@ -44031,7 +44346,7 @@
                 <a:cs typeface="Arial"/>
                 <a:sym typeface="Arial"/>
               </a:rPr>
-              <a:t>22</a:t>
+              <a:t>23</a:t>
             </a:fld>
             <a:endParaRPr lang="en" sz="1200">
               <a:solidFill>
@@ -45500,10 +45815,17 @@
   <p:clrMapOvr>
     <a:masterClrMapping/>
   </p:clrMapOvr>
+  <p:timing>
+    <p:tnLst>
+      <p:par>
+        <p:cTn id="1" dur="indefinite" restart="never" nodeType="tmRoot"/>
+      </p:par>
+    </p:tnLst>
+  </p:timing>
 </p:sld>
 </file>
 
-<file path=ppt/slides/slide23.xml><?xml version="1.0" encoding="utf-8"?>
+<file path=ppt/slides/slide24.xml><?xml version="1.0" encoding="utf-8"?>
 <p:sld xmlns:a="http://schemas.openxmlformats.org/drawingml/2006/main" xmlns:r="http://schemas.openxmlformats.org/officeDocument/2006/relationships" xmlns:p="http://schemas.openxmlformats.org/presentationml/2006/main">
   <p:cSld>
     <p:spTree>
@@ -45692,10 +46014,17 @@
   <p:clrMapOvr>
     <a:masterClrMapping/>
   </p:clrMapOvr>
+  <p:timing>
+    <p:tnLst>
+      <p:par>
+        <p:cTn id="1" dur="indefinite" restart="never" nodeType="tmRoot"/>
+      </p:par>
+    </p:tnLst>
+  </p:timing>
 </p:sld>
 </file>
 
-<file path=ppt/slides/slide24.xml><?xml version="1.0" encoding="utf-8"?>
+<file path=ppt/slides/slide25.xml><?xml version="1.0" encoding="utf-8"?>
 <p:sld xmlns:a="http://schemas.openxmlformats.org/drawingml/2006/main" xmlns:r="http://schemas.openxmlformats.org/officeDocument/2006/relationships" xmlns:p="http://schemas.openxmlformats.org/presentationml/2006/main">
   <p:cSld>
     <p:spTree>
@@ -45862,7 +46191,7 @@
                 <a:cs typeface="Avenir"/>
                 <a:sym typeface="Avenir"/>
               </a:rPr>
-              <a:t>24</a:t>
+              <a:t>25</a:t>
             </a:fld>
             <a:endParaRPr lang="en" sz="1200">
               <a:solidFill>
@@ -45881,10 +46210,17 @@
   <p:clrMapOvr>
     <a:masterClrMapping/>
   </p:clrMapOvr>
+  <p:timing>
+    <p:tnLst>
+      <p:par>
+        <p:cTn id="1" dur="indefinite" restart="never" nodeType="tmRoot"/>
+      </p:par>
+    </p:tnLst>
+  </p:timing>
 </p:sld>
 </file>
 
-<file path=ppt/slides/slide25.xml><?xml version="1.0" encoding="utf-8"?>
+<file path=ppt/slides/slide26.xml><?xml version="1.0" encoding="utf-8"?>
 <p:sld xmlns:a="http://schemas.openxmlformats.org/drawingml/2006/main" xmlns:r="http://schemas.openxmlformats.org/officeDocument/2006/relationships" xmlns:p="http://schemas.openxmlformats.org/presentationml/2006/main">
   <p:cSld>
     <p:spTree>
@@ -46002,7 +46338,7 @@
                 <a:cs typeface="Avenir"/>
                 <a:sym typeface="Avenir"/>
               </a:rPr>
-              <a:t>25</a:t>
+              <a:t>26</a:t>
             </a:fld>
             <a:endParaRPr lang="en" sz="1200" dirty="0">
               <a:solidFill>
@@ -46146,10 +46482,17 @@
   <p:clrMapOvr>
     <a:masterClrMapping/>
   </p:clrMapOvr>
+  <p:timing>
+    <p:tnLst>
+      <p:par>
+        <p:cTn id="1" dur="indefinite" restart="never" nodeType="tmRoot"/>
+      </p:par>
+    </p:tnLst>
+  </p:timing>
 </p:sld>
 </file>
 
-<file path=ppt/slides/slide26.xml><?xml version="1.0" encoding="utf-8"?>
+<file path=ppt/slides/slide27.xml><?xml version="1.0" encoding="utf-8"?>
 <p:sld xmlns:a="http://schemas.openxmlformats.org/drawingml/2006/main" xmlns:r="http://schemas.openxmlformats.org/officeDocument/2006/relationships" xmlns:p="http://schemas.openxmlformats.org/presentationml/2006/main">
   <p:cSld>
     <p:spTree>
@@ -46928,10 +47271,17 @@
   <p:clrMapOvr>
     <a:masterClrMapping/>
   </p:clrMapOvr>
+  <p:timing>
+    <p:tnLst>
+      <p:par>
+        <p:cTn id="1" dur="indefinite" restart="never" nodeType="tmRoot"/>
+      </p:par>
+    </p:tnLst>
+  </p:timing>
 </p:sld>
 </file>
 
-<file path=ppt/slides/slide27.xml><?xml version="1.0" encoding="utf-8"?>
+<file path=ppt/slides/slide28.xml><?xml version="1.0" encoding="utf-8"?>
 <p:sld xmlns:a="http://schemas.openxmlformats.org/drawingml/2006/main" xmlns:r="http://schemas.openxmlformats.org/officeDocument/2006/relationships" xmlns:p="http://schemas.openxmlformats.org/presentationml/2006/main">
   <p:cSld>
     <p:spTree>
@@ -47049,7 +47399,7 @@
                 <a:cs typeface="Avenir"/>
                 <a:sym typeface="Avenir"/>
               </a:rPr>
-              <a:t>27</a:t>
+              <a:t>28</a:t>
             </a:fld>
             <a:endParaRPr lang="en" sz="1200">
               <a:solidFill>
@@ -47411,10 +47761,17 @@
   <p:clrMapOvr>
     <a:masterClrMapping/>
   </p:clrMapOvr>
+  <p:timing>
+    <p:tnLst>
+      <p:par>
+        <p:cTn id="1" dur="indefinite" restart="never" nodeType="tmRoot"/>
+      </p:par>
+    </p:tnLst>
+  </p:timing>
 </p:sld>
 </file>
 
-<file path=ppt/slides/slide28.xml><?xml version="1.0" encoding="utf-8"?>
+<file path=ppt/slides/slide29.xml><?xml version="1.0" encoding="utf-8"?>
 <p:sld xmlns:a="http://schemas.openxmlformats.org/drawingml/2006/main" xmlns:r="http://schemas.openxmlformats.org/officeDocument/2006/relationships" xmlns:p="http://schemas.openxmlformats.org/presentationml/2006/main">
   <p:cSld>
     <p:spTree>
@@ -47477,7 +47834,7 @@
                 <a:cs typeface="Avenir"/>
                 <a:sym typeface="Avenir"/>
               </a:rPr>
-              <a:t>28</a:t>
+              <a:t>29</a:t>
             </a:fld>
             <a:endParaRPr lang="en" sz="1200">
               <a:solidFill>
@@ -47523,409 +47880,13 @@
   <p:clrMapOvr>
     <a:masterClrMapping/>
   </p:clrMapOvr>
-</p:sld>
-</file>
-
-<file path=ppt/slides/slide29.xml><?xml version="1.0" encoding="utf-8"?>
-<p:sld xmlns:a="http://schemas.openxmlformats.org/drawingml/2006/main" xmlns:r="http://schemas.openxmlformats.org/officeDocument/2006/relationships" xmlns:p="http://schemas.openxmlformats.org/presentationml/2006/main">
-  <p:cSld>
-    <p:spTree>
-      <p:nvGrpSpPr>
-        <p:cNvPr id="1" name="Shape 737"/>
-        <p:cNvGrpSpPr/>
-        <p:nvPr/>
-      </p:nvGrpSpPr>
-      <p:grpSpPr>
-        <a:xfrm>
-          <a:off x="0" y="0"/>
-          <a:ext cx="0" cy="0"/>
-          <a:chOff x="0" y="0"/>
-          <a:chExt cx="0" cy="0"/>
-        </a:xfrm>
-      </p:grpSpPr>
-      <p:pic>
-        <p:nvPicPr>
-          <p:cNvPr id="738" name="Shape 738" descr="imgres.png"/>
-          <p:cNvPicPr preferRelativeResize="0"/>
-          <p:nvPr/>
-        </p:nvPicPr>
-        <p:blipFill rotWithShape="1">
-          <a:blip r:embed="rId3">
-            <a:alphaModFix/>
-          </a:blip>
-          <a:srcRect/>
-          <a:stretch/>
-        </p:blipFill>
-        <p:spPr>
-          <a:xfrm>
-            <a:off x="633341" y="1150653"/>
-            <a:ext cx="2226600" cy="1252800"/>
-          </a:xfrm>
-          <a:prstGeom prst="rect">
-            <a:avLst/>
-          </a:prstGeom>
-          <a:noFill/>
-          <a:ln>
-            <a:noFill/>
-          </a:ln>
-        </p:spPr>
-      </p:pic>
-      <p:pic>
-        <p:nvPicPr>
-          <p:cNvPr id="739" name="Shape 739" descr="imgres.png"/>
-          <p:cNvPicPr preferRelativeResize="0"/>
-          <p:nvPr/>
-        </p:nvPicPr>
-        <p:blipFill rotWithShape="1">
-          <a:blip r:embed="rId4">
-            <a:alphaModFix/>
-          </a:blip>
-          <a:srcRect/>
-          <a:stretch/>
-        </p:blipFill>
-        <p:spPr>
-          <a:xfrm>
-            <a:off x="1438357" y="2853676"/>
-            <a:ext cx="1372500" cy="1217700"/>
-          </a:xfrm>
-          <a:prstGeom prst="rect">
-            <a:avLst/>
-          </a:prstGeom>
-          <a:noFill/>
-          <a:ln>
-            <a:noFill/>
-          </a:ln>
-        </p:spPr>
-      </p:pic>
-      <p:pic>
-        <p:nvPicPr>
-          <p:cNvPr id="740" name="Shape 740" descr="imgres.png"/>
-          <p:cNvPicPr preferRelativeResize="0"/>
-          <p:nvPr/>
-        </p:nvPicPr>
-        <p:blipFill rotWithShape="1">
-          <a:blip r:embed="rId5">
-            <a:alphaModFix/>
-          </a:blip>
-          <a:srcRect/>
-          <a:stretch/>
-        </p:blipFill>
-        <p:spPr>
-          <a:xfrm>
-            <a:off x="633341" y="4840156"/>
-            <a:ext cx="2177400" cy="902700"/>
-          </a:xfrm>
-          <a:prstGeom prst="rect">
-            <a:avLst/>
-          </a:prstGeom>
-          <a:noFill/>
-          <a:ln>
-            <a:noFill/>
-          </a:ln>
-        </p:spPr>
-      </p:pic>
-      <p:sp>
-        <p:nvSpPr>
-          <p:cNvPr id="741" name="Shape 741"/>
-          <p:cNvSpPr txBox="1"/>
-          <p:nvPr/>
-        </p:nvSpPr>
-        <p:spPr>
-          <a:xfrm>
-            <a:off x="3175000" y="4840156"/>
-            <a:ext cx="5511900" cy="861600"/>
-          </a:xfrm>
-          <a:prstGeom prst="rect">
-            <a:avLst/>
-          </a:prstGeom>
-          <a:noFill/>
-          <a:ln>
-            <a:noFill/>
-          </a:ln>
-        </p:spPr>
-        <p:txBody>
-          <a:bodyPr lIns="91425" tIns="45700" rIns="91425" bIns="45700" anchor="t" anchorCtr="0">
-            <a:noAutofit/>
-          </a:bodyPr>
-          <a:lstStyle/>
-          <a:p>
-            <a:pPr marL="0" marR="0" lvl="0" indent="0" algn="l" rtl="0">
-              <a:spcBef>
-                <a:spcPts val="0"/>
-              </a:spcBef>
-              <a:buSzPct val="25000"/>
-              <a:buNone/>
-            </a:pPr>
-            <a:r>
-              <a:rPr lang="en" sz="1800">
-                <a:solidFill>
-                  <a:srgbClr val="34AD91"/>
-                </a:solidFill>
-                <a:latin typeface="Avenir"/>
-                <a:ea typeface="Avenir"/>
-                <a:cs typeface="Avenir"/>
-                <a:sym typeface="Avenir"/>
-              </a:rPr>
-              <a:t>30</a:t>
-            </a:r>
-            <a:r>
-              <a:rPr lang="en" sz="1800">
-                <a:solidFill>
-                  <a:schemeClr val="dk1"/>
-                </a:solidFill>
-                <a:latin typeface="Avenir"/>
-                <a:ea typeface="Avenir"/>
-                <a:cs typeface="Avenir"/>
-                <a:sym typeface="Avenir"/>
-              </a:rPr>
-              <a:t> Flink applications </a:t>
-            </a:r>
-            <a:r>
-              <a:rPr lang="en" sz="1800">
-                <a:solidFill>
-                  <a:srgbClr val="34AD91"/>
-                </a:solidFill>
-                <a:latin typeface="Avenir"/>
-                <a:ea typeface="Avenir"/>
-                <a:cs typeface="Avenir"/>
-                <a:sym typeface="Avenir"/>
-              </a:rPr>
-              <a:t>in production for more than one year</a:t>
-            </a:r>
-            <a:r>
-              <a:rPr lang="en" sz="1800">
-                <a:solidFill>
-                  <a:schemeClr val="dk1"/>
-                </a:solidFill>
-                <a:latin typeface="Avenir"/>
-                <a:ea typeface="Avenir"/>
-                <a:cs typeface="Avenir"/>
-                <a:sym typeface="Avenir"/>
-              </a:rPr>
-              <a:t>. 10 billion events (2TB) processed daily</a:t>
-            </a:r>
-          </a:p>
-        </p:txBody>
-      </p:sp>
-      <p:sp>
-        <p:nvSpPr>
-          <p:cNvPr id="742" name="Shape 742"/>
-          <p:cNvSpPr txBox="1"/>
-          <p:nvPr/>
-        </p:nvSpPr>
-        <p:spPr>
-          <a:xfrm>
-            <a:off x="3175000" y="2853676"/>
-            <a:ext cx="5511900" cy="1231200"/>
-          </a:xfrm>
-          <a:prstGeom prst="rect">
-            <a:avLst/>
-          </a:prstGeom>
-          <a:noFill/>
-          <a:ln>
-            <a:noFill/>
-          </a:ln>
-        </p:spPr>
-        <p:txBody>
-          <a:bodyPr lIns="91425" tIns="45700" rIns="91425" bIns="45700" anchor="t" anchorCtr="0">
-            <a:noAutofit/>
-          </a:bodyPr>
-          <a:lstStyle/>
-          <a:p>
-            <a:pPr marL="0" marR="0" lvl="0" indent="0" algn="l" rtl="0">
-              <a:spcBef>
-                <a:spcPts val="0"/>
-              </a:spcBef>
-              <a:buSzPct val="25000"/>
-              <a:buNone/>
-            </a:pPr>
-            <a:r>
-              <a:rPr lang="en" sz="1800">
-                <a:solidFill>
-                  <a:schemeClr val="dk1"/>
-                </a:solidFill>
-                <a:latin typeface="Avenir"/>
-                <a:ea typeface="Avenir"/>
-                <a:cs typeface="Avenir"/>
-                <a:sym typeface="Avenir"/>
-              </a:rPr>
-              <a:t>Complex jobs of </a:t>
-            </a:r>
-            <a:r>
-              <a:rPr lang="en" sz="1800">
-                <a:solidFill>
-                  <a:srgbClr val="34AD91"/>
-                </a:solidFill>
-                <a:latin typeface="Avenir"/>
-                <a:ea typeface="Avenir"/>
-                <a:cs typeface="Avenir"/>
-                <a:sym typeface="Avenir"/>
-              </a:rPr>
-              <a:t>&gt; 30 operators</a:t>
-            </a:r>
-            <a:r>
-              <a:rPr lang="en" sz="1800">
-                <a:solidFill>
-                  <a:schemeClr val="dk1"/>
-                </a:solidFill>
-                <a:latin typeface="Avenir"/>
-                <a:ea typeface="Avenir"/>
-                <a:cs typeface="Avenir"/>
-                <a:sym typeface="Avenir"/>
-              </a:rPr>
-              <a:t> running 24/7, processing 30 billion events daily, maintaining </a:t>
-            </a:r>
-            <a:r>
-              <a:rPr lang="en" sz="1800">
-                <a:solidFill>
-                  <a:srgbClr val="34AD91"/>
-                </a:solidFill>
-                <a:latin typeface="Avenir"/>
-                <a:ea typeface="Avenir"/>
-                <a:cs typeface="Avenir"/>
-                <a:sym typeface="Avenir"/>
-              </a:rPr>
-              <a:t>state of 100s of GB with exactly-once guarantees</a:t>
-            </a:r>
-          </a:p>
-        </p:txBody>
-      </p:sp>
-      <p:sp>
-        <p:nvSpPr>
-          <p:cNvPr id="743" name="Shape 743"/>
-          <p:cNvSpPr txBox="1"/>
-          <p:nvPr/>
-        </p:nvSpPr>
-        <p:spPr>
-          <a:xfrm>
-            <a:off x="3175000" y="1150653"/>
-            <a:ext cx="5511900" cy="1231200"/>
-          </a:xfrm>
-          <a:prstGeom prst="rect">
-            <a:avLst/>
-          </a:prstGeom>
-          <a:noFill/>
-          <a:ln>
-            <a:noFill/>
-          </a:ln>
-        </p:spPr>
-        <p:txBody>
-          <a:bodyPr lIns="91425" tIns="45700" rIns="91425" bIns="45700" anchor="t" anchorCtr="0">
-            <a:noAutofit/>
-          </a:bodyPr>
-          <a:lstStyle/>
-          <a:p>
-            <a:pPr marL="0" marR="0" lvl="0" indent="0" algn="l" rtl="0">
-              <a:spcBef>
-                <a:spcPts val="0"/>
-              </a:spcBef>
-              <a:buSzPct val="25000"/>
-              <a:buNone/>
-            </a:pPr>
-            <a:r>
-              <a:rPr lang="en" sz="1800">
-                <a:solidFill>
-                  <a:schemeClr val="dk1"/>
-                </a:solidFill>
-                <a:latin typeface="Avenir"/>
-                <a:ea typeface="Avenir"/>
-                <a:cs typeface="Avenir"/>
-                <a:sym typeface="Avenir"/>
-              </a:rPr>
-              <a:t>Largest job has &gt; 20 operators, runs on &gt; </a:t>
-            </a:r>
-            <a:r>
-              <a:rPr lang="en" sz="1800">
-                <a:solidFill>
-                  <a:srgbClr val="34AD91"/>
-                </a:solidFill>
-                <a:latin typeface="Avenir"/>
-                <a:ea typeface="Avenir"/>
-                <a:cs typeface="Avenir"/>
-                <a:sym typeface="Avenir"/>
-              </a:rPr>
-              <a:t>5000 vCores in 1000-node cluster</a:t>
-            </a:r>
-            <a:r>
-              <a:rPr lang="en" sz="1800">
-                <a:solidFill>
-                  <a:schemeClr val="dk1"/>
-                </a:solidFill>
-                <a:latin typeface="Avenir"/>
-                <a:ea typeface="Avenir"/>
-                <a:cs typeface="Avenir"/>
-                <a:sym typeface="Avenir"/>
-              </a:rPr>
-              <a:t>, processes millions of events per second</a:t>
-            </a:r>
-          </a:p>
-        </p:txBody>
-      </p:sp>
-      <p:sp>
-        <p:nvSpPr>
-          <p:cNvPr id="744" name="Shape 744"/>
-          <p:cNvSpPr txBox="1">
-            <a:spLocks noGrp="1"/>
-          </p:cNvSpPr>
-          <p:nvPr>
-            <p:ph type="sldNum" idx="12"/>
-          </p:nvPr>
-        </p:nvSpPr>
-        <p:spPr>
-          <a:xfrm>
-            <a:off x="6553200" y="6356352"/>
-            <a:ext cx="2133600" cy="365100"/>
-          </a:xfrm>
-          <a:prstGeom prst="rect">
-            <a:avLst/>
-          </a:prstGeom>
-          <a:noFill/>
-          <a:ln>
-            <a:noFill/>
-          </a:ln>
-        </p:spPr>
-        <p:txBody>
-          <a:bodyPr lIns="91425" tIns="45700" rIns="91425" bIns="45700" anchor="ctr" anchorCtr="0">
-            <a:noAutofit/>
-          </a:bodyPr>
-          <a:lstStyle/>
-          <a:p>
-            <a:pPr marL="0" marR="0" lvl="0" indent="0" algn="r" rtl="0">
-              <a:spcBef>
-                <a:spcPts val="0"/>
-              </a:spcBef>
-              <a:buSzPct val="25000"/>
-              <a:buNone/>
-            </a:pPr>
-            <a:fld id="{00000000-1234-1234-1234-123412341234}" type="slidenum">
-              <a:rPr lang="en" sz="1200">
-                <a:solidFill>
-                  <a:srgbClr val="888888"/>
-                </a:solidFill>
-                <a:latin typeface="Avenir"/>
-                <a:ea typeface="Avenir"/>
-                <a:cs typeface="Avenir"/>
-                <a:sym typeface="Avenir"/>
-              </a:rPr>
-              <a:t>29</a:t>
-            </a:fld>
-            <a:endParaRPr lang="en" sz="1200">
-              <a:solidFill>
-                <a:srgbClr val="888888"/>
-              </a:solidFill>
-              <a:latin typeface="Avenir"/>
-              <a:ea typeface="Avenir"/>
-              <a:cs typeface="Avenir"/>
-              <a:sym typeface="Avenir"/>
-            </a:endParaRPr>
-          </a:p>
-        </p:txBody>
-      </p:sp>
-    </p:spTree>
-  </p:cSld>
-  <p:clrMapOvr>
-    <a:masterClrMapping/>
-  </p:clrMapOvr>
+  <p:timing>
+    <p:tnLst>
+      <p:par>
+        <p:cTn id="1" dur="indefinite" restart="never" nodeType="tmRoot"/>
+      </p:par>
+    </p:tnLst>
+  </p:timing>
 </p:sld>
 </file>
 
@@ -49528,10 +49489,675 @@
   <p:clrMapOvr>
     <a:masterClrMapping/>
   </p:clrMapOvr>
+  <p:timing>
+    <p:tnLst>
+      <p:par>
+        <p:cTn id="1" dur="indefinite" restart="never" nodeType="tmRoot"/>
+      </p:par>
+    </p:tnLst>
+  </p:timing>
+</p:sld>
+</file>
+
+<file path=ppt/slides/slide30.xml><?xml version="1.0" encoding="utf-8"?>
+<p:sld xmlns:a="http://schemas.openxmlformats.org/drawingml/2006/main" xmlns:r="http://schemas.openxmlformats.org/officeDocument/2006/relationships" xmlns:p="http://schemas.openxmlformats.org/presentationml/2006/main">
+  <p:cSld>
+    <p:spTree>
+      <p:nvGrpSpPr>
+        <p:cNvPr id="1" name="Shape 737"/>
+        <p:cNvGrpSpPr/>
+        <p:nvPr/>
+      </p:nvGrpSpPr>
+      <p:grpSpPr>
+        <a:xfrm>
+          <a:off x="0" y="0"/>
+          <a:ext cx="0" cy="0"/>
+          <a:chOff x="0" y="0"/>
+          <a:chExt cx="0" cy="0"/>
+        </a:xfrm>
+      </p:grpSpPr>
+      <p:pic>
+        <p:nvPicPr>
+          <p:cNvPr id="738" name="Shape 738" descr="imgres.png"/>
+          <p:cNvPicPr preferRelativeResize="0"/>
+          <p:nvPr/>
+        </p:nvPicPr>
+        <p:blipFill rotWithShape="1">
+          <a:blip r:embed="rId3">
+            <a:alphaModFix/>
+          </a:blip>
+          <a:srcRect/>
+          <a:stretch/>
+        </p:blipFill>
+        <p:spPr>
+          <a:xfrm>
+            <a:off x="633341" y="1150653"/>
+            <a:ext cx="2226600" cy="1252800"/>
+          </a:xfrm>
+          <a:prstGeom prst="rect">
+            <a:avLst/>
+          </a:prstGeom>
+          <a:noFill/>
+          <a:ln>
+            <a:noFill/>
+          </a:ln>
+        </p:spPr>
+      </p:pic>
+      <p:pic>
+        <p:nvPicPr>
+          <p:cNvPr id="739" name="Shape 739" descr="imgres.png"/>
+          <p:cNvPicPr preferRelativeResize="0"/>
+          <p:nvPr/>
+        </p:nvPicPr>
+        <p:blipFill rotWithShape="1">
+          <a:blip r:embed="rId4">
+            <a:alphaModFix/>
+          </a:blip>
+          <a:srcRect/>
+          <a:stretch/>
+        </p:blipFill>
+        <p:spPr>
+          <a:xfrm>
+            <a:off x="1438357" y="2853676"/>
+            <a:ext cx="1372500" cy="1217700"/>
+          </a:xfrm>
+          <a:prstGeom prst="rect">
+            <a:avLst/>
+          </a:prstGeom>
+          <a:noFill/>
+          <a:ln>
+            <a:noFill/>
+          </a:ln>
+        </p:spPr>
+      </p:pic>
+      <p:pic>
+        <p:nvPicPr>
+          <p:cNvPr id="740" name="Shape 740" descr="imgres.png"/>
+          <p:cNvPicPr preferRelativeResize="0"/>
+          <p:nvPr/>
+        </p:nvPicPr>
+        <p:blipFill rotWithShape="1">
+          <a:blip r:embed="rId5">
+            <a:alphaModFix/>
+          </a:blip>
+          <a:srcRect/>
+          <a:stretch/>
+        </p:blipFill>
+        <p:spPr>
+          <a:xfrm>
+            <a:off x="633341" y="4840156"/>
+            <a:ext cx="2177400" cy="902700"/>
+          </a:xfrm>
+          <a:prstGeom prst="rect">
+            <a:avLst/>
+          </a:prstGeom>
+          <a:noFill/>
+          <a:ln>
+            <a:noFill/>
+          </a:ln>
+        </p:spPr>
+      </p:pic>
+      <p:sp>
+        <p:nvSpPr>
+          <p:cNvPr id="741" name="Shape 741"/>
+          <p:cNvSpPr txBox="1"/>
+          <p:nvPr/>
+        </p:nvSpPr>
+        <p:spPr>
+          <a:xfrm>
+            <a:off x="3175000" y="4840156"/>
+            <a:ext cx="5511900" cy="861600"/>
+          </a:xfrm>
+          <a:prstGeom prst="rect">
+            <a:avLst/>
+          </a:prstGeom>
+          <a:noFill/>
+          <a:ln>
+            <a:noFill/>
+          </a:ln>
+        </p:spPr>
+        <p:txBody>
+          <a:bodyPr lIns="91425" tIns="45700" rIns="91425" bIns="45700" anchor="t" anchorCtr="0">
+            <a:noAutofit/>
+          </a:bodyPr>
+          <a:lstStyle/>
+          <a:p>
+            <a:pPr marL="0" marR="0" lvl="0" indent="0" algn="l" rtl="0">
+              <a:spcBef>
+                <a:spcPts val="0"/>
+              </a:spcBef>
+              <a:buSzPct val="25000"/>
+              <a:buNone/>
+            </a:pPr>
+            <a:r>
+              <a:rPr lang="en" sz="1800">
+                <a:solidFill>
+                  <a:srgbClr val="34AD91"/>
+                </a:solidFill>
+                <a:latin typeface="Avenir"/>
+                <a:ea typeface="Avenir"/>
+                <a:cs typeface="Avenir"/>
+                <a:sym typeface="Avenir"/>
+              </a:rPr>
+              <a:t>30</a:t>
+            </a:r>
+            <a:r>
+              <a:rPr lang="en" sz="1800">
+                <a:solidFill>
+                  <a:schemeClr val="dk1"/>
+                </a:solidFill>
+                <a:latin typeface="Avenir"/>
+                <a:ea typeface="Avenir"/>
+                <a:cs typeface="Avenir"/>
+                <a:sym typeface="Avenir"/>
+              </a:rPr>
+              <a:t> Flink applications </a:t>
+            </a:r>
+            <a:r>
+              <a:rPr lang="en" sz="1800">
+                <a:solidFill>
+                  <a:srgbClr val="34AD91"/>
+                </a:solidFill>
+                <a:latin typeface="Avenir"/>
+                <a:ea typeface="Avenir"/>
+                <a:cs typeface="Avenir"/>
+                <a:sym typeface="Avenir"/>
+              </a:rPr>
+              <a:t>in production for more than one year</a:t>
+            </a:r>
+            <a:r>
+              <a:rPr lang="en" sz="1800">
+                <a:solidFill>
+                  <a:schemeClr val="dk1"/>
+                </a:solidFill>
+                <a:latin typeface="Avenir"/>
+                <a:ea typeface="Avenir"/>
+                <a:cs typeface="Avenir"/>
+                <a:sym typeface="Avenir"/>
+              </a:rPr>
+              <a:t>. 10 billion events (2TB) processed daily</a:t>
+            </a:r>
+          </a:p>
+        </p:txBody>
+      </p:sp>
+      <p:sp>
+        <p:nvSpPr>
+          <p:cNvPr id="742" name="Shape 742"/>
+          <p:cNvSpPr txBox="1"/>
+          <p:nvPr/>
+        </p:nvSpPr>
+        <p:spPr>
+          <a:xfrm>
+            <a:off x="3175000" y="2853676"/>
+            <a:ext cx="5511900" cy="1231200"/>
+          </a:xfrm>
+          <a:prstGeom prst="rect">
+            <a:avLst/>
+          </a:prstGeom>
+          <a:noFill/>
+          <a:ln>
+            <a:noFill/>
+          </a:ln>
+        </p:spPr>
+        <p:txBody>
+          <a:bodyPr lIns="91425" tIns="45700" rIns="91425" bIns="45700" anchor="t" anchorCtr="0">
+            <a:noAutofit/>
+          </a:bodyPr>
+          <a:lstStyle/>
+          <a:p>
+            <a:pPr marL="0" marR="0" lvl="0" indent="0" algn="l" rtl="0">
+              <a:spcBef>
+                <a:spcPts val="0"/>
+              </a:spcBef>
+              <a:buSzPct val="25000"/>
+              <a:buNone/>
+            </a:pPr>
+            <a:r>
+              <a:rPr lang="en" sz="1800">
+                <a:solidFill>
+                  <a:schemeClr val="dk1"/>
+                </a:solidFill>
+                <a:latin typeface="Avenir"/>
+                <a:ea typeface="Avenir"/>
+                <a:cs typeface="Avenir"/>
+                <a:sym typeface="Avenir"/>
+              </a:rPr>
+              <a:t>Complex jobs of </a:t>
+            </a:r>
+            <a:r>
+              <a:rPr lang="en" sz="1800">
+                <a:solidFill>
+                  <a:srgbClr val="34AD91"/>
+                </a:solidFill>
+                <a:latin typeface="Avenir"/>
+                <a:ea typeface="Avenir"/>
+                <a:cs typeface="Avenir"/>
+                <a:sym typeface="Avenir"/>
+              </a:rPr>
+              <a:t>&gt; 30 operators</a:t>
+            </a:r>
+            <a:r>
+              <a:rPr lang="en" sz="1800">
+                <a:solidFill>
+                  <a:schemeClr val="dk1"/>
+                </a:solidFill>
+                <a:latin typeface="Avenir"/>
+                <a:ea typeface="Avenir"/>
+                <a:cs typeface="Avenir"/>
+                <a:sym typeface="Avenir"/>
+              </a:rPr>
+              <a:t> running 24/7, processing 30 billion events daily, maintaining </a:t>
+            </a:r>
+            <a:r>
+              <a:rPr lang="en" sz="1800">
+                <a:solidFill>
+                  <a:srgbClr val="34AD91"/>
+                </a:solidFill>
+                <a:latin typeface="Avenir"/>
+                <a:ea typeface="Avenir"/>
+                <a:cs typeface="Avenir"/>
+                <a:sym typeface="Avenir"/>
+              </a:rPr>
+              <a:t>state of 100s of GB with exactly-once guarantees</a:t>
+            </a:r>
+          </a:p>
+        </p:txBody>
+      </p:sp>
+      <p:sp>
+        <p:nvSpPr>
+          <p:cNvPr id="743" name="Shape 743"/>
+          <p:cNvSpPr txBox="1"/>
+          <p:nvPr/>
+        </p:nvSpPr>
+        <p:spPr>
+          <a:xfrm>
+            <a:off x="3175000" y="1150653"/>
+            <a:ext cx="5511900" cy="1231200"/>
+          </a:xfrm>
+          <a:prstGeom prst="rect">
+            <a:avLst/>
+          </a:prstGeom>
+          <a:noFill/>
+          <a:ln>
+            <a:noFill/>
+          </a:ln>
+        </p:spPr>
+        <p:txBody>
+          <a:bodyPr lIns="91425" tIns="45700" rIns="91425" bIns="45700" anchor="t" anchorCtr="0">
+            <a:noAutofit/>
+          </a:bodyPr>
+          <a:lstStyle/>
+          <a:p>
+            <a:pPr marL="0" marR="0" lvl="0" indent="0" algn="l" rtl="0">
+              <a:spcBef>
+                <a:spcPts val="0"/>
+              </a:spcBef>
+              <a:buSzPct val="25000"/>
+              <a:buNone/>
+            </a:pPr>
+            <a:r>
+              <a:rPr lang="en" sz="1800">
+                <a:solidFill>
+                  <a:schemeClr val="dk1"/>
+                </a:solidFill>
+                <a:latin typeface="Avenir"/>
+                <a:ea typeface="Avenir"/>
+                <a:cs typeface="Avenir"/>
+                <a:sym typeface="Avenir"/>
+              </a:rPr>
+              <a:t>Largest job has &gt; 20 operators, runs on &gt; </a:t>
+            </a:r>
+            <a:r>
+              <a:rPr lang="en" sz="1800">
+                <a:solidFill>
+                  <a:srgbClr val="34AD91"/>
+                </a:solidFill>
+                <a:latin typeface="Avenir"/>
+                <a:ea typeface="Avenir"/>
+                <a:cs typeface="Avenir"/>
+                <a:sym typeface="Avenir"/>
+              </a:rPr>
+              <a:t>5000 vCores in 1000-node cluster</a:t>
+            </a:r>
+            <a:r>
+              <a:rPr lang="en" sz="1800">
+                <a:solidFill>
+                  <a:schemeClr val="dk1"/>
+                </a:solidFill>
+                <a:latin typeface="Avenir"/>
+                <a:ea typeface="Avenir"/>
+                <a:cs typeface="Avenir"/>
+                <a:sym typeface="Avenir"/>
+              </a:rPr>
+              <a:t>, processes millions of events per second</a:t>
+            </a:r>
+          </a:p>
+        </p:txBody>
+      </p:sp>
+      <p:sp>
+        <p:nvSpPr>
+          <p:cNvPr id="744" name="Shape 744"/>
+          <p:cNvSpPr txBox="1">
+            <a:spLocks noGrp="1"/>
+          </p:cNvSpPr>
+          <p:nvPr>
+            <p:ph type="sldNum" idx="12"/>
+          </p:nvPr>
+        </p:nvSpPr>
+        <p:spPr>
+          <a:xfrm>
+            <a:off x="6553200" y="6356352"/>
+            <a:ext cx="2133600" cy="365100"/>
+          </a:xfrm>
+          <a:prstGeom prst="rect">
+            <a:avLst/>
+          </a:prstGeom>
+          <a:noFill/>
+          <a:ln>
+            <a:noFill/>
+          </a:ln>
+        </p:spPr>
+        <p:txBody>
+          <a:bodyPr lIns="91425" tIns="45700" rIns="91425" bIns="45700" anchor="ctr" anchorCtr="0">
+            <a:noAutofit/>
+          </a:bodyPr>
+          <a:lstStyle/>
+          <a:p>
+            <a:pPr marL="0" marR="0" lvl="0" indent="0" algn="r" rtl="0">
+              <a:spcBef>
+                <a:spcPts val="0"/>
+              </a:spcBef>
+              <a:buSzPct val="25000"/>
+              <a:buNone/>
+            </a:pPr>
+            <a:fld id="{00000000-1234-1234-1234-123412341234}" type="slidenum">
+              <a:rPr lang="en" sz="1200">
+                <a:solidFill>
+                  <a:srgbClr val="888888"/>
+                </a:solidFill>
+                <a:latin typeface="Avenir"/>
+                <a:ea typeface="Avenir"/>
+                <a:cs typeface="Avenir"/>
+                <a:sym typeface="Avenir"/>
+              </a:rPr>
+              <a:t>30</a:t>
+            </a:fld>
+            <a:endParaRPr lang="en" sz="1200">
+              <a:solidFill>
+                <a:srgbClr val="888888"/>
+              </a:solidFill>
+              <a:latin typeface="Avenir"/>
+              <a:ea typeface="Avenir"/>
+              <a:cs typeface="Avenir"/>
+              <a:sym typeface="Avenir"/>
+            </a:endParaRPr>
+          </a:p>
+        </p:txBody>
+      </p:sp>
+    </p:spTree>
+  </p:cSld>
+  <p:clrMapOvr>
+    <a:masterClrMapping/>
+  </p:clrMapOvr>
+  <p:timing>
+    <p:tnLst>
+      <p:par>
+        <p:cTn id="1" dur="indefinite" restart="never" nodeType="tmRoot"/>
+      </p:par>
+    </p:tnLst>
+  </p:timing>
+</p:sld>
+</file>
+
+<file path=ppt/slides/slide31.xml><?xml version="1.0" encoding="utf-8"?>
+<p:sld xmlns:a="http://schemas.openxmlformats.org/drawingml/2006/main" xmlns:r="http://schemas.openxmlformats.org/officeDocument/2006/relationships" xmlns:p="http://schemas.openxmlformats.org/presentationml/2006/main">
+  <p:cSld>
+    <p:spTree>
+      <p:nvGrpSpPr>
+        <p:cNvPr id="1" name=""/>
+        <p:cNvGrpSpPr/>
+        <p:nvPr/>
+      </p:nvGrpSpPr>
+      <p:grpSpPr>
+        <a:xfrm>
+          <a:off x="0" y="0"/>
+          <a:ext cx="0" cy="0"/>
+          <a:chOff x="0" y="0"/>
+          <a:chExt cx="0" cy="0"/>
+        </a:xfrm>
+      </p:grpSpPr>
+      <p:sp>
+        <p:nvSpPr>
+          <p:cNvPr id="2" name="TextBox 1"/>
+          <p:cNvSpPr txBox="1"/>
+          <p:nvPr/>
+        </p:nvSpPr>
+        <p:spPr>
+          <a:xfrm>
+            <a:off x="408439" y="2728890"/>
+            <a:ext cx="8473669" cy="646331"/>
+          </a:xfrm>
+          <a:prstGeom prst="rect">
+            <a:avLst/>
+          </a:prstGeom>
+          <a:noFill/>
+        </p:spPr>
+        <p:txBody>
+          <a:bodyPr wrap="none" rtlCol="0">
+            <a:spAutoFit/>
+          </a:bodyPr>
+          <a:lstStyle/>
+          <a:p>
+            <a:r>
+              <a:rPr lang="de-DE" sz="3600" dirty="0"/>
+              <a:t>http://</a:t>
+            </a:r>
+            <a:r>
+              <a:rPr lang="de-DE" sz="3600" dirty="0" err="1"/>
+              <a:t>dataartisans.github.io</a:t>
+            </a:r>
+            <a:r>
+              <a:rPr lang="de-DE" sz="3600" dirty="0"/>
+              <a:t>/flink-training/</a:t>
+            </a:r>
+            <a:endParaRPr lang="en-US" sz="3600" dirty="0"/>
+          </a:p>
+        </p:txBody>
+      </p:sp>
+    </p:spTree>
+    <p:extLst>
+      <p:ext uri="{BB962C8B-B14F-4D97-AF65-F5344CB8AC3E}">
+        <p14:creationId xmlns:p14="http://schemas.microsoft.com/office/powerpoint/2010/main" val="1389095644"/>
+      </p:ext>
+    </p:extLst>
+  </p:cSld>
+  <p:clrMapOvr>
+    <a:masterClrMapping/>
+  </p:clrMapOvr>
+  <p:timing>
+    <p:tnLst>
+      <p:par>
+        <p:cTn id="1" dur="indefinite" restart="never" nodeType="tmRoot"/>
+      </p:par>
+    </p:tnLst>
+  </p:timing>
 </p:sld>
 </file>
 
 <file path=ppt/slides/slide4.xml><?xml version="1.0" encoding="utf-8"?>
+<p:sld xmlns:a="http://schemas.openxmlformats.org/drawingml/2006/main" xmlns:r="http://schemas.openxmlformats.org/officeDocument/2006/relationships" xmlns:p="http://schemas.openxmlformats.org/presentationml/2006/main">
+  <p:cSld>
+    <p:spTree>
+      <p:nvGrpSpPr>
+        <p:cNvPr id="1" name=""/>
+        <p:cNvGrpSpPr/>
+        <p:nvPr/>
+      </p:nvGrpSpPr>
+      <p:grpSpPr>
+        <a:xfrm>
+          <a:off x="0" y="0"/>
+          <a:ext cx="0" cy="0"/>
+          <a:chOff x="0" y="0"/>
+          <a:chExt cx="0" cy="0"/>
+        </a:xfrm>
+      </p:grpSpPr>
+      <p:sp>
+        <p:nvSpPr>
+          <p:cNvPr id="2" name="Title 1"/>
+          <p:cNvSpPr>
+            <a:spLocks noGrp="1"/>
+          </p:cNvSpPr>
+          <p:nvPr>
+            <p:ph type="title"/>
+          </p:nvPr>
+        </p:nvSpPr>
+        <p:spPr/>
+        <p:txBody>
+          <a:bodyPr/>
+          <a:lstStyle/>
+          <a:p>
+            <a:r>
+              <a:rPr lang="en-US" dirty="0" smtClean="0"/>
+              <a:t>What is Stream Processing?</a:t>
+            </a:r>
+            <a:endParaRPr lang="en-US" dirty="0"/>
+          </a:p>
+        </p:txBody>
+      </p:sp>
+      <p:sp>
+        <p:nvSpPr>
+          <p:cNvPr id="3" name="Text Placeholder 2"/>
+          <p:cNvSpPr>
+            <a:spLocks noGrp="1"/>
+          </p:cNvSpPr>
+          <p:nvPr>
+            <p:ph type="body" idx="1"/>
+          </p:nvPr>
+        </p:nvSpPr>
+        <p:spPr/>
+        <p:txBody>
+          <a:bodyPr/>
+          <a:lstStyle/>
+          <a:p>
+            <a:r>
+              <a:rPr lang="en-US" sz="2800" dirty="0" smtClean="0"/>
+              <a:t> Today, most data is continuously produced</a:t>
+            </a:r>
+          </a:p>
+          <a:p>
+            <a:pPr lvl="1"/>
+            <a:r>
+              <a:rPr lang="en-US" sz="2400" dirty="0"/>
+              <a:t> </a:t>
+            </a:r>
+            <a:r>
+              <a:rPr lang="en-US" sz="2400" dirty="0" smtClean="0"/>
+              <a:t>web logs, sensors, database transactions, </a:t>
+            </a:r>
+            <a:r>
+              <a:rPr lang="mr-IN" sz="2400" dirty="0" smtClean="0"/>
+              <a:t>…</a:t>
+            </a:r>
+            <a:endParaRPr lang="en-US" sz="2400" dirty="0" smtClean="0"/>
+          </a:p>
+          <a:p>
+            <a:pPr lvl="1"/>
+            <a:endParaRPr lang="en-US" sz="2400" dirty="0" smtClean="0"/>
+          </a:p>
+          <a:p>
+            <a:r>
+              <a:rPr lang="en-US" sz="2800" dirty="0"/>
+              <a:t> </a:t>
+            </a:r>
+            <a:r>
+              <a:rPr lang="en-US" sz="2800" dirty="0" smtClean="0"/>
+              <a:t>The common approach so far</a:t>
+            </a:r>
+          </a:p>
+          <a:p>
+            <a:pPr lvl="1"/>
+            <a:r>
+              <a:rPr lang="en-US" sz="2400" dirty="0"/>
+              <a:t> </a:t>
+            </a:r>
+            <a:r>
+              <a:rPr lang="en-US" sz="2400" dirty="0" smtClean="0"/>
+              <a:t>Record stream to stable storage (DBMS, HDFS, </a:t>
+            </a:r>
+            <a:r>
+              <a:rPr lang="mr-IN" sz="2400" dirty="0" smtClean="0"/>
+              <a:t>…</a:t>
+            </a:r>
+            <a:r>
+              <a:rPr lang="en-US" sz="2400" dirty="0" smtClean="0"/>
+              <a:t>)</a:t>
+            </a:r>
+          </a:p>
+          <a:p>
+            <a:pPr lvl="1"/>
+            <a:r>
+              <a:rPr lang="en-US" sz="2400" dirty="0"/>
+              <a:t> </a:t>
+            </a:r>
+            <a:r>
+              <a:rPr lang="en-US" sz="2400" dirty="0" smtClean="0"/>
+              <a:t>Analyze data </a:t>
+            </a:r>
+            <a:r>
+              <a:rPr lang="pl-PL" sz="2400" dirty="0" err="1" smtClean="0"/>
+              <a:t>wi</a:t>
+            </a:r>
+            <a:r>
+              <a:rPr lang="en-US" sz="2400" dirty="0" err="1" smtClean="0"/>
+              <a:t>th</a:t>
+            </a:r>
+            <a:r>
+              <a:rPr lang="en-US" sz="2400" dirty="0"/>
+              <a:t> </a:t>
+            </a:r>
+            <a:r>
+              <a:rPr lang="en-US" sz="2400" dirty="0" smtClean="0"/>
+              <a:t>periodic batch jobs</a:t>
+            </a:r>
+          </a:p>
+          <a:p>
+            <a:pPr lvl="1"/>
+            <a:endParaRPr lang="en-US" sz="2400" dirty="0" smtClean="0"/>
+          </a:p>
+          <a:p>
+            <a:r>
+              <a:rPr lang="en-US" sz="2800" dirty="0"/>
+              <a:t> </a:t>
+            </a:r>
+            <a:r>
+              <a:rPr lang="en-US" sz="2800" dirty="0" smtClean="0"/>
+              <a:t>Stream processors analyze data as it arrives</a:t>
+            </a:r>
+            <a:endParaRPr lang="en-US" sz="2800" dirty="0"/>
+          </a:p>
+        </p:txBody>
+      </p:sp>
+    </p:spTree>
+    <p:extLst>
+      <p:ext uri="{BB962C8B-B14F-4D97-AF65-F5344CB8AC3E}">
+        <p14:creationId xmlns:p14="http://schemas.microsoft.com/office/powerpoint/2010/main" val="1329682525"/>
+      </p:ext>
+    </p:extLst>
+  </p:cSld>
+  <p:clrMapOvr>
+    <a:masterClrMapping/>
+  </p:clrMapOvr>
+  <p:timing>
+    <p:tnLst>
+      <p:par>
+        <p:cTn id="1" dur="indefinite" restart="never" nodeType="tmRoot"/>
+      </p:par>
+    </p:tnLst>
+  </p:timing>
+</p:sld>
+</file>
+
+<file path=ppt/slides/slide5.xml><?xml version="1.0" encoding="utf-8"?>
 <p:sld xmlns:a="http://schemas.openxmlformats.org/drawingml/2006/main" xmlns:r="http://schemas.openxmlformats.org/officeDocument/2006/relationships" xmlns:p="http://schemas.openxmlformats.org/presentationml/2006/main">
   <p:cSld>
     <p:spTree>
@@ -49589,19 +50215,7 @@
               <a:buNone/>
             </a:pPr>
             <a:r>
-              <a:rPr lang="en" sz="3959" b="0" i="0" u="none" strike="noStrike" cap="none">
-                <a:solidFill>
-                  <a:schemeClr val="dk1"/>
-                </a:solidFill>
-                <a:latin typeface="Arial"/>
-                <a:ea typeface="Arial"/>
-                <a:cs typeface="Arial"/>
-                <a:sym typeface="Arial"/>
-              </a:rPr>
-              <a:t>(</a:t>
-            </a:r>
-            <a:r>
-              <a:rPr lang="en" sz="3959" b="0">
+              <a:rPr lang="en" sz="3959" b="0" dirty="0" smtClean="0">
                 <a:latin typeface="Arial"/>
                 <a:ea typeface="Arial"/>
                 <a:cs typeface="Arial"/>
@@ -49610,7 +50224,7 @@
               <a:t>D</a:t>
             </a:r>
             <a:r>
-              <a:rPr lang="en" sz="3959" b="0" i="0" u="none" strike="noStrike" cap="none">
+              <a:rPr lang="en" sz="3959" b="0" i="0" u="none" strike="noStrike" cap="none" dirty="0" smtClean="0">
                 <a:solidFill>
                   <a:schemeClr val="dk1"/>
                 </a:solidFill>
@@ -49619,7 +50233,19 @@
                 <a:cs typeface="Arial"/>
                 <a:sym typeface="Arial"/>
               </a:rPr>
-              <a:t>istributed) streaming</a:t>
+              <a:t>istributed </a:t>
+            </a:r>
+            <a:r>
+              <a:rPr lang="en" sz="3959" b="0" i="0" u="none" strike="noStrike" cap="none" dirty="0">
+                <a:solidFill>
+                  <a:schemeClr val="dk1"/>
+                </a:solidFill>
+                <a:latin typeface="Arial"/>
+                <a:ea typeface="Arial"/>
+                <a:cs typeface="Arial"/>
+                <a:sym typeface="Arial"/>
+              </a:rPr>
+              <a:t>streaming</a:t>
             </a:r>
           </a:p>
         </p:txBody>
@@ -49668,7 +50294,7 @@
               <a:buChar char="▪"/>
             </a:pPr>
             <a:r>
-              <a:rPr lang="en" sz="2800" b="0" i="0" u="none" strike="noStrike" cap="none">
+              <a:rPr lang="en" sz="2400" b="0" i="0" u="none" strike="noStrike" cap="none" dirty="0">
                 <a:solidFill>
                   <a:schemeClr val="dk1"/>
                 </a:solidFill>
@@ -49677,8 +50303,29 @@
                 <a:cs typeface="Arial"/>
                 <a:sym typeface="Arial"/>
               </a:rPr>
-              <a:t>Computations on never-ending “streams” of data records (“events”)</a:t>
+              <a:t>Computations on never-ending “streams” of data records (“events</a:t>
             </a:r>
+            <a:r>
+              <a:rPr lang="en" sz="2400" b="0" i="0" u="none" strike="noStrike" cap="none" dirty="0" smtClean="0">
+                <a:solidFill>
+                  <a:schemeClr val="dk1"/>
+                </a:solidFill>
+                <a:latin typeface="Arial"/>
+                <a:ea typeface="Arial"/>
+                <a:cs typeface="Arial"/>
+                <a:sym typeface="Arial"/>
+              </a:rPr>
+              <a:t>”)</a:t>
+            </a:r>
+            <a:endParaRPr lang="en-US" sz="2400" b="0" i="0" u="none" strike="noStrike" cap="none" dirty="0" smtClean="0">
+              <a:solidFill>
+                <a:schemeClr val="dk1"/>
+              </a:solidFill>
+              <a:latin typeface="Arial"/>
+              <a:ea typeface="Arial"/>
+              <a:cs typeface="Arial"/>
+              <a:sym typeface="Arial"/>
+            </a:endParaRPr>
           </a:p>
           <a:p>
             <a:pPr marL="3886200" marR="0" lvl="8" indent="-228600" algn="l" rtl="0">
@@ -49695,7 +50342,7 @@
               <a:buFont typeface="Arial"/>
               <a:buNone/>
             </a:pPr>
-            <a:endParaRPr sz="1800" b="0" i="0" u="none" strike="noStrike" cap="none">
+            <a:endParaRPr sz="1600" b="0" i="0" u="none" strike="noStrike" cap="none" dirty="0">
               <a:solidFill>
                 <a:schemeClr val="dk1"/>
               </a:solidFill>
@@ -49718,7 +50365,7 @@
               <a:buChar char="▪"/>
             </a:pPr>
             <a:r>
-              <a:rPr lang="en" sz="2800" b="0" i="0" u="none" strike="noStrike" cap="none">
+              <a:rPr lang="en" sz="2400" b="0" i="0" u="none" strike="noStrike" cap="none" dirty="0">
                 <a:solidFill>
                   <a:schemeClr val="dk1"/>
                 </a:solidFill>
@@ -49727,8 +50374,93 @@
                 <a:cs typeface="Arial"/>
                 <a:sym typeface="Arial"/>
               </a:rPr>
-              <a:t>A stream processor distributes the computation in a cluster</a:t>
+              <a:t>A stream processor distributes the computation in a </a:t>
             </a:r>
+            <a:r>
+              <a:rPr lang="en" sz="2400" b="0" i="0" u="none" strike="noStrike" cap="none" dirty="0" smtClean="0">
+                <a:solidFill>
+                  <a:schemeClr val="dk1"/>
+                </a:solidFill>
+                <a:latin typeface="Arial"/>
+                <a:ea typeface="Arial"/>
+                <a:cs typeface="Arial"/>
+                <a:sym typeface="Arial"/>
+              </a:rPr>
+              <a:t>cluster</a:t>
+            </a:r>
+            <a:endParaRPr lang="en-US" sz="2400" b="0" i="0" u="none" strike="noStrike" cap="none" dirty="0" smtClean="0">
+              <a:solidFill>
+                <a:schemeClr val="dk1"/>
+              </a:solidFill>
+              <a:latin typeface="Arial"/>
+              <a:ea typeface="Arial"/>
+              <a:cs typeface="Arial"/>
+              <a:sym typeface="Arial"/>
+            </a:endParaRPr>
+          </a:p>
+          <a:p>
+            <a:pPr marL="342900" marR="0" lvl="0" indent="-342900" algn="l" rtl="0">
+              <a:spcBef>
+                <a:spcPts val="560"/>
+              </a:spcBef>
+              <a:buClr>
+                <a:srgbClr val="34AD91"/>
+              </a:buClr>
+              <a:buSzPct val="100000"/>
+              <a:buFont typeface="Arial"/>
+              <a:buChar char="▪"/>
+            </a:pPr>
+            <a:endParaRPr lang="en-US" sz="2400" dirty="0">
+              <a:latin typeface="Arial"/>
+              <a:ea typeface="Arial"/>
+              <a:cs typeface="Arial"/>
+              <a:sym typeface="Arial"/>
+            </a:endParaRPr>
+          </a:p>
+          <a:p>
+            <a:pPr indent="-342900">
+              <a:spcBef>
+                <a:spcPts val="560"/>
+              </a:spcBef>
+              <a:buFont typeface="Arial"/>
+              <a:buChar char="▪"/>
+            </a:pPr>
+            <a:r>
+              <a:rPr lang="en-US" sz="2400" dirty="0">
+                <a:latin typeface="Arial"/>
+                <a:ea typeface="Arial"/>
+                <a:cs typeface="Arial"/>
+                <a:sym typeface="Arial"/>
+              </a:rPr>
+              <a:t>Low latency, high throughput</a:t>
+            </a:r>
+            <a:endParaRPr lang="en" sz="2400" dirty="0">
+              <a:latin typeface="Arial"/>
+              <a:ea typeface="Arial"/>
+              <a:cs typeface="Arial"/>
+              <a:sym typeface="Arial"/>
+            </a:endParaRPr>
+          </a:p>
+          <a:p>
+            <a:pPr marL="0" marR="0" lvl="0" indent="0" algn="l" rtl="0">
+              <a:spcBef>
+                <a:spcPts val="560"/>
+              </a:spcBef>
+              <a:buClr>
+                <a:srgbClr val="34AD91"/>
+              </a:buClr>
+              <a:buSzPct val="100000"/>
+              <a:buNone/>
+            </a:pPr>
+            <a:endParaRPr lang="en" sz="2400" b="0" i="0" u="none" strike="noStrike" cap="none" dirty="0">
+              <a:solidFill>
+                <a:schemeClr val="dk1"/>
+              </a:solidFill>
+              <a:latin typeface="Arial"/>
+              <a:ea typeface="Arial"/>
+              <a:cs typeface="Arial"/>
+              <a:sym typeface="Arial"/>
+            </a:endParaRPr>
           </a:p>
         </p:txBody>
       </p:sp>
@@ -49778,7 +50510,7 @@
                 <a:cs typeface="Avenir"/>
                 <a:sym typeface="Avenir"/>
               </a:rPr>
-              <a:t>4</a:t>
+              <a:t>5</a:t>
             </a:fld>
             <a:endParaRPr lang="en" sz="1200" b="0" i="0" u="none" strike="noStrike" cap="none">
               <a:solidFill>
@@ -51457,10 +52189,17 @@
   <p:clrMapOvr>
     <a:masterClrMapping/>
   </p:clrMapOvr>
+  <p:timing>
+    <p:tnLst>
+      <p:par>
+        <p:cTn id="1" dur="indefinite" restart="never" nodeType="tmRoot"/>
+      </p:par>
+    </p:tnLst>
+  </p:timing>
 </p:sld>
 </file>
 
-<file path=ppt/slides/slide5.xml><?xml version="1.0" encoding="utf-8"?>
+<file path=ppt/slides/slide6.xml><?xml version="1.0" encoding="utf-8"?>
 <p:sld xmlns:a="http://schemas.openxmlformats.org/drawingml/2006/main" xmlns:r="http://schemas.openxmlformats.org/officeDocument/2006/relationships" xmlns:p="http://schemas.openxmlformats.org/presentationml/2006/main">
   <p:cSld>
     <p:spTree>
@@ -51553,8 +52292,8 @@
         </p:nvSpPr>
         <p:spPr>
           <a:xfrm>
-            <a:off x="3163140" y="3010112"/>
-            <a:ext cx="5773610" cy="3586164"/>
+            <a:off x="3897586" y="2785241"/>
+            <a:ext cx="5039164" cy="3811035"/>
           </a:xfrm>
           <a:prstGeom prst="rect">
             <a:avLst/>
@@ -51585,7 +52324,7 @@
               <a:buChar char="▪"/>
             </a:pPr>
             <a:r>
-              <a:rPr lang="en" sz="2420" b="0" i="0" u="none" strike="noStrike" cap="none" dirty="0">
+              <a:rPr lang="en" sz="2000" b="0" i="0" u="none" strike="noStrike" cap="none" dirty="0">
                 <a:solidFill>
                   <a:schemeClr val="dk1"/>
                 </a:solidFill>
@@ -51597,7 +52336,7 @@
               <a:t>Computation </a:t>
             </a:r>
             <a:r>
-              <a:rPr lang="en" sz="2420" b="0" i="1" u="none" strike="noStrike" cap="none" dirty="0">
+              <a:rPr lang="en" sz="2000" b="0" i="1" u="none" strike="noStrike" cap="none" dirty="0">
                 <a:solidFill>
                   <a:schemeClr val="dk1"/>
                 </a:solidFill>
@@ -51609,7 +52348,7 @@
               <a:t>and</a:t>
             </a:r>
             <a:r>
-              <a:rPr lang="en" sz="2420" b="0" i="0" u="none" strike="noStrike" cap="none" dirty="0">
+              <a:rPr lang="en" sz="2000" b="0" i="0" u="none" strike="noStrike" cap="none" dirty="0">
                 <a:solidFill>
                   <a:schemeClr val="dk1"/>
                 </a:solidFill>
@@ -51637,7 +52376,7 @@
               <a:buChar char="•"/>
             </a:pPr>
             <a:r>
-              <a:rPr lang="en" sz="2070" b="0" i="0" u="none" strike="noStrike" cap="none" dirty="0">
+              <a:rPr lang="en" sz="1800" b="0" i="0" u="none" strike="noStrike" cap="none" dirty="0">
                 <a:solidFill>
                   <a:schemeClr val="dk1"/>
                 </a:solidFill>
@@ -51646,25 +52385,79 @@
                 <a:cs typeface="Arial"/>
                 <a:sym typeface="Arial"/>
               </a:rPr>
-              <a:t>E.g., counters, windows of past events, state machines, trained ML models</a:t>
+              <a:t>E.g., counters, windows of past events, state machines, trained ML </a:t>
             </a:r>
+            <a:r>
+              <a:rPr lang="en" sz="1800" b="0" i="0" u="none" strike="noStrike" cap="none" dirty="0" smtClean="0">
+                <a:solidFill>
+                  <a:schemeClr val="dk1"/>
+                </a:solidFill>
+                <a:latin typeface="Arial"/>
+                <a:ea typeface="Arial"/>
+                <a:cs typeface="Arial"/>
+                <a:sym typeface="Arial"/>
+              </a:rPr>
+              <a:t>models</a:t>
+            </a:r>
+            <a:endParaRPr lang="en-US" sz="1800" dirty="0">
+              <a:latin typeface="Arial"/>
+              <a:ea typeface="Arial"/>
+              <a:cs typeface="Arial"/>
+              <a:sym typeface="Arial"/>
+            </a:endParaRPr>
           </a:p>
           <a:p>
-            <a:pPr marL="2971800" marR="0" lvl="6" indent="-228600" algn="l" rtl="0">
-              <a:spcBef>
-                <a:spcPts val="280"/>
+            <a:pPr marL="742950" marR="0" lvl="1" indent="-279400" algn="l" rtl="0">
+              <a:spcBef>
+                <a:spcPts val="434"/>
               </a:spcBef>
               <a:spcAft>
                 <a:spcPts val="0"/>
               </a:spcAft>
               <a:buClr>
-                <a:schemeClr val="dk1"/>
+                <a:srgbClr val="34AD91"/>
               </a:buClr>
-              <a:buSzPct val="107692"/>
+              <a:buSzPct val="98571"/>
               <a:buFont typeface="Arial"/>
-              <a:buNone/>
+              <a:buChar char="•"/>
             </a:pPr>
-            <a:endParaRPr sz="1300" b="0" i="0" u="none" strike="noStrike" cap="none" dirty="0">
+            <a:r>
+              <a:rPr lang="en" sz="1800" b="0" i="0" u="none" strike="noStrike" cap="none" dirty="0" smtClean="0">
+                <a:solidFill>
+                  <a:schemeClr val="dk1"/>
+                </a:solidFill>
+                <a:latin typeface="Arial"/>
+                <a:ea typeface="Arial"/>
+                <a:cs typeface="Arial"/>
+                <a:sym typeface="Arial"/>
+              </a:rPr>
+              <a:t>Results </a:t>
+            </a:r>
+            <a:r>
+              <a:rPr lang="en" sz="1800" b="0" i="0" u="none" strike="noStrike" cap="none" dirty="0">
+                <a:solidFill>
+                  <a:schemeClr val="dk1"/>
+                </a:solidFill>
+                <a:latin typeface="Arial"/>
+                <a:ea typeface="Arial"/>
+                <a:cs typeface="Arial"/>
+                <a:sym typeface="Arial"/>
+              </a:rPr>
+              <a:t>depend on history of </a:t>
+            </a:r>
+            <a:r>
+              <a:rPr lang="en" sz="1800" b="0" i="0" u="none" strike="noStrike" cap="none" dirty="0" smtClean="0">
+                <a:solidFill>
+                  <a:schemeClr val="dk1"/>
+                </a:solidFill>
+                <a:latin typeface="Arial"/>
+                <a:ea typeface="Arial"/>
+                <a:cs typeface="Arial"/>
+                <a:sym typeface="Arial"/>
+              </a:rPr>
+              <a:t>stream</a:t>
+            </a:r>
+            <a:endParaRPr lang="en-US" sz="1800" b="0" i="0" u="none" strike="noStrike" cap="none" dirty="0" smtClean="0">
               <a:solidFill>
                 <a:schemeClr val="dk1"/>
               </a:solidFill>
@@ -51689,35 +52482,7 @@
               <a:buFont typeface="Arial"/>
               <a:buChar char="▪"/>
             </a:pPr>
-            <a:r>
-              <a:rPr lang="en" sz="2420" b="0" i="0" u="none" strike="noStrike" cap="none" dirty="0">
-                <a:solidFill>
-                  <a:schemeClr val="dk1"/>
-                </a:solidFill>
-                <a:latin typeface="Arial"/>
-                <a:ea typeface="Arial"/>
-                <a:cs typeface="Arial"/>
-                <a:sym typeface="Arial"/>
-              </a:rPr>
-              <a:t>Results depend on history of stream</a:t>
-            </a:r>
-          </a:p>
-          <a:p>
-            <a:pPr marL="2514600" marR="0" lvl="5" indent="-228600" algn="l" rtl="0">
-              <a:spcBef>
-                <a:spcPts val="280"/>
-              </a:spcBef>
-              <a:spcAft>
-                <a:spcPts val="0"/>
-              </a:spcAft>
-              <a:buClr>
-                <a:schemeClr val="dk1"/>
-              </a:buClr>
-              <a:buSzPct val="107692"/>
-              <a:buFont typeface="Arial"/>
-              <a:buNone/>
-            </a:pPr>
-            <a:endParaRPr sz="1300" b="0" i="0" u="none" strike="noStrike" cap="none" dirty="0">
+            <a:endParaRPr lang="en-US" sz="2000" b="0" i="0" u="none" strike="noStrike" cap="none" dirty="0" smtClean="0">
               <a:solidFill>
                 <a:schemeClr val="dk1"/>
               </a:solidFill>
@@ -51743,7 +52508,51 @@
               <a:buChar char="▪"/>
             </a:pPr>
             <a:r>
-              <a:rPr lang="en" sz="2420" b="0" i="0" u="none" strike="noStrike" cap="none" dirty="0">
+              <a:rPr lang="en-US" sz="2000" dirty="0" smtClean="0">
+                <a:latin typeface="Arial"/>
+                <a:ea typeface="Arial"/>
+                <a:cs typeface="Arial"/>
+                <a:sym typeface="Arial"/>
+              </a:rPr>
+              <a:t>Fault-tolerant, with exactly-once consistency</a:t>
+            </a:r>
+          </a:p>
+          <a:p>
+            <a:pPr lvl="1" indent="-336550">
+              <a:spcBef>
+                <a:spcPts val="504"/>
+              </a:spcBef>
+              <a:buSzPct val="100833"/>
+              <a:buFont typeface="Arial"/>
+              <a:buChar char="▪"/>
+            </a:pPr>
+            <a:endParaRPr sz="1100" b="0" i="0" u="none" strike="noStrike" cap="none" dirty="0">
+              <a:solidFill>
+                <a:schemeClr val="dk1"/>
+              </a:solidFill>
+              <a:latin typeface="Arial"/>
+              <a:ea typeface="Arial"/>
+              <a:cs typeface="Arial"/>
+              <a:sym typeface="Arial"/>
+            </a:endParaRPr>
+          </a:p>
+          <a:p>
+            <a:pPr marL="342900" marR="0" lvl="0" indent="-336550" algn="l" rtl="0">
+              <a:spcBef>
+                <a:spcPts val="504"/>
+              </a:spcBef>
+              <a:spcAft>
+                <a:spcPts val="0"/>
+              </a:spcAft>
+              <a:buClr>
+                <a:srgbClr val="34AD91"/>
+              </a:buClr>
+              <a:buSzPct val="100833"/>
+              <a:buFont typeface="Arial"/>
+              <a:buChar char="▪"/>
+            </a:pPr>
+            <a:r>
+              <a:rPr lang="en" sz="2000" b="0" i="0" u="none" strike="noStrike" cap="none" dirty="0">
                 <a:solidFill>
                   <a:schemeClr val="dk1"/>
                 </a:solidFill>
@@ -51755,7 +52564,7 @@
               <a:t>A stateful stream processor </a:t>
             </a:r>
             <a:r>
-              <a:rPr lang="en" sz="2420" dirty="0">
+              <a:rPr lang="en" sz="2000" dirty="0">
                 <a:latin typeface="Arial"/>
                 <a:ea typeface="Arial"/>
                 <a:cs typeface="Arial"/>
@@ -51764,7 +52573,7 @@
               <a:t>provides</a:t>
             </a:r>
             <a:r>
-              <a:rPr lang="en" sz="2420" b="0" i="0" u="none" strike="noStrike" cap="none" dirty="0">
+              <a:rPr lang="en" sz="2000" b="0" i="0" u="none" strike="noStrike" cap="none" dirty="0">
                 <a:solidFill>
                   <a:schemeClr val="dk1"/>
                 </a:solidFill>
@@ -51789,7 +52598,7 @@
               <a:buChar char="•"/>
             </a:pPr>
             <a:r>
-              <a:rPr lang="en" sz="2070" b="0" i="0" u="none" strike="noStrike" cap="none" dirty="0">
+              <a:rPr lang="en" sz="1800" b="0" i="0" u="none" strike="noStrike" cap="none" dirty="0">
                 <a:solidFill>
                   <a:schemeClr val="dk1"/>
                 </a:solidFill>
@@ -51798,8 +52607,26 @@
                 <a:cs typeface="Arial"/>
                 <a:sym typeface="Arial"/>
               </a:rPr>
-              <a:t>Recover, roll back, version, upgrade, etc.</a:t>
+              <a:t>Recover, roll back, version, upgrade, </a:t>
             </a:r>
+            <a:r>
+              <a:rPr lang="mr-IN" sz="1800" dirty="0" smtClean="0">
+                <a:latin typeface="Arial"/>
+                <a:ea typeface="Arial"/>
+                <a:cs typeface="Arial"/>
+                <a:sym typeface="Arial"/>
+              </a:rPr>
+              <a:t>…</a:t>
+            </a:r>
+            <a:endParaRPr lang="en" sz="1800" b="0" i="0" u="none" strike="noStrike" cap="none" dirty="0">
+              <a:solidFill>
+                <a:schemeClr val="dk1"/>
+              </a:solidFill>
+              <a:latin typeface="Arial"/>
+              <a:ea typeface="Arial"/>
+              <a:cs typeface="Arial"/>
+              <a:sym typeface="Arial"/>
+            </a:endParaRPr>
           </a:p>
         </p:txBody>
       </p:sp>
@@ -51849,7 +52676,7 @@
                 <a:cs typeface="Avenir"/>
                 <a:sym typeface="Avenir"/>
               </a:rPr>
-              <a:t>5</a:t>
+              <a:t>6</a:t>
             </a:fld>
             <a:endParaRPr lang="en" sz="1200" b="0" i="0" u="none" strike="noStrike" cap="none">
               <a:solidFill>
@@ -52416,10 +53243,17 @@
   <p:clrMapOvr>
     <a:masterClrMapping/>
   </p:clrMapOvr>
+  <p:timing>
+    <p:tnLst>
+      <p:par>
+        <p:cTn id="1" dur="indefinite" restart="never" nodeType="tmRoot"/>
+      </p:par>
+    </p:tnLst>
+  </p:timing>
 </p:sld>
 </file>
 
-<file path=ppt/slides/slide6.xml><?xml version="1.0" encoding="utf-8"?>
+<file path=ppt/slides/slide7.xml><?xml version="1.0" encoding="utf-8"?>
 <p:sld xmlns:a="http://schemas.openxmlformats.org/drawingml/2006/main" xmlns:r="http://schemas.openxmlformats.org/officeDocument/2006/relationships" xmlns:p="http://schemas.openxmlformats.org/presentationml/2006/main">
   <p:cSld>
     <p:spTree>
@@ -52544,7 +53378,7 @@
               <a:buChar char="▪"/>
             </a:pPr>
             <a:r>
-              <a:rPr lang="en" sz="2240" b="0" i="0" u="none" strike="noStrike" cap="none" dirty="0" smtClean="0">
+              <a:rPr lang="en-US" sz="2240" b="0" i="0" u="none" strike="noStrike" cap="none" dirty="0" smtClean="0">
                 <a:solidFill>
                   <a:schemeClr val="dk1"/>
                 </a:solidFill>
@@ -52553,8 +53387,17 @@
                 <a:cs typeface="Arial"/>
                 <a:sym typeface="Arial"/>
               </a:rPr>
-              <a:t>Data records associated with timestamps (time series data)</a:t>
+              <a:t>Makes the time dimension of data explicit</a:t>
             </a:r>
+            <a:endParaRPr lang="en" sz="2240" b="0" i="0" u="none" strike="noStrike" cap="none" dirty="0" smtClean="0">
+              <a:solidFill>
+                <a:schemeClr val="dk1"/>
+              </a:solidFill>
+              <a:latin typeface="Arial"/>
+              <a:ea typeface="Arial"/>
+              <a:cs typeface="Arial"/>
+              <a:sym typeface="Arial"/>
+            </a:endParaRPr>
           </a:p>
           <a:p>
             <a:pPr marL="2514600" marR="0" lvl="5" indent="-228600" algn="l" rtl="0">
@@ -52777,7 +53620,7 @@
                 <a:cs typeface="Avenir"/>
                 <a:sym typeface="Avenir"/>
               </a:rPr>
-              <a:t>6</a:t>
+              <a:t>7</a:t>
             </a:fld>
             <a:endParaRPr lang="en" sz="1200" b="0" i="0" u="none" strike="noStrike" cap="none">
               <a:solidFill>
@@ -53641,10 +54484,17 @@
   <p:clrMapOvr>
     <a:masterClrMapping/>
   </p:clrMapOvr>
+  <p:timing>
+    <p:tnLst>
+      <p:par>
+        <p:cTn id="1" dur="indefinite" restart="never" nodeType="tmRoot"/>
+      </p:par>
+    </p:tnLst>
+  </p:timing>
 </p:sld>
 </file>
 
-<file path=ppt/slides/slide7.xml><?xml version="1.0" encoding="utf-8"?>
+<file path=ppt/slides/slide8.xml><?xml version="1.0" encoding="utf-8"?>
 <p:sld xmlns:a="http://schemas.openxmlformats.org/drawingml/2006/main" xmlns:r="http://schemas.openxmlformats.org/officeDocument/2006/relationships" xmlns:p="http://schemas.openxmlformats.org/presentationml/2006/main">
   <p:cSld>
     <p:spTree>
@@ -53707,7 +54557,7 @@
                 <a:cs typeface="Avenir"/>
                 <a:sym typeface="Avenir"/>
               </a:rPr>
-              <a:t>7</a:t>
+              <a:t>8</a:t>
             </a:fld>
             <a:endParaRPr lang="en" sz="1200" b="0" i="0" u="none" strike="noStrike" cap="none">
               <a:solidFill>
@@ -55041,10 +55891,17 @@
   <p:clrMapOvr>
     <a:masterClrMapping/>
   </p:clrMapOvr>
+  <p:timing>
+    <p:tnLst>
+      <p:par>
+        <p:cTn id="1" dur="indefinite" restart="never" nodeType="tmRoot"/>
+      </p:par>
+    </p:tnLst>
+  </p:timing>
 </p:sld>
 </file>
 
-<file path=ppt/slides/slide8.xml><?xml version="1.0" encoding="utf-8"?>
+<file path=ppt/slides/slide9.xml><?xml version="1.0" encoding="utf-8"?>
 <p:sld xmlns:a="http://schemas.openxmlformats.org/drawingml/2006/main" xmlns:r="http://schemas.openxmlformats.org/officeDocument/2006/relationships" xmlns:p="http://schemas.openxmlformats.org/presentationml/2006/main">
   <p:cSld>
     <p:spTree>
@@ -55154,7 +56011,7 @@
                 <a:cs typeface="Arial"/>
                 <a:sym typeface="Arial"/>
               </a:rPr>
-              <a:t>8</a:t>
+              <a:t>9</a:t>
             </a:fld>
             <a:endParaRPr lang="en" sz="1200">
               <a:solidFill>
@@ -55664,228 +56521,13 @@
   <p:clrMapOvr>
     <a:masterClrMapping/>
   </p:clrMapOvr>
-</p:sld>
-</file>
-
-<file path=ppt/slides/slide9.xml><?xml version="1.0" encoding="utf-8"?>
-<p:sld xmlns:a="http://schemas.openxmlformats.org/drawingml/2006/main" xmlns:r="http://schemas.openxmlformats.org/officeDocument/2006/relationships" xmlns:p="http://schemas.openxmlformats.org/presentationml/2006/main">
-  <p:cSld>
-    <p:spTree>
-      <p:nvGrpSpPr>
-        <p:cNvPr id="1" name="Shape 504"/>
-        <p:cNvGrpSpPr/>
-        <p:nvPr/>
-      </p:nvGrpSpPr>
-      <p:grpSpPr>
-        <a:xfrm>
-          <a:off x="0" y="0"/>
-          <a:ext cx="0" cy="0"/>
-          <a:chOff x="0" y="0"/>
-          <a:chExt cx="0" cy="0"/>
-        </a:xfrm>
-      </p:grpSpPr>
-      <p:sp>
-        <p:nvSpPr>
-          <p:cNvPr id="505" name="Shape 505"/>
-          <p:cNvSpPr txBox="1">
-            <a:spLocks noGrp="1"/>
-          </p:cNvSpPr>
-          <p:nvPr>
-            <p:ph type="title"/>
-          </p:nvPr>
-        </p:nvSpPr>
-        <p:spPr>
-          <a:xfrm>
-            <a:off x="457222" y="274651"/>
-            <a:ext cx="7474800" cy="898500"/>
-          </a:xfrm>
-          <a:prstGeom prst="rect">
-            <a:avLst/>
-          </a:prstGeom>
-        </p:spPr>
-        <p:txBody>
-          <a:bodyPr lIns="91425" tIns="91425" rIns="91425" bIns="91425" anchor="ctr" anchorCtr="0">
-            <a:noAutofit/>
-          </a:bodyPr>
-          <a:lstStyle/>
-          <a:p>
-            <a:pPr lvl="0">
-              <a:spcBef>
-                <a:spcPts val="0"/>
-              </a:spcBef>
-              <a:buNone/>
-            </a:pPr>
-            <a:r>
-              <a:rPr lang="en" sz="3600" b="0" dirty="0">
-                <a:latin typeface="Arial"/>
-                <a:ea typeface="Arial"/>
-                <a:cs typeface="Arial"/>
-                <a:sym typeface="Arial"/>
-              </a:rPr>
-              <a:t>Benefits of a streaming architecture</a:t>
-            </a:r>
-          </a:p>
-        </p:txBody>
-      </p:sp>
-      <p:sp>
-        <p:nvSpPr>
-          <p:cNvPr id="506" name="Shape 506"/>
-          <p:cNvSpPr txBox="1">
-            <a:spLocks noGrp="1"/>
-          </p:cNvSpPr>
-          <p:nvPr>
-            <p:ph type="body" idx="1"/>
-          </p:nvPr>
-        </p:nvSpPr>
-        <p:spPr>
-          <a:xfrm>
-            <a:off x="457200" y="1474375"/>
-            <a:ext cx="8229600" cy="4651800"/>
-          </a:xfrm>
-          <a:prstGeom prst="rect">
-            <a:avLst/>
-          </a:prstGeom>
-          <a:noFill/>
-          <a:ln>
-            <a:noFill/>
-          </a:ln>
-        </p:spPr>
-        <p:txBody>
-          <a:bodyPr lIns="91425" tIns="45700" rIns="91425" bIns="45700" anchor="t" anchorCtr="0">
-            <a:noAutofit/>
-          </a:bodyPr>
-          <a:lstStyle/>
-          <a:p>
-            <a:pPr marL="342900" marR="0" lvl="0" indent="-342900" algn="l" rtl="0">
-              <a:lnSpc>
-                <a:spcPct val="115000"/>
-              </a:lnSpc>
-              <a:spcBef>
-                <a:spcPts val="0"/>
-              </a:spcBef>
-              <a:spcAft>
-                <a:spcPts val="0"/>
-              </a:spcAft>
-              <a:buClr>
-                <a:srgbClr val="34AD91"/>
-              </a:buClr>
-              <a:buSzPct val="100000"/>
-              <a:buFont typeface="Arial"/>
-              <a:buChar char="▪"/>
-            </a:pPr>
-            <a:r>
-              <a:rPr lang="en" dirty="0">
-                <a:latin typeface="Arial"/>
-                <a:ea typeface="Arial"/>
-                <a:cs typeface="Arial"/>
-                <a:sym typeface="Arial"/>
-              </a:rPr>
-              <a:t>More real-time reaction to events</a:t>
-            </a:r>
-          </a:p>
-          <a:p>
-            <a:pPr marL="342900" marR="0" lvl="0" indent="-342900" algn="l" rtl="0">
-              <a:lnSpc>
-                <a:spcPct val="115000"/>
-              </a:lnSpc>
-              <a:spcBef>
-                <a:spcPts val="640"/>
-              </a:spcBef>
-              <a:spcAft>
-                <a:spcPts val="0"/>
-              </a:spcAft>
-              <a:buClr>
-                <a:srgbClr val="34AD91"/>
-              </a:buClr>
-              <a:buSzPct val="100000"/>
-              <a:buFont typeface="Arial"/>
-              <a:buChar char="▪"/>
-            </a:pPr>
-            <a:r>
-              <a:rPr lang="en" dirty="0">
-                <a:latin typeface="Arial"/>
-                <a:ea typeface="Arial"/>
-                <a:cs typeface="Arial"/>
-                <a:sym typeface="Arial"/>
-              </a:rPr>
-              <a:t>Robust continuous applications</a:t>
-            </a:r>
-          </a:p>
-          <a:p>
-            <a:pPr marR="0" lvl="1" indent="-347472" algn="l" rtl="0">
-              <a:lnSpc>
-                <a:spcPct val="115000"/>
-              </a:lnSpc>
-              <a:spcBef>
-                <a:spcPts val="640"/>
-              </a:spcBef>
-              <a:spcAft>
-                <a:spcPts val="0"/>
-              </a:spcAft>
-              <a:buFont typeface="Arial"/>
-            </a:pPr>
-            <a:r>
-              <a:rPr lang="en" dirty="0">
-                <a:latin typeface="Arial"/>
-                <a:ea typeface="Arial"/>
-                <a:cs typeface="Arial"/>
-                <a:sym typeface="Arial"/>
-              </a:rPr>
-              <a:t>Continuous batch apps are duck-taped together from many tools</a:t>
-            </a:r>
-          </a:p>
-          <a:p>
-            <a:pPr marL="342900" marR="0" lvl="0" indent="-342900" algn="l" rtl="0">
-              <a:lnSpc>
-                <a:spcPct val="115000"/>
-              </a:lnSpc>
-              <a:spcBef>
-                <a:spcPts val="640"/>
-              </a:spcBef>
-              <a:buClr>
-                <a:srgbClr val="34AD91"/>
-              </a:buClr>
-              <a:buSzPct val="100000"/>
-              <a:buFont typeface="Arial"/>
-              <a:buChar char="▪"/>
-            </a:pPr>
-            <a:r>
-              <a:rPr lang="en" dirty="0">
-                <a:latin typeface="Arial"/>
-                <a:ea typeface="Arial"/>
-                <a:cs typeface="Arial"/>
-                <a:sym typeface="Arial"/>
-              </a:rPr>
-              <a:t>Process both real-time and historical data</a:t>
-            </a:r>
-          </a:p>
-          <a:p>
-            <a:pPr marR="0" lvl="1" indent="-347472" algn="l" rtl="0">
-              <a:lnSpc>
-                <a:spcPct val="115000"/>
-              </a:lnSpc>
-              <a:spcBef>
-                <a:spcPts val="640"/>
-              </a:spcBef>
-              <a:buFont typeface="Arial"/>
-            </a:pPr>
-            <a:r>
-              <a:rPr lang="en" dirty="0">
-                <a:latin typeface="Arial"/>
-                <a:ea typeface="Arial"/>
-                <a:cs typeface="Arial"/>
-                <a:sym typeface="Arial"/>
-              </a:rPr>
-              <a:t>Using exactly the same application</a:t>
-            </a:r>
-          </a:p>
-        </p:txBody>
-      </p:sp>
-    </p:spTree>
-  </p:cSld>
-  <p:clrMapOvr>
-    <a:masterClrMapping/>
-  </p:clrMapOvr>
+  <p:timing>
+    <p:tnLst>
+      <p:par>
+        <p:cTn id="1" dur="indefinite" restart="never" nodeType="tmRoot"/>
+      </p:par>
+    </p:tnLst>
+  </p:timing>
 </p:sld>
 </file>
 

</xml_diff>